<commit_message>
add rpc article on presentation
</commit_message>
<xml_diff>
--- a/presentation_en/pres.pptx
+++ b/presentation_en/pres.pptx
@@ -5,10 +5,10 @@
     <p:sldMasterId id="2147483664" r:id="rId1"/>
   </p:sldMasterIdLst>
   <p:notesMasterIdLst>
-    <p:notesMasterId r:id="rId15"/>
+    <p:notesMasterId r:id="rId20"/>
   </p:notesMasterIdLst>
   <p:handoutMasterIdLst>
-    <p:handoutMasterId r:id="rId16"/>
+    <p:handoutMasterId r:id="rId21"/>
   </p:handoutMasterIdLst>
   <p:sldIdLst>
     <p:sldId id="256" r:id="rId2"/>
@@ -24,6 +24,11 @@
     <p:sldId id="267" r:id="rId12"/>
     <p:sldId id="268" r:id="rId13"/>
     <p:sldId id="269" r:id="rId14"/>
+    <p:sldId id="270" r:id="rId15"/>
+    <p:sldId id="271" r:id="rId16"/>
+    <p:sldId id="272" r:id="rId17"/>
+    <p:sldId id="274" r:id="rId18"/>
+    <p:sldId id="273" r:id="rId19"/>
   </p:sldIdLst>
   <p:sldSz cx="9144000" cy="6858000" type="screen4x3"/>
   <p:notesSz cx="6743700" cy="9880600"/>
@@ -3681,14 +3686,7 @@
                 <a:latin typeface="+mn-lt"/>
                 <a:ea typeface="+mn-ea"/>
               </a:rPr>
-              <a:t> </a:t>
-            </a:r>
-            <a:r>
-              <a:rPr lang="en-US" sz="1800" b="0" kern="0" dirty="0" smtClean="0">
-                <a:latin typeface="+mn-lt"/>
-                <a:ea typeface="+mn-ea"/>
-              </a:rPr>
-              <a:t>   stack</a:t>
+              <a:t>    stack</a:t>
             </a:r>
             <a:endParaRPr kumimoji="0" lang="en-US" sz="1800" b="0" i="0" u="none" strike="noStrike" kern="0" cap="none" spc="0" normalizeH="0" baseline="0" noProof="0" dirty="0" smtClean="0">
               <a:ln>
@@ -4094,18 +4092,30 @@
             </a:r>
             <a:r>
               <a:rPr lang="en-US" dirty="0" smtClean="0"/>
-              <a:t> server:</a:t>
+              <a:t> server</a:t>
+            </a:r>
+            <a:r>
+              <a:rPr lang="en-US" dirty="0" smtClean="0"/>
+              <a:t>:</a:t>
             </a:r>
           </a:p>
           <a:p>
             <a:pPr lvl="1"/>
             <a:r>
+              <a:rPr lang="en-US" dirty="0" smtClean="0"/>
+              <a:t>Based on Tornado </a:t>
+            </a:r>
+            <a:r>
+              <a:rPr lang="en-US" dirty="0" err="1" smtClean="0"/>
+              <a:t>webserver</a:t>
+            </a:r>
+            <a:endParaRPr lang="en-US" dirty="0" smtClean="0"/>
+          </a:p>
+          <a:p>
+            <a:pPr lvl="1"/>
+            <a:r>
               <a:rPr lang="fr-FR" i="1" dirty="0" smtClean="0"/>
-              <a:t>ws://sockets.mbed.org/ws</a:t>
-            </a:r>
-            <a:r>
-              <a:rPr lang="fr-FR" i="1" dirty="0" smtClean="0"/>
-              <a:t>/</a:t>
+              <a:t>ws://sockets.mbed.org/ws/</a:t>
             </a:r>
             <a:r>
               <a:rPr lang="fr-FR" i="1" dirty="0" smtClean="0">
@@ -4125,15 +4135,7 @@
                   <a:schemeClr val="accent3"/>
                 </a:solidFill>
               </a:rPr>
-              <a:t>&lt;</a:t>
-            </a:r>
-            <a:r>
-              <a:rPr lang="fr-FR" i="1" dirty="0" smtClean="0">
-                <a:solidFill>
-                  <a:schemeClr val="accent3"/>
-                </a:solidFill>
-              </a:rPr>
-              <a:t>mode&gt;</a:t>
+              <a:t>&lt;mode&gt;</a:t>
             </a:r>
             <a:endParaRPr lang="en-US" i="1" dirty="0" smtClean="0">
               <a:solidFill>
@@ -4363,6 +4365,2577 @@
 </p:sld>
 </file>
 
+<file path=ppt/slides/slide14.xml><?xml version="1.0" encoding="utf-8"?>
+<p:sld xmlns:a="http://schemas.openxmlformats.org/drawingml/2006/main" xmlns:r="http://schemas.openxmlformats.org/officeDocument/2006/relationships" xmlns:p="http://schemas.openxmlformats.org/presentationml/2006/main">
+  <p:cSld>
+    <p:spTree>
+      <p:nvGrpSpPr>
+        <p:cNvPr id="1" name=""/>
+        <p:cNvGrpSpPr/>
+        <p:nvPr/>
+      </p:nvGrpSpPr>
+      <p:grpSpPr>
+        <a:xfrm>
+          <a:off x="0" y="0"/>
+          <a:ext cx="0" cy="0"/>
+          <a:chOff x="0" y="0"/>
+          <a:chExt cx="0" cy="0"/>
+        </a:xfrm>
+      </p:grpSpPr>
+      <p:sp>
+        <p:nvSpPr>
+          <p:cNvPr id="2" name="Titre 1"/>
+          <p:cNvSpPr>
+            <a:spLocks noGrp="1"/>
+          </p:cNvSpPr>
+          <p:nvPr>
+            <p:ph type="title"/>
+          </p:nvPr>
+        </p:nvSpPr>
+        <p:spPr/>
+        <p:txBody>
+          <a:bodyPr/>
+          <a:lstStyle/>
+          <a:p>
+            <a:r>
+              <a:rPr lang="en-US" dirty="0" smtClean="0"/>
+              <a:t>IOT: RPC over </a:t>
+            </a:r>
+            <a:r>
+              <a:rPr lang="en-US" dirty="0" err="1" smtClean="0"/>
+              <a:t>WebSockets</a:t>
+            </a:r>
+            <a:endParaRPr lang="en-US" dirty="0"/>
+          </a:p>
+        </p:txBody>
+      </p:sp>
+      <p:sp>
+        <p:nvSpPr>
+          <p:cNvPr id="3" name="Espace réservé du contenu 2"/>
+          <p:cNvSpPr>
+            <a:spLocks noGrp="1"/>
+          </p:cNvSpPr>
+          <p:nvPr>
+            <p:ph idx="1"/>
+          </p:nvPr>
+        </p:nvSpPr>
+        <p:spPr>
+          <a:xfrm>
+            <a:off x="206977" y="1263816"/>
+            <a:ext cx="8775700" cy="1374282"/>
+          </a:xfrm>
+        </p:spPr>
+        <p:txBody>
+          <a:bodyPr/>
+          <a:lstStyle/>
+          <a:p>
+            <a:r>
+              <a:rPr lang="en-US" dirty="0" smtClean="0"/>
+              <a:t>Objectives:</a:t>
+            </a:r>
+          </a:p>
+          <a:p>
+            <a:pPr lvl="1"/>
+            <a:r>
+              <a:rPr lang="en-US" dirty="0" smtClean="0"/>
+              <a:t>Execute a method on a distant method from another </a:t>
+            </a:r>
+            <a:r>
+              <a:rPr lang="en-US" dirty="0" err="1" smtClean="0"/>
+              <a:t>mbed</a:t>
+            </a:r>
+            <a:endParaRPr lang="en-US" dirty="0" smtClean="0"/>
+          </a:p>
+          <a:p>
+            <a:pPr lvl="1"/>
+            <a:r>
+              <a:rPr lang="en-US" dirty="0" err="1" smtClean="0"/>
+              <a:t>WebSocket</a:t>
+            </a:r>
+            <a:r>
+              <a:rPr lang="en-US" dirty="0" smtClean="0"/>
+              <a:t> communication</a:t>
+            </a:r>
+            <a:endParaRPr lang="en-US" dirty="0"/>
+          </a:p>
+        </p:txBody>
+      </p:sp>
+      <p:sp>
+        <p:nvSpPr>
+          <p:cNvPr id="5" name="Espace réservé du contenu 2"/>
+          <p:cNvSpPr txBox="1">
+            <a:spLocks/>
+          </p:cNvSpPr>
+          <p:nvPr/>
+        </p:nvSpPr>
+        <p:spPr bwMode="auto">
+          <a:xfrm>
+            <a:off x="222743" y="3013789"/>
+            <a:ext cx="8775700" cy="1374282"/>
+          </a:xfrm>
+          <a:prstGeom prst="rect">
+            <a:avLst/>
+          </a:prstGeom>
+          <a:noFill/>
+          <a:ln w="9525">
+            <a:noFill/>
+            <a:miter lim="800000"/>
+            <a:headEnd/>
+            <a:tailEnd/>
+          </a:ln>
+          <a:effectLst/>
+        </p:spPr>
+        <p:txBody>
+          <a:bodyPr vert="horz" wrap="square" lIns="91440" tIns="45720" rIns="91440" bIns="45720" numCol="1" anchor="t" anchorCtr="0" compatLnSpc="1">
+            <a:prstTxWarp prst="textNoShape">
+              <a:avLst/>
+            </a:prstTxWarp>
+          </a:bodyPr>
+          <a:lstStyle/>
+          <a:p>
+            <a:pPr marL="265113" marR="0" lvl="0" indent="-265113" algn="l" defTabSz="914400" rtl="0" eaLnBrk="1" fontAlgn="ctr" latinLnBrk="0" hangingPunct="1">
+              <a:lnSpc>
+                <a:spcPct val="100000"/>
+              </a:lnSpc>
+              <a:spcBef>
+                <a:spcPct val="25000"/>
+              </a:spcBef>
+              <a:spcAft>
+                <a:spcPct val="0"/>
+              </a:spcAft>
+              <a:buClr>
+                <a:schemeClr val="accent1"/>
+              </a:buClr>
+              <a:buSzPct val="125000"/>
+              <a:buFont typeface="Wingdings" pitchFamily="2" charset="2"/>
+              <a:buChar char="§"/>
+              <a:tabLst/>
+              <a:defRPr/>
+            </a:pPr>
+            <a:r>
+              <a:rPr kumimoji="0" lang="en-US" sz="2400" b="0" i="0" u="none" strike="noStrike" kern="0" cap="none" spc="0" normalizeH="0" baseline="0" noProof="0" dirty="0" smtClean="0">
+                <a:ln>
+                  <a:noFill/>
+                </a:ln>
+                <a:solidFill>
+                  <a:srgbClr val="000000"/>
+                </a:solidFill>
+                <a:effectLst/>
+                <a:uLnTx/>
+                <a:uFillTx/>
+                <a:latin typeface="+mn-lt"/>
+                <a:ea typeface="+mn-ea"/>
+                <a:cs typeface="+mn-cs"/>
+              </a:rPr>
+              <a:t>Application</a:t>
+            </a:r>
+            <a:r>
+              <a:rPr kumimoji="0" lang="en-US" sz="2400" b="0" i="0" u="none" strike="noStrike" kern="0" cap="none" spc="0" normalizeH="0" noProof="0" dirty="0" smtClean="0">
+                <a:ln>
+                  <a:noFill/>
+                </a:ln>
+                <a:solidFill>
+                  <a:srgbClr val="000000"/>
+                </a:solidFill>
+                <a:effectLst/>
+                <a:uLnTx/>
+                <a:uFillTx/>
+                <a:latin typeface="+mn-lt"/>
+                <a:ea typeface="+mn-ea"/>
+                <a:cs typeface="+mn-cs"/>
+              </a:rPr>
+              <a:t> examples</a:t>
+            </a:r>
+            <a:r>
+              <a:rPr kumimoji="0" lang="en-US" sz="2400" b="0" i="0" u="none" strike="noStrike" kern="0" cap="none" spc="0" normalizeH="0" baseline="0" noProof="0" dirty="0" smtClean="0">
+                <a:ln>
+                  <a:noFill/>
+                </a:ln>
+                <a:solidFill>
+                  <a:srgbClr val="000000"/>
+                </a:solidFill>
+                <a:effectLst/>
+                <a:uLnTx/>
+                <a:uFillTx/>
+                <a:latin typeface="+mn-lt"/>
+                <a:ea typeface="+mn-ea"/>
+                <a:cs typeface="+mn-cs"/>
+              </a:rPr>
+              <a:t>:</a:t>
+            </a:r>
+          </a:p>
+          <a:p>
+            <a:pPr marL="722313" marR="0" lvl="1" indent="-277813" algn="l" defTabSz="914400" rtl="0" eaLnBrk="1" fontAlgn="ctr" latinLnBrk="0" hangingPunct="1">
+              <a:lnSpc>
+                <a:spcPct val="100000"/>
+              </a:lnSpc>
+              <a:spcBef>
+                <a:spcPct val="25000"/>
+              </a:spcBef>
+              <a:spcAft>
+                <a:spcPct val="0"/>
+              </a:spcAft>
+              <a:buClr>
+                <a:schemeClr val="accent1"/>
+              </a:buClr>
+              <a:buSzPct val="125000"/>
+              <a:buFont typeface="Wingdings" pitchFamily="2" charset="2"/>
+              <a:buChar char="§"/>
+              <a:tabLst/>
+              <a:defRPr/>
+            </a:pPr>
+            <a:r>
+              <a:rPr lang="en-US" sz="2000" b="0" kern="0" dirty="0" smtClean="0">
+                <a:latin typeface="+mn-lt"/>
+              </a:rPr>
+              <a:t>Handle remotely a whole system</a:t>
+            </a:r>
+          </a:p>
+          <a:p>
+            <a:pPr marL="1179513" lvl="2" indent="-277813" algn="l" fontAlgn="ctr">
+              <a:spcBef>
+                <a:spcPct val="25000"/>
+              </a:spcBef>
+              <a:buClr>
+                <a:schemeClr val="accent1"/>
+              </a:buClr>
+              <a:buSzPct val="125000"/>
+              <a:buFont typeface="Wingdings" pitchFamily="2" charset="2"/>
+              <a:buChar char="§"/>
+            </a:pPr>
+            <a:r>
+              <a:rPr kumimoji="0" lang="en-US" sz="2000" b="0" i="0" u="none" strike="noStrike" kern="0" cap="none" spc="0" normalizeH="0" baseline="0" noProof="0" dirty="0" smtClean="0">
+                <a:ln>
+                  <a:noFill/>
+                </a:ln>
+                <a:solidFill>
+                  <a:srgbClr val="000000"/>
+                </a:solidFill>
+                <a:effectLst/>
+                <a:uLnTx/>
+                <a:uFillTx/>
+                <a:latin typeface="+mn-lt"/>
+              </a:rPr>
+              <a:t>Medical</a:t>
+            </a:r>
+            <a:r>
+              <a:rPr kumimoji="0" lang="en-US" sz="2000" b="0" i="0" u="none" strike="noStrike" kern="0" cap="none" spc="0" normalizeH="0" noProof="0" dirty="0" smtClean="0">
+                <a:ln>
+                  <a:noFill/>
+                </a:ln>
+                <a:solidFill>
+                  <a:srgbClr val="000000"/>
+                </a:solidFill>
+                <a:effectLst/>
+                <a:uLnTx/>
+                <a:uFillTx/>
+                <a:latin typeface="+mn-lt"/>
+              </a:rPr>
+              <a:t> applications</a:t>
+            </a:r>
+          </a:p>
+          <a:p>
+            <a:pPr marL="1179513" lvl="2" indent="-277813" algn="l" fontAlgn="ctr">
+              <a:spcBef>
+                <a:spcPct val="25000"/>
+              </a:spcBef>
+              <a:buClr>
+                <a:schemeClr val="accent1"/>
+              </a:buClr>
+              <a:buSzPct val="125000"/>
+              <a:buFont typeface="Wingdings" pitchFamily="2" charset="2"/>
+              <a:buChar char="§"/>
+            </a:pPr>
+            <a:r>
+              <a:rPr lang="en-US" sz="2000" b="0" kern="0" noProof="0" dirty="0" smtClean="0">
+                <a:latin typeface="+mn-lt"/>
+              </a:rPr>
+              <a:t>Not easy to access space</a:t>
+            </a:r>
+            <a:endParaRPr kumimoji="0" lang="en-US" sz="2000" b="0" i="0" u="none" strike="noStrike" kern="0" cap="none" spc="0" normalizeH="0" baseline="0" noProof="0" dirty="0" smtClean="0">
+              <a:ln>
+                <a:noFill/>
+              </a:ln>
+              <a:solidFill>
+                <a:srgbClr val="000000"/>
+              </a:solidFill>
+              <a:effectLst/>
+              <a:uLnTx/>
+              <a:uFillTx/>
+              <a:latin typeface="+mn-lt"/>
+            </a:endParaRPr>
+          </a:p>
+          <a:p>
+            <a:pPr marL="722313" marR="0" lvl="1" indent="-277813" algn="l" defTabSz="914400" rtl="0" eaLnBrk="1" fontAlgn="ctr" latinLnBrk="0" hangingPunct="1">
+              <a:lnSpc>
+                <a:spcPct val="100000"/>
+              </a:lnSpc>
+              <a:spcBef>
+                <a:spcPct val="25000"/>
+              </a:spcBef>
+              <a:spcAft>
+                <a:spcPct val="0"/>
+              </a:spcAft>
+              <a:buClr>
+                <a:schemeClr val="accent1"/>
+              </a:buClr>
+              <a:buSzPct val="125000"/>
+              <a:buFont typeface="Wingdings" pitchFamily="2" charset="2"/>
+              <a:buChar char="§"/>
+              <a:tabLst/>
+              <a:defRPr/>
+            </a:pPr>
+            <a:endParaRPr kumimoji="0" lang="en-US" sz="2000" b="0" i="0" u="none" strike="noStrike" kern="0" cap="none" spc="0" normalizeH="0" baseline="0" noProof="0" dirty="0">
+              <a:ln>
+                <a:noFill/>
+              </a:ln>
+              <a:solidFill>
+                <a:srgbClr val="000000"/>
+              </a:solidFill>
+              <a:effectLst/>
+              <a:uLnTx/>
+              <a:uFillTx/>
+              <a:latin typeface="+mn-lt"/>
+            </a:endParaRPr>
+          </a:p>
+        </p:txBody>
+      </p:sp>
+    </p:spTree>
+  </p:cSld>
+  <p:clrMapOvr>
+    <a:masterClrMapping/>
+  </p:clrMapOvr>
+  <p:timing>
+    <p:tnLst>
+      <p:par>
+        <p:cTn id="1" dur="indefinite" restart="never" nodeType="tmRoot"/>
+      </p:par>
+    </p:tnLst>
+  </p:timing>
+</p:sld>
+</file>
+
+<file path=ppt/slides/slide15.xml><?xml version="1.0" encoding="utf-8"?>
+<p:sld xmlns:a="http://schemas.openxmlformats.org/drawingml/2006/main" xmlns:r="http://schemas.openxmlformats.org/officeDocument/2006/relationships" xmlns:p="http://schemas.openxmlformats.org/presentationml/2006/main">
+  <p:cSld>
+    <p:spTree>
+      <p:nvGrpSpPr>
+        <p:cNvPr id="1" name=""/>
+        <p:cNvGrpSpPr/>
+        <p:nvPr/>
+      </p:nvGrpSpPr>
+      <p:grpSpPr>
+        <a:xfrm>
+          <a:off x="0" y="0"/>
+          <a:ext cx="0" cy="0"/>
+          <a:chOff x="0" y="0"/>
+          <a:chExt cx="0" cy="0"/>
+        </a:xfrm>
+      </p:grpSpPr>
+      <p:sp>
+        <p:nvSpPr>
+          <p:cNvPr id="2" name="Titre 1"/>
+          <p:cNvSpPr>
+            <a:spLocks noGrp="1"/>
+          </p:cNvSpPr>
+          <p:nvPr>
+            <p:ph type="title"/>
+          </p:nvPr>
+        </p:nvSpPr>
+        <p:spPr/>
+        <p:txBody>
+          <a:bodyPr/>
+          <a:lstStyle/>
+          <a:p>
+            <a:r>
+              <a:rPr lang="en-US" dirty="0" smtClean="0"/>
+              <a:t>IOT: RPC over </a:t>
+            </a:r>
+            <a:r>
+              <a:rPr lang="en-US" dirty="0" err="1" smtClean="0"/>
+              <a:t>WebSockets</a:t>
+            </a:r>
+            <a:endParaRPr lang="en-US" dirty="0"/>
+          </a:p>
+        </p:txBody>
+      </p:sp>
+      <p:pic>
+        <p:nvPicPr>
+          <p:cNvPr id="1026" name="Picture 2" descr="C:\Users\samux\Desktop\ARM-internship-report\report\rpc-1.jpg"/>
+          <p:cNvPicPr>
+            <a:picLocks noChangeAspect="1" noChangeArrowheads="1"/>
+          </p:cNvPicPr>
+          <p:nvPr/>
+        </p:nvPicPr>
+        <p:blipFill>
+          <a:blip r:embed="rId2"/>
+          <a:srcRect/>
+          <a:stretch>
+            <a:fillRect/>
+          </a:stretch>
+        </p:blipFill>
+        <p:spPr bwMode="auto">
+          <a:xfrm>
+            <a:off x="1186775" y="846291"/>
+            <a:ext cx="3879209" cy="5482963"/>
+          </a:xfrm>
+          <a:prstGeom prst="rect">
+            <a:avLst/>
+          </a:prstGeom>
+          <a:noFill/>
+        </p:spPr>
+      </p:pic>
+      <p:sp>
+        <p:nvSpPr>
+          <p:cNvPr id="3" name="Espace réservé du contenu 2"/>
+          <p:cNvSpPr>
+            <a:spLocks noGrp="1"/>
+          </p:cNvSpPr>
+          <p:nvPr>
+            <p:ph idx="1"/>
+          </p:nvPr>
+        </p:nvSpPr>
+        <p:spPr>
+          <a:xfrm>
+            <a:off x="217488" y="906463"/>
+            <a:ext cx="8775700" cy="575496"/>
+          </a:xfrm>
+        </p:spPr>
+        <p:txBody>
+          <a:bodyPr/>
+          <a:lstStyle/>
+          <a:p>
+            <a:r>
+              <a:rPr lang="en-US" dirty="0" smtClean="0"/>
+              <a:t>Architecture:</a:t>
+            </a:r>
+            <a:endParaRPr lang="en-US" dirty="0"/>
+          </a:p>
+        </p:txBody>
+      </p:sp>
+      <p:sp>
+        <p:nvSpPr>
+          <p:cNvPr id="6" name="Espace réservé du contenu 2"/>
+          <p:cNvSpPr txBox="1">
+            <a:spLocks/>
+          </p:cNvSpPr>
+          <p:nvPr/>
+        </p:nvSpPr>
+        <p:spPr bwMode="auto">
+          <a:xfrm>
+            <a:off x="5204646" y="2456740"/>
+            <a:ext cx="3939354" cy="1978626"/>
+          </a:xfrm>
+          <a:prstGeom prst="rect">
+            <a:avLst/>
+          </a:prstGeom>
+          <a:noFill/>
+          <a:ln w="9525">
+            <a:noFill/>
+            <a:miter lim="800000"/>
+            <a:headEnd/>
+            <a:tailEnd/>
+          </a:ln>
+          <a:effectLst/>
+        </p:spPr>
+        <p:txBody>
+          <a:bodyPr vert="horz" wrap="square" lIns="91440" tIns="45720" rIns="91440" bIns="45720" numCol="1" anchor="t" anchorCtr="0" compatLnSpc="1">
+            <a:prstTxWarp prst="textNoShape">
+              <a:avLst/>
+            </a:prstTxWarp>
+          </a:bodyPr>
+          <a:lstStyle/>
+          <a:p>
+            <a:pPr marL="265113" marR="0" lvl="0" indent="-265113" algn="l" defTabSz="914400" rtl="0" eaLnBrk="1" fontAlgn="ctr" latinLnBrk="0" hangingPunct="1">
+              <a:lnSpc>
+                <a:spcPct val="100000"/>
+              </a:lnSpc>
+              <a:spcBef>
+                <a:spcPct val="25000"/>
+              </a:spcBef>
+              <a:spcAft>
+                <a:spcPct val="0"/>
+              </a:spcAft>
+              <a:buClr>
+                <a:schemeClr val="accent1"/>
+              </a:buClr>
+              <a:buSzPct val="125000"/>
+              <a:buFont typeface="Wingdings" pitchFamily="2" charset="2"/>
+              <a:buChar char="§"/>
+              <a:tabLst/>
+              <a:defRPr/>
+            </a:pPr>
+            <a:r>
+              <a:rPr lang="en-US" sz="1800" b="0" kern="0" noProof="0" dirty="0" err="1" smtClean="0">
+                <a:latin typeface="+mn-lt"/>
+                <a:ea typeface="+mn-ea"/>
+              </a:rPr>
+              <a:t>Mbed</a:t>
+            </a:r>
+            <a:r>
+              <a:rPr lang="en-US" sz="1800" b="0" kern="0" noProof="0" dirty="0" smtClean="0">
+                <a:latin typeface="+mn-lt"/>
+                <a:ea typeface="+mn-ea"/>
+              </a:rPr>
+              <a:t>(s) connected to a </a:t>
+            </a:r>
+            <a:r>
+              <a:rPr lang="en-US" sz="1800" b="0" kern="0" noProof="0" dirty="0" err="1" smtClean="0">
+                <a:latin typeface="+mn-lt"/>
+                <a:ea typeface="+mn-ea"/>
+              </a:rPr>
+              <a:t>WebSocket</a:t>
+            </a:r>
+            <a:r>
+              <a:rPr lang="en-US" sz="1800" b="0" kern="0" noProof="0" dirty="0" smtClean="0">
+                <a:latin typeface="+mn-lt"/>
+                <a:ea typeface="+mn-ea"/>
+              </a:rPr>
+              <a:t> server</a:t>
+            </a:r>
+          </a:p>
+          <a:p>
+            <a:pPr marL="265113" marR="0" lvl="0" indent="-265113" algn="l" defTabSz="914400" rtl="0" eaLnBrk="1" fontAlgn="ctr" latinLnBrk="0" hangingPunct="1">
+              <a:lnSpc>
+                <a:spcPct val="100000"/>
+              </a:lnSpc>
+              <a:spcBef>
+                <a:spcPct val="25000"/>
+              </a:spcBef>
+              <a:spcAft>
+                <a:spcPct val="0"/>
+              </a:spcAft>
+              <a:buClr>
+                <a:schemeClr val="accent1"/>
+              </a:buClr>
+              <a:buSzPct val="125000"/>
+              <a:buFont typeface="Wingdings" pitchFamily="2" charset="2"/>
+              <a:buChar char="§"/>
+              <a:tabLst/>
+              <a:defRPr/>
+            </a:pPr>
+            <a:r>
+              <a:rPr lang="en-US" sz="1800" b="0" kern="0" noProof="0" dirty="0" smtClean="0">
+                <a:latin typeface="+mn-lt"/>
+                <a:ea typeface="+mn-ea"/>
+              </a:rPr>
+              <a:t>Organization by sub-networks</a:t>
+            </a:r>
+          </a:p>
+          <a:p>
+            <a:pPr marL="265113" marR="0" lvl="0" indent="-265113" algn="l" defTabSz="914400" rtl="0" eaLnBrk="1" fontAlgn="ctr" latinLnBrk="0" hangingPunct="1">
+              <a:lnSpc>
+                <a:spcPct val="100000"/>
+              </a:lnSpc>
+              <a:spcBef>
+                <a:spcPct val="25000"/>
+              </a:spcBef>
+              <a:spcAft>
+                <a:spcPct val="0"/>
+              </a:spcAft>
+              <a:buClr>
+                <a:schemeClr val="accent1"/>
+              </a:buClr>
+              <a:buSzPct val="125000"/>
+              <a:buFont typeface="Wingdings" pitchFamily="2" charset="2"/>
+              <a:buChar char="§"/>
+              <a:tabLst/>
+              <a:defRPr/>
+            </a:pPr>
+            <a:r>
+              <a:rPr kumimoji="0" lang="en-US" sz="1800" b="0" i="0" u="none" strike="noStrike" kern="0" cap="none" spc="0" normalizeH="0" baseline="0" dirty="0" smtClean="0">
+                <a:ln>
+                  <a:noFill/>
+                </a:ln>
+                <a:solidFill>
+                  <a:srgbClr val="000000"/>
+                </a:solidFill>
+                <a:effectLst/>
+                <a:uLnTx/>
+                <a:uFillTx/>
+                <a:latin typeface="+mn-lt"/>
+                <a:ea typeface="+mn-ea"/>
+                <a:cs typeface="+mn-cs"/>
+              </a:rPr>
+              <a:t>On</a:t>
+            </a:r>
+            <a:r>
+              <a:rPr kumimoji="0" lang="en-US" sz="1800" b="0" i="0" u="none" strike="noStrike" kern="0" cap="none" spc="0" normalizeH="0" dirty="0" smtClean="0">
+                <a:ln>
+                  <a:noFill/>
+                </a:ln>
+                <a:solidFill>
+                  <a:srgbClr val="000000"/>
+                </a:solidFill>
+                <a:effectLst/>
+                <a:uLnTx/>
+                <a:uFillTx/>
+                <a:latin typeface="+mn-lt"/>
+                <a:ea typeface="+mn-ea"/>
+                <a:cs typeface="+mn-cs"/>
+              </a:rPr>
+              <a:t> each sub-network, an </a:t>
+            </a:r>
+            <a:r>
+              <a:rPr kumimoji="0" lang="en-US" sz="1800" b="0" i="0" u="none" strike="noStrike" kern="0" cap="none" spc="0" normalizeH="0" dirty="0" err="1" smtClean="0">
+                <a:ln>
+                  <a:noFill/>
+                </a:ln>
+                <a:solidFill>
+                  <a:srgbClr val="000000"/>
+                </a:solidFill>
+                <a:effectLst/>
+                <a:uLnTx/>
+                <a:uFillTx/>
+                <a:latin typeface="+mn-lt"/>
+                <a:ea typeface="+mn-ea"/>
+                <a:cs typeface="+mn-cs"/>
+              </a:rPr>
+              <a:t>mbed</a:t>
+            </a:r>
+            <a:r>
+              <a:rPr kumimoji="0" lang="en-US" sz="1800" b="0" i="0" u="none" strike="noStrike" kern="0" cap="none" spc="0" normalizeH="0" dirty="0" smtClean="0">
+                <a:ln>
+                  <a:noFill/>
+                </a:ln>
+                <a:solidFill>
+                  <a:srgbClr val="000000"/>
+                </a:solidFill>
+                <a:effectLst/>
+                <a:uLnTx/>
+                <a:uFillTx/>
+                <a:latin typeface="+mn-lt"/>
+                <a:ea typeface="+mn-ea"/>
+                <a:cs typeface="+mn-cs"/>
+              </a:rPr>
+              <a:t> must have a unique id</a:t>
+            </a:r>
+            <a:endParaRPr kumimoji="0" lang="en-US" sz="1800" b="0" i="0" u="none" strike="noStrike" kern="0" cap="none" spc="0" normalizeH="0" baseline="0" noProof="0" dirty="0" smtClean="0">
+              <a:ln>
+                <a:noFill/>
+              </a:ln>
+              <a:solidFill>
+                <a:srgbClr val="000000"/>
+              </a:solidFill>
+              <a:effectLst/>
+              <a:uLnTx/>
+              <a:uFillTx/>
+              <a:latin typeface="+mn-lt"/>
+              <a:ea typeface="+mn-ea"/>
+              <a:cs typeface="+mn-cs"/>
+            </a:endParaRPr>
+          </a:p>
+          <a:p>
+            <a:pPr marL="265113" marR="0" lvl="0" indent="-265113" algn="l" defTabSz="914400" rtl="0" eaLnBrk="1" fontAlgn="ctr" latinLnBrk="0" hangingPunct="1">
+              <a:lnSpc>
+                <a:spcPct val="100000"/>
+              </a:lnSpc>
+              <a:spcBef>
+                <a:spcPct val="25000"/>
+              </a:spcBef>
+              <a:spcAft>
+                <a:spcPct val="0"/>
+              </a:spcAft>
+              <a:buClr>
+                <a:schemeClr val="accent1"/>
+              </a:buClr>
+              <a:buSzPct val="125000"/>
+              <a:buFont typeface="Wingdings" pitchFamily="2" charset="2"/>
+              <a:buChar char="§"/>
+              <a:tabLst/>
+              <a:defRPr/>
+            </a:pPr>
+            <a:r>
+              <a:rPr kumimoji="0" lang="en-US" sz="1800" b="0" i="0" u="none" strike="noStrike" kern="0" cap="none" spc="0" normalizeH="0" baseline="0" noProof="0" dirty="0" smtClean="0">
+                <a:ln>
+                  <a:noFill/>
+                </a:ln>
+                <a:solidFill>
+                  <a:srgbClr val="000000"/>
+                </a:solidFill>
+                <a:effectLst/>
+                <a:uLnTx/>
+                <a:uFillTx/>
+                <a:latin typeface="+mn-lt"/>
+                <a:ea typeface="+mn-ea"/>
+                <a:cs typeface="+mn-cs"/>
+              </a:rPr>
+              <a:t>JSON messages between clients and server</a:t>
+            </a:r>
+            <a:endParaRPr kumimoji="0" lang="en-US" sz="1800" b="0" i="0" u="none" strike="noStrike" kern="0" cap="none" spc="0" normalizeH="0" baseline="0" noProof="0" dirty="0">
+              <a:ln>
+                <a:noFill/>
+              </a:ln>
+              <a:solidFill>
+                <a:srgbClr val="000000"/>
+              </a:solidFill>
+              <a:effectLst/>
+              <a:uLnTx/>
+              <a:uFillTx/>
+              <a:latin typeface="+mn-lt"/>
+              <a:ea typeface="+mn-ea"/>
+              <a:cs typeface="+mn-cs"/>
+            </a:endParaRPr>
+          </a:p>
+        </p:txBody>
+      </p:sp>
+    </p:spTree>
+  </p:cSld>
+  <p:clrMapOvr>
+    <a:masterClrMapping/>
+  </p:clrMapOvr>
+  <p:timing>
+    <p:tnLst>
+      <p:par>
+        <p:cTn id="1" dur="indefinite" restart="never" nodeType="tmRoot"/>
+      </p:par>
+    </p:tnLst>
+  </p:timing>
+</p:sld>
+</file>
+
+<file path=ppt/slides/slide16.xml><?xml version="1.0" encoding="utf-8"?>
+<p:sld xmlns:a="http://schemas.openxmlformats.org/drawingml/2006/main" xmlns:r="http://schemas.openxmlformats.org/officeDocument/2006/relationships" xmlns:p="http://schemas.openxmlformats.org/presentationml/2006/main">
+  <p:cSld>
+    <p:spTree>
+      <p:nvGrpSpPr>
+        <p:cNvPr id="1" name=""/>
+        <p:cNvGrpSpPr/>
+        <p:nvPr/>
+      </p:nvGrpSpPr>
+      <p:grpSpPr>
+        <a:xfrm>
+          <a:off x="0" y="0"/>
+          <a:ext cx="0" cy="0"/>
+          <a:chOff x="0" y="0"/>
+          <a:chExt cx="0" cy="0"/>
+        </a:xfrm>
+      </p:grpSpPr>
+      <p:sp>
+        <p:nvSpPr>
+          <p:cNvPr id="2" name="Titre 1"/>
+          <p:cNvSpPr>
+            <a:spLocks noGrp="1"/>
+          </p:cNvSpPr>
+          <p:nvPr>
+            <p:ph type="title"/>
+          </p:nvPr>
+        </p:nvSpPr>
+        <p:spPr/>
+        <p:txBody>
+          <a:bodyPr/>
+          <a:lstStyle/>
+          <a:p>
+            <a:r>
+              <a:rPr lang="en-US" dirty="0" smtClean="0"/>
+              <a:t>IOT: RPC over </a:t>
+            </a:r>
+            <a:r>
+              <a:rPr lang="en-US" dirty="0" err="1" smtClean="0"/>
+              <a:t>WebSockets</a:t>
+            </a:r>
+            <a:endParaRPr lang="en-US" dirty="0"/>
+          </a:p>
+        </p:txBody>
+      </p:sp>
+      <p:sp>
+        <p:nvSpPr>
+          <p:cNvPr id="3" name="Espace réservé du contenu 2"/>
+          <p:cNvSpPr>
+            <a:spLocks noGrp="1"/>
+          </p:cNvSpPr>
+          <p:nvPr>
+            <p:ph idx="1"/>
+          </p:nvPr>
+        </p:nvSpPr>
+        <p:spPr>
+          <a:xfrm>
+            <a:off x="217488" y="748813"/>
+            <a:ext cx="8775700" cy="3224103"/>
+          </a:xfrm>
+        </p:spPr>
+        <p:txBody>
+          <a:bodyPr/>
+          <a:lstStyle/>
+          <a:p>
+            <a:r>
+              <a:rPr lang="en-US" dirty="0" smtClean="0"/>
+              <a:t>Messages exchanged:</a:t>
+            </a:r>
+          </a:p>
+          <a:p>
+            <a:pPr lvl="1"/>
+            <a:r>
+              <a:rPr lang="en-US" dirty="0" smtClean="0"/>
+              <a:t>CALL</a:t>
+            </a:r>
+          </a:p>
+          <a:p>
+            <a:pPr lvl="1"/>
+            <a:r>
+              <a:rPr lang="en-US" dirty="0" smtClean="0"/>
+              <a:t>RESULT</a:t>
+            </a:r>
+          </a:p>
+          <a:p>
+            <a:pPr lvl="1"/>
+            <a:r>
+              <a:rPr lang="en-US" dirty="0" smtClean="0"/>
+              <a:t>REGISTER</a:t>
+            </a:r>
+          </a:p>
+          <a:p>
+            <a:pPr lvl="1"/>
+            <a:r>
+              <a:rPr lang="en-US" dirty="0" smtClean="0"/>
+              <a:t>INFO_METHODS</a:t>
+            </a:r>
+          </a:p>
+          <a:p>
+            <a:pPr lvl="1"/>
+            <a:r>
+              <a:rPr lang="en-US" dirty="0" smtClean="0"/>
+              <a:t>ERROR</a:t>
+            </a:r>
+            <a:endParaRPr lang="en-US" dirty="0" smtClean="0"/>
+          </a:p>
+          <a:p>
+            <a:pPr lvl="1"/>
+            <a:endParaRPr lang="en-US" dirty="0" smtClean="0"/>
+          </a:p>
+          <a:p>
+            <a:r>
+              <a:rPr lang="en-US" dirty="0" smtClean="0"/>
+              <a:t>Messages examples:</a:t>
+            </a:r>
+          </a:p>
+          <a:p>
+            <a:pPr>
+              <a:buNone/>
+            </a:pPr>
+            <a:r>
+              <a:rPr lang="en-US" dirty="0" smtClean="0"/>
+              <a:t>	</a:t>
+            </a:r>
+            <a:endParaRPr lang="en-US" dirty="0" smtClean="0"/>
+          </a:p>
+        </p:txBody>
+      </p:sp>
+      <p:grpSp>
+        <p:nvGrpSpPr>
+          <p:cNvPr id="16" name="Groupe 15"/>
+          <p:cNvGrpSpPr/>
+          <p:nvPr/>
+        </p:nvGrpSpPr>
+        <p:grpSpPr>
+          <a:xfrm>
+            <a:off x="304800" y="3930880"/>
+            <a:ext cx="8366234" cy="733446"/>
+            <a:chOff x="304800" y="4120060"/>
+            <a:chExt cx="8366234" cy="733446"/>
+          </a:xfrm>
+        </p:grpSpPr>
+        <p:grpSp>
+          <p:nvGrpSpPr>
+            <p:cNvPr id="14" name="Groupe 13"/>
+            <p:cNvGrpSpPr/>
+            <p:nvPr/>
+          </p:nvGrpSpPr>
+          <p:grpSpPr>
+            <a:xfrm>
+              <a:off x="304800" y="4120060"/>
+              <a:ext cx="8366234" cy="733446"/>
+              <a:chOff x="304800" y="4141080"/>
+              <a:chExt cx="8366234" cy="733446"/>
+            </a:xfrm>
+          </p:grpSpPr>
+          <p:sp>
+            <p:nvSpPr>
+              <p:cNvPr id="4" name="ZoneTexte 3"/>
+              <p:cNvSpPr txBox="1"/>
+              <p:nvPr/>
+            </p:nvSpPr>
+            <p:spPr>
+              <a:xfrm>
+                <a:off x="304800" y="4141080"/>
+                <a:ext cx="8366234" cy="307777"/>
+              </a:xfrm>
+              <a:prstGeom prst="rect">
+                <a:avLst/>
+              </a:prstGeom>
+              <a:solidFill>
+                <a:schemeClr val="accent1">
+                  <a:lumMod val="20000"/>
+                  <a:lumOff val="80000"/>
+                </a:schemeClr>
+              </a:solidFill>
+              <a:ln>
+                <a:solidFill>
+                  <a:schemeClr val="tx1"/>
+                </a:solidFill>
+              </a:ln>
+            </p:spPr>
+            <p:txBody>
+              <a:bodyPr wrap="square" rtlCol="0">
+                <a:spAutoFit/>
+              </a:bodyPr>
+              <a:lstStyle/>
+              <a:p>
+                <a:pPr algn="l"/>
+                <a:r>
+                  <a:rPr lang="en-US" b="0" dirty="0" smtClean="0">
+                    <a:latin typeface="Book Antiqua" pitchFamily="18" charset="0"/>
+                  </a:rPr>
+                  <a:t>            {“</a:t>
+                </a:r>
+                <a:r>
+                  <a:rPr lang="en-US" dirty="0" smtClean="0">
+                    <a:latin typeface="Book Antiqua" pitchFamily="18" charset="0"/>
+                  </a:rPr>
+                  <a:t>from</a:t>
+                </a:r>
+                <a:r>
+                  <a:rPr lang="en-US" b="0" dirty="0" smtClean="0">
+                    <a:latin typeface="Book Antiqua" pitchFamily="18" charset="0"/>
+                  </a:rPr>
+                  <a:t>”: “mbed1”, “</a:t>
+                </a:r>
+                <a:r>
+                  <a:rPr lang="en-US" dirty="0" smtClean="0">
+                    <a:latin typeface="Book Antiqua" pitchFamily="18" charset="0"/>
+                  </a:rPr>
+                  <a:t>to</a:t>
+                </a:r>
+                <a:r>
+                  <a:rPr lang="en-US" b="0" dirty="0" smtClean="0">
+                    <a:latin typeface="Book Antiqua" pitchFamily="18" charset="0"/>
+                  </a:rPr>
+                  <a:t>”: “gateway”, “</a:t>
+                </a:r>
+                <a:r>
+                  <a:rPr lang="en-US" dirty="0" err="1" smtClean="0">
+                    <a:latin typeface="Book Antiqua" pitchFamily="18" charset="0"/>
+                  </a:rPr>
+                  <a:t>msg</a:t>
+                </a:r>
+                <a:r>
+                  <a:rPr lang="en-US" b="0" dirty="0" smtClean="0">
+                    <a:latin typeface="Book Antiqua" pitchFamily="18" charset="0"/>
+                  </a:rPr>
+                  <a:t>”:”REGISTER”,  “</a:t>
+                </a:r>
+                <a:r>
+                  <a:rPr lang="en-US" dirty="0" smtClean="0">
+                    <a:latin typeface="Book Antiqua" pitchFamily="18" charset="0"/>
+                  </a:rPr>
+                  <a:t>fn</a:t>
+                </a:r>
+                <a:r>
+                  <a:rPr lang="en-US" b="0" dirty="0" smtClean="0">
+                    <a:latin typeface="Book Antiqua" pitchFamily="18" charset="0"/>
+                  </a:rPr>
+                  <a:t>”: “echo”, “</a:t>
+                </a:r>
+                <a:r>
+                  <a:rPr lang="en-US" dirty="0" smtClean="0">
+                    <a:latin typeface="Book Antiqua" pitchFamily="18" charset="0"/>
+                  </a:rPr>
+                  <a:t>id</a:t>
+                </a:r>
+                <a:r>
+                  <a:rPr lang="en-US" b="0" dirty="0" smtClean="0">
+                    <a:latin typeface="Book Antiqua" pitchFamily="18" charset="0"/>
+                  </a:rPr>
+                  <a:t>”:  10}</a:t>
+                </a:r>
+              </a:p>
+            </p:txBody>
+          </p:sp>
+          <p:sp>
+            <p:nvSpPr>
+              <p:cNvPr id="7" name="ZoneTexte 6"/>
+              <p:cNvSpPr txBox="1"/>
+              <p:nvPr/>
+            </p:nvSpPr>
+            <p:spPr>
+              <a:xfrm>
+                <a:off x="310055" y="4566749"/>
+                <a:ext cx="8345214" cy="307777"/>
+              </a:xfrm>
+              <a:prstGeom prst="rect">
+                <a:avLst/>
+              </a:prstGeom>
+              <a:solidFill>
+                <a:schemeClr val="accent1">
+                  <a:lumMod val="20000"/>
+                  <a:lumOff val="80000"/>
+                </a:schemeClr>
+              </a:solidFill>
+              <a:ln>
+                <a:solidFill>
+                  <a:schemeClr val="tx1"/>
+                </a:solidFill>
+              </a:ln>
+            </p:spPr>
+            <p:txBody>
+              <a:bodyPr wrap="square" rtlCol="0">
+                <a:spAutoFit/>
+              </a:bodyPr>
+              <a:lstStyle/>
+              <a:p>
+                <a:pPr algn="l"/>
+                <a:r>
+                  <a:rPr lang="en-US" b="0" dirty="0" smtClean="0">
+                    <a:latin typeface="Book Antiqua" pitchFamily="18" charset="0"/>
+                  </a:rPr>
+                  <a:t>            {“</a:t>
+                </a:r>
+                <a:r>
+                  <a:rPr lang="en-US" dirty="0" smtClean="0">
+                    <a:latin typeface="Book Antiqua" pitchFamily="18" charset="0"/>
+                  </a:rPr>
+                  <a:t>from</a:t>
+                </a:r>
+                <a:r>
+                  <a:rPr lang="en-US" b="0" dirty="0" smtClean="0">
+                    <a:latin typeface="Book Antiqua" pitchFamily="18" charset="0"/>
+                  </a:rPr>
+                  <a:t>”: “gateway”, “</a:t>
+                </a:r>
+                <a:r>
+                  <a:rPr lang="en-US" dirty="0" smtClean="0">
+                    <a:latin typeface="Book Antiqua" pitchFamily="18" charset="0"/>
+                  </a:rPr>
+                  <a:t>to</a:t>
+                </a:r>
+                <a:r>
+                  <a:rPr lang="en-US" b="0" dirty="0" smtClean="0">
+                    <a:latin typeface="Book Antiqua" pitchFamily="18" charset="0"/>
+                  </a:rPr>
+                  <a:t>”: “mbed1”, “</a:t>
+                </a:r>
+                <a:r>
+                  <a:rPr lang="en-US" dirty="0" err="1" smtClean="0">
+                    <a:latin typeface="Book Antiqua" pitchFamily="18" charset="0"/>
+                  </a:rPr>
+                  <a:t>msg</a:t>
+                </a:r>
+                <a:r>
+                  <a:rPr lang="en-US" b="0" dirty="0" smtClean="0">
+                    <a:latin typeface="Book Antiqua" pitchFamily="18" charset="0"/>
+                  </a:rPr>
+                  <a:t>”:”REGISTER_OK”,  “</a:t>
+                </a:r>
+                <a:r>
+                  <a:rPr lang="en-US" dirty="0" smtClean="0">
+                    <a:latin typeface="Book Antiqua" pitchFamily="18" charset="0"/>
+                  </a:rPr>
+                  <a:t>id</a:t>
+                </a:r>
+                <a:r>
+                  <a:rPr lang="en-US" b="0" dirty="0" smtClean="0">
+                    <a:latin typeface="Book Antiqua" pitchFamily="18" charset="0"/>
+                  </a:rPr>
+                  <a:t>”:  10}</a:t>
+                </a:r>
+              </a:p>
+            </p:txBody>
+          </p:sp>
+        </p:grpSp>
+        <p:cxnSp>
+          <p:nvCxnSpPr>
+            <p:cNvPr id="9" name="Connecteur droit avec flèche 8"/>
+            <p:cNvCxnSpPr/>
+            <p:nvPr/>
+          </p:nvCxnSpPr>
+          <p:spPr bwMode="auto">
+            <a:xfrm>
+              <a:off x="430924" y="4277710"/>
+              <a:ext cx="441435" cy="0"/>
+            </a:xfrm>
+            <a:prstGeom prst="straightConnector1">
+              <a:avLst/>
+            </a:prstGeom>
+            <a:noFill/>
+            <a:ln w="19050" cap="flat" cmpd="sng" algn="ctr">
+              <a:solidFill>
+                <a:schemeClr val="tx1"/>
+              </a:solidFill>
+              <a:prstDash val="solid"/>
+              <a:round/>
+              <a:headEnd type="none" w="med" len="med"/>
+              <a:tailEnd type="arrow"/>
+            </a:ln>
+            <a:effectLst/>
+          </p:spPr>
+        </p:cxnSp>
+        <p:cxnSp>
+          <p:nvCxnSpPr>
+            <p:cNvPr id="11" name="Connecteur droit avec flèche 10"/>
+            <p:cNvCxnSpPr/>
+            <p:nvPr/>
+          </p:nvCxnSpPr>
+          <p:spPr bwMode="auto">
+            <a:xfrm flipH="1">
+              <a:off x="420414" y="4740166"/>
+              <a:ext cx="430924" cy="10510"/>
+            </a:xfrm>
+            <a:prstGeom prst="straightConnector1">
+              <a:avLst/>
+            </a:prstGeom>
+            <a:noFill/>
+            <a:ln w="19050" cap="flat" cmpd="sng" algn="ctr">
+              <a:solidFill>
+                <a:schemeClr val="tx1"/>
+              </a:solidFill>
+              <a:prstDash val="solid"/>
+              <a:round/>
+              <a:headEnd type="none" w="med" len="med"/>
+              <a:tailEnd type="arrow"/>
+            </a:ln>
+            <a:effectLst/>
+          </p:spPr>
+        </p:cxnSp>
+      </p:grpSp>
+      <p:grpSp>
+        <p:nvGrpSpPr>
+          <p:cNvPr id="17" name="Groupe 16"/>
+          <p:cNvGrpSpPr/>
+          <p:nvPr/>
+        </p:nvGrpSpPr>
+        <p:grpSpPr>
+          <a:xfrm>
+            <a:off x="289034" y="5218389"/>
+            <a:ext cx="8350469" cy="764980"/>
+            <a:chOff x="289034" y="5270939"/>
+            <a:chExt cx="8350469" cy="764980"/>
+          </a:xfrm>
+        </p:grpSpPr>
+        <p:grpSp>
+          <p:nvGrpSpPr>
+            <p:cNvPr id="15" name="Groupe 14"/>
+            <p:cNvGrpSpPr/>
+            <p:nvPr/>
+          </p:nvGrpSpPr>
+          <p:grpSpPr>
+            <a:xfrm>
+              <a:off x="289034" y="5270939"/>
+              <a:ext cx="8350469" cy="764980"/>
+              <a:chOff x="289034" y="5270939"/>
+              <a:chExt cx="8350469" cy="764980"/>
+            </a:xfrm>
+          </p:grpSpPr>
+          <p:sp>
+            <p:nvSpPr>
+              <p:cNvPr id="5" name="ZoneTexte 4"/>
+              <p:cNvSpPr txBox="1"/>
+              <p:nvPr/>
+            </p:nvSpPr>
+            <p:spPr>
+              <a:xfrm>
+                <a:off x="289034" y="5270939"/>
+                <a:ext cx="8345214" cy="307777"/>
+              </a:xfrm>
+              <a:prstGeom prst="rect">
+                <a:avLst/>
+              </a:prstGeom>
+              <a:solidFill>
+                <a:schemeClr val="accent1">
+                  <a:lumMod val="20000"/>
+                  <a:lumOff val="80000"/>
+                </a:schemeClr>
+              </a:solidFill>
+              <a:ln>
+                <a:solidFill>
+                  <a:schemeClr val="tx1"/>
+                </a:solidFill>
+              </a:ln>
+            </p:spPr>
+            <p:txBody>
+              <a:bodyPr wrap="square" rtlCol="0">
+                <a:spAutoFit/>
+              </a:bodyPr>
+              <a:lstStyle/>
+              <a:p>
+                <a:pPr algn="l"/>
+                <a:r>
+                  <a:rPr lang="en-US" b="0" dirty="0" smtClean="0">
+                    <a:latin typeface="Book Antiqua" pitchFamily="18" charset="0"/>
+                  </a:rPr>
+                  <a:t>             {“</a:t>
+                </a:r>
+                <a:r>
+                  <a:rPr lang="en-US" dirty="0" smtClean="0">
+                    <a:latin typeface="Book Antiqua" pitchFamily="18" charset="0"/>
+                  </a:rPr>
+                  <a:t>from</a:t>
+                </a:r>
+                <a:r>
+                  <a:rPr lang="en-US" b="0" dirty="0" smtClean="0">
+                    <a:latin typeface="Book Antiqua" pitchFamily="18" charset="0"/>
+                  </a:rPr>
+                  <a:t>”: “mbed2”, “</a:t>
+                </a:r>
+                <a:r>
+                  <a:rPr lang="en-US" dirty="0" smtClean="0">
+                    <a:latin typeface="Book Antiqua" pitchFamily="18" charset="0"/>
+                  </a:rPr>
+                  <a:t>to</a:t>
+                </a:r>
+                <a:r>
+                  <a:rPr lang="en-US" b="0" dirty="0" smtClean="0">
+                    <a:latin typeface="Book Antiqua" pitchFamily="18" charset="0"/>
+                  </a:rPr>
+                  <a:t>”: “mbed1”, “</a:t>
+                </a:r>
+                <a:r>
+                  <a:rPr lang="en-US" dirty="0" err="1" smtClean="0">
+                    <a:latin typeface="Book Antiqua" pitchFamily="18" charset="0"/>
+                  </a:rPr>
+                  <a:t>msg</a:t>
+                </a:r>
+                <a:r>
+                  <a:rPr lang="en-US" b="0" dirty="0" smtClean="0">
+                    <a:latin typeface="Book Antiqua" pitchFamily="18" charset="0"/>
+                  </a:rPr>
+                  <a:t>”:”CALL”,  “</a:t>
+                </a:r>
+                <a:r>
+                  <a:rPr lang="en-US" dirty="0" smtClean="0">
+                    <a:latin typeface="Book Antiqua" pitchFamily="18" charset="0"/>
+                  </a:rPr>
+                  <a:t>fn</a:t>
+                </a:r>
+                <a:r>
+                  <a:rPr lang="en-US" b="0" dirty="0" smtClean="0">
+                    <a:latin typeface="Book Antiqua" pitchFamily="18" charset="0"/>
+                  </a:rPr>
+                  <a:t>”: “echo”,  “</a:t>
+                </a:r>
+                <a:r>
+                  <a:rPr lang="en-US" dirty="0" err="1" smtClean="0">
+                    <a:latin typeface="Book Antiqua" pitchFamily="18" charset="0"/>
+                  </a:rPr>
+                  <a:t>params</a:t>
+                </a:r>
+                <a:r>
+                  <a:rPr lang="en-US" b="0" dirty="0" smtClean="0">
+                    <a:latin typeface="Book Antiqua" pitchFamily="18" charset="0"/>
+                  </a:rPr>
+                  <a:t>”: “Hello!”, “</a:t>
+                </a:r>
+                <a:r>
+                  <a:rPr lang="en-US" dirty="0" smtClean="0">
+                    <a:latin typeface="Book Antiqua" pitchFamily="18" charset="0"/>
+                  </a:rPr>
+                  <a:t>id</a:t>
+                </a:r>
+                <a:r>
+                  <a:rPr lang="en-US" b="0" dirty="0" smtClean="0">
+                    <a:latin typeface="Book Antiqua" pitchFamily="18" charset="0"/>
+                  </a:rPr>
+                  <a:t>”:  13}</a:t>
+                </a:r>
+              </a:p>
+            </p:txBody>
+          </p:sp>
+          <p:sp>
+            <p:nvSpPr>
+              <p:cNvPr id="6" name="ZoneTexte 5"/>
+              <p:cNvSpPr txBox="1"/>
+              <p:nvPr/>
+            </p:nvSpPr>
+            <p:spPr>
+              <a:xfrm>
+                <a:off x="294289" y="5728142"/>
+                <a:ext cx="8345214" cy="307777"/>
+              </a:xfrm>
+              <a:prstGeom prst="rect">
+                <a:avLst/>
+              </a:prstGeom>
+              <a:solidFill>
+                <a:schemeClr val="accent1">
+                  <a:lumMod val="20000"/>
+                  <a:lumOff val="80000"/>
+                </a:schemeClr>
+              </a:solidFill>
+              <a:ln>
+                <a:solidFill>
+                  <a:schemeClr val="tx1"/>
+                </a:solidFill>
+              </a:ln>
+            </p:spPr>
+            <p:txBody>
+              <a:bodyPr wrap="square" rtlCol="0">
+                <a:spAutoFit/>
+              </a:bodyPr>
+              <a:lstStyle/>
+              <a:p>
+                <a:pPr algn="l"/>
+                <a:r>
+                  <a:rPr lang="en-US" b="0" dirty="0" smtClean="0">
+                    <a:latin typeface="Book Antiqua" pitchFamily="18" charset="0"/>
+                  </a:rPr>
+                  <a:t>             {“</a:t>
+                </a:r>
+                <a:r>
+                  <a:rPr lang="en-US" dirty="0" smtClean="0">
+                    <a:latin typeface="Book Antiqua" pitchFamily="18" charset="0"/>
+                  </a:rPr>
+                  <a:t>from</a:t>
+                </a:r>
+                <a:r>
+                  <a:rPr lang="en-US" b="0" dirty="0" smtClean="0">
+                    <a:latin typeface="Book Antiqua" pitchFamily="18" charset="0"/>
+                  </a:rPr>
+                  <a:t>”: “mbed1”, “</a:t>
+                </a:r>
+                <a:r>
+                  <a:rPr lang="en-US" dirty="0" smtClean="0">
+                    <a:latin typeface="Book Antiqua" pitchFamily="18" charset="0"/>
+                  </a:rPr>
+                  <a:t>to</a:t>
+                </a:r>
+                <a:r>
+                  <a:rPr lang="en-US" b="0" dirty="0" smtClean="0">
+                    <a:latin typeface="Book Antiqua" pitchFamily="18" charset="0"/>
+                  </a:rPr>
+                  <a:t>”: “mbed1”, “</a:t>
+                </a:r>
+                <a:r>
+                  <a:rPr lang="en-US" dirty="0" err="1" smtClean="0">
+                    <a:latin typeface="Book Antiqua" pitchFamily="18" charset="0"/>
+                  </a:rPr>
+                  <a:t>msg</a:t>
+                </a:r>
+                <a:r>
+                  <a:rPr lang="en-US" b="0" dirty="0" smtClean="0">
+                    <a:latin typeface="Book Antiqua" pitchFamily="18" charset="0"/>
+                  </a:rPr>
+                  <a:t>”:”RESULT”,  “</a:t>
+                </a:r>
+                <a:r>
+                  <a:rPr lang="en-US" dirty="0" smtClean="0">
+                    <a:latin typeface="Book Antiqua" pitchFamily="18" charset="0"/>
+                  </a:rPr>
+                  <a:t>res</a:t>
+                </a:r>
+                <a:r>
+                  <a:rPr lang="en-US" b="0" dirty="0" smtClean="0">
+                    <a:latin typeface="Book Antiqua" pitchFamily="18" charset="0"/>
+                  </a:rPr>
+                  <a:t>”: “Hello!”, “</a:t>
+                </a:r>
+                <a:r>
+                  <a:rPr lang="en-US" dirty="0" smtClean="0">
+                    <a:latin typeface="Book Antiqua" pitchFamily="18" charset="0"/>
+                  </a:rPr>
+                  <a:t>id</a:t>
+                </a:r>
+                <a:r>
+                  <a:rPr lang="en-US" b="0" dirty="0" smtClean="0">
+                    <a:latin typeface="Book Antiqua" pitchFamily="18" charset="0"/>
+                  </a:rPr>
+                  <a:t>”:  13}</a:t>
+                </a:r>
+              </a:p>
+            </p:txBody>
+          </p:sp>
+        </p:grpSp>
+        <p:cxnSp>
+          <p:nvCxnSpPr>
+            <p:cNvPr id="12" name="Connecteur droit avec flèche 11"/>
+            <p:cNvCxnSpPr/>
+            <p:nvPr/>
+          </p:nvCxnSpPr>
+          <p:spPr bwMode="auto">
+            <a:xfrm>
+              <a:off x="436179" y="5449613"/>
+              <a:ext cx="441435" cy="0"/>
+            </a:xfrm>
+            <a:prstGeom prst="straightConnector1">
+              <a:avLst/>
+            </a:prstGeom>
+            <a:noFill/>
+            <a:ln w="19050" cap="flat" cmpd="sng" algn="ctr">
+              <a:solidFill>
+                <a:schemeClr val="tx1"/>
+              </a:solidFill>
+              <a:prstDash val="solid"/>
+              <a:round/>
+              <a:headEnd type="none" w="med" len="med"/>
+              <a:tailEnd type="arrow"/>
+            </a:ln>
+            <a:effectLst/>
+          </p:spPr>
+        </p:cxnSp>
+        <p:cxnSp>
+          <p:nvCxnSpPr>
+            <p:cNvPr id="13" name="Connecteur droit avec flèche 12"/>
+            <p:cNvCxnSpPr/>
+            <p:nvPr/>
+          </p:nvCxnSpPr>
+          <p:spPr bwMode="auto">
+            <a:xfrm flipH="1">
+              <a:off x="415159" y="5901559"/>
+              <a:ext cx="430924" cy="10510"/>
+            </a:xfrm>
+            <a:prstGeom prst="straightConnector1">
+              <a:avLst/>
+            </a:prstGeom>
+            <a:noFill/>
+            <a:ln w="19050" cap="flat" cmpd="sng" algn="ctr">
+              <a:solidFill>
+                <a:schemeClr val="tx1"/>
+              </a:solidFill>
+              <a:prstDash val="solid"/>
+              <a:round/>
+              <a:headEnd type="none" w="med" len="med"/>
+              <a:tailEnd type="arrow"/>
+            </a:ln>
+            <a:effectLst/>
+          </p:spPr>
+        </p:cxnSp>
+      </p:grpSp>
+      <p:sp>
+        <p:nvSpPr>
+          <p:cNvPr id="18" name="ZoneTexte 17"/>
+          <p:cNvSpPr txBox="1"/>
+          <p:nvPr/>
+        </p:nvSpPr>
+        <p:spPr>
+          <a:xfrm>
+            <a:off x="3096609" y="4708634"/>
+            <a:ext cx="2610010" cy="307777"/>
+          </a:xfrm>
+          <a:prstGeom prst="rect">
+            <a:avLst/>
+          </a:prstGeom>
+          <a:noFill/>
+        </p:spPr>
+        <p:txBody>
+          <a:bodyPr wrap="none" rtlCol="0">
+            <a:spAutoFit/>
+          </a:bodyPr>
+          <a:lstStyle/>
+          <a:p>
+            <a:r>
+              <a:rPr lang="en-US" dirty="0" smtClean="0"/>
+              <a:t>Register method transaction</a:t>
+            </a:r>
+            <a:endParaRPr lang="en-US" dirty="0"/>
+          </a:p>
+        </p:txBody>
+      </p:sp>
+      <p:sp>
+        <p:nvSpPr>
+          <p:cNvPr id="19" name="ZoneTexte 18"/>
+          <p:cNvSpPr txBox="1"/>
+          <p:nvPr/>
+        </p:nvSpPr>
+        <p:spPr>
+          <a:xfrm>
+            <a:off x="3025286" y="6027682"/>
+            <a:ext cx="2847254" cy="307777"/>
+          </a:xfrm>
+          <a:prstGeom prst="rect">
+            <a:avLst/>
+          </a:prstGeom>
+          <a:noFill/>
+        </p:spPr>
+        <p:txBody>
+          <a:bodyPr wrap="none" rtlCol="0">
+            <a:spAutoFit/>
+          </a:bodyPr>
+          <a:lstStyle/>
+          <a:p>
+            <a:r>
+              <a:rPr lang="en-US" dirty="0" smtClean="0"/>
+              <a:t>Distant method call transaction</a:t>
+            </a:r>
+            <a:endParaRPr lang="en-US" dirty="0"/>
+          </a:p>
+        </p:txBody>
+      </p:sp>
+    </p:spTree>
+  </p:cSld>
+  <p:clrMapOvr>
+    <a:masterClrMapping/>
+  </p:clrMapOvr>
+</p:sld>
+</file>
+
+<file path=ppt/slides/slide17.xml><?xml version="1.0" encoding="utf-8"?>
+<p:sld xmlns:a="http://schemas.openxmlformats.org/drawingml/2006/main" xmlns:r="http://schemas.openxmlformats.org/officeDocument/2006/relationships" xmlns:p="http://schemas.openxmlformats.org/presentationml/2006/main">
+  <p:cSld>
+    <p:spTree>
+      <p:nvGrpSpPr>
+        <p:cNvPr id="1" name=""/>
+        <p:cNvGrpSpPr/>
+        <p:nvPr/>
+      </p:nvGrpSpPr>
+      <p:grpSpPr>
+        <a:xfrm>
+          <a:off x="0" y="0"/>
+          <a:ext cx="0" cy="0"/>
+          <a:chOff x="0" y="0"/>
+          <a:chExt cx="0" cy="0"/>
+        </a:xfrm>
+      </p:grpSpPr>
+      <p:sp>
+        <p:nvSpPr>
+          <p:cNvPr id="2" name="Titre 1"/>
+          <p:cNvSpPr>
+            <a:spLocks noGrp="1"/>
+          </p:cNvSpPr>
+          <p:nvPr>
+            <p:ph type="title"/>
+          </p:nvPr>
+        </p:nvSpPr>
+        <p:spPr/>
+        <p:txBody>
+          <a:bodyPr/>
+          <a:lstStyle/>
+          <a:p>
+            <a:r>
+              <a:rPr lang="en-US" dirty="0" smtClean="0"/>
+              <a:t>IOT: RPC over </a:t>
+            </a:r>
+            <a:r>
+              <a:rPr lang="en-US" dirty="0" err="1" smtClean="0"/>
+              <a:t>WebSockets</a:t>
+            </a:r>
+            <a:endParaRPr lang="en-US" dirty="0"/>
+          </a:p>
+        </p:txBody>
+      </p:sp>
+      <p:sp>
+        <p:nvSpPr>
+          <p:cNvPr id="3" name="Espace réservé du contenu 2"/>
+          <p:cNvSpPr>
+            <a:spLocks noGrp="1"/>
+          </p:cNvSpPr>
+          <p:nvPr>
+            <p:ph idx="1"/>
+          </p:nvPr>
+        </p:nvSpPr>
+        <p:spPr>
+          <a:xfrm>
+            <a:off x="206977" y="2398932"/>
+            <a:ext cx="8775700" cy="2120516"/>
+          </a:xfrm>
+        </p:spPr>
+        <p:txBody>
+          <a:bodyPr/>
+          <a:lstStyle/>
+          <a:p>
+            <a:r>
+              <a:rPr lang="fr-FR" dirty="0" err="1" smtClean="0"/>
+              <a:t>WebSocket</a:t>
+            </a:r>
+            <a:r>
+              <a:rPr lang="fr-FR" dirty="0" smtClean="0"/>
+              <a:t> server:</a:t>
+            </a:r>
+          </a:p>
+          <a:p>
+            <a:pPr lvl="1"/>
+            <a:r>
+              <a:rPr lang="fr-FR" dirty="0" err="1" smtClean="0"/>
+              <a:t>Based</a:t>
+            </a:r>
+            <a:r>
+              <a:rPr lang="fr-FR" dirty="0" smtClean="0"/>
+              <a:t> on </a:t>
+            </a:r>
+            <a:r>
+              <a:rPr lang="fr-FR" dirty="0" err="1" smtClean="0"/>
+              <a:t>Tornado</a:t>
+            </a:r>
+            <a:r>
+              <a:rPr lang="fr-FR" dirty="0" smtClean="0"/>
+              <a:t> </a:t>
+            </a:r>
+            <a:r>
+              <a:rPr lang="fr-FR" dirty="0" err="1" smtClean="0"/>
+              <a:t>webserver</a:t>
+            </a:r>
+            <a:r>
+              <a:rPr lang="fr-FR" dirty="0" smtClean="0"/>
+              <a:t> (Python)</a:t>
+            </a:r>
+          </a:p>
+          <a:p>
+            <a:pPr lvl="1"/>
+            <a:r>
+              <a:rPr lang="fr-FR" i="1" dirty="0" smtClean="0"/>
+              <a:t>ws://</a:t>
+            </a:r>
+            <a:r>
+              <a:rPr lang="fr-FR" i="1" dirty="0" smtClean="0"/>
+              <a:t>sockets.mbed.org/rpc/</a:t>
+            </a:r>
+            <a:r>
+              <a:rPr lang="fr-FR" i="1" dirty="0" smtClean="0">
+                <a:solidFill>
+                  <a:srgbClr val="FF0000"/>
+                </a:solidFill>
+              </a:rPr>
+              <a:t>&lt;sub-network&gt;</a:t>
+            </a:r>
+            <a:r>
+              <a:rPr lang="fr-FR" i="1" dirty="0" smtClean="0"/>
+              <a:t>/</a:t>
+            </a:r>
+            <a:r>
+              <a:rPr lang="fr-FR" i="1" dirty="0" smtClean="0">
+                <a:solidFill>
+                  <a:schemeClr val="accent3"/>
+                </a:solidFill>
+              </a:rPr>
+              <a:t>&lt;mbed_id&gt;</a:t>
+            </a:r>
+          </a:p>
+          <a:p>
+            <a:pPr lvl="1"/>
+            <a:r>
+              <a:rPr lang="en-US" dirty="0" smtClean="0">
+                <a:solidFill>
+                  <a:schemeClr val="tx1"/>
+                </a:solidFill>
+              </a:rPr>
+              <a:t>Manage all sub-networks</a:t>
+            </a:r>
+          </a:p>
+          <a:p>
+            <a:pPr lvl="1"/>
+            <a:r>
+              <a:rPr lang="en-US" dirty="0" smtClean="0">
+                <a:solidFill>
+                  <a:schemeClr val="tx1"/>
+                </a:solidFill>
+              </a:rPr>
+              <a:t>Manage messages exchanged</a:t>
+            </a:r>
+            <a:endParaRPr lang="en-US" dirty="0" smtClean="0">
+              <a:solidFill>
+                <a:schemeClr val="tx1"/>
+              </a:solidFill>
+            </a:endParaRPr>
+          </a:p>
+          <a:p>
+            <a:pPr lvl="1"/>
+            <a:endParaRPr lang="en-US" dirty="0" smtClean="0"/>
+          </a:p>
+          <a:p>
+            <a:endParaRPr lang="en-US" dirty="0"/>
+          </a:p>
+        </p:txBody>
+      </p:sp>
+    </p:spTree>
+  </p:cSld>
+  <p:clrMapOvr>
+    <a:masterClrMapping/>
+  </p:clrMapOvr>
+</p:sld>
+</file>
+
+<file path=ppt/slides/slide18.xml><?xml version="1.0" encoding="utf-8"?>
+<p:sld xmlns:a="http://schemas.openxmlformats.org/drawingml/2006/main" xmlns:r="http://schemas.openxmlformats.org/officeDocument/2006/relationships" xmlns:p="http://schemas.openxmlformats.org/presentationml/2006/main">
+  <p:cSld>
+    <p:spTree>
+      <p:nvGrpSpPr>
+        <p:cNvPr id="1" name=""/>
+        <p:cNvGrpSpPr/>
+        <p:nvPr/>
+      </p:nvGrpSpPr>
+      <p:grpSpPr>
+        <a:xfrm>
+          <a:off x="0" y="0"/>
+          <a:ext cx="0" cy="0"/>
+          <a:chOff x="0" y="0"/>
+          <a:chExt cx="0" cy="0"/>
+        </a:xfrm>
+      </p:grpSpPr>
+      <p:sp>
+        <p:nvSpPr>
+          <p:cNvPr id="2" name="Titre 1"/>
+          <p:cNvSpPr>
+            <a:spLocks noGrp="1"/>
+          </p:cNvSpPr>
+          <p:nvPr>
+            <p:ph type="title"/>
+          </p:nvPr>
+        </p:nvSpPr>
+        <p:spPr/>
+        <p:txBody>
+          <a:bodyPr/>
+          <a:lstStyle/>
+          <a:p>
+            <a:r>
+              <a:rPr lang="en-US" dirty="0" smtClean="0"/>
+              <a:t>IOT: RPC over </a:t>
+            </a:r>
+            <a:r>
+              <a:rPr lang="en-US" dirty="0" err="1" smtClean="0"/>
+              <a:t>WebSockets</a:t>
+            </a:r>
+            <a:endParaRPr lang="en-US" dirty="0"/>
+          </a:p>
+        </p:txBody>
+      </p:sp>
+      <p:sp>
+        <p:nvSpPr>
+          <p:cNvPr id="3" name="Espace réservé du contenu 2"/>
+          <p:cNvSpPr>
+            <a:spLocks noGrp="1"/>
+          </p:cNvSpPr>
+          <p:nvPr>
+            <p:ph idx="1"/>
+          </p:nvPr>
+        </p:nvSpPr>
+        <p:spPr>
+          <a:xfrm>
+            <a:off x="217488" y="906463"/>
+            <a:ext cx="8775700" cy="1300709"/>
+          </a:xfrm>
+        </p:spPr>
+        <p:txBody>
+          <a:bodyPr/>
+          <a:lstStyle/>
+          <a:p>
+            <a:r>
+              <a:rPr lang="en-US" dirty="0" err="1" smtClean="0"/>
+              <a:t>Mbed</a:t>
+            </a:r>
+            <a:r>
+              <a:rPr lang="en-US" dirty="0" smtClean="0"/>
+              <a:t> boards requirements:</a:t>
+            </a:r>
+          </a:p>
+          <a:p>
+            <a:pPr lvl="1"/>
+            <a:r>
+              <a:rPr lang="en-US" dirty="0" err="1" smtClean="0"/>
+              <a:t>Wifi</a:t>
+            </a:r>
+            <a:r>
+              <a:rPr lang="en-US" dirty="0" smtClean="0"/>
+              <a:t> module or Ethernet connection</a:t>
+            </a:r>
+          </a:p>
+          <a:p>
+            <a:pPr lvl="1"/>
+            <a:r>
+              <a:rPr lang="en-US" dirty="0" smtClean="0"/>
+              <a:t>RPC library</a:t>
+            </a:r>
+          </a:p>
+          <a:p>
+            <a:pPr lvl="1"/>
+            <a:endParaRPr lang="en-US" dirty="0"/>
+          </a:p>
+        </p:txBody>
+      </p:sp>
+      <p:sp>
+        <p:nvSpPr>
+          <p:cNvPr id="4" name="ZoneTexte 3"/>
+          <p:cNvSpPr txBox="1"/>
+          <p:nvPr/>
+        </p:nvSpPr>
+        <p:spPr>
+          <a:xfrm>
+            <a:off x="52551" y="2480465"/>
+            <a:ext cx="4445875" cy="3231654"/>
+          </a:xfrm>
+          <a:prstGeom prst="rect">
+            <a:avLst/>
+          </a:prstGeom>
+          <a:solidFill>
+            <a:schemeClr val="accent1">
+              <a:lumMod val="20000"/>
+              <a:lumOff val="80000"/>
+            </a:schemeClr>
+          </a:solidFill>
+        </p:spPr>
+        <p:txBody>
+          <a:bodyPr wrap="square" rtlCol="0">
+            <a:spAutoFit/>
+          </a:bodyPr>
+          <a:lstStyle/>
+          <a:p>
+            <a:pPr algn="l"/>
+            <a:r>
+              <a:rPr lang="en-US" sz="1200" b="0" dirty="0" smtClean="0">
+                <a:solidFill>
+                  <a:srgbClr val="0070C0"/>
+                </a:solidFill>
+                <a:latin typeface="Book Antiqua" pitchFamily="18" charset="0"/>
+              </a:rPr>
+              <a:t>v</a:t>
+            </a:r>
+            <a:r>
+              <a:rPr lang="en-US" sz="1200" b="0" dirty="0" smtClean="0">
+                <a:solidFill>
+                  <a:srgbClr val="0070C0"/>
+                </a:solidFill>
+                <a:latin typeface="Book Antiqua" pitchFamily="18" charset="0"/>
+              </a:rPr>
+              <a:t>oid</a:t>
+            </a:r>
+            <a:r>
+              <a:rPr lang="en-US" sz="1200" b="0" dirty="0" smtClean="0">
+                <a:latin typeface="Book Antiqua" pitchFamily="18" charset="0"/>
+              </a:rPr>
+              <a:t> echo(</a:t>
+            </a:r>
+            <a:r>
+              <a:rPr lang="en-US" sz="1200" b="0" dirty="0" err="1" smtClean="0">
+                <a:latin typeface="Book Antiqua" pitchFamily="18" charset="0"/>
+              </a:rPr>
+              <a:t>MbedJSONValue</a:t>
+            </a:r>
+            <a:r>
+              <a:rPr lang="en-US" sz="1200" b="0" dirty="0" smtClean="0">
+                <a:latin typeface="Book Antiqua" pitchFamily="18" charset="0"/>
+              </a:rPr>
+              <a:t>&amp; in, </a:t>
+            </a:r>
+            <a:r>
+              <a:rPr lang="en-US" sz="1200" b="0" dirty="0" err="1" smtClean="0">
+                <a:latin typeface="Book Antiqua" pitchFamily="18" charset="0"/>
+              </a:rPr>
+              <a:t>MbedJSONValue</a:t>
+            </a:r>
+            <a:r>
+              <a:rPr lang="en-US" sz="1200" b="0" dirty="0" smtClean="0">
+                <a:latin typeface="Book Antiqua" pitchFamily="18" charset="0"/>
+              </a:rPr>
+              <a:t>&amp; out)</a:t>
+            </a:r>
+          </a:p>
+          <a:p>
+            <a:pPr algn="l"/>
+            <a:r>
+              <a:rPr lang="en-US" sz="1200" b="0" dirty="0" smtClean="0">
+                <a:latin typeface="Book Antiqua" pitchFamily="18" charset="0"/>
+              </a:rPr>
+              <a:t>{</a:t>
+            </a:r>
+          </a:p>
+          <a:p>
+            <a:pPr algn="l"/>
+            <a:r>
+              <a:rPr lang="en-US" sz="1200" b="0" dirty="0" smtClean="0">
+                <a:latin typeface="Book Antiqua" pitchFamily="18" charset="0"/>
+              </a:rPr>
+              <a:t> </a:t>
+            </a:r>
+            <a:r>
+              <a:rPr lang="en-US" sz="1200" b="0" dirty="0" smtClean="0">
+                <a:latin typeface="Book Antiqua" pitchFamily="18" charset="0"/>
+              </a:rPr>
+              <a:t>    out = </a:t>
+            </a:r>
+            <a:r>
+              <a:rPr lang="en-US" sz="1200" b="0" dirty="0" err="1" smtClean="0">
+                <a:latin typeface="Book Antiqua" pitchFamily="18" charset="0"/>
+              </a:rPr>
+              <a:t>in.get</a:t>
+            </a:r>
+            <a:r>
+              <a:rPr lang="en-US" sz="1200" b="0" dirty="0" smtClean="0">
+                <a:latin typeface="Book Antiqua" pitchFamily="18" charset="0"/>
+              </a:rPr>
+              <a:t>&lt;string&gt;();</a:t>
+            </a:r>
+            <a:endParaRPr lang="en-US" sz="1200" b="0" dirty="0" smtClean="0">
+              <a:latin typeface="Book Antiqua" pitchFamily="18" charset="0"/>
+            </a:endParaRPr>
+          </a:p>
+          <a:p>
+            <a:pPr algn="l"/>
+            <a:r>
+              <a:rPr lang="en-US" sz="1200" b="0" dirty="0" smtClean="0">
+                <a:latin typeface="Book Antiqua" pitchFamily="18" charset="0"/>
+              </a:rPr>
+              <a:t>}</a:t>
+            </a:r>
+            <a:r>
+              <a:rPr lang="en-US" sz="1200" b="0" dirty="0" smtClean="0">
+                <a:latin typeface="Book Antiqua" pitchFamily="18" charset="0"/>
+              </a:rPr>
+              <a:t>  </a:t>
+            </a:r>
+          </a:p>
+          <a:p>
+            <a:pPr algn="l"/>
+            <a:endParaRPr lang="en-US" sz="1200" b="0" dirty="0" smtClean="0">
+              <a:latin typeface="Book Antiqua" pitchFamily="18" charset="0"/>
+            </a:endParaRPr>
+          </a:p>
+          <a:p>
+            <a:pPr algn="l"/>
+            <a:r>
+              <a:rPr lang="en-US" sz="1200" b="0" dirty="0" err="1" smtClean="0">
+                <a:solidFill>
+                  <a:srgbClr val="0070C0"/>
+                </a:solidFill>
+                <a:latin typeface="Book Antiqua" pitchFamily="18" charset="0"/>
+              </a:rPr>
+              <a:t>i</a:t>
+            </a:r>
+            <a:r>
+              <a:rPr lang="en-US" sz="1200" b="0" dirty="0" err="1" smtClean="0">
+                <a:solidFill>
+                  <a:srgbClr val="0070C0"/>
+                </a:solidFill>
+                <a:latin typeface="Book Antiqua" pitchFamily="18" charset="0"/>
+              </a:rPr>
+              <a:t>nt</a:t>
+            </a:r>
+            <a:r>
+              <a:rPr lang="en-US" sz="1200" b="0" dirty="0" smtClean="0">
+                <a:solidFill>
+                  <a:srgbClr val="0070C0"/>
+                </a:solidFill>
+                <a:latin typeface="Book Antiqua" pitchFamily="18" charset="0"/>
+              </a:rPr>
+              <a:t> </a:t>
+            </a:r>
+            <a:r>
+              <a:rPr lang="en-US" sz="1200" b="0" dirty="0" smtClean="0">
+                <a:latin typeface="Book Antiqua" pitchFamily="18" charset="0"/>
+              </a:rPr>
+              <a:t>main()</a:t>
+            </a:r>
+          </a:p>
+          <a:p>
+            <a:pPr algn="l"/>
+            <a:r>
+              <a:rPr lang="en-US" sz="1200" b="0" dirty="0" smtClean="0">
+                <a:latin typeface="Book Antiqua" pitchFamily="18" charset="0"/>
+              </a:rPr>
+              <a:t>{</a:t>
+            </a:r>
+          </a:p>
+          <a:p>
+            <a:pPr algn="l"/>
+            <a:r>
+              <a:rPr lang="en-US" sz="1200" b="0" dirty="0" smtClean="0">
+                <a:latin typeface="Book Antiqua" pitchFamily="18" charset="0"/>
+              </a:rPr>
+              <a:t>    </a:t>
+            </a:r>
+            <a:r>
+              <a:rPr lang="en-US" sz="1200" b="0" dirty="0" err="1" smtClean="0">
+                <a:latin typeface="Book Antiqua" pitchFamily="18" charset="0"/>
+              </a:rPr>
+              <a:t>WebSocket</a:t>
+            </a:r>
+            <a:r>
+              <a:rPr lang="en-US" sz="1200" b="0" dirty="0" smtClean="0">
+                <a:latin typeface="Book Antiqua" pitchFamily="18" charset="0"/>
+              </a:rPr>
+              <a:t> </a:t>
+            </a:r>
+            <a:r>
+              <a:rPr lang="en-US" sz="1200" b="0" dirty="0" err="1" smtClean="0">
+                <a:latin typeface="Book Antiqua" pitchFamily="18" charset="0"/>
+              </a:rPr>
+              <a:t>ws</a:t>
+            </a:r>
+            <a:r>
+              <a:rPr lang="en-US" sz="1200" b="0" dirty="0" smtClean="0">
+                <a:latin typeface="Book Antiqua" pitchFamily="18" charset="0"/>
+              </a:rPr>
+              <a:t>(“ws://sockets.mbed.org/rpc/</a:t>
+            </a:r>
+            <a:r>
+              <a:rPr lang="en-US" sz="1200" dirty="0" smtClean="0">
+                <a:latin typeface="Book Antiqua" pitchFamily="18" charset="0"/>
+              </a:rPr>
+              <a:t>net/mbed1</a:t>
+            </a:r>
+            <a:r>
+              <a:rPr lang="en-US" sz="1200" b="0" dirty="0" smtClean="0">
+                <a:latin typeface="Book Antiqua" pitchFamily="18" charset="0"/>
+              </a:rPr>
+              <a:t>”);</a:t>
+            </a:r>
+          </a:p>
+          <a:p>
+            <a:pPr algn="l"/>
+            <a:r>
+              <a:rPr lang="en-US" sz="1200" b="0" dirty="0" smtClean="0">
+                <a:latin typeface="Book Antiqua" pitchFamily="18" charset="0"/>
+              </a:rPr>
+              <a:t> </a:t>
+            </a:r>
+            <a:r>
+              <a:rPr lang="en-US" sz="1200" b="0" dirty="0" smtClean="0">
+                <a:latin typeface="Book Antiqua" pitchFamily="18" charset="0"/>
+              </a:rPr>
+              <a:t>   </a:t>
+            </a:r>
+            <a:r>
+              <a:rPr lang="en-US" sz="1200" dirty="0" err="1" smtClean="0">
+                <a:latin typeface="Book Antiqua" pitchFamily="18" charset="0"/>
+              </a:rPr>
+              <a:t>MbedJSONRpc</a:t>
+            </a:r>
+            <a:r>
+              <a:rPr lang="en-US" sz="1200" dirty="0" smtClean="0">
+                <a:latin typeface="Book Antiqua" pitchFamily="18" charset="0"/>
+              </a:rPr>
+              <a:t> </a:t>
+            </a:r>
+            <a:r>
+              <a:rPr lang="en-US" sz="1200" dirty="0" err="1" smtClean="0">
+                <a:latin typeface="Book Antiqua" pitchFamily="18" charset="0"/>
+              </a:rPr>
+              <a:t>rpc</a:t>
+            </a:r>
+            <a:r>
+              <a:rPr lang="en-US" sz="1200" dirty="0" smtClean="0">
+                <a:latin typeface="Book Antiqua" pitchFamily="18" charset="0"/>
+              </a:rPr>
+              <a:t>(&amp;</a:t>
+            </a:r>
+            <a:r>
+              <a:rPr lang="en-US" sz="1200" dirty="0" err="1" smtClean="0">
+                <a:latin typeface="Book Antiqua" pitchFamily="18" charset="0"/>
+              </a:rPr>
+              <a:t>ws</a:t>
+            </a:r>
+            <a:r>
+              <a:rPr lang="en-US" sz="1200" dirty="0" smtClean="0">
+                <a:latin typeface="Book Antiqua" pitchFamily="18" charset="0"/>
+              </a:rPr>
+              <a:t>);</a:t>
+            </a:r>
+            <a:endParaRPr lang="en-US" sz="1200" dirty="0" smtClean="0">
+              <a:latin typeface="Book Antiqua" pitchFamily="18" charset="0"/>
+            </a:endParaRPr>
+          </a:p>
+          <a:p>
+            <a:pPr algn="l"/>
+            <a:endParaRPr lang="en-US" sz="1200" b="0" dirty="0" smtClean="0">
+              <a:latin typeface="Book Antiqua" pitchFamily="18" charset="0"/>
+            </a:endParaRPr>
+          </a:p>
+          <a:p>
+            <a:pPr algn="l"/>
+            <a:r>
+              <a:rPr lang="en-US" sz="1200" b="0" dirty="0" smtClean="0">
+                <a:latin typeface="Book Antiqua" pitchFamily="18" charset="0"/>
+              </a:rPr>
+              <a:t>    </a:t>
+            </a:r>
+            <a:r>
+              <a:rPr lang="en-US" sz="1200" b="0" dirty="0" err="1" smtClean="0">
+                <a:latin typeface="Book Antiqua" pitchFamily="18" charset="0"/>
+              </a:rPr>
+              <a:t>connectWifi</a:t>
+            </a:r>
+            <a:r>
+              <a:rPr lang="en-US" sz="1200" b="0" dirty="0" smtClean="0">
+                <a:latin typeface="Book Antiqua" pitchFamily="18" charset="0"/>
+              </a:rPr>
+              <a:t>();</a:t>
+            </a:r>
+          </a:p>
+          <a:p>
+            <a:pPr algn="l"/>
+            <a:r>
+              <a:rPr lang="en-US" sz="1200" b="0" dirty="0" smtClean="0">
+                <a:latin typeface="Book Antiqua" pitchFamily="18" charset="0"/>
+              </a:rPr>
+              <a:t> </a:t>
+            </a:r>
+            <a:r>
+              <a:rPr lang="en-US" sz="1200" b="0" dirty="0" smtClean="0">
+                <a:latin typeface="Book Antiqua" pitchFamily="18" charset="0"/>
+              </a:rPr>
+              <a:t>   </a:t>
+            </a:r>
+            <a:r>
+              <a:rPr lang="en-US" sz="1200" b="0" dirty="0" err="1" smtClean="0">
+                <a:latin typeface="Book Antiqua" pitchFamily="18" charset="0"/>
+              </a:rPr>
+              <a:t>connectWebSocket</a:t>
+            </a:r>
+            <a:r>
+              <a:rPr lang="en-US" sz="1200" b="0" dirty="0" smtClean="0">
+                <a:latin typeface="Book Antiqua" pitchFamily="18" charset="0"/>
+              </a:rPr>
+              <a:t>();</a:t>
+            </a:r>
+          </a:p>
+          <a:p>
+            <a:pPr algn="l"/>
+            <a:endParaRPr lang="en-US" sz="1200" b="0" dirty="0" smtClean="0">
+              <a:latin typeface="Book Antiqua" pitchFamily="18" charset="0"/>
+            </a:endParaRPr>
+          </a:p>
+          <a:p>
+            <a:pPr algn="l"/>
+            <a:r>
+              <a:rPr lang="en-US" sz="1200" b="0" dirty="0" smtClean="0">
+                <a:latin typeface="Book Antiqua" pitchFamily="18" charset="0"/>
+              </a:rPr>
+              <a:t>     </a:t>
+            </a:r>
+            <a:r>
+              <a:rPr lang="en-US" sz="1200" dirty="0" err="1" smtClean="0">
+                <a:latin typeface="Book Antiqua" pitchFamily="18" charset="0"/>
+              </a:rPr>
+              <a:t>rpc.registerMethod</a:t>
+            </a:r>
+            <a:r>
+              <a:rPr lang="en-US" sz="1200" dirty="0" smtClean="0">
+                <a:latin typeface="Book Antiqua" pitchFamily="18" charset="0"/>
+              </a:rPr>
+              <a:t>(“echo”, &amp;</a:t>
+            </a:r>
+            <a:r>
+              <a:rPr lang="en-US" sz="1200" dirty="0" smtClean="0">
+                <a:latin typeface="Book Antiqua" pitchFamily="18" charset="0"/>
+              </a:rPr>
+              <a:t>e</a:t>
+            </a:r>
+            <a:r>
+              <a:rPr lang="en-US" sz="1200" dirty="0" smtClean="0">
+                <a:latin typeface="Book Antiqua" pitchFamily="18" charset="0"/>
+              </a:rPr>
+              <a:t>cho);</a:t>
+            </a:r>
+          </a:p>
+          <a:p>
+            <a:pPr algn="l"/>
+            <a:endParaRPr lang="en-US" sz="1200" b="0" dirty="0" smtClean="0">
+              <a:latin typeface="Book Antiqua" pitchFamily="18" charset="0"/>
+            </a:endParaRPr>
+          </a:p>
+          <a:p>
+            <a:pPr algn="l"/>
+            <a:r>
+              <a:rPr lang="en-US" sz="1200" b="0" dirty="0" smtClean="0">
+                <a:latin typeface="Book Antiqua" pitchFamily="18" charset="0"/>
+              </a:rPr>
+              <a:t>     </a:t>
+            </a:r>
+            <a:r>
+              <a:rPr lang="en-US" sz="1200" dirty="0" err="1" smtClean="0">
+                <a:latin typeface="Book Antiqua" pitchFamily="18" charset="0"/>
+              </a:rPr>
+              <a:t>rpc.work</a:t>
+            </a:r>
+            <a:r>
+              <a:rPr lang="en-US" sz="1200" dirty="0" smtClean="0">
+                <a:latin typeface="Book Antiqua" pitchFamily="18" charset="0"/>
+              </a:rPr>
+              <a:t>();</a:t>
+            </a:r>
+            <a:endParaRPr lang="en-US" sz="1200" dirty="0" smtClean="0">
+              <a:latin typeface="Book Antiqua" pitchFamily="18" charset="0"/>
+            </a:endParaRPr>
+          </a:p>
+          <a:p>
+            <a:pPr algn="l"/>
+            <a:r>
+              <a:rPr lang="en-US" sz="1200" b="0" dirty="0" smtClean="0">
+                <a:latin typeface="Book Antiqua" pitchFamily="18" charset="0"/>
+              </a:rPr>
+              <a:t>}</a:t>
+            </a:r>
+            <a:endParaRPr lang="en-US" sz="1200" b="0" dirty="0">
+              <a:latin typeface="Book Antiqua" pitchFamily="18" charset="0"/>
+            </a:endParaRPr>
+          </a:p>
+        </p:txBody>
+      </p:sp>
+      <p:sp>
+        <p:nvSpPr>
+          <p:cNvPr id="5" name="ZoneTexte 4"/>
+          <p:cNvSpPr txBox="1"/>
+          <p:nvPr/>
+        </p:nvSpPr>
+        <p:spPr>
+          <a:xfrm>
+            <a:off x="4540468" y="2480463"/>
+            <a:ext cx="4466898" cy="3231654"/>
+          </a:xfrm>
+          <a:prstGeom prst="rect">
+            <a:avLst/>
+          </a:prstGeom>
+          <a:solidFill>
+            <a:schemeClr val="accent1">
+              <a:lumMod val="20000"/>
+              <a:lumOff val="80000"/>
+            </a:schemeClr>
+          </a:solidFill>
+        </p:spPr>
+        <p:txBody>
+          <a:bodyPr wrap="square" rtlCol="0">
+            <a:spAutoFit/>
+          </a:bodyPr>
+          <a:lstStyle/>
+          <a:p>
+            <a:pPr algn="l"/>
+            <a:r>
+              <a:rPr lang="en-US" sz="1200" b="0" dirty="0" err="1" smtClean="0">
+                <a:solidFill>
+                  <a:srgbClr val="0070C0"/>
+                </a:solidFill>
+                <a:latin typeface="Book Antiqua" pitchFamily="18" charset="0"/>
+              </a:rPr>
+              <a:t>i</a:t>
+            </a:r>
+            <a:r>
+              <a:rPr lang="en-US" sz="1200" b="0" dirty="0" err="1" smtClean="0">
+                <a:solidFill>
+                  <a:srgbClr val="0070C0"/>
+                </a:solidFill>
+                <a:latin typeface="Book Antiqua" pitchFamily="18" charset="0"/>
+              </a:rPr>
+              <a:t>nt</a:t>
+            </a:r>
+            <a:r>
+              <a:rPr lang="en-US" sz="1200" b="0" dirty="0" smtClean="0">
+                <a:latin typeface="Book Antiqua" pitchFamily="18" charset="0"/>
+              </a:rPr>
+              <a:t> main(void)</a:t>
+            </a:r>
+          </a:p>
+          <a:p>
+            <a:pPr algn="l"/>
+            <a:r>
+              <a:rPr lang="en-US" sz="1200" b="0" dirty="0" smtClean="0">
+                <a:latin typeface="Book Antiqua" pitchFamily="18" charset="0"/>
+              </a:rPr>
+              <a:t>{</a:t>
+            </a:r>
+            <a:endParaRPr lang="en-US" sz="1200" b="0" dirty="0" smtClean="0">
+              <a:latin typeface="Book Antiqua" pitchFamily="18" charset="0"/>
+            </a:endParaRPr>
+          </a:p>
+          <a:p>
+            <a:pPr algn="l"/>
+            <a:r>
+              <a:rPr lang="en-US" sz="1200" b="0" dirty="0" smtClean="0">
+                <a:latin typeface="Book Antiqua" pitchFamily="18" charset="0"/>
+              </a:rPr>
+              <a:t>    </a:t>
+            </a:r>
+            <a:r>
+              <a:rPr lang="en-US" sz="1200" b="0" dirty="0" err="1" smtClean="0">
+                <a:latin typeface="Book Antiqua" pitchFamily="18" charset="0"/>
+              </a:rPr>
+              <a:t>WebSocket</a:t>
+            </a:r>
+            <a:r>
+              <a:rPr lang="en-US" sz="1200" b="0" dirty="0" smtClean="0">
+                <a:latin typeface="Book Antiqua" pitchFamily="18" charset="0"/>
+              </a:rPr>
+              <a:t> </a:t>
+            </a:r>
+            <a:r>
+              <a:rPr lang="en-US" sz="1200" b="0" dirty="0" err="1" smtClean="0">
+                <a:latin typeface="Book Antiqua" pitchFamily="18" charset="0"/>
+              </a:rPr>
+              <a:t>ws</a:t>
+            </a:r>
+            <a:r>
+              <a:rPr lang="en-US" sz="1200" b="0" dirty="0" smtClean="0">
+                <a:latin typeface="Book Antiqua" pitchFamily="18" charset="0"/>
+              </a:rPr>
+              <a:t>(“ws://</a:t>
+            </a:r>
+            <a:r>
+              <a:rPr lang="en-US" sz="1200" b="0" dirty="0" smtClean="0">
+                <a:latin typeface="Book Antiqua" pitchFamily="18" charset="0"/>
+              </a:rPr>
+              <a:t>sockets.mbed.org/rpc/</a:t>
+            </a:r>
+            <a:r>
+              <a:rPr lang="en-US" sz="1200" dirty="0" smtClean="0">
+                <a:latin typeface="Book Antiqua" pitchFamily="18" charset="0"/>
+              </a:rPr>
+              <a:t>net/mbed2</a:t>
+            </a:r>
+            <a:r>
+              <a:rPr lang="en-US" sz="1200" b="0" dirty="0" smtClean="0">
+                <a:latin typeface="Book Antiqua" pitchFamily="18" charset="0"/>
+              </a:rPr>
+              <a:t>”);</a:t>
+            </a:r>
+            <a:endParaRPr lang="en-US" sz="1200" b="0" dirty="0" smtClean="0">
+              <a:latin typeface="Book Antiqua" pitchFamily="18" charset="0"/>
+            </a:endParaRPr>
+          </a:p>
+          <a:p>
+            <a:pPr algn="l"/>
+            <a:r>
+              <a:rPr lang="en-US" sz="1200" b="0" dirty="0" smtClean="0">
+                <a:latin typeface="Book Antiqua" pitchFamily="18" charset="0"/>
+              </a:rPr>
+              <a:t>    </a:t>
+            </a:r>
+            <a:r>
+              <a:rPr lang="en-US" sz="1200" dirty="0" err="1" smtClean="0">
+                <a:latin typeface="Book Antiqua" pitchFamily="18" charset="0"/>
+              </a:rPr>
+              <a:t>MbedJSONRpc</a:t>
+            </a:r>
+            <a:r>
+              <a:rPr lang="en-US" sz="1200" dirty="0" smtClean="0">
+                <a:latin typeface="Book Antiqua" pitchFamily="18" charset="0"/>
+              </a:rPr>
+              <a:t> </a:t>
+            </a:r>
+            <a:r>
+              <a:rPr lang="en-US" sz="1200" dirty="0" err="1" smtClean="0">
+                <a:latin typeface="Book Antiqua" pitchFamily="18" charset="0"/>
+              </a:rPr>
+              <a:t>rpc</a:t>
+            </a:r>
+            <a:r>
+              <a:rPr lang="en-US" sz="1200" dirty="0" smtClean="0">
+                <a:latin typeface="Book Antiqua" pitchFamily="18" charset="0"/>
+              </a:rPr>
+              <a:t>(&amp;</a:t>
+            </a:r>
+            <a:r>
+              <a:rPr lang="en-US" sz="1200" dirty="0" err="1" smtClean="0">
+                <a:latin typeface="Book Antiqua" pitchFamily="18" charset="0"/>
+              </a:rPr>
+              <a:t>ws</a:t>
+            </a:r>
+            <a:r>
+              <a:rPr lang="en-US" sz="1200" dirty="0" smtClean="0">
+                <a:latin typeface="Book Antiqua" pitchFamily="18" charset="0"/>
+              </a:rPr>
+              <a:t>);</a:t>
+            </a:r>
+            <a:endParaRPr lang="en-US" sz="1200" dirty="0" smtClean="0">
+              <a:latin typeface="Book Antiqua" pitchFamily="18" charset="0"/>
+            </a:endParaRPr>
+          </a:p>
+          <a:p>
+            <a:pPr algn="l"/>
+            <a:endParaRPr lang="en-US" sz="1200" b="0" dirty="0" smtClean="0">
+              <a:latin typeface="Book Antiqua" pitchFamily="18" charset="0"/>
+            </a:endParaRPr>
+          </a:p>
+          <a:p>
+            <a:pPr algn="l"/>
+            <a:r>
+              <a:rPr lang="en-US" sz="1200" b="0" dirty="0" smtClean="0">
+                <a:latin typeface="Book Antiqua" pitchFamily="18" charset="0"/>
+              </a:rPr>
+              <a:t>    </a:t>
+            </a:r>
+            <a:r>
+              <a:rPr lang="en-US" sz="1200" b="0" dirty="0" err="1" smtClean="0">
+                <a:latin typeface="Book Antiqua" pitchFamily="18" charset="0"/>
+              </a:rPr>
+              <a:t>MbedJSONValue</a:t>
+            </a:r>
+            <a:r>
+              <a:rPr lang="en-US" sz="1200" b="0" dirty="0" smtClean="0">
+                <a:latin typeface="Book Antiqua" pitchFamily="18" charset="0"/>
+              </a:rPr>
+              <a:t> in = “Hello!”;</a:t>
+            </a:r>
+          </a:p>
+          <a:p>
+            <a:pPr algn="l"/>
+            <a:r>
+              <a:rPr lang="en-US" sz="1200" b="0" dirty="0" smtClean="0">
+                <a:latin typeface="Book Antiqua" pitchFamily="18" charset="0"/>
+              </a:rPr>
+              <a:t> </a:t>
+            </a:r>
+            <a:r>
+              <a:rPr lang="en-US" sz="1200" b="0" dirty="0" smtClean="0">
+                <a:latin typeface="Book Antiqua" pitchFamily="18" charset="0"/>
+              </a:rPr>
+              <a:t>   </a:t>
+            </a:r>
+            <a:r>
+              <a:rPr lang="en-US" sz="1200" b="0" dirty="0" err="1" smtClean="0">
+                <a:latin typeface="Book Antiqua" pitchFamily="18" charset="0"/>
+              </a:rPr>
+              <a:t>MbedJSONValue</a:t>
+            </a:r>
+            <a:r>
+              <a:rPr lang="en-US" sz="1200" b="0" dirty="0" smtClean="0">
+                <a:latin typeface="Book Antiqua" pitchFamily="18" charset="0"/>
+              </a:rPr>
+              <a:t> out;</a:t>
+            </a:r>
+          </a:p>
+          <a:p>
+            <a:pPr algn="l"/>
+            <a:endParaRPr lang="en-US" sz="1200" b="0" dirty="0" smtClean="0">
+              <a:latin typeface="Book Antiqua" pitchFamily="18" charset="0"/>
+            </a:endParaRPr>
+          </a:p>
+          <a:p>
+            <a:pPr algn="l"/>
+            <a:r>
+              <a:rPr lang="en-US" sz="1200" b="0" dirty="0" smtClean="0">
+                <a:latin typeface="Book Antiqua" pitchFamily="18" charset="0"/>
+              </a:rPr>
+              <a:t>    </a:t>
+            </a:r>
+            <a:r>
+              <a:rPr lang="en-US" sz="1200" b="0" dirty="0" err="1" smtClean="0">
+                <a:latin typeface="Book Antiqua" pitchFamily="18" charset="0"/>
+              </a:rPr>
+              <a:t>connectWifi</a:t>
+            </a:r>
+            <a:r>
+              <a:rPr lang="en-US" sz="1200" b="0" dirty="0" smtClean="0">
+                <a:latin typeface="Book Antiqua" pitchFamily="18" charset="0"/>
+              </a:rPr>
+              <a:t>();</a:t>
+            </a:r>
+          </a:p>
+          <a:p>
+            <a:pPr algn="l"/>
+            <a:r>
+              <a:rPr lang="en-US" sz="1200" b="0" dirty="0" smtClean="0">
+                <a:latin typeface="Book Antiqua" pitchFamily="18" charset="0"/>
+              </a:rPr>
+              <a:t> </a:t>
+            </a:r>
+            <a:r>
+              <a:rPr lang="en-US" sz="1200" b="0" dirty="0" smtClean="0">
+                <a:latin typeface="Book Antiqua" pitchFamily="18" charset="0"/>
+              </a:rPr>
+              <a:t>   </a:t>
+            </a:r>
+            <a:r>
+              <a:rPr lang="en-US" sz="1200" b="0" dirty="0" err="1" smtClean="0">
+                <a:latin typeface="Book Antiqua" pitchFamily="18" charset="0"/>
+              </a:rPr>
+              <a:t>connectWebSocket</a:t>
+            </a:r>
+            <a:r>
+              <a:rPr lang="en-US" sz="1200" b="0" dirty="0" smtClean="0">
+                <a:latin typeface="Book Antiqua" pitchFamily="18" charset="0"/>
+              </a:rPr>
+              <a:t>();</a:t>
+            </a:r>
+          </a:p>
+          <a:p>
+            <a:pPr algn="l"/>
+            <a:endParaRPr lang="en-US" sz="1200" b="0" dirty="0" smtClean="0">
+              <a:latin typeface="Book Antiqua" pitchFamily="18" charset="0"/>
+            </a:endParaRPr>
+          </a:p>
+          <a:p>
+            <a:pPr algn="l"/>
+            <a:r>
+              <a:rPr lang="en-US" sz="1200" b="0" dirty="0" smtClean="0">
+                <a:latin typeface="Book Antiqua" pitchFamily="18" charset="0"/>
+              </a:rPr>
+              <a:t>    </a:t>
+            </a:r>
+            <a:r>
+              <a:rPr lang="en-US" sz="1200" dirty="0" err="1" smtClean="0">
+                <a:latin typeface="Book Antiqua" pitchFamily="18" charset="0"/>
+              </a:rPr>
+              <a:t>rpc.call</a:t>
+            </a:r>
+            <a:r>
+              <a:rPr lang="en-US" sz="1200" dirty="0" smtClean="0">
+                <a:latin typeface="Book Antiqua" pitchFamily="18" charset="0"/>
+              </a:rPr>
+              <a:t>(“echo”, “mbed1”, in, out);</a:t>
+            </a:r>
+          </a:p>
+          <a:p>
+            <a:pPr algn="l"/>
+            <a:r>
+              <a:rPr lang="en-US" sz="1200" b="0" dirty="0" smtClean="0">
+                <a:latin typeface="Book Antiqua" pitchFamily="18" charset="0"/>
+              </a:rPr>
+              <a:t> </a:t>
+            </a:r>
+            <a:r>
+              <a:rPr lang="en-US" sz="1200" b="0" dirty="0" smtClean="0">
+                <a:latin typeface="Book Antiqua" pitchFamily="18" charset="0"/>
+              </a:rPr>
+              <a:t>   </a:t>
+            </a:r>
+            <a:r>
+              <a:rPr lang="en-US" sz="1200" b="0" dirty="0" err="1" smtClean="0">
+                <a:latin typeface="Book Antiqua" pitchFamily="18" charset="0"/>
+              </a:rPr>
+              <a:t>printf</a:t>
+            </a:r>
+            <a:r>
+              <a:rPr lang="en-US" sz="1200" b="0" dirty="0" smtClean="0">
+                <a:latin typeface="Book Antiqua" pitchFamily="18" charset="0"/>
+              </a:rPr>
+              <a:t>(“result: %s”, </a:t>
+            </a:r>
+            <a:r>
+              <a:rPr lang="en-US" sz="1200" b="0" dirty="0" err="1" smtClean="0">
+                <a:latin typeface="Book Antiqua" pitchFamily="18" charset="0"/>
+              </a:rPr>
+              <a:t>out.get</a:t>
+            </a:r>
+            <a:r>
+              <a:rPr lang="en-US" sz="1200" b="0" dirty="0" smtClean="0">
+                <a:latin typeface="Book Antiqua" pitchFamily="18" charset="0"/>
+              </a:rPr>
+              <a:t>&lt;string&gt;());</a:t>
+            </a:r>
+            <a:endParaRPr lang="en-US" sz="1200" b="0" dirty="0" smtClean="0">
+              <a:latin typeface="Book Antiqua" pitchFamily="18" charset="0"/>
+            </a:endParaRPr>
+          </a:p>
+          <a:p>
+            <a:pPr algn="l"/>
+            <a:r>
+              <a:rPr lang="en-US" sz="1200" b="0" dirty="0" smtClean="0">
+                <a:latin typeface="Book Antiqua" pitchFamily="18" charset="0"/>
+              </a:rPr>
+              <a:t>}</a:t>
+            </a:r>
+          </a:p>
+          <a:p>
+            <a:pPr algn="l"/>
+            <a:endParaRPr lang="en-US" sz="1200" b="0" dirty="0" smtClean="0">
+              <a:latin typeface="Book Antiqua" pitchFamily="18" charset="0"/>
+            </a:endParaRPr>
+          </a:p>
+          <a:p>
+            <a:pPr algn="l"/>
+            <a:endParaRPr lang="en-US" sz="1200" b="0" dirty="0" smtClean="0">
+              <a:latin typeface="Book Antiqua" pitchFamily="18" charset="0"/>
+            </a:endParaRPr>
+          </a:p>
+          <a:p>
+            <a:pPr algn="l"/>
+            <a:endParaRPr lang="en-US" sz="1200" b="0" dirty="0">
+              <a:latin typeface="Book Antiqua" pitchFamily="18" charset="0"/>
+            </a:endParaRPr>
+          </a:p>
+        </p:txBody>
+      </p:sp>
+    </p:spTree>
+  </p:cSld>
+  <p:clrMapOvr>
+    <a:masterClrMapping/>
+  </p:clrMapOvr>
+</p:sld>
+</file>
+
 <file path=ppt/slides/slide2.xml><?xml version="1.0" encoding="utf-8"?>
 <p:sld xmlns:a="http://schemas.openxmlformats.org/drawingml/2006/main" xmlns:r="http://schemas.openxmlformats.org/officeDocument/2006/relationships" xmlns:p="http://schemas.openxmlformats.org/presentationml/2006/main">
   <p:cSld>
@@ -4450,7 +7023,7 @@
             </a:pPr>
             <a:r>
               <a:rPr lang="en-US" dirty="0" err="1" smtClean="0"/>
-              <a:t>Websockets</a:t>
+              <a:t>WebSockets</a:t>
             </a:r>
             <a:endParaRPr lang="en-US" dirty="0" smtClean="0"/>
           </a:p>
@@ -4463,7 +7036,6 @@
               <a:rPr lang="en-US" dirty="0" smtClean="0"/>
               <a:t>Connecting sensors to the cloud</a:t>
             </a:r>
-            <a:endParaRPr lang="en-US" dirty="0" smtClean="0"/>
           </a:p>
           <a:p>
             <a:pPr marL="901700" lvl="1" indent="-457200">
@@ -4476,7 +7048,11 @@
             </a:r>
             <a:r>
               <a:rPr lang="en-US" dirty="0" err="1" smtClean="0"/>
-              <a:t>websocket</a:t>
+              <a:t>W</a:t>
+            </a:r>
+            <a:r>
+              <a:rPr lang="en-US" dirty="0" err="1" smtClean="0"/>
+              <a:t>ebSocket</a:t>
             </a:r>
             <a:endParaRPr lang="en-US" dirty="0" smtClean="0"/>
           </a:p>
@@ -5357,11 +7933,7 @@
           <a:p>
             <a:r>
               <a:rPr lang="en-US" dirty="0" smtClean="0"/>
-              <a:t>Internet of </a:t>
-            </a:r>
-            <a:r>
-              <a:rPr lang="en-US" dirty="0" smtClean="0"/>
-              <a:t>Things (IOT)</a:t>
+              <a:t>Internet of Things (IOT)</a:t>
             </a:r>
             <a:endParaRPr lang="en-US" dirty="0"/>
           </a:p>
@@ -5799,7 +8371,18 @@
             <a:pPr lvl="1"/>
             <a:r>
               <a:rPr lang="en-US" dirty="0" smtClean="0"/>
-              <a:t>To replace all existing polling techniques (AJAX)</a:t>
+              <a:t>To replace all existing polling techniques (AJAX</a:t>
+            </a:r>
+            <a:r>
+              <a:rPr lang="en-US" dirty="0" smtClean="0"/>
+              <a:t>)</a:t>
+            </a:r>
+          </a:p>
+          <a:p>
+            <a:pPr lvl="1"/>
+            <a:r>
+              <a:rPr lang="en-US" dirty="0" smtClean="0"/>
+              <a:t>Allow a real server-push mechanism</a:t>
             </a:r>
             <a:endParaRPr lang="en-US" dirty="0"/>
           </a:p>
@@ -5912,11 +8495,7 @@
           <a:p>
             <a:r>
               <a:rPr lang="en-US" dirty="0" smtClean="0"/>
-              <a:t>Once the connection is established</a:t>
-            </a:r>
-            <a:r>
-              <a:rPr lang="en-US" dirty="0" smtClean="0"/>
-              <a:t>:</a:t>
+              <a:t>Once the connection is established:</a:t>
             </a:r>
           </a:p>
           <a:p>

</xml_diff>

<commit_message>
beginning of usb in pres
</commit_message>
<xml_diff>
--- a/presentation_en/pres.pptx
+++ b/presentation_en/pres.pptx
@@ -5,10 +5,10 @@
     <p:sldMasterId id="2147483664" r:id="rId1"/>
   </p:sldMasterIdLst>
   <p:notesMasterIdLst>
-    <p:notesMasterId r:id="rId20"/>
+    <p:notesMasterId r:id="rId25"/>
   </p:notesMasterIdLst>
   <p:handoutMasterIdLst>
-    <p:handoutMasterId r:id="rId21"/>
+    <p:handoutMasterId r:id="rId26"/>
   </p:handoutMasterIdLst>
   <p:sldIdLst>
     <p:sldId id="256" r:id="rId2"/>
@@ -29,6 +29,11 @@
     <p:sldId id="272" r:id="rId17"/>
     <p:sldId id="274" r:id="rId18"/>
     <p:sldId id="273" r:id="rId19"/>
+    <p:sldId id="275" r:id="rId20"/>
+    <p:sldId id="276" r:id="rId21"/>
+    <p:sldId id="277" r:id="rId22"/>
+    <p:sldId id="278" r:id="rId23"/>
+    <p:sldId id="279" r:id="rId24"/>
   </p:sldIdLst>
   <p:sldSz cx="9144000" cy="6858000" type="screen4x3"/>
   <p:notesSz cx="6743700" cy="9880600"/>
@@ -4092,11 +4097,7 @@
             </a:r>
             <a:r>
               <a:rPr lang="en-US" dirty="0" smtClean="0"/>
-              <a:t> server</a:t>
-            </a:r>
-            <a:r>
-              <a:rPr lang="en-US" dirty="0" smtClean="0"/>
-              <a:t>:</a:t>
+              <a:t> server:</a:t>
             </a:r>
           </a:p>
           <a:p>
@@ -5197,7 +5198,6 @@
               <a:rPr lang="en-US" dirty="0" smtClean="0"/>
               <a:t>ERROR</a:t>
             </a:r>
-            <a:endParaRPr lang="en-US" dirty="0" smtClean="0"/>
           </a:p>
           <a:p>
             <a:pPr lvl="1"/>
@@ -5217,7 +5217,6 @@
               <a:rPr lang="en-US" dirty="0" smtClean="0"/>
               <a:t>	</a:t>
             </a:r>
-            <a:endParaRPr lang="en-US" dirty="0" smtClean="0"/>
           </a:p>
         </p:txBody>
       </p:sp>
@@ -5969,11 +5968,7 @@
             <a:pPr lvl="1"/>
             <a:r>
               <a:rPr lang="fr-FR" i="1" dirty="0" smtClean="0"/>
-              <a:t>ws://</a:t>
-            </a:r>
-            <a:r>
-              <a:rPr lang="fr-FR" i="1" dirty="0" smtClean="0"/>
-              <a:t>sockets.mbed.org/rpc/</a:t>
+              <a:t>ws://sockets.mbed.org/rpc/</a:t>
             </a:r>
             <a:r>
               <a:rPr lang="fr-FR" i="1" dirty="0" smtClean="0">
@@ -6017,11 +6012,6 @@
               </a:rPr>
               <a:t>Manage messages exchanged</a:t>
             </a:r>
-            <a:endParaRPr lang="en-US" dirty="0" smtClean="0">
-              <a:solidFill>
-                <a:schemeClr val="tx1"/>
-              </a:solidFill>
-            </a:endParaRPr>
           </a:p>
           <a:p>
             <a:pPr lvl="1"/>
@@ -6172,7 +6162,94 @@
                 </a:solidFill>
                 <a:latin typeface="Book Antiqua" pitchFamily="18" charset="0"/>
               </a:rPr>
-              <a:t>v</a:t>
+              <a:t>void</a:t>
+            </a:r>
+            <a:r>
+              <a:rPr lang="en-US" sz="1200" b="0" dirty="0" smtClean="0">
+                <a:latin typeface="Book Antiqua" pitchFamily="18" charset="0"/>
+              </a:rPr>
+              <a:t> echo(</a:t>
+            </a:r>
+            <a:r>
+              <a:rPr lang="en-US" sz="1200" b="0" dirty="0" err="1" smtClean="0">
+                <a:latin typeface="Book Antiqua" pitchFamily="18" charset="0"/>
+              </a:rPr>
+              <a:t>MbedJSONValue</a:t>
+            </a:r>
+            <a:r>
+              <a:rPr lang="en-US" sz="1200" b="0" dirty="0" smtClean="0">
+                <a:latin typeface="Book Antiqua" pitchFamily="18" charset="0"/>
+              </a:rPr>
+              <a:t>&amp; in, </a:t>
+            </a:r>
+            <a:r>
+              <a:rPr lang="en-US" sz="1200" b="0" dirty="0" err="1" smtClean="0">
+                <a:latin typeface="Book Antiqua" pitchFamily="18" charset="0"/>
+              </a:rPr>
+              <a:t>MbedJSONValue</a:t>
+            </a:r>
+            <a:r>
+              <a:rPr lang="en-US" sz="1200" b="0" dirty="0" smtClean="0">
+                <a:latin typeface="Book Antiqua" pitchFamily="18" charset="0"/>
+              </a:rPr>
+              <a:t>&amp; out)</a:t>
+            </a:r>
+          </a:p>
+          <a:p>
+            <a:pPr algn="l"/>
+            <a:r>
+              <a:rPr lang="en-US" sz="1200" b="0" dirty="0" smtClean="0">
+                <a:latin typeface="Book Antiqua" pitchFamily="18" charset="0"/>
+              </a:rPr>
+              <a:t>{</a:t>
+            </a:r>
+          </a:p>
+          <a:p>
+            <a:pPr algn="l"/>
+            <a:r>
+              <a:rPr lang="en-US" sz="1200" b="0" dirty="0" smtClean="0">
+                <a:latin typeface="Book Antiqua" pitchFamily="18" charset="0"/>
+              </a:rPr>
+              <a:t>     out = </a:t>
+            </a:r>
+            <a:r>
+              <a:rPr lang="en-US" sz="1200" b="0" dirty="0" err="1" smtClean="0">
+                <a:latin typeface="Book Antiqua" pitchFamily="18" charset="0"/>
+              </a:rPr>
+              <a:t>in.get</a:t>
+            </a:r>
+            <a:r>
+              <a:rPr lang="en-US" sz="1200" b="0" dirty="0" smtClean="0">
+                <a:latin typeface="Book Antiqua" pitchFamily="18" charset="0"/>
+              </a:rPr>
+              <a:t>&lt;string&gt;();</a:t>
+            </a:r>
+          </a:p>
+          <a:p>
+            <a:pPr algn="l"/>
+            <a:r>
+              <a:rPr lang="en-US" sz="1200" b="0" dirty="0" smtClean="0">
+                <a:latin typeface="Book Antiqua" pitchFamily="18" charset="0"/>
+              </a:rPr>
+              <a:t>}  </a:t>
+            </a:r>
+          </a:p>
+          <a:p>
+            <a:pPr algn="l"/>
+            <a:endParaRPr lang="en-US" sz="1200" b="0" dirty="0" smtClean="0">
+              <a:latin typeface="Book Antiqua" pitchFamily="18" charset="0"/>
+            </a:endParaRPr>
+          </a:p>
+          <a:p>
+            <a:pPr algn="l"/>
+            <a:r>
+              <a:rPr lang="en-US" sz="1200" b="0" dirty="0" err="1" smtClean="0">
+                <a:solidFill>
+                  <a:srgbClr val="0070C0"/>
+                </a:solidFill>
+                <a:latin typeface="Book Antiqua" pitchFamily="18" charset="0"/>
+              </a:rPr>
+              <a:t>int</a:t>
             </a:r>
             <a:r>
               <a:rPr lang="en-US" sz="1200" b="0" dirty="0" smtClean="0">
@@ -6181,46 +6258,67 @@
                 </a:solidFill>
                 <a:latin typeface="Book Antiqua" pitchFamily="18" charset="0"/>
               </a:rPr>
-              <a:t>oid</a:t>
+              <a:t> </a:t>
             </a:r>
             <a:r>
               <a:rPr lang="en-US" sz="1200" b="0" dirty="0" smtClean="0">
                 <a:latin typeface="Book Antiqua" pitchFamily="18" charset="0"/>
               </a:rPr>
-              <a:t> echo(</a:t>
+              <a:t>main()</a:t>
+            </a:r>
+          </a:p>
+          <a:p>
+            <a:pPr algn="l"/>
+            <a:r>
+              <a:rPr lang="en-US" sz="1200" b="0" dirty="0" smtClean="0">
+                <a:latin typeface="Book Antiqua" pitchFamily="18" charset="0"/>
+              </a:rPr>
+              <a:t>{</a:t>
+            </a:r>
+          </a:p>
+          <a:p>
+            <a:pPr algn="l"/>
+            <a:r>
+              <a:rPr lang="en-US" sz="1200" b="0" dirty="0" smtClean="0">
+                <a:latin typeface="Book Antiqua" pitchFamily="18" charset="0"/>
+              </a:rPr>
+              <a:t>    </a:t>
             </a:r>
             <a:r>
               <a:rPr lang="en-US" sz="1200" b="0" dirty="0" err="1" smtClean="0">
                 <a:latin typeface="Book Antiqua" pitchFamily="18" charset="0"/>
               </a:rPr>
-              <a:t>MbedJSONValue</a:t>
+              <a:t>WebSocket</a:t>
             </a:r>
             <a:r>
               <a:rPr lang="en-US" sz="1200" b="0" dirty="0" smtClean="0">
                 <a:latin typeface="Book Antiqua" pitchFamily="18" charset="0"/>
               </a:rPr>
-              <a:t>&amp; in, </a:t>
+              <a:t> </a:t>
             </a:r>
             <a:r>
               <a:rPr lang="en-US" sz="1200" b="0" dirty="0" err="1" smtClean="0">
                 <a:latin typeface="Book Antiqua" pitchFamily="18" charset="0"/>
               </a:rPr>
-              <a:t>MbedJSONValue</a:t>
+              <a:t>ws</a:t>
             </a:r>
             <a:r>
               <a:rPr lang="en-US" sz="1200" b="0" dirty="0" smtClean="0">
                 <a:latin typeface="Book Antiqua" pitchFamily="18" charset="0"/>
               </a:rPr>
-              <a:t>&amp; out)</a:t>
-            </a:r>
-          </a:p>
-          <a:p>
-            <a:pPr algn="l"/>
+              <a:t>(“ws://sockets.mbed.org/rpc/</a:t>
+            </a:r>
+            <a:r>
+              <a:rPr lang="en-US" sz="1200" dirty="0" smtClean="0">
+                <a:latin typeface="Book Antiqua" pitchFamily="18" charset="0"/>
+              </a:rPr>
+              <a:t>net/mbed1</a:t>
+            </a:r>
             <a:r>
               <a:rPr lang="en-US" sz="1200" b="0" dirty="0" smtClean="0">
                 <a:latin typeface="Book Antiqua" pitchFamily="18" charset="0"/>
               </a:rPr>
-              <a:t>{</a:t>
+              <a:t>”);</a:t>
             </a:r>
           </a:p>
           <a:p>
@@ -6229,43 +6327,43 @@
               <a:rPr lang="en-US" sz="1200" b="0" dirty="0" smtClean="0">
                 <a:latin typeface="Book Antiqua" pitchFamily="18" charset="0"/>
               </a:rPr>
+              <a:t>    </a:t>
+            </a:r>
+            <a:r>
+              <a:rPr lang="en-US" sz="1200" dirty="0" err="1" smtClean="0">
+                <a:latin typeface="Book Antiqua" pitchFamily="18" charset="0"/>
+              </a:rPr>
+              <a:t>MbedJSONRpc</a:t>
+            </a:r>
+            <a:r>
+              <a:rPr lang="en-US" sz="1200" dirty="0" smtClean="0">
+                <a:latin typeface="Book Antiqua" pitchFamily="18" charset="0"/>
+              </a:rPr>
               <a:t> </a:t>
             </a:r>
             <a:r>
-              <a:rPr lang="en-US" sz="1200" b="0" dirty="0" smtClean="0">
+              <a:rPr lang="en-US" sz="1200" dirty="0" err="1" smtClean="0">
                 <a:latin typeface="Book Antiqua" pitchFamily="18" charset="0"/>
               </a:rPr>
-              <a:t>    out = </a:t>
-            </a:r>
-            <a:r>
-              <a:rPr lang="en-US" sz="1200" b="0" dirty="0" err="1" smtClean="0">
+              <a:t>rpc</a:t>
+            </a:r>
+            <a:r>
+              <a:rPr lang="en-US" sz="1200" dirty="0" smtClean="0">
                 <a:latin typeface="Book Antiqua" pitchFamily="18" charset="0"/>
               </a:rPr>
-              <a:t>in.get</a:t>
-            </a:r>
-            <a:r>
-              <a:rPr lang="en-US" sz="1200" b="0" dirty="0" smtClean="0">
+              <a:t>(&amp;</a:t>
+            </a:r>
+            <a:r>
+              <a:rPr lang="en-US" sz="1200" dirty="0" err="1" smtClean="0">
                 <a:latin typeface="Book Antiqua" pitchFamily="18" charset="0"/>
               </a:rPr>
-              <a:t>&lt;string&gt;();</a:t>
-            </a:r>
-            <a:endParaRPr lang="en-US" sz="1200" b="0" dirty="0" smtClean="0">
-              <a:latin typeface="Book Antiqua" pitchFamily="18" charset="0"/>
-            </a:endParaRPr>
-          </a:p>
-          <a:p>
-            <a:pPr algn="l"/>
-            <a:r>
-              <a:rPr lang="en-US" sz="1200" b="0" dirty="0" smtClean="0">
+              <a:t>ws</a:t>
+            </a:r>
+            <a:r>
+              <a:rPr lang="en-US" sz="1200" dirty="0" smtClean="0">
                 <a:latin typeface="Book Antiqua" pitchFamily="18" charset="0"/>
               </a:rPr>
-              <a:t>}</a:t>
-            </a:r>
-            <a:r>
-              <a:rPr lang="en-US" sz="1200" b="0" dirty="0" smtClean="0">
-                <a:latin typeface="Book Antiqua" pitchFamily="18" charset="0"/>
-              </a:rPr>
-              <a:t>  </a:t>
+              <a:t>);</a:t>
             </a:r>
           </a:p>
           <a:p>
@@ -6277,46 +6375,22 @@
           <a:p>
             <a:pPr algn="l"/>
             <a:r>
-              <a:rPr lang="en-US" sz="1200" b="0" dirty="0" err="1" smtClean="0">
-                <a:solidFill>
-                  <a:srgbClr val="0070C0"/>
-                </a:solidFill>
-                <a:latin typeface="Book Antiqua" pitchFamily="18" charset="0"/>
-              </a:rPr>
-              <a:t>i</a:t>
-            </a:r>
-            <a:r>
-              <a:rPr lang="en-US" sz="1200" b="0" dirty="0" err="1" smtClean="0">
-                <a:solidFill>
-                  <a:srgbClr val="0070C0"/>
-                </a:solidFill>
-                <a:latin typeface="Book Antiqua" pitchFamily="18" charset="0"/>
-              </a:rPr>
-              <a:t>nt</a:t>
-            </a:r>
-            <a:r>
-              <a:rPr lang="en-US" sz="1200" b="0" dirty="0" smtClean="0">
-                <a:solidFill>
-                  <a:srgbClr val="0070C0"/>
-                </a:solidFill>
-                <a:latin typeface="Book Antiqua" pitchFamily="18" charset="0"/>
-              </a:rPr>
-              <a:t> </a:t>
-            </a:r>
-            <a:r>
               <a:rPr lang="en-US" sz="1200" b="0" dirty="0" smtClean="0">
                 <a:latin typeface="Book Antiqua" pitchFamily="18" charset="0"/>
               </a:rPr>
-              <a:t>main()</a:t>
-            </a:r>
-          </a:p>
-          <a:p>
-            <a:pPr algn="l"/>
+              <a:t>    </a:t>
+            </a:r>
+            <a:r>
+              <a:rPr lang="en-US" sz="1200" b="0" dirty="0" err="1" smtClean="0">
+                <a:latin typeface="Book Antiqua" pitchFamily="18" charset="0"/>
+              </a:rPr>
+              <a:t>connectWifi</a:t>
+            </a:r>
             <a:r>
               <a:rPr lang="en-US" sz="1200" b="0" dirty="0" smtClean="0">
                 <a:latin typeface="Book Antiqua" pitchFamily="18" charset="0"/>
               </a:rPr>
-              <a:t>{</a:t>
+              <a:t>();</a:t>
             </a:r>
           </a:p>
           <a:p>
@@ -6331,92 +6405,14 @@
               <a:rPr lang="en-US" sz="1200" b="0" dirty="0" err="1" smtClean="0">
                 <a:latin typeface="Book Antiqua" pitchFamily="18" charset="0"/>
               </a:rPr>
-              <a:t>WebSocket</a:t>
+              <a:t>connectWebSocket</a:t>
             </a:r>
             <a:r>
               <a:rPr lang="en-US" sz="1200" b="0" dirty="0" smtClean="0">
                 <a:latin typeface="Book Antiqua" pitchFamily="18" charset="0"/>
               </a:rPr>
-              <a:t> </a:t>
-            </a:r>
-            <a:r>
-              <a:rPr lang="en-US" sz="1200" b="0" dirty="0" err="1" smtClean="0">
-                <a:latin typeface="Book Antiqua" pitchFamily="18" charset="0"/>
-              </a:rPr>
-              <a:t>ws</a:t>
-            </a:r>
-            <a:r>
-              <a:rPr lang="en-US" sz="1200" b="0" dirty="0" smtClean="0">
-                <a:latin typeface="Book Antiqua" pitchFamily="18" charset="0"/>
-              </a:rPr>
-              <a:t>(“ws://sockets.mbed.org/rpc/</a:t>
-            </a:r>
-            <a:r>
-              <a:rPr lang="en-US" sz="1200" dirty="0" smtClean="0">
-                <a:latin typeface="Book Antiqua" pitchFamily="18" charset="0"/>
-              </a:rPr>
-              <a:t>net/mbed1</a:t>
-            </a:r>
-            <a:r>
-              <a:rPr lang="en-US" sz="1200" b="0" dirty="0" smtClean="0">
-                <a:latin typeface="Book Antiqua" pitchFamily="18" charset="0"/>
-              </a:rPr>
-              <a:t>”);</a:t>
-            </a:r>
-          </a:p>
-          <a:p>
-            <a:pPr algn="l"/>
-            <a:r>
-              <a:rPr lang="en-US" sz="1200" b="0" dirty="0" smtClean="0">
-                <a:latin typeface="Book Antiqua" pitchFamily="18" charset="0"/>
-              </a:rPr>
-              <a:t> </a:t>
-            </a:r>
-            <a:r>
-              <a:rPr lang="en-US" sz="1200" b="0" dirty="0" smtClean="0">
-                <a:latin typeface="Book Antiqua" pitchFamily="18" charset="0"/>
-              </a:rPr>
-              <a:t>   </a:t>
-            </a:r>
-            <a:r>
-              <a:rPr lang="en-US" sz="1200" dirty="0" err="1" smtClean="0">
-                <a:latin typeface="Book Antiqua" pitchFamily="18" charset="0"/>
-              </a:rPr>
-              <a:t>MbedJSONRpc</a:t>
-            </a:r>
-            <a:r>
-              <a:rPr lang="en-US" sz="1200" dirty="0" smtClean="0">
-                <a:latin typeface="Book Antiqua" pitchFamily="18" charset="0"/>
-              </a:rPr>
-              <a:t> </a:t>
-            </a:r>
-            <a:r>
-              <a:rPr lang="en-US" sz="1200" dirty="0" err="1" smtClean="0">
-                <a:latin typeface="Book Antiqua" pitchFamily="18" charset="0"/>
-              </a:rPr>
-              <a:t>rpc</a:t>
-            </a:r>
-            <a:r>
-              <a:rPr lang="en-US" sz="1200" dirty="0" smtClean="0">
-                <a:latin typeface="Book Antiqua" pitchFamily="18" charset="0"/>
-              </a:rPr>
-              <a:t>(&amp;</a:t>
-            </a:r>
-            <a:r>
-              <a:rPr lang="en-US" sz="1200" dirty="0" err="1" smtClean="0">
-                <a:latin typeface="Book Antiqua" pitchFamily="18" charset="0"/>
-              </a:rPr>
-              <a:t>ws</a:t>
-            </a:r>
-            <a:r>
-              <a:rPr lang="en-US" sz="1200" dirty="0" smtClean="0">
-                <a:latin typeface="Book Antiqua" pitchFamily="18" charset="0"/>
-              </a:rPr>
-              <a:t>);</a:t>
-            </a:r>
-            <a:endParaRPr lang="en-US" sz="1200" dirty="0" smtClean="0">
-              <a:latin typeface="Book Antiqua" pitchFamily="18" charset="0"/>
-            </a:endParaRPr>
+              <a:t>();</a:t>
+            </a:r>
           </a:p>
           <a:p>
             <a:pPr algn="l"/>
@@ -6430,46 +6426,19 @@
               <a:rPr lang="en-US" sz="1200" b="0" dirty="0" smtClean="0">
                 <a:latin typeface="Book Antiqua" pitchFamily="18" charset="0"/>
               </a:rPr>
-              <a:t>    </a:t>
-            </a:r>
-            <a:r>
-              <a:rPr lang="en-US" sz="1200" b="0" dirty="0" err="1" smtClean="0">
+              <a:t>     </a:t>
+            </a:r>
+            <a:r>
+              <a:rPr lang="en-US" sz="1200" dirty="0" err="1" smtClean="0">
                 <a:latin typeface="Book Antiqua" pitchFamily="18" charset="0"/>
               </a:rPr>
-              <a:t>connectWifi</a:t>
-            </a:r>
-            <a:r>
-              <a:rPr lang="en-US" sz="1200" b="0" dirty="0" smtClean="0">
+              <a:t>rpc.registerMethod</a:t>
+            </a:r>
+            <a:r>
+              <a:rPr lang="en-US" sz="1200" dirty="0" smtClean="0">
                 <a:latin typeface="Book Antiqua" pitchFamily="18" charset="0"/>
               </a:rPr>
-              <a:t>();</a:t>
-            </a:r>
-          </a:p>
-          <a:p>
-            <a:pPr algn="l"/>
-            <a:r>
-              <a:rPr lang="en-US" sz="1200" b="0" dirty="0" smtClean="0">
-                <a:latin typeface="Book Antiqua" pitchFamily="18" charset="0"/>
-              </a:rPr>
-              <a:t> </a:t>
-            </a:r>
-            <a:r>
-              <a:rPr lang="en-US" sz="1200" b="0" dirty="0" smtClean="0">
-                <a:latin typeface="Book Antiqua" pitchFamily="18" charset="0"/>
-              </a:rPr>
-              <a:t>   </a:t>
-            </a:r>
-            <a:r>
-              <a:rPr lang="en-US" sz="1200" b="0" dirty="0" err="1" smtClean="0">
-                <a:latin typeface="Book Antiqua" pitchFamily="18" charset="0"/>
-              </a:rPr>
-              <a:t>connectWebSocket</a:t>
-            </a:r>
-            <a:r>
-              <a:rPr lang="en-US" sz="1200" b="0" dirty="0" smtClean="0">
-                <a:latin typeface="Book Antiqua" pitchFamily="18" charset="0"/>
-              </a:rPr>
-              <a:t>();</a:t>
+              <a:t>(“echo”, &amp;echo);</a:t>
             </a:r>
           </a:p>
           <a:p>
@@ -6490,56 +6459,14 @@
               <a:rPr lang="en-US" sz="1200" dirty="0" err="1" smtClean="0">
                 <a:latin typeface="Book Antiqua" pitchFamily="18" charset="0"/>
               </a:rPr>
-              <a:t>rpc.registerMethod</a:t>
+              <a:t>rpc.work</a:t>
             </a:r>
             <a:r>
               <a:rPr lang="en-US" sz="1200" dirty="0" smtClean="0">
                 <a:latin typeface="Book Antiqua" pitchFamily="18" charset="0"/>
               </a:rPr>
-              <a:t>(“echo”, &amp;</a:t>
-            </a:r>
-            <a:r>
-              <a:rPr lang="en-US" sz="1200" dirty="0" smtClean="0">
-                <a:latin typeface="Book Antiqua" pitchFamily="18" charset="0"/>
-              </a:rPr>
-              <a:t>e</a:t>
-            </a:r>
-            <a:r>
-              <a:rPr lang="en-US" sz="1200" dirty="0" smtClean="0">
-                <a:latin typeface="Book Antiqua" pitchFamily="18" charset="0"/>
-              </a:rPr>
-              <a:t>cho);</a:t>
-            </a:r>
-          </a:p>
-          <a:p>
-            <a:pPr algn="l"/>
-            <a:endParaRPr lang="en-US" sz="1200" b="0" dirty="0" smtClean="0">
-              <a:latin typeface="Book Antiqua" pitchFamily="18" charset="0"/>
-            </a:endParaRPr>
-          </a:p>
-          <a:p>
-            <a:pPr algn="l"/>
-            <a:r>
-              <a:rPr lang="en-US" sz="1200" b="0" dirty="0" smtClean="0">
-                <a:latin typeface="Book Antiqua" pitchFamily="18" charset="0"/>
-              </a:rPr>
-              <a:t>     </a:t>
-            </a:r>
-            <a:r>
-              <a:rPr lang="en-US" sz="1200" dirty="0" err="1" smtClean="0">
-                <a:latin typeface="Book Antiqua" pitchFamily="18" charset="0"/>
-              </a:rPr>
-              <a:t>rpc.work</a:t>
-            </a:r>
-            <a:r>
-              <a:rPr lang="en-US" sz="1200" dirty="0" smtClean="0">
-                <a:latin typeface="Book Antiqua" pitchFamily="18" charset="0"/>
-              </a:rPr>
               <a:t>();</a:t>
             </a:r>
-            <a:endParaRPr lang="en-US" sz="1200" dirty="0" smtClean="0">
-              <a:latin typeface="Book Antiqua" pitchFamily="18" charset="0"/>
-            </a:endParaRPr>
           </a:p>
           <a:p>
             <a:pPr algn="l"/>
@@ -6590,16 +6517,7 @@
                 </a:solidFill>
                 <a:latin typeface="Book Antiqua" pitchFamily="18" charset="0"/>
               </a:rPr>
-              <a:t>i</a:t>
-            </a:r>
-            <a:r>
-              <a:rPr lang="en-US" sz="1200" b="0" dirty="0" err="1" smtClean="0">
-                <a:solidFill>
-                  <a:srgbClr val="0070C0"/>
-                </a:solidFill>
-                <a:latin typeface="Book Antiqua" pitchFamily="18" charset="0"/>
-              </a:rPr>
-              <a:t>nt</a:t>
+              <a:t>int</a:t>
             </a:r>
             <a:r>
               <a:rPr lang="en-US" sz="1200" b="0" dirty="0" smtClean="0">
@@ -6616,9 +6534,6 @@
               </a:rPr>
               <a:t>{</a:t>
             </a:r>
-            <a:endParaRPr lang="en-US" sz="1200" b="0" dirty="0" smtClean="0">
-              <a:latin typeface="Book Antiqua" pitchFamily="18" charset="0"/>
-            </a:endParaRPr>
           </a:p>
           <a:p>
             <a:pPr algn="l"/>
@@ -6650,77 +6565,65 @@
               <a:rPr lang="en-US" sz="1200" b="0" dirty="0" smtClean="0">
                 <a:latin typeface="Book Antiqua" pitchFamily="18" charset="0"/>
               </a:rPr>
-              <a:t>(“ws://</a:t>
+              <a:t>(“ws://sockets.mbed.org/rpc/</a:t>
+            </a:r>
+            <a:r>
+              <a:rPr lang="en-US" sz="1200" dirty="0" smtClean="0">
+                <a:latin typeface="Book Antiqua" pitchFamily="18" charset="0"/>
+              </a:rPr>
+              <a:t>net/mbed2</a:t>
             </a:r>
             <a:r>
               <a:rPr lang="en-US" sz="1200" b="0" dirty="0" smtClean="0">
                 <a:latin typeface="Book Antiqua" pitchFamily="18" charset="0"/>
               </a:rPr>
-              <a:t>sockets.mbed.org/rpc/</a:t>
+              <a:t>”);</a:t>
+            </a:r>
+          </a:p>
+          <a:p>
+            <a:pPr algn="l"/>
+            <a:r>
+              <a:rPr lang="en-US" sz="1200" b="0" dirty="0" smtClean="0">
+                <a:latin typeface="Book Antiqua" pitchFamily="18" charset="0"/>
+              </a:rPr>
+              <a:t>    </a:t>
+            </a:r>
+            <a:r>
+              <a:rPr lang="en-US" sz="1200" dirty="0" err="1" smtClean="0">
+                <a:latin typeface="Book Antiqua" pitchFamily="18" charset="0"/>
+              </a:rPr>
+              <a:t>MbedJSONRpc</a:t>
             </a:r>
             <a:r>
               <a:rPr lang="en-US" sz="1200" dirty="0" smtClean="0">
                 <a:latin typeface="Book Antiqua" pitchFamily="18" charset="0"/>
               </a:rPr>
-              <a:t>net/mbed2</a:t>
-            </a:r>
-            <a:r>
-              <a:rPr lang="en-US" sz="1200" b="0" dirty="0" smtClean="0">
-                <a:latin typeface="Book Antiqua" pitchFamily="18" charset="0"/>
-              </a:rPr>
-              <a:t>”);</a:t>
-            </a:r>
-            <a:endParaRPr lang="en-US" sz="1200" b="0" dirty="0" smtClean="0">
-              <a:latin typeface="Book Antiqua" pitchFamily="18" charset="0"/>
-            </a:endParaRPr>
-          </a:p>
-          <a:p>
-            <a:pPr algn="l"/>
-            <a:r>
-              <a:rPr lang="en-US" sz="1200" b="0" dirty="0" smtClean="0">
-                <a:latin typeface="Book Antiqua" pitchFamily="18" charset="0"/>
-              </a:rPr>
-              <a:t>    </a:t>
+              <a:t> </a:t>
             </a:r>
             <a:r>
               <a:rPr lang="en-US" sz="1200" dirty="0" err="1" smtClean="0">
                 <a:latin typeface="Book Antiqua" pitchFamily="18" charset="0"/>
               </a:rPr>
-              <a:t>MbedJSONRpc</a:t>
+              <a:t>rpc</a:t>
             </a:r>
             <a:r>
               <a:rPr lang="en-US" sz="1200" dirty="0" smtClean="0">
                 <a:latin typeface="Book Antiqua" pitchFamily="18" charset="0"/>
               </a:rPr>
-              <a:t> </a:t>
+              <a:t>(&amp;</a:t>
             </a:r>
             <a:r>
               <a:rPr lang="en-US" sz="1200" dirty="0" err="1" smtClean="0">
                 <a:latin typeface="Book Antiqua" pitchFamily="18" charset="0"/>
               </a:rPr>
-              <a:t>rpc</a:t>
+              <a:t>ws</a:t>
             </a:r>
             <a:r>
               <a:rPr lang="en-US" sz="1200" dirty="0" smtClean="0">
                 <a:latin typeface="Book Antiqua" pitchFamily="18" charset="0"/>
               </a:rPr>
-              <a:t>(&amp;</a:t>
-            </a:r>
-            <a:r>
-              <a:rPr lang="en-US" sz="1200" dirty="0" err="1" smtClean="0">
-                <a:latin typeface="Book Antiqua" pitchFamily="18" charset="0"/>
-              </a:rPr>
-              <a:t>ws</a:t>
-            </a:r>
-            <a:r>
-              <a:rPr lang="en-US" sz="1200" dirty="0" smtClean="0">
-                <a:latin typeface="Book Antiqua" pitchFamily="18" charset="0"/>
-              </a:rPr>
               <a:t>);</a:t>
             </a:r>
-            <a:endParaRPr lang="en-US" sz="1200" dirty="0" smtClean="0">
-              <a:latin typeface="Book Antiqua" pitchFamily="18" charset="0"/>
-            </a:endParaRPr>
           </a:p>
           <a:p>
             <a:pPr algn="l"/>
@@ -6755,13 +6658,7 @@
               <a:rPr lang="en-US" sz="1200" b="0" dirty="0" smtClean="0">
                 <a:latin typeface="Book Antiqua" pitchFamily="18" charset="0"/>
               </a:rPr>
-              <a:t> </a:t>
-            </a:r>
-            <a:r>
-              <a:rPr lang="en-US" sz="1200" b="0" dirty="0" smtClean="0">
-                <a:latin typeface="Book Antiqua" pitchFamily="18" charset="0"/>
-              </a:rPr>
-              <a:t>   </a:t>
+              <a:t>    </a:t>
             </a:r>
             <a:r>
               <a:rPr lang="en-US" sz="1200" b="0" dirty="0" err="1" smtClean="0">
@@ -6809,13 +6706,7 @@
               <a:rPr lang="en-US" sz="1200" b="0" dirty="0" smtClean="0">
                 <a:latin typeface="Book Antiqua" pitchFamily="18" charset="0"/>
               </a:rPr>
-              <a:t> </a:t>
-            </a:r>
-            <a:r>
-              <a:rPr lang="en-US" sz="1200" b="0" dirty="0" smtClean="0">
-                <a:latin typeface="Book Antiqua" pitchFamily="18" charset="0"/>
-              </a:rPr>
-              <a:t>   </a:t>
+              <a:t>    </a:t>
             </a:r>
             <a:r>
               <a:rPr lang="en-US" sz="1200" b="0" dirty="0" err="1" smtClean="0">
@@ -6863,41 +6754,32 @@
               <a:rPr lang="en-US" sz="1200" b="0" dirty="0" smtClean="0">
                 <a:latin typeface="Book Antiqua" pitchFamily="18" charset="0"/>
               </a:rPr>
-              <a:t> </a:t>
+              <a:t>    </a:t>
+            </a:r>
+            <a:r>
+              <a:rPr lang="en-US" sz="1200" b="0" dirty="0" err="1" smtClean="0">
+                <a:latin typeface="Book Antiqua" pitchFamily="18" charset="0"/>
+              </a:rPr>
+              <a:t>printf</a:t>
             </a:r>
             <a:r>
               <a:rPr lang="en-US" sz="1200" b="0" dirty="0" smtClean="0">
                 <a:latin typeface="Book Antiqua" pitchFamily="18" charset="0"/>
               </a:rPr>
-              <a:t>   </a:t>
+              <a:t>(“result: %s”, </a:t>
             </a:r>
             <a:r>
               <a:rPr lang="en-US" sz="1200" b="0" dirty="0" err="1" smtClean="0">
                 <a:latin typeface="Book Antiqua" pitchFamily="18" charset="0"/>
               </a:rPr>
-              <a:t>printf</a:t>
+              <a:t>out.get</a:t>
             </a:r>
             <a:r>
               <a:rPr lang="en-US" sz="1200" b="0" dirty="0" smtClean="0">
                 <a:latin typeface="Book Antiqua" pitchFamily="18" charset="0"/>
               </a:rPr>
-              <a:t>(“result: %s”, </a:t>
-            </a:r>
-            <a:r>
-              <a:rPr lang="en-US" sz="1200" b="0" dirty="0" err="1" smtClean="0">
-                <a:latin typeface="Book Antiqua" pitchFamily="18" charset="0"/>
-              </a:rPr>
-              <a:t>out.get</a:t>
-            </a:r>
-            <a:r>
-              <a:rPr lang="en-US" sz="1200" b="0" dirty="0" smtClean="0">
-                <a:latin typeface="Book Antiqua" pitchFamily="18" charset="0"/>
-              </a:rPr>
               <a:t>&lt;string&gt;());</a:t>
             </a:r>
-            <a:endParaRPr lang="en-US" sz="1200" b="0" dirty="0" smtClean="0">
-              <a:latin typeface="Book Antiqua" pitchFamily="18" charset="0"/>
-            </a:endParaRPr>
           </a:p>
           <a:p>
             <a:pPr algn="l"/>
@@ -6928,6 +6810,625 @@
           </a:p>
         </p:txBody>
       </p:sp>
+    </p:spTree>
+  </p:cSld>
+  <p:clrMapOvr>
+    <a:masterClrMapping/>
+  </p:clrMapOvr>
+</p:sld>
+</file>
+
+<file path=ppt/slides/slide19.xml><?xml version="1.0" encoding="utf-8"?>
+<p:sld xmlns:a="http://schemas.openxmlformats.org/drawingml/2006/main" xmlns:r="http://schemas.openxmlformats.org/officeDocument/2006/relationships" xmlns:p="http://schemas.openxmlformats.org/presentationml/2006/main">
+  <p:cSld>
+    <p:spTree>
+      <p:nvGrpSpPr>
+        <p:cNvPr id="1" name=""/>
+        <p:cNvGrpSpPr/>
+        <p:nvPr/>
+      </p:nvGrpSpPr>
+      <p:grpSpPr>
+        <a:xfrm>
+          <a:off x="0" y="0"/>
+          <a:ext cx="0" cy="0"/>
+          <a:chOff x="0" y="0"/>
+          <a:chExt cx="0" cy="0"/>
+        </a:xfrm>
+      </p:grpSpPr>
+      <p:sp>
+        <p:nvSpPr>
+          <p:cNvPr id="2" name="Titre 1"/>
+          <p:cNvSpPr>
+            <a:spLocks noGrp="1"/>
+          </p:cNvSpPr>
+          <p:nvPr>
+            <p:ph type="title"/>
+          </p:nvPr>
+        </p:nvSpPr>
+        <p:spPr/>
+        <p:txBody>
+          <a:bodyPr/>
+          <a:lstStyle/>
+          <a:p>
+            <a:r>
+              <a:rPr lang="en-US" dirty="0" smtClean="0"/>
+              <a:t>USB Device: Overview</a:t>
+            </a:r>
+            <a:endParaRPr lang="en-US" dirty="0"/>
+          </a:p>
+        </p:txBody>
+      </p:sp>
+      <p:sp>
+        <p:nvSpPr>
+          <p:cNvPr id="3" name="Espace réservé du contenu 2"/>
+          <p:cNvSpPr>
+            <a:spLocks noGrp="1"/>
+          </p:cNvSpPr>
+          <p:nvPr>
+            <p:ph idx="1"/>
+          </p:nvPr>
+        </p:nvSpPr>
+        <p:spPr>
+          <a:xfrm>
+            <a:off x="217488" y="906463"/>
+            <a:ext cx="8775700" cy="1290199"/>
+          </a:xfrm>
+        </p:spPr>
+        <p:txBody>
+          <a:bodyPr/>
+          <a:lstStyle/>
+          <a:p>
+            <a:r>
+              <a:rPr lang="en-US" dirty="0" smtClean="0"/>
+              <a:t>Speed:</a:t>
+            </a:r>
+            <a:endParaRPr lang="en-US" dirty="0"/>
+          </a:p>
+        </p:txBody>
+      </p:sp>
+      <p:graphicFrame>
+        <p:nvGraphicFramePr>
+          <p:cNvPr id="6" name="Tableau 5"/>
+          <p:cNvGraphicFramePr>
+            <a:graphicFrameLocks noGrp="1"/>
+          </p:cNvGraphicFramePr>
+          <p:nvPr/>
+        </p:nvGraphicFramePr>
+        <p:xfrm>
+          <a:off x="1513489" y="1439041"/>
+          <a:ext cx="6096000" cy="1483360"/>
+        </p:xfrm>
+        <a:graphic>
+          <a:graphicData uri="http://schemas.openxmlformats.org/drawingml/2006/table">
+            <a:tbl>
+              <a:tblPr firstRow="1" bandRow="1">
+                <a:tableStyleId>{5C22544A-7EE6-4342-B048-85BDC9FD1C3A}</a:tableStyleId>
+              </a:tblPr>
+              <a:tblGrid>
+                <a:gridCol w="2032000"/>
+                <a:gridCol w="2032000"/>
+                <a:gridCol w="2032000"/>
+              </a:tblGrid>
+              <a:tr h="741680">
+                <a:tc>
+                  <a:txBody>
+                    <a:bodyPr/>
+                    <a:lstStyle/>
+                    <a:p>
+                      <a:pPr marL="0" algn="ctr" defTabSz="914400" rtl="0" eaLnBrk="1" latinLnBrk="0" hangingPunct="1"/>
+                      <a:r>
+                        <a:rPr lang="en-US" sz="1800" b="0" kern="1200" dirty="0" smtClean="0">
+                          <a:solidFill>
+                            <a:schemeClr val="dk1"/>
+                          </a:solidFill>
+                          <a:latin typeface="+mn-lt"/>
+                          <a:ea typeface="+mn-ea"/>
+                          <a:cs typeface="+mn-cs"/>
+                        </a:rPr>
+                        <a:t>USB 1.0</a:t>
+                      </a:r>
+                    </a:p>
+                  </a:txBody>
+                  <a:tcPr>
+                    <a:solidFill>
+                      <a:srgbClr val="95BACD"/>
+                    </a:solidFill>
+                  </a:tcPr>
+                </a:tc>
+                <a:tc>
+                  <a:txBody>
+                    <a:bodyPr/>
+                    <a:lstStyle/>
+                    <a:p>
+                      <a:pPr marL="0" algn="l" defTabSz="914400" rtl="0" eaLnBrk="1" latinLnBrk="0" hangingPunct="1"/>
+                      <a:r>
+                        <a:rPr lang="en-US" sz="1800" b="0" kern="1200" dirty="0" smtClean="0">
+                          <a:solidFill>
+                            <a:schemeClr val="dk1"/>
+                          </a:solidFill>
+                          <a:latin typeface="+mn-lt"/>
+                          <a:ea typeface="+mn-ea"/>
+                          <a:cs typeface="+mn-cs"/>
+                        </a:rPr>
+                        <a:t>Low-speed</a:t>
+                      </a:r>
+                    </a:p>
+                    <a:p>
+                      <a:pPr marL="0" algn="l" defTabSz="914400" rtl="0" eaLnBrk="1" latinLnBrk="0" hangingPunct="1"/>
+                      <a:r>
+                        <a:rPr lang="en-US" sz="1800" b="0" kern="1200" dirty="0" smtClean="0">
+                          <a:solidFill>
+                            <a:schemeClr val="dk1"/>
+                          </a:solidFill>
+                          <a:latin typeface="+mn-lt"/>
+                          <a:ea typeface="+mn-ea"/>
+                          <a:cs typeface="+mn-cs"/>
+                        </a:rPr>
+                        <a:t>Full-speed</a:t>
+                      </a:r>
+                    </a:p>
+                  </a:txBody>
+                  <a:tcPr>
+                    <a:solidFill>
+                      <a:srgbClr val="95BACD"/>
+                    </a:solidFill>
+                  </a:tcPr>
+                </a:tc>
+                <a:tc>
+                  <a:txBody>
+                    <a:bodyPr/>
+                    <a:lstStyle/>
+                    <a:p>
+                      <a:pPr marL="0" algn="l" defTabSz="914400" rtl="0" eaLnBrk="1" latinLnBrk="0" hangingPunct="1"/>
+                      <a:r>
+                        <a:rPr lang="en-US" sz="1800" b="0" kern="1200" dirty="0" smtClean="0">
+                          <a:solidFill>
+                            <a:schemeClr val="dk1"/>
+                          </a:solidFill>
+                          <a:latin typeface="+mn-lt"/>
+                          <a:ea typeface="+mn-ea"/>
+                          <a:cs typeface="+mn-cs"/>
+                        </a:rPr>
+                        <a:t>1.5 </a:t>
+                      </a:r>
+                      <a:r>
+                        <a:rPr lang="en-US" sz="1800" b="0" kern="1200" dirty="0" err="1" smtClean="0">
+                          <a:solidFill>
+                            <a:schemeClr val="dk1"/>
+                          </a:solidFill>
+                          <a:latin typeface="+mn-lt"/>
+                          <a:ea typeface="+mn-ea"/>
+                          <a:cs typeface="+mn-cs"/>
+                        </a:rPr>
+                        <a:t>Mbit</a:t>
+                      </a:r>
+                      <a:r>
+                        <a:rPr lang="en-US" sz="1800" b="0" kern="1200" dirty="0" smtClean="0">
+                          <a:solidFill>
+                            <a:schemeClr val="dk1"/>
+                          </a:solidFill>
+                          <a:latin typeface="+mn-lt"/>
+                          <a:ea typeface="+mn-ea"/>
+                          <a:cs typeface="+mn-cs"/>
+                        </a:rPr>
+                        <a:t>/s</a:t>
+                      </a:r>
+                    </a:p>
+                    <a:p>
+                      <a:pPr marL="0" algn="l" defTabSz="914400" rtl="0" eaLnBrk="1" latinLnBrk="0" hangingPunct="1"/>
+                      <a:r>
+                        <a:rPr lang="en-US" sz="1800" b="0" kern="1200" dirty="0" smtClean="0">
+                          <a:solidFill>
+                            <a:schemeClr val="dk1"/>
+                          </a:solidFill>
+                          <a:latin typeface="+mn-lt"/>
+                          <a:ea typeface="+mn-ea"/>
+                          <a:cs typeface="+mn-cs"/>
+                        </a:rPr>
+                        <a:t>12 </a:t>
+                      </a:r>
+                      <a:r>
+                        <a:rPr lang="en-US" sz="1800" b="0" kern="1200" dirty="0" err="1" smtClean="0">
+                          <a:solidFill>
+                            <a:schemeClr val="dk1"/>
+                          </a:solidFill>
+                          <a:latin typeface="+mn-lt"/>
+                          <a:ea typeface="+mn-ea"/>
+                          <a:cs typeface="+mn-cs"/>
+                        </a:rPr>
+                        <a:t>Mbit</a:t>
+                      </a:r>
+                      <a:r>
+                        <a:rPr lang="en-US" sz="1800" b="0" kern="1200" dirty="0" smtClean="0">
+                          <a:solidFill>
+                            <a:schemeClr val="dk1"/>
+                          </a:solidFill>
+                          <a:latin typeface="+mn-lt"/>
+                          <a:ea typeface="+mn-ea"/>
+                          <a:cs typeface="+mn-cs"/>
+                        </a:rPr>
+                        <a:t>/s</a:t>
+                      </a:r>
+                    </a:p>
+                  </a:txBody>
+                  <a:tcPr>
+                    <a:solidFill>
+                      <a:srgbClr val="95BACD"/>
+                    </a:solidFill>
+                  </a:tcPr>
+                </a:tc>
+              </a:tr>
+              <a:tr h="370840">
+                <a:tc>
+                  <a:txBody>
+                    <a:bodyPr/>
+                    <a:lstStyle/>
+                    <a:p>
+                      <a:pPr algn="ctr"/>
+                      <a:r>
+                        <a:rPr lang="en-US" b="0" dirty="0" smtClean="0"/>
+                        <a:t>USB 2.0</a:t>
+                      </a:r>
+                      <a:endParaRPr lang="en-US" b="0" dirty="0"/>
+                    </a:p>
+                  </a:txBody>
+                  <a:tcPr/>
+                </a:tc>
+                <a:tc>
+                  <a:txBody>
+                    <a:bodyPr/>
+                    <a:lstStyle/>
+                    <a:p>
+                      <a:r>
+                        <a:rPr lang="en-US" b="0" dirty="0" smtClean="0"/>
+                        <a:t>High Speed</a:t>
+                      </a:r>
+                      <a:endParaRPr lang="en-US" b="0" dirty="0"/>
+                    </a:p>
+                  </a:txBody>
+                  <a:tcPr/>
+                </a:tc>
+                <a:tc>
+                  <a:txBody>
+                    <a:bodyPr/>
+                    <a:lstStyle/>
+                    <a:p>
+                      <a:r>
+                        <a:rPr lang="en-US" b="0" dirty="0" smtClean="0"/>
+                        <a:t>480</a:t>
+                      </a:r>
+                      <a:r>
+                        <a:rPr lang="en-US" b="0" baseline="0" dirty="0" smtClean="0"/>
+                        <a:t> </a:t>
+                      </a:r>
+                      <a:r>
+                        <a:rPr lang="en-US" b="0" baseline="0" dirty="0" err="1" smtClean="0"/>
+                        <a:t>Mbit</a:t>
+                      </a:r>
+                      <a:r>
+                        <a:rPr lang="en-US" b="0" baseline="0" dirty="0" smtClean="0"/>
+                        <a:t>/s</a:t>
+                      </a:r>
+                      <a:endParaRPr lang="en-US" b="0" dirty="0"/>
+                    </a:p>
+                  </a:txBody>
+                  <a:tcPr/>
+                </a:tc>
+              </a:tr>
+              <a:tr h="370840">
+                <a:tc>
+                  <a:txBody>
+                    <a:bodyPr/>
+                    <a:lstStyle/>
+                    <a:p>
+                      <a:pPr algn="ctr"/>
+                      <a:r>
+                        <a:rPr lang="en-US" b="0" dirty="0" smtClean="0"/>
+                        <a:t>USB  3.0</a:t>
+                      </a:r>
+                      <a:endParaRPr lang="en-US" b="0" dirty="0"/>
+                    </a:p>
+                  </a:txBody>
+                  <a:tcPr/>
+                </a:tc>
+                <a:tc>
+                  <a:txBody>
+                    <a:bodyPr/>
+                    <a:lstStyle/>
+                    <a:p>
+                      <a:r>
+                        <a:rPr lang="en-US" b="0" dirty="0" smtClean="0"/>
+                        <a:t>Super Speed</a:t>
+                      </a:r>
+                      <a:endParaRPr lang="en-US" b="0" dirty="0"/>
+                    </a:p>
+                  </a:txBody>
+                  <a:tcPr/>
+                </a:tc>
+                <a:tc>
+                  <a:txBody>
+                    <a:bodyPr/>
+                    <a:lstStyle/>
+                    <a:p>
+                      <a:r>
+                        <a:rPr lang="en-US" b="0" dirty="0" smtClean="0"/>
+                        <a:t>5 </a:t>
+                      </a:r>
+                      <a:r>
+                        <a:rPr lang="en-US" b="0" dirty="0" err="1" smtClean="0"/>
+                        <a:t>Gbit</a:t>
+                      </a:r>
+                      <a:r>
+                        <a:rPr lang="en-US" b="0" dirty="0" smtClean="0"/>
+                        <a:t>/s</a:t>
+                      </a:r>
+                      <a:endParaRPr lang="en-US" b="0" dirty="0"/>
+                    </a:p>
+                  </a:txBody>
+                  <a:tcPr/>
+                </a:tc>
+              </a:tr>
+            </a:tbl>
+          </a:graphicData>
+        </a:graphic>
+      </p:graphicFrame>
+      <p:sp>
+        <p:nvSpPr>
+          <p:cNvPr id="8" name="Espace réservé du contenu 2"/>
+          <p:cNvSpPr txBox="1">
+            <a:spLocks/>
+          </p:cNvSpPr>
+          <p:nvPr/>
+        </p:nvSpPr>
+        <p:spPr bwMode="auto">
+          <a:xfrm>
+            <a:off x="368300" y="3234506"/>
+            <a:ext cx="8775700" cy="528198"/>
+          </a:xfrm>
+          <a:prstGeom prst="rect">
+            <a:avLst/>
+          </a:prstGeom>
+          <a:noFill/>
+          <a:ln w="9525">
+            <a:noFill/>
+            <a:miter lim="800000"/>
+            <a:headEnd/>
+            <a:tailEnd/>
+          </a:ln>
+          <a:effectLst/>
+        </p:spPr>
+        <p:txBody>
+          <a:bodyPr vert="horz" wrap="square" lIns="91440" tIns="45720" rIns="91440" bIns="45720" numCol="1" anchor="t" anchorCtr="0" compatLnSpc="1">
+            <a:prstTxWarp prst="textNoShape">
+              <a:avLst/>
+            </a:prstTxWarp>
+          </a:bodyPr>
+          <a:lstStyle/>
+          <a:p>
+            <a:pPr marL="265113" marR="0" lvl="0" indent="-265113" algn="l" defTabSz="914400" rtl="0" eaLnBrk="1" fontAlgn="ctr" latinLnBrk="0" hangingPunct="1">
+              <a:lnSpc>
+                <a:spcPct val="100000"/>
+              </a:lnSpc>
+              <a:spcBef>
+                <a:spcPct val="25000"/>
+              </a:spcBef>
+              <a:spcAft>
+                <a:spcPct val="0"/>
+              </a:spcAft>
+              <a:buClr>
+                <a:schemeClr val="accent1"/>
+              </a:buClr>
+              <a:buSzPct val="125000"/>
+              <a:buFont typeface="Wingdings" pitchFamily="2" charset="2"/>
+              <a:buChar char="§"/>
+              <a:tabLst/>
+              <a:defRPr/>
+            </a:pPr>
+            <a:r>
+              <a:rPr lang="en-US" sz="2400" b="0" kern="0" dirty="0" smtClean="0">
+                <a:latin typeface="+mn-lt"/>
+                <a:ea typeface="+mn-ea"/>
+              </a:rPr>
+              <a:t>Topology</a:t>
+            </a:r>
+            <a:r>
+              <a:rPr kumimoji="0" lang="en-US" sz="2400" b="0" i="0" u="none" strike="noStrike" kern="0" cap="none" spc="0" normalizeH="0" baseline="0" noProof="0" dirty="0" smtClean="0">
+                <a:ln>
+                  <a:noFill/>
+                </a:ln>
+                <a:solidFill>
+                  <a:srgbClr val="000000"/>
+                </a:solidFill>
+                <a:effectLst/>
+                <a:uLnTx/>
+                <a:uFillTx/>
+                <a:latin typeface="+mn-lt"/>
+                <a:ea typeface="+mn-ea"/>
+                <a:cs typeface="+mn-cs"/>
+              </a:rPr>
+              <a:t>: </a:t>
+            </a:r>
+          </a:p>
+          <a:p>
+            <a:pPr marL="722313" lvl="1" indent="-265113" algn="l" fontAlgn="ctr">
+              <a:spcBef>
+                <a:spcPct val="25000"/>
+              </a:spcBef>
+              <a:buClr>
+                <a:schemeClr val="accent1"/>
+              </a:buClr>
+              <a:buSzPct val="125000"/>
+              <a:buFont typeface="Wingdings" pitchFamily="2" charset="2"/>
+              <a:buChar char="§"/>
+            </a:pPr>
+            <a:r>
+              <a:rPr kumimoji="0" lang="en-US" sz="2400" b="0" i="0" u="none" strike="noStrike" kern="0" cap="none" spc="0" normalizeH="0" baseline="0" noProof="0" dirty="0" smtClean="0">
+                <a:ln>
+                  <a:noFill/>
+                </a:ln>
+                <a:solidFill>
+                  <a:srgbClr val="000000"/>
+                </a:solidFill>
+                <a:effectLst/>
+                <a:uLnTx/>
+                <a:uFillTx/>
+                <a:latin typeface="+mn-lt"/>
+                <a:ea typeface="+mn-ea"/>
+                <a:cs typeface="+mn-cs"/>
+              </a:rPr>
+              <a:t>One host</a:t>
+            </a:r>
+          </a:p>
+          <a:p>
+            <a:pPr marL="722313" lvl="1" indent="-265113" algn="l" fontAlgn="ctr">
+              <a:spcBef>
+                <a:spcPct val="25000"/>
+              </a:spcBef>
+              <a:buClr>
+                <a:schemeClr val="accent1"/>
+              </a:buClr>
+              <a:buSzPct val="125000"/>
+              <a:buFont typeface="Wingdings" pitchFamily="2" charset="2"/>
+              <a:buChar char="§"/>
+            </a:pPr>
+            <a:r>
+              <a:rPr lang="en-US" sz="2400" b="0" kern="0" dirty="0" smtClean="0">
+                <a:latin typeface="+mn-lt"/>
+                <a:ea typeface="+mn-ea"/>
+              </a:rPr>
+              <a:t>S</a:t>
+            </a:r>
+            <a:r>
+              <a:rPr kumimoji="0" lang="en-US" sz="2400" b="0" i="0" u="none" strike="noStrike" kern="0" cap="none" spc="0" normalizeH="0" baseline="0" noProof="0" dirty="0" err="1" smtClean="0">
+                <a:ln>
+                  <a:noFill/>
+                </a:ln>
+                <a:solidFill>
+                  <a:srgbClr val="000000"/>
+                </a:solidFill>
+                <a:effectLst/>
+                <a:uLnTx/>
+                <a:uFillTx/>
+                <a:latin typeface="+mn-lt"/>
+                <a:ea typeface="+mn-ea"/>
+                <a:cs typeface="+mn-cs"/>
+              </a:rPr>
+              <a:t>everal</a:t>
+            </a:r>
+            <a:r>
+              <a:rPr kumimoji="0" lang="en-US" sz="2400" b="0" i="0" u="none" strike="noStrike" kern="0" cap="none" spc="0" normalizeH="0" baseline="0" noProof="0" dirty="0" smtClean="0">
+                <a:ln>
+                  <a:noFill/>
+                </a:ln>
+                <a:solidFill>
+                  <a:srgbClr val="000000"/>
+                </a:solidFill>
+                <a:effectLst/>
+                <a:uLnTx/>
+                <a:uFillTx/>
+                <a:latin typeface="+mn-lt"/>
+                <a:ea typeface="+mn-ea"/>
+                <a:cs typeface="+mn-cs"/>
+              </a:rPr>
+              <a:t> devices</a:t>
+            </a:r>
+          </a:p>
+          <a:p>
+            <a:pPr marL="722313" lvl="1" indent="-265113" algn="l" fontAlgn="ctr">
+              <a:spcBef>
+                <a:spcPct val="25000"/>
+              </a:spcBef>
+              <a:buClr>
+                <a:schemeClr val="accent1"/>
+              </a:buClr>
+              <a:buSzPct val="125000"/>
+              <a:buFont typeface="Wingdings" pitchFamily="2" charset="2"/>
+              <a:buChar char="§"/>
+            </a:pPr>
+            <a:r>
+              <a:rPr lang="en-US" sz="2400" b="0" kern="0" dirty="0" smtClean="0">
+                <a:latin typeface="+mn-lt"/>
+                <a:ea typeface="+mn-ea"/>
+              </a:rPr>
+              <a:t>T</a:t>
+            </a:r>
+            <a:r>
+              <a:rPr kumimoji="0" lang="en-US" sz="2400" b="0" i="0" u="none" strike="noStrike" kern="0" cap="none" spc="0" normalizeH="0" baseline="0" noProof="0" dirty="0" err="1" smtClean="0">
+                <a:ln>
+                  <a:noFill/>
+                </a:ln>
+                <a:solidFill>
+                  <a:srgbClr val="000000"/>
+                </a:solidFill>
+                <a:effectLst/>
+                <a:uLnTx/>
+                <a:uFillTx/>
+                <a:latin typeface="+mn-lt"/>
+                <a:ea typeface="+mn-ea"/>
+                <a:cs typeface="+mn-cs"/>
+              </a:rPr>
+              <a:t>iered</a:t>
+            </a:r>
+            <a:r>
+              <a:rPr kumimoji="0" lang="en-US" sz="2400" b="0" i="0" u="none" strike="noStrike" kern="0" cap="none" spc="0" normalizeH="0" baseline="0" noProof="0" dirty="0" smtClean="0">
+                <a:ln>
+                  <a:noFill/>
+                </a:ln>
+                <a:solidFill>
+                  <a:srgbClr val="000000"/>
+                </a:solidFill>
+                <a:effectLst/>
+                <a:uLnTx/>
+                <a:uFillTx/>
+                <a:latin typeface="+mn-lt"/>
+                <a:ea typeface="+mn-ea"/>
+                <a:cs typeface="+mn-cs"/>
+              </a:rPr>
+              <a:t> star architecture</a:t>
+            </a:r>
+            <a:endParaRPr kumimoji="0" lang="en-US" sz="2400" b="0" i="0" u="none" strike="noStrike" kern="0" cap="none" spc="0" normalizeH="0" baseline="0" noProof="0" dirty="0">
+              <a:ln>
+                <a:noFill/>
+              </a:ln>
+              <a:solidFill>
+                <a:srgbClr val="000000"/>
+              </a:solidFill>
+              <a:effectLst/>
+              <a:uLnTx/>
+              <a:uFillTx/>
+              <a:latin typeface="+mn-lt"/>
+              <a:ea typeface="+mn-ea"/>
+              <a:cs typeface="+mn-cs"/>
+            </a:endParaRPr>
+          </a:p>
+        </p:txBody>
+      </p:sp>
+      <p:pic>
+        <p:nvPicPr>
+          <p:cNvPr id="1026" name="Picture 2" descr="C:\Users\samux\Desktop\ARM-internship-report\report\usb_component_topology.jpg"/>
+          <p:cNvPicPr>
+            <a:picLocks noChangeAspect="1" noChangeArrowheads="1"/>
+          </p:cNvPicPr>
+          <p:nvPr/>
+        </p:nvPicPr>
+        <p:blipFill>
+          <a:blip r:embed="rId2"/>
+          <a:srcRect/>
+          <a:stretch>
+            <a:fillRect/>
+          </a:stretch>
+        </p:blipFill>
+        <p:spPr bwMode="auto">
+          <a:xfrm>
+            <a:off x="4380836" y="3121573"/>
+            <a:ext cx="3581463" cy="3039843"/>
+          </a:xfrm>
+          <a:prstGeom prst="rect">
+            <a:avLst/>
+          </a:prstGeom>
+          <a:noFill/>
+        </p:spPr>
+      </p:pic>
     </p:spTree>
   </p:cSld>
   <p:clrMapOvr>
@@ -7048,11 +7549,7 @@
             </a:r>
             <a:r>
               <a:rPr lang="en-US" dirty="0" err="1" smtClean="0"/>
-              <a:t>W</a:t>
-            </a:r>
-            <a:r>
-              <a:rPr lang="en-US" dirty="0" err="1" smtClean="0"/>
-              <a:t>ebSocket</a:t>
+              <a:t>WebSocket</a:t>
             </a:r>
             <a:endParaRPr lang="en-US" dirty="0" smtClean="0"/>
           </a:p>
@@ -7120,6 +7617,416 @@
       </p:par>
     </p:tnLst>
   </p:timing>
+</p:sld>
+</file>
+
+<file path=ppt/slides/slide20.xml><?xml version="1.0" encoding="utf-8"?>
+<p:sld xmlns:a="http://schemas.openxmlformats.org/drawingml/2006/main" xmlns:r="http://schemas.openxmlformats.org/officeDocument/2006/relationships" xmlns:p="http://schemas.openxmlformats.org/presentationml/2006/main">
+  <p:cSld>
+    <p:spTree>
+      <p:nvGrpSpPr>
+        <p:cNvPr id="1" name=""/>
+        <p:cNvGrpSpPr/>
+        <p:nvPr/>
+      </p:nvGrpSpPr>
+      <p:grpSpPr>
+        <a:xfrm>
+          <a:off x="0" y="0"/>
+          <a:ext cx="0" cy="0"/>
+          <a:chOff x="0" y="0"/>
+          <a:chExt cx="0" cy="0"/>
+        </a:xfrm>
+      </p:grpSpPr>
+      <p:sp>
+        <p:nvSpPr>
+          <p:cNvPr id="3" name="Espace réservé du contenu 2"/>
+          <p:cNvSpPr>
+            <a:spLocks noGrp="1"/>
+          </p:cNvSpPr>
+          <p:nvPr>
+            <p:ph idx="1"/>
+          </p:nvPr>
+        </p:nvSpPr>
+        <p:spPr>
+          <a:xfrm>
+            <a:off x="217488" y="906463"/>
+            <a:ext cx="8775700" cy="1290199"/>
+          </a:xfrm>
+        </p:spPr>
+        <p:txBody>
+          <a:bodyPr/>
+          <a:lstStyle/>
+          <a:p>
+            <a:r>
+              <a:rPr lang="en-US" dirty="0" smtClean="0"/>
+              <a:t>Transfers:</a:t>
+            </a:r>
+          </a:p>
+          <a:p>
+            <a:pPr lvl="1"/>
+            <a:r>
+              <a:rPr lang="en-US" dirty="0" smtClean="0"/>
+              <a:t>Between “</a:t>
+            </a:r>
+            <a:r>
+              <a:rPr lang="en-US" b="1" dirty="0" smtClean="0"/>
+              <a:t>endpoints</a:t>
+            </a:r>
+            <a:r>
+              <a:rPr lang="en-US" dirty="0" smtClean="0"/>
+              <a:t>”</a:t>
+            </a:r>
+          </a:p>
+          <a:p>
+            <a:pPr lvl="1"/>
+            <a:r>
+              <a:rPr lang="en-US" dirty="0" smtClean="0"/>
+              <a:t>Different types according to different requirements</a:t>
+            </a:r>
+            <a:endParaRPr lang="en-US" dirty="0"/>
+          </a:p>
+        </p:txBody>
+      </p:sp>
+      <p:sp>
+        <p:nvSpPr>
+          <p:cNvPr id="4" name="Espace réservé du contenu 2"/>
+          <p:cNvSpPr>
+            <a:spLocks noGrp="1"/>
+          </p:cNvSpPr>
+          <p:nvPr>
+            <p:ph type="title"/>
+          </p:nvPr>
+        </p:nvSpPr>
+        <p:spPr/>
+        <p:txBody>
+          <a:bodyPr/>
+          <a:lstStyle/>
+          <a:p>
+            <a:r>
+              <a:rPr lang="en-US" dirty="0" smtClean="0"/>
+              <a:t>USB Device: Overview</a:t>
+            </a:r>
+            <a:endParaRPr lang="en-US" dirty="0"/>
+          </a:p>
+        </p:txBody>
+      </p:sp>
+      <p:pic>
+        <p:nvPicPr>
+          <p:cNvPr id="2050" name="Picture 2" descr="C:\Users\samux\Desktop\ARM-internship-report\report\endpoint.jpg"/>
+          <p:cNvPicPr>
+            <a:picLocks noChangeAspect="1" noChangeArrowheads="1"/>
+          </p:cNvPicPr>
+          <p:nvPr/>
+        </p:nvPicPr>
+        <p:blipFill>
+          <a:blip r:embed="rId2"/>
+          <a:srcRect/>
+          <a:stretch>
+            <a:fillRect/>
+          </a:stretch>
+        </p:blipFill>
+        <p:spPr bwMode="auto">
+          <a:xfrm>
+            <a:off x="546532" y="2059206"/>
+            <a:ext cx="7897620" cy="4201566"/>
+          </a:xfrm>
+          <a:prstGeom prst="rect">
+            <a:avLst/>
+          </a:prstGeom>
+          <a:noFill/>
+        </p:spPr>
+      </p:pic>
+    </p:spTree>
+  </p:cSld>
+  <p:clrMapOvr>
+    <a:masterClrMapping/>
+  </p:clrMapOvr>
+</p:sld>
+</file>
+
+<file path=ppt/slides/slide21.xml><?xml version="1.0" encoding="utf-8"?>
+<p:sld xmlns:a="http://schemas.openxmlformats.org/drawingml/2006/main" xmlns:r="http://schemas.openxmlformats.org/officeDocument/2006/relationships" xmlns:p="http://schemas.openxmlformats.org/presentationml/2006/main">
+  <p:cSld>
+    <p:spTree>
+      <p:nvGrpSpPr>
+        <p:cNvPr id="1" name=""/>
+        <p:cNvGrpSpPr/>
+        <p:nvPr/>
+      </p:nvGrpSpPr>
+      <p:grpSpPr>
+        <a:xfrm>
+          <a:off x="0" y="0"/>
+          <a:ext cx="0" cy="0"/>
+          <a:chOff x="0" y="0"/>
+          <a:chExt cx="0" cy="0"/>
+        </a:xfrm>
+      </p:grpSpPr>
+      <p:sp>
+        <p:nvSpPr>
+          <p:cNvPr id="2" name="Titre 1"/>
+          <p:cNvSpPr>
+            <a:spLocks noGrp="1"/>
+          </p:cNvSpPr>
+          <p:nvPr>
+            <p:ph type="title"/>
+          </p:nvPr>
+        </p:nvSpPr>
+        <p:spPr/>
+        <p:txBody>
+          <a:bodyPr/>
+          <a:lstStyle/>
+          <a:p>
+            <a:r>
+              <a:rPr lang="en-US" dirty="0" smtClean="0"/>
+              <a:t>USB Device: Overview</a:t>
+            </a:r>
+            <a:endParaRPr lang="en-US" dirty="0"/>
+          </a:p>
+        </p:txBody>
+      </p:sp>
+      <p:sp>
+        <p:nvSpPr>
+          <p:cNvPr id="3" name="Espace réservé du contenu 2"/>
+          <p:cNvSpPr>
+            <a:spLocks noGrp="1"/>
+          </p:cNvSpPr>
+          <p:nvPr>
+            <p:ph idx="1"/>
+          </p:nvPr>
+        </p:nvSpPr>
+        <p:spPr>
+          <a:xfrm>
+            <a:off x="217488" y="906463"/>
+            <a:ext cx="8775700" cy="1731634"/>
+          </a:xfrm>
+        </p:spPr>
+        <p:txBody>
+          <a:bodyPr/>
+          <a:lstStyle/>
+          <a:p>
+            <a:r>
+              <a:rPr lang="en-US" dirty="0" smtClean="0"/>
+              <a:t>Enumeration:</a:t>
+            </a:r>
+          </a:p>
+          <a:p>
+            <a:pPr lvl="1"/>
+            <a:r>
+              <a:rPr lang="en-US" dirty="0" smtClean="0"/>
+              <a:t>The host set a </a:t>
+            </a:r>
+            <a:r>
+              <a:rPr lang="en-US" b="1" dirty="0" smtClean="0"/>
+              <a:t>unique address </a:t>
+            </a:r>
+            <a:r>
+              <a:rPr lang="en-US" dirty="0" smtClean="0"/>
+              <a:t>to the device</a:t>
+            </a:r>
+          </a:p>
+          <a:p>
+            <a:pPr lvl="1"/>
+            <a:r>
+              <a:rPr lang="en-US" dirty="0" smtClean="0"/>
+              <a:t>The host learns about the device capabilities</a:t>
+            </a:r>
+          </a:p>
+          <a:p>
+            <a:pPr lvl="1"/>
+            <a:r>
+              <a:rPr lang="en-US" dirty="0" smtClean="0"/>
+              <a:t>Device capabilities contained in </a:t>
+            </a:r>
+            <a:r>
+              <a:rPr lang="en-US" b="1" dirty="0" smtClean="0"/>
+              <a:t>descriptors</a:t>
+            </a:r>
+          </a:p>
+          <a:p>
+            <a:pPr lvl="1"/>
+            <a:endParaRPr lang="en-US" dirty="0"/>
+          </a:p>
+        </p:txBody>
+      </p:sp>
+      <p:pic>
+        <p:nvPicPr>
+          <p:cNvPr id="3074" name="Picture 2" descr="C:\Users\samux\Desktop\ARM-internship-report\report\descr.jpg"/>
+          <p:cNvPicPr>
+            <a:picLocks noChangeAspect="1" noChangeArrowheads="1"/>
+          </p:cNvPicPr>
+          <p:nvPr/>
+        </p:nvPicPr>
+        <p:blipFill>
+          <a:blip r:embed="rId2"/>
+          <a:srcRect/>
+          <a:stretch>
+            <a:fillRect/>
+          </a:stretch>
+        </p:blipFill>
+        <p:spPr bwMode="auto">
+          <a:xfrm>
+            <a:off x="987404" y="2911366"/>
+            <a:ext cx="7126442" cy="3153104"/>
+          </a:xfrm>
+          <a:prstGeom prst="rect">
+            <a:avLst/>
+          </a:prstGeom>
+          <a:noFill/>
+        </p:spPr>
+      </p:pic>
+    </p:spTree>
+  </p:cSld>
+  <p:clrMapOvr>
+    <a:masterClrMapping/>
+  </p:clrMapOvr>
+</p:sld>
+</file>
+
+<file path=ppt/slides/slide22.xml><?xml version="1.0" encoding="utf-8"?>
+<p:sld xmlns:a="http://schemas.openxmlformats.org/drawingml/2006/main" xmlns:r="http://schemas.openxmlformats.org/officeDocument/2006/relationships" xmlns:p="http://schemas.openxmlformats.org/presentationml/2006/main">
+  <p:cSld>
+    <p:spTree>
+      <p:nvGrpSpPr>
+        <p:cNvPr id="1" name=""/>
+        <p:cNvGrpSpPr/>
+        <p:nvPr/>
+      </p:nvGrpSpPr>
+      <p:grpSpPr>
+        <a:xfrm>
+          <a:off x="0" y="0"/>
+          <a:ext cx="0" cy="0"/>
+          <a:chOff x="0" y="0"/>
+          <a:chExt cx="0" cy="0"/>
+        </a:xfrm>
+      </p:grpSpPr>
+      <p:sp>
+        <p:nvSpPr>
+          <p:cNvPr id="2" name="Titre 1"/>
+          <p:cNvSpPr>
+            <a:spLocks noGrp="1"/>
+          </p:cNvSpPr>
+          <p:nvPr>
+            <p:ph type="title"/>
+          </p:nvPr>
+        </p:nvSpPr>
+        <p:spPr/>
+        <p:txBody>
+          <a:bodyPr/>
+          <a:lstStyle/>
+          <a:p>
+            <a:r>
+              <a:rPr lang="en-US" dirty="0" smtClean="0"/>
+              <a:t>USB Device: stack architecture</a:t>
+            </a:r>
+            <a:endParaRPr lang="en-US" dirty="0"/>
+          </a:p>
+        </p:txBody>
+      </p:sp>
+      <p:pic>
+        <p:nvPicPr>
+          <p:cNvPr id="4098" name="Picture 2" descr="C:\Users\samux\Desktop\ARM-internship-report\report\usb_arch3.png"/>
+          <p:cNvPicPr>
+            <a:picLocks noChangeAspect="1" noChangeArrowheads="1"/>
+          </p:cNvPicPr>
+          <p:nvPr/>
+        </p:nvPicPr>
+        <p:blipFill>
+          <a:blip r:embed="rId2"/>
+          <a:srcRect/>
+          <a:stretch>
+            <a:fillRect/>
+          </a:stretch>
+        </p:blipFill>
+        <p:spPr bwMode="auto">
+          <a:xfrm>
+            <a:off x="207162" y="1471449"/>
+            <a:ext cx="8768678" cy="4081190"/>
+          </a:xfrm>
+          <a:prstGeom prst="rect">
+            <a:avLst/>
+          </a:prstGeom>
+          <a:noFill/>
+        </p:spPr>
+      </p:pic>
+    </p:spTree>
+  </p:cSld>
+  <p:clrMapOvr>
+    <a:masterClrMapping/>
+  </p:clrMapOvr>
+</p:sld>
+</file>
+
+<file path=ppt/slides/slide23.xml><?xml version="1.0" encoding="utf-8"?>
+<p:sld xmlns:a="http://schemas.openxmlformats.org/drawingml/2006/main" xmlns:r="http://schemas.openxmlformats.org/officeDocument/2006/relationships" xmlns:p="http://schemas.openxmlformats.org/presentationml/2006/main">
+  <p:cSld>
+    <p:spTree>
+      <p:nvGrpSpPr>
+        <p:cNvPr id="1" name=""/>
+        <p:cNvGrpSpPr/>
+        <p:nvPr/>
+      </p:nvGrpSpPr>
+      <p:grpSpPr>
+        <a:xfrm>
+          <a:off x="0" y="0"/>
+          <a:ext cx="0" cy="0"/>
+          <a:chOff x="0" y="0"/>
+          <a:chExt cx="0" cy="0"/>
+        </a:xfrm>
+      </p:grpSpPr>
+      <p:sp>
+        <p:nvSpPr>
+          <p:cNvPr id="2" name="Titre 1"/>
+          <p:cNvSpPr>
+            <a:spLocks noGrp="1"/>
+          </p:cNvSpPr>
+          <p:nvPr>
+            <p:ph type="title"/>
+          </p:nvPr>
+        </p:nvSpPr>
+        <p:spPr/>
+        <p:txBody>
+          <a:bodyPr/>
+          <a:lstStyle/>
+          <a:p>
+            <a:r>
+              <a:rPr lang="en-US" dirty="0" smtClean="0"/>
+              <a:t>USB Device: USBHAL</a:t>
+            </a:r>
+            <a:endParaRPr lang="en-US" dirty="0"/>
+          </a:p>
+        </p:txBody>
+      </p:sp>
+      <p:sp>
+        <p:nvSpPr>
+          <p:cNvPr id="3" name="Espace réservé du contenu 2"/>
+          <p:cNvSpPr>
+            <a:spLocks noGrp="1"/>
+          </p:cNvSpPr>
+          <p:nvPr>
+            <p:ph idx="1"/>
+          </p:nvPr>
+        </p:nvSpPr>
+        <p:spPr/>
+        <p:txBody>
+          <a:bodyPr/>
+          <a:lstStyle/>
+          <a:p>
+            <a:r>
+              <a:rPr lang="en-US" smtClean="0"/>
+              <a:t>USBHAL:</a:t>
+            </a:r>
+          </a:p>
+          <a:p>
+            <a:pPr lvl="1"/>
+            <a:endParaRPr lang="en-US"/>
+          </a:p>
+        </p:txBody>
+      </p:sp>
+    </p:spTree>
+  </p:cSld>
+  <p:clrMapOvr>
+    <a:masterClrMapping/>
+  </p:clrMapOvr>
 </p:sld>
 </file>
 
@@ -8371,11 +9278,7 @@
             <a:pPr lvl="1"/>
             <a:r>
               <a:rPr lang="en-US" dirty="0" smtClean="0"/>
-              <a:t>To replace all existing polling techniques (AJAX</a:t>
-            </a:r>
-            <a:r>
-              <a:rPr lang="en-US" dirty="0" smtClean="0"/>
-              <a:t>)</a:t>
+              <a:t>To replace all existing polling techniques (AJAX)</a:t>
             </a:r>
           </a:p>
           <a:p>

</xml_diff>

<commit_message>
add usb hid and audio article
</commit_message>
<xml_diff>
--- a/presentation_en/pres.pptx
+++ b/presentation_en/pres.pptx
@@ -5,10 +5,10 @@
     <p:sldMasterId id="2147483664" r:id="rId1"/>
   </p:sldMasterIdLst>
   <p:notesMasterIdLst>
-    <p:notesMasterId r:id="rId25"/>
+    <p:notesMasterId r:id="rId31"/>
   </p:notesMasterIdLst>
   <p:handoutMasterIdLst>
-    <p:handoutMasterId r:id="rId26"/>
+    <p:handoutMasterId r:id="rId32"/>
   </p:handoutMasterIdLst>
   <p:sldIdLst>
     <p:sldId id="256" r:id="rId2"/>
@@ -34,6 +34,12 @@
     <p:sldId id="277" r:id="rId22"/>
     <p:sldId id="278" r:id="rId23"/>
     <p:sldId id="279" r:id="rId24"/>
+    <p:sldId id="280" r:id="rId25"/>
+    <p:sldId id="281" r:id="rId26"/>
+    <p:sldId id="282" r:id="rId27"/>
+    <p:sldId id="283" r:id="rId28"/>
+    <p:sldId id="284" r:id="rId29"/>
+    <p:sldId id="285" r:id="rId30"/>
   </p:sldIdLst>
   <p:sldSz cx="9144000" cy="6858000" type="screen4x3"/>
   <p:notesSz cx="6743700" cy="9880600"/>
@@ -3274,29 +3280,26 @@
           <a:p>
             <a:r>
               <a:rPr lang="en-GB" sz="4000" i="1" dirty="0" smtClean="0"/>
-              <a:t>Embedded systems</a:t>
+              <a:t>Embedded </a:t>
+            </a:r>
+            <a:r>
+              <a:rPr lang="en-GB" sz="4000" i="1" dirty="0" smtClean="0"/>
+              <a:t>systems</a:t>
             </a:r>
             <a:r>
               <a:rPr lang="en-GB" sz="4000" dirty="0" smtClean="0"/>
-              <a:t>,</a:t>
+              <a:t>:</a:t>
+            </a:r>
+            <a:r>
+              <a:rPr lang="en-GB" sz="4000" dirty="0" smtClean="0"/>
+              <a:t/>
             </a:r>
             <a:br>
               <a:rPr lang="en-GB" sz="4000" dirty="0" smtClean="0"/>
             </a:br>
             <a:r>
-              <a:rPr lang="en-GB" sz="4000" i="1" dirty="0" smtClean="0"/>
-              <a:t>Internet of Things </a:t>
-            </a:r>
-            <a:r>
-              <a:rPr lang="en-GB" sz="4000" b="0" dirty="0" smtClean="0"/>
-              <a:t>and</a:t>
-            </a:r>
-            <a:br>
-              <a:rPr lang="en-GB" sz="4000" b="0" dirty="0" smtClean="0"/>
-            </a:br>
-            <a:r>
-              <a:rPr lang="en-GB" sz="4000" i="1" dirty="0" smtClean="0"/>
-              <a:t>Communication</a:t>
+              <a:rPr lang="en-GB" sz="4000" dirty="0" smtClean="0"/>
+              <a:t>From the cloud to a global connectivity</a:t>
             </a:r>
             <a:endParaRPr lang="en-GB" sz="4000" i="1" dirty="0"/>
           </a:p>
@@ -3314,7 +3317,7 @@
         </p:nvSpPr>
         <p:spPr>
           <a:xfrm>
-            <a:off x="1405210" y="3147957"/>
+            <a:off x="1247560" y="3084897"/>
             <a:ext cx="6711950" cy="1460500"/>
           </a:xfrm>
         </p:spPr>
@@ -3324,7 +3327,15 @@
           <a:p>
             <a:r>
               <a:rPr lang="en-US" sz="2000" i="1" dirty="0" smtClean="0"/>
-              <a:t>Industrial Engineering Internship Presentation:</a:t>
+              <a:t>Industrial </a:t>
+            </a:r>
+            <a:r>
+              <a:rPr lang="en-US" sz="2000" i="1" dirty="0" smtClean="0"/>
+              <a:t>Placement Presentation</a:t>
+            </a:r>
+            <a:r>
+              <a:rPr lang="en-US" sz="2000" i="1" dirty="0" smtClean="0"/>
+              <a:t>:</a:t>
             </a:r>
           </a:p>
           <a:p>
@@ -4439,7 +4450,7 @@
             <a:pPr lvl="1"/>
             <a:r>
               <a:rPr lang="en-US" dirty="0" smtClean="0"/>
-              <a:t>Execute a method on a distant method from another </a:t>
+              <a:t>Execute a method on a distant </a:t>
             </a:r>
             <a:r>
               <a:rPr lang="en-US" dirty="0" err="1" smtClean="0"/>
@@ -4648,10 +4659,16 @@
               <a:buChar char="§"/>
             </a:pPr>
             <a:r>
-              <a:rPr lang="en-US" sz="2000" b="0" kern="0" noProof="0" dirty="0" smtClean="0">
+              <a:rPr lang="en-US" sz="2000" b="0" kern="0" dirty="0" err="1" smtClean="0">
                 <a:latin typeface="+mn-lt"/>
               </a:rPr>
-              <a:t>Not easy to access space</a:t>
+              <a:t>Mbed</a:t>
+            </a:r>
+            <a:r>
+              <a:rPr lang="en-US" sz="2000" b="0" kern="0" dirty="0" smtClean="0">
+                <a:latin typeface="+mn-lt"/>
+              </a:rPr>
+              <a:t> located in places where people cannot go frequently</a:t>
             </a:r>
             <a:endParaRPr kumimoji="0" lang="en-US" sz="2000" b="0" i="0" u="none" strike="noStrike" kern="0" cap="none" spc="0" normalizeH="0" baseline="0" noProof="0" dirty="0" smtClean="0">
               <a:ln>
@@ -4920,8 +4937,12 @@
                 <a:latin typeface="+mn-lt"/>
                 <a:ea typeface="+mn-ea"/>
               </a:rPr>
-              <a:t>Organization by sub-networks</a:t>
-            </a:r>
+              <a:t>Sub-networks organization</a:t>
+            </a:r>
+            <a:endParaRPr lang="en-US" sz="1800" b="0" kern="0" noProof="0" dirty="0" smtClean="0">
+              <a:latin typeface="+mn-lt"/>
+              <a:ea typeface="+mn-ea"/>
+            </a:endParaRPr>
           </a:p>
           <a:p>
             <a:pPr marL="265113" marR="0" lvl="0" indent="-265113" algn="l" defTabSz="914400" rtl="0" eaLnBrk="1" fontAlgn="ctr" latinLnBrk="0" hangingPunct="1">
@@ -5699,7 +5720,19 @@
                   <a:rPr lang="en-US" b="0" dirty="0" smtClean="0">
                     <a:latin typeface="Book Antiqua" pitchFamily="18" charset="0"/>
                   </a:rPr>
-                  <a:t>”: “mbed1”, “</a:t>
+                  <a:t>”: “</a:t>
+                </a:r>
+                <a:r>
+                  <a:rPr lang="en-US" b="0" dirty="0" smtClean="0">
+                    <a:latin typeface="Book Antiqua" pitchFamily="18" charset="0"/>
+                  </a:rPr>
+                  <a:t>mbed2”, </a:t>
+                </a:r>
+                <a:r>
+                  <a:rPr lang="en-US" b="0" dirty="0" smtClean="0">
+                    <a:latin typeface="Book Antiqua" pitchFamily="18" charset="0"/>
+                  </a:rPr>
+                  <a:t>“</a:t>
                 </a:r>
                 <a:r>
                   <a:rPr lang="en-US" dirty="0" err="1" smtClean="0">
@@ -7813,7 +7846,15 @@
             <a:pPr lvl="1"/>
             <a:r>
               <a:rPr lang="en-US" dirty="0" smtClean="0"/>
-              <a:t>The host set a </a:t>
+              <a:t>The host </a:t>
+            </a:r>
+            <a:r>
+              <a:rPr lang="en-US" dirty="0" smtClean="0"/>
+              <a:t>sets </a:t>
+            </a:r>
+            <a:r>
+              <a:rPr lang="en-US" dirty="0" smtClean="0"/>
+              <a:t>a </a:t>
             </a:r>
             <a:r>
               <a:rPr lang="en-US" b="1" dirty="0" smtClean="0"/>
@@ -7835,7 +7876,15 @@
             <a:pPr lvl="1"/>
             <a:r>
               <a:rPr lang="en-US" dirty="0" smtClean="0"/>
-              <a:t>Device capabilities contained in </a:t>
+              <a:t>Device capabilities </a:t>
+            </a:r>
+            <a:r>
+              <a:rPr lang="en-US" dirty="0" smtClean="0"/>
+              <a:t>are contained </a:t>
+            </a:r>
+            <a:r>
+              <a:rPr lang="en-US" dirty="0" smtClean="0"/>
+              <a:t>in </a:t>
             </a:r>
             <a:r>
               <a:rPr lang="en-US" b="1" dirty="0" smtClean="0"/>
@@ -8006,19 +8055,1775 @@
             <p:ph idx="1"/>
           </p:nvPr>
         </p:nvSpPr>
+        <p:spPr>
+          <a:xfrm>
+            <a:off x="0" y="895952"/>
+            <a:ext cx="9806152" cy="5473700"/>
+          </a:xfrm>
+        </p:spPr>
+        <p:txBody>
+          <a:bodyPr/>
+          <a:lstStyle/>
+          <a:p>
+            <a:r>
+              <a:rPr lang="en-US" dirty="0" smtClean="0"/>
+              <a:t>USBHAL class:</a:t>
+            </a:r>
+          </a:p>
+          <a:p>
+            <a:pPr lvl="1"/>
+            <a:r>
+              <a:rPr lang="en-US" dirty="0" smtClean="0"/>
+              <a:t>USB Hardware Abstraction layer for the LPC11U24 and the LPC1768</a:t>
+            </a:r>
+          </a:p>
+          <a:p>
+            <a:pPr lvl="1"/>
+            <a:r>
+              <a:rPr lang="en-US" dirty="0" smtClean="0"/>
+              <a:t>Implemented in two different .</a:t>
+            </a:r>
+            <a:r>
+              <a:rPr lang="en-US" dirty="0" err="1" smtClean="0"/>
+              <a:t>cpp</a:t>
+            </a:r>
+            <a:r>
+              <a:rPr lang="en-US" dirty="0" smtClean="0"/>
+              <a:t> files with a unique .h</a:t>
+            </a:r>
+          </a:p>
+          <a:p>
+            <a:pPr lvl="1"/>
+            <a:r>
+              <a:rPr lang="en-US" dirty="0" smtClean="0"/>
+              <a:t>A macro is defined by the compiler according to the target</a:t>
+            </a:r>
+          </a:p>
+          <a:p>
+            <a:pPr lvl="1">
+              <a:buNone/>
+            </a:pPr>
+            <a:endParaRPr lang="en-US" dirty="0" smtClean="0"/>
+          </a:p>
+          <a:p>
+            <a:pPr lvl="1"/>
+            <a:r>
+              <a:rPr lang="en-US" dirty="0" smtClean="0"/>
+              <a:t>Low level methods:</a:t>
+            </a:r>
+          </a:p>
+          <a:p>
+            <a:pPr lvl="2"/>
+            <a:r>
+              <a:rPr lang="en-US" dirty="0" smtClean="0"/>
+              <a:t>Write an Endpoint</a:t>
+            </a:r>
+          </a:p>
+          <a:p>
+            <a:pPr lvl="2"/>
+            <a:r>
+              <a:rPr lang="en-US" dirty="0" smtClean="0"/>
+              <a:t>Read an Endpoint</a:t>
+            </a:r>
+          </a:p>
+          <a:p>
+            <a:pPr lvl="2"/>
+            <a:r>
+              <a:rPr lang="en-US" dirty="0" smtClean="0"/>
+              <a:t>IRQ handler which calls virtual functions:</a:t>
+            </a:r>
+          </a:p>
+          <a:p>
+            <a:pPr lvl="3"/>
+            <a:r>
+              <a:rPr lang="en-US" dirty="0" err="1" smtClean="0"/>
+              <a:t>EPx_OUT_callback</a:t>
+            </a:r>
+            <a:r>
+              <a:rPr lang="en-US" dirty="0" smtClean="0"/>
+              <a:t>(): data received</a:t>
+            </a:r>
+          </a:p>
+          <a:p>
+            <a:pPr lvl="3"/>
+            <a:r>
+              <a:rPr lang="en-US" dirty="0" err="1" smtClean="0"/>
+              <a:t>Epx_IN_callback</a:t>
+            </a:r>
+            <a:r>
+              <a:rPr lang="en-US" dirty="0" smtClean="0"/>
+              <a:t>(): data sent</a:t>
+            </a:r>
+          </a:p>
+          <a:p>
+            <a:pPr lvl="3"/>
+            <a:r>
+              <a:rPr lang="en-US" dirty="0" smtClean="0"/>
+              <a:t>SOF(</a:t>
+            </a:r>
+            <a:r>
+              <a:rPr lang="en-US" dirty="0" err="1" smtClean="0"/>
+              <a:t>int</a:t>
+            </a:r>
+            <a:r>
+              <a:rPr lang="en-US" dirty="0" smtClean="0"/>
+              <a:t> </a:t>
+            </a:r>
+            <a:r>
+              <a:rPr lang="en-US" dirty="0" err="1" smtClean="0"/>
+              <a:t>frameNumber</a:t>
+            </a:r>
+            <a:r>
+              <a:rPr lang="en-US" dirty="0" smtClean="0"/>
+              <a:t>): Start Of Frame event (each ms)</a:t>
+            </a:r>
+            <a:endParaRPr lang="en-US" dirty="0"/>
+          </a:p>
+        </p:txBody>
+      </p:sp>
+    </p:spTree>
+  </p:cSld>
+  <p:clrMapOvr>
+    <a:masterClrMapping/>
+  </p:clrMapOvr>
+</p:sld>
+</file>
+
+<file path=ppt/slides/slide24.xml><?xml version="1.0" encoding="utf-8"?>
+<p:sld xmlns:a="http://schemas.openxmlformats.org/drawingml/2006/main" xmlns:r="http://schemas.openxmlformats.org/officeDocument/2006/relationships" xmlns:p="http://schemas.openxmlformats.org/presentationml/2006/main">
+  <p:cSld>
+    <p:spTree>
+      <p:nvGrpSpPr>
+        <p:cNvPr id="1" name=""/>
+        <p:cNvGrpSpPr/>
+        <p:nvPr/>
+      </p:nvGrpSpPr>
+      <p:grpSpPr>
+        <a:xfrm>
+          <a:off x="0" y="0"/>
+          <a:ext cx="0" cy="0"/>
+          <a:chOff x="0" y="0"/>
+          <a:chExt cx="0" cy="0"/>
+        </a:xfrm>
+      </p:grpSpPr>
+      <p:sp>
+        <p:nvSpPr>
+          <p:cNvPr id="2" name="Titre 1"/>
+          <p:cNvSpPr>
+            <a:spLocks noGrp="1"/>
+          </p:cNvSpPr>
+          <p:nvPr>
+            <p:ph type="title"/>
+          </p:nvPr>
+        </p:nvSpPr>
         <p:spPr/>
         <p:txBody>
           <a:bodyPr/>
           <a:lstStyle/>
           <a:p>
             <a:r>
-              <a:rPr lang="en-US" smtClean="0"/>
-              <a:t>USBHAL:</a:t>
+              <a:rPr lang="en-US" dirty="0" smtClean="0"/>
+              <a:t>USB Device: </a:t>
+            </a:r>
+            <a:r>
+              <a:rPr lang="en-US" dirty="0" err="1" smtClean="0"/>
+              <a:t>USBDevice</a:t>
+            </a:r>
+            <a:endParaRPr lang="en-US" dirty="0"/>
+          </a:p>
+        </p:txBody>
+      </p:sp>
+      <p:sp>
+        <p:nvSpPr>
+          <p:cNvPr id="3" name="Espace réservé du contenu 2"/>
+          <p:cNvSpPr>
+            <a:spLocks noGrp="1"/>
+          </p:cNvSpPr>
+          <p:nvPr>
+            <p:ph idx="1"/>
+          </p:nvPr>
+        </p:nvSpPr>
+        <p:spPr/>
+        <p:txBody>
+          <a:bodyPr/>
+          <a:lstStyle/>
+          <a:p>
+            <a:r>
+              <a:rPr lang="en-US" dirty="0" err="1" smtClean="0"/>
+              <a:t>USBDevice</a:t>
+            </a:r>
+            <a:r>
+              <a:rPr lang="en-US" dirty="0" smtClean="0"/>
+              <a:t> class:</a:t>
             </a:r>
           </a:p>
           <a:p>
             <a:pPr lvl="1"/>
-            <a:endParaRPr lang="en-US"/>
+            <a:r>
+              <a:rPr lang="en-US" dirty="0" smtClean="0"/>
+              <a:t>No difference between the two targets</a:t>
+            </a:r>
+          </a:p>
+          <a:p>
+            <a:pPr lvl="1"/>
+            <a:r>
+              <a:rPr lang="en-US" dirty="0" smtClean="0"/>
+              <a:t>Enumeration step for “standard” descriptors:</a:t>
+            </a:r>
+          </a:p>
+          <a:p>
+            <a:endParaRPr lang="en-US" dirty="0"/>
+          </a:p>
+        </p:txBody>
+      </p:sp>
+      <p:pic>
+        <p:nvPicPr>
+          <p:cNvPr id="1026" name="Picture 2" descr="C:\Users\samux\Desktop\ARM-internship-report\report\setup_packets.jpg"/>
+          <p:cNvPicPr>
+            <a:picLocks noChangeAspect="1" noChangeArrowheads="1"/>
+          </p:cNvPicPr>
+          <p:nvPr/>
+        </p:nvPicPr>
+        <p:blipFill>
+          <a:blip r:embed="rId2"/>
+          <a:srcRect/>
+          <a:stretch>
+            <a:fillRect/>
+          </a:stretch>
+        </p:blipFill>
+        <p:spPr bwMode="auto">
+          <a:xfrm>
+            <a:off x="115610" y="2375346"/>
+            <a:ext cx="8926761" cy="3136078"/>
+          </a:xfrm>
+          <a:prstGeom prst="rect">
+            <a:avLst/>
+          </a:prstGeom>
+          <a:noFill/>
+        </p:spPr>
+      </p:pic>
+    </p:spTree>
+  </p:cSld>
+  <p:clrMapOvr>
+    <a:masterClrMapping/>
+  </p:clrMapOvr>
+</p:sld>
+</file>
+
+<file path=ppt/slides/slide25.xml><?xml version="1.0" encoding="utf-8"?>
+<p:sld xmlns:a="http://schemas.openxmlformats.org/drawingml/2006/main" xmlns:r="http://schemas.openxmlformats.org/officeDocument/2006/relationships" xmlns:p="http://schemas.openxmlformats.org/presentationml/2006/main">
+  <p:cSld>
+    <p:spTree>
+      <p:nvGrpSpPr>
+        <p:cNvPr id="1" name=""/>
+        <p:cNvGrpSpPr/>
+        <p:nvPr/>
+      </p:nvGrpSpPr>
+      <p:grpSpPr>
+        <a:xfrm>
+          <a:off x="0" y="0"/>
+          <a:ext cx="0" cy="0"/>
+          <a:chOff x="0" y="0"/>
+          <a:chExt cx="0" cy="0"/>
+        </a:xfrm>
+      </p:grpSpPr>
+      <p:sp>
+        <p:nvSpPr>
+          <p:cNvPr id="2" name="Titre 1"/>
+          <p:cNvSpPr>
+            <a:spLocks noGrp="1"/>
+          </p:cNvSpPr>
+          <p:nvPr>
+            <p:ph type="title"/>
+          </p:nvPr>
+        </p:nvSpPr>
+        <p:spPr/>
+        <p:txBody>
+          <a:bodyPr/>
+          <a:lstStyle/>
+          <a:p>
+            <a:r>
+              <a:rPr lang="en-US" dirty="0" smtClean="0"/>
+              <a:t>USB Device: USB HID</a:t>
+            </a:r>
+            <a:endParaRPr lang="en-US" dirty="0"/>
+          </a:p>
+        </p:txBody>
+      </p:sp>
+      <p:sp>
+        <p:nvSpPr>
+          <p:cNvPr id="3" name="Espace réservé du contenu 2"/>
+          <p:cNvSpPr>
+            <a:spLocks noGrp="1"/>
+          </p:cNvSpPr>
+          <p:nvPr>
+            <p:ph idx="1"/>
+          </p:nvPr>
+        </p:nvSpPr>
+        <p:spPr>
+          <a:xfrm>
+            <a:off x="217488" y="906463"/>
+            <a:ext cx="8775700" cy="522944"/>
+          </a:xfrm>
+        </p:spPr>
+        <p:txBody>
+          <a:bodyPr/>
+          <a:lstStyle/>
+          <a:p>
+            <a:r>
+              <a:rPr lang="en-US" dirty="0" smtClean="0"/>
+              <a:t>Human Interface device (HID):</a:t>
+            </a:r>
+          </a:p>
+          <a:p>
+            <a:pPr lvl="1"/>
+            <a:r>
+              <a:rPr lang="en-US" dirty="0" smtClean="0"/>
+              <a:t>primarily defined </a:t>
+            </a:r>
+            <a:r>
+              <a:rPr lang="en-US" dirty="0" smtClean="0"/>
+              <a:t>for devices </a:t>
+            </a:r>
+            <a:r>
+              <a:rPr lang="en-US" dirty="0" smtClean="0"/>
+              <a:t>that are </a:t>
+            </a:r>
+            <a:r>
+              <a:rPr lang="en-US" dirty="0" smtClean="0"/>
+              <a:t>used by </a:t>
+            </a:r>
+            <a:r>
+              <a:rPr lang="en-US" dirty="0" smtClean="0"/>
+              <a:t>humans</a:t>
+            </a:r>
+          </a:p>
+          <a:p>
+            <a:pPr lvl="1"/>
+            <a:r>
+              <a:rPr lang="en-US" dirty="0" smtClean="0"/>
+              <a:t>Examples: mouse, keyboard, joystick</a:t>
+            </a:r>
+          </a:p>
+          <a:p>
+            <a:pPr lvl="1"/>
+            <a:r>
+              <a:rPr lang="en-US" dirty="0" smtClean="0"/>
+              <a:t>Can be a solution to exchange raw data with a computer</a:t>
+            </a:r>
+          </a:p>
+          <a:p>
+            <a:pPr lvl="1"/>
+            <a:r>
+              <a:rPr lang="en-US" dirty="0" smtClean="0"/>
+              <a:t>A HID driver is built-in in all operating systems</a:t>
+            </a:r>
+          </a:p>
+          <a:p>
+            <a:pPr lvl="1"/>
+            <a:endParaRPr lang="en-US" dirty="0" smtClean="0"/>
+          </a:p>
+          <a:p>
+            <a:pPr lvl="1"/>
+            <a:r>
+              <a:rPr lang="en-US" dirty="0" smtClean="0"/>
+              <a:t>Class requirements:</a:t>
+            </a:r>
+          </a:p>
+          <a:p>
+            <a:pPr lvl="2"/>
+            <a:r>
+              <a:rPr lang="en-US" dirty="0" smtClean="0"/>
+              <a:t>Interrupt IN endpoint to send data</a:t>
+            </a:r>
+          </a:p>
+          <a:p>
+            <a:pPr lvl="2"/>
+            <a:r>
+              <a:rPr lang="en-US" dirty="0" smtClean="0"/>
+              <a:t>Interrupt OUT endpoint to receive data</a:t>
+            </a:r>
+          </a:p>
+          <a:p>
+            <a:pPr lvl="2"/>
+            <a:r>
+              <a:rPr lang="en-US" dirty="0" smtClean="0"/>
+              <a:t>Data are exchanged in data structure called “</a:t>
+            </a:r>
+            <a:r>
+              <a:rPr lang="en-US" b="1" dirty="0" smtClean="0"/>
+              <a:t>reports</a:t>
+            </a:r>
+            <a:r>
+              <a:rPr lang="en-US" dirty="0" smtClean="0"/>
+              <a:t>”</a:t>
+            </a:r>
+          </a:p>
+          <a:p>
+            <a:pPr lvl="2"/>
+            <a:r>
+              <a:rPr lang="en-US" dirty="0" smtClean="0"/>
+              <a:t>A </a:t>
+            </a:r>
+            <a:r>
+              <a:rPr lang="en-US" b="1" dirty="0" smtClean="0"/>
+              <a:t>report descriptor </a:t>
+            </a:r>
+            <a:r>
+              <a:rPr lang="en-US" dirty="0" smtClean="0"/>
+              <a:t>defines format and size of a report</a:t>
+            </a:r>
+            <a:endParaRPr lang="en-US" dirty="0"/>
+          </a:p>
+        </p:txBody>
+      </p:sp>
+    </p:spTree>
+  </p:cSld>
+  <p:clrMapOvr>
+    <a:masterClrMapping/>
+  </p:clrMapOvr>
+</p:sld>
+</file>
+
+<file path=ppt/slides/slide26.xml><?xml version="1.0" encoding="utf-8"?>
+<p:sld xmlns:a="http://schemas.openxmlformats.org/drawingml/2006/main" xmlns:r="http://schemas.openxmlformats.org/officeDocument/2006/relationships" xmlns:p="http://schemas.openxmlformats.org/presentationml/2006/main">
+  <p:cSld>
+    <p:spTree>
+      <p:nvGrpSpPr>
+        <p:cNvPr id="1" name=""/>
+        <p:cNvGrpSpPr/>
+        <p:nvPr/>
+      </p:nvGrpSpPr>
+      <p:grpSpPr>
+        <a:xfrm>
+          <a:off x="0" y="0"/>
+          <a:ext cx="0" cy="0"/>
+          <a:chOff x="0" y="0"/>
+          <a:chExt cx="0" cy="0"/>
+        </a:xfrm>
+      </p:grpSpPr>
+      <p:sp>
+        <p:nvSpPr>
+          <p:cNvPr id="2" name="Titre 1"/>
+          <p:cNvSpPr>
+            <a:spLocks noGrp="1"/>
+          </p:cNvSpPr>
+          <p:nvPr>
+            <p:ph type="title"/>
+          </p:nvPr>
+        </p:nvSpPr>
+        <p:spPr/>
+        <p:txBody>
+          <a:bodyPr/>
+          <a:lstStyle/>
+          <a:p>
+            <a:r>
+              <a:rPr lang="en-US" dirty="0" smtClean="0"/>
+              <a:t>USB Device: Generic USB HID device</a:t>
+            </a:r>
+            <a:endParaRPr lang="en-US" dirty="0"/>
+          </a:p>
+        </p:txBody>
+      </p:sp>
+      <p:sp>
+        <p:nvSpPr>
+          <p:cNvPr id="4" name="ZoneTexte 3"/>
+          <p:cNvSpPr txBox="1"/>
+          <p:nvPr/>
+        </p:nvSpPr>
+        <p:spPr>
+          <a:xfrm>
+            <a:off x="157655" y="1219229"/>
+            <a:ext cx="4498428" cy="4524315"/>
+          </a:xfrm>
+          <a:prstGeom prst="rect">
+            <a:avLst/>
+          </a:prstGeom>
+          <a:solidFill>
+            <a:schemeClr val="accent1">
+              <a:lumMod val="20000"/>
+              <a:lumOff val="80000"/>
+            </a:schemeClr>
+          </a:solidFill>
+        </p:spPr>
+        <p:txBody>
+          <a:bodyPr wrap="square" rtlCol="0">
+            <a:spAutoFit/>
+          </a:bodyPr>
+          <a:lstStyle/>
+          <a:p>
+            <a:pPr algn="l"/>
+            <a:r>
+              <a:rPr lang="en-US" sz="1200" b="0" dirty="0" smtClean="0">
+                <a:solidFill>
+                  <a:schemeClr val="tx1"/>
+                </a:solidFill>
+                <a:latin typeface="Book Antiqua" pitchFamily="18" charset="0"/>
+              </a:rPr>
+              <a:t>uint8_t </a:t>
+            </a:r>
+            <a:r>
+              <a:rPr lang="en-US" sz="1200" b="0" dirty="0" smtClean="0">
+                <a:solidFill>
+                  <a:schemeClr val="tx1"/>
+                </a:solidFill>
+                <a:latin typeface="Book Antiqua" pitchFamily="18" charset="0"/>
+              </a:rPr>
+              <a:t>* USBHID::</a:t>
+            </a:r>
+            <a:r>
+              <a:rPr lang="en-US" sz="1200" b="0" dirty="0" err="1" smtClean="0">
+                <a:solidFill>
+                  <a:schemeClr val="tx1"/>
+                </a:solidFill>
+                <a:latin typeface="Book Antiqua" pitchFamily="18" charset="0"/>
+              </a:rPr>
+              <a:t>reportDesc</a:t>
+            </a:r>
+            <a:r>
+              <a:rPr lang="en-US" sz="1200" b="0" dirty="0" smtClean="0">
+                <a:solidFill>
+                  <a:schemeClr val="tx1"/>
+                </a:solidFill>
+                <a:latin typeface="Book Antiqua" pitchFamily="18" charset="0"/>
+              </a:rPr>
+              <a:t>() {</a:t>
+            </a:r>
+          </a:p>
+          <a:p>
+            <a:pPr algn="l"/>
+            <a:r>
+              <a:rPr lang="en-US" sz="1200" b="0" dirty="0" smtClean="0">
+                <a:solidFill>
+                  <a:schemeClr val="tx1"/>
+                </a:solidFill>
+                <a:latin typeface="Book Antiqua" pitchFamily="18" charset="0"/>
+              </a:rPr>
+              <a:t>    static uint8_t </a:t>
+            </a:r>
+            <a:r>
+              <a:rPr lang="en-US" sz="1200" b="0" dirty="0" err="1" smtClean="0">
+                <a:solidFill>
+                  <a:schemeClr val="tx1"/>
+                </a:solidFill>
+                <a:latin typeface="Book Antiqua" pitchFamily="18" charset="0"/>
+              </a:rPr>
+              <a:t>reportDescriptor</a:t>
+            </a:r>
+            <a:r>
+              <a:rPr lang="en-US" sz="1200" b="0" dirty="0" smtClean="0">
+                <a:solidFill>
+                  <a:schemeClr val="tx1"/>
+                </a:solidFill>
+                <a:latin typeface="Book Antiqua" pitchFamily="18" charset="0"/>
+              </a:rPr>
+              <a:t>[] = {</a:t>
+            </a:r>
+          </a:p>
+          <a:p>
+            <a:pPr algn="l"/>
+            <a:r>
+              <a:rPr lang="en-US" sz="1200" b="0" dirty="0" smtClean="0">
+                <a:solidFill>
+                  <a:schemeClr val="tx1"/>
+                </a:solidFill>
+                <a:latin typeface="Book Antiqua" pitchFamily="18" charset="0"/>
+              </a:rPr>
+              <a:t>        0x06, LSB(0xFFAB), MSB(0xFFAB),</a:t>
+            </a:r>
+          </a:p>
+          <a:p>
+            <a:pPr algn="l"/>
+            <a:r>
+              <a:rPr lang="en-US" sz="1200" b="0" dirty="0" smtClean="0">
+                <a:solidFill>
+                  <a:schemeClr val="tx1"/>
+                </a:solidFill>
+                <a:latin typeface="Book Antiqua" pitchFamily="18" charset="0"/>
+              </a:rPr>
+              <a:t>        0x0A, LSB(0x0200), MSB(0x0200),</a:t>
+            </a:r>
+          </a:p>
+          <a:p>
+            <a:pPr algn="l"/>
+            <a:r>
+              <a:rPr lang="en-US" sz="1200" b="0" dirty="0" smtClean="0">
+                <a:solidFill>
+                  <a:schemeClr val="tx1"/>
+                </a:solidFill>
+                <a:latin typeface="Book Antiqua" pitchFamily="18" charset="0"/>
+              </a:rPr>
+              <a:t>        0xA1, 0x01,         </a:t>
+            </a:r>
+            <a:r>
+              <a:rPr lang="en-US" sz="1200" b="0" dirty="0" smtClean="0">
+                <a:solidFill>
+                  <a:schemeClr val="tx1"/>
+                </a:solidFill>
+                <a:latin typeface="Book Antiqua" pitchFamily="18" charset="0"/>
+              </a:rPr>
+              <a:t>	// </a:t>
+            </a:r>
+            <a:r>
+              <a:rPr lang="en-US" sz="1200" b="0" dirty="0" smtClean="0">
+                <a:solidFill>
+                  <a:schemeClr val="tx1"/>
+                </a:solidFill>
+                <a:latin typeface="Book Antiqua" pitchFamily="18" charset="0"/>
+              </a:rPr>
+              <a:t>Collection </a:t>
+            </a:r>
+            <a:r>
+              <a:rPr lang="en-US" sz="1200" b="0" dirty="0" smtClean="0">
+                <a:solidFill>
+                  <a:schemeClr val="tx1"/>
+                </a:solidFill>
+                <a:latin typeface="Book Antiqua" pitchFamily="18" charset="0"/>
+              </a:rPr>
+              <a:t>0x01</a:t>
+            </a:r>
+          </a:p>
+          <a:p>
+            <a:pPr algn="l"/>
+            <a:endParaRPr lang="en-US" sz="1200" b="0" dirty="0" smtClean="0">
+              <a:solidFill>
+                <a:schemeClr val="tx1"/>
+              </a:solidFill>
+              <a:latin typeface="Book Antiqua" pitchFamily="18" charset="0"/>
+            </a:endParaRPr>
+          </a:p>
+          <a:p>
+            <a:pPr algn="l"/>
+            <a:r>
+              <a:rPr lang="en-US" sz="1200" b="0" dirty="0" smtClean="0"/>
+              <a:t>       // </a:t>
+            </a:r>
+            <a:r>
+              <a:rPr lang="en-US" sz="1200" b="0" dirty="0" smtClean="0"/>
+              <a:t>data </a:t>
+            </a:r>
+            <a:r>
+              <a:rPr lang="en-US" sz="1200" b="0" dirty="0" smtClean="0"/>
+              <a:t>are sent </a:t>
+            </a:r>
+            <a:r>
+              <a:rPr lang="en-US" sz="1200" b="0" dirty="0" smtClean="0"/>
+              <a:t>in </a:t>
+            </a:r>
+            <a:r>
+              <a:rPr lang="en-US" sz="1200" b="0" dirty="0" smtClean="0"/>
+              <a:t>packets containing </a:t>
+            </a:r>
+            <a:r>
+              <a:rPr lang="en-US" sz="1200" b="0" dirty="0" smtClean="0"/>
+              <a:t>input </a:t>
+            </a:r>
+            <a:r>
+              <a:rPr lang="en-US" sz="1200" b="0" dirty="0" smtClean="0"/>
+              <a:t>length bytes</a:t>
+            </a:r>
+            <a:endParaRPr lang="en-US" sz="1200" b="0" dirty="0" smtClean="0">
+              <a:solidFill>
+                <a:schemeClr val="tx1"/>
+              </a:solidFill>
+              <a:latin typeface="Book Antiqua" pitchFamily="18" charset="0"/>
+            </a:endParaRPr>
+          </a:p>
+          <a:p>
+            <a:pPr algn="l"/>
+            <a:r>
+              <a:rPr lang="en-US" sz="1200" b="0" dirty="0" smtClean="0">
+                <a:solidFill>
+                  <a:schemeClr val="tx1"/>
+                </a:solidFill>
+                <a:latin typeface="Book Antiqua" pitchFamily="18" charset="0"/>
+              </a:rPr>
+              <a:t>        0x75, 0x08,         </a:t>
+            </a:r>
+            <a:r>
+              <a:rPr lang="en-US" sz="1200" b="0" dirty="0" smtClean="0">
+                <a:solidFill>
+                  <a:schemeClr val="tx1"/>
+                </a:solidFill>
+                <a:latin typeface="Book Antiqua" pitchFamily="18" charset="0"/>
+              </a:rPr>
+              <a:t>	// </a:t>
+            </a:r>
+            <a:r>
+              <a:rPr lang="en-US" sz="1200" b="0" dirty="0" smtClean="0">
+                <a:solidFill>
+                  <a:schemeClr val="tx1"/>
+                </a:solidFill>
+                <a:latin typeface="Book Antiqua" pitchFamily="18" charset="0"/>
+              </a:rPr>
+              <a:t>report size = 8 bits</a:t>
+            </a:r>
+          </a:p>
+          <a:p>
+            <a:pPr algn="l"/>
+            <a:r>
+              <a:rPr lang="en-US" sz="1200" b="0" dirty="0" smtClean="0">
+                <a:solidFill>
+                  <a:schemeClr val="tx1"/>
+                </a:solidFill>
+                <a:latin typeface="Book Antiqua" pitchFamily="18" charset="0"/>
+              </a:rPr>
+              <a:t>        0x15, 0x00,         </a:t>
+            </a:r>
+            <a:r>
+              <a:rPr lang="en-US" sz="1200" b="0" dirty="0" smtClean="0">
+                <a:solidFill>
+                  <a:schemeClr val="tx1"/>
+                </a:solidFill>
+                <a:latin typeface="Book Antiqua" pitchFamily="18" charset="0"/>
+              </a:rPr>
+              <a:t>	// </a:t>
+            </a:r>
+            <a:r>
+              <a:rPr lang="en-US" sz="1200" b="0" dirty="0" smtClean="0">
+                <a:solidFill>
+                  <a:schemeClr val="tx1"/>
+                </a:solidFill>
+                <a:latin typeface="Book Antiqua" pitchFamily="18" charset="0"/>
+              </a:rPr>
+              <a:t>logical minimum = 0</a:t>
+            </a:r>
+          </a:p>
+          <a:p>
+            <a:pPr algn="l"/>
+            <a:r>
+              <a:rPr lang="en-US" sz="1200" b="0" dirty="0" smtClean="0">
+                <a:solidFill>
+                  <a:schemeClr val="tx1"/>
+                </a:solidFill>
+                <a:latin typeface="Book Antiqua" pitchFamily="18" charset="0"/>
+              </a:rPr>
+              <a:t>        0x26, 0xFF, 0x00,   </a:t>
+            </a:r>
+            <a:r>
+              <a:rPr lang="en-US" sz="1200" b="0" dirty="0" smtClean="0">
+                <a:solidFill>
+                  <a:schemeClr val="tx1"/>
+                </a:solidFill>
+                <a:latin typeface="Book Antiqua" pitchFamily="18" charset="0"/>
+              </a:rPr>
+              <a:t>	// </a:t>
+            </a:r>
+            <a:r>
+              <a:rPr lang="en-US" sz="1200" b="0" dirty="0" smtClean="0">
+                <a:solidFill>
+                  <a:schemeClr val="tx1"/>
+                </a:solidFill>
+                <a:latin typeface="Book Antiqua" pitchFamily="18" charset="0"/>
+              </a:rPr>
+              <a:t>logical maximum = 255</a:t>
+            </a:r>
+          </a:p>
+          <a:p>
+            <a:pPr algn="l"/>
+            <a:r>
+              <a:rPr lang="en-US" sz="1200" b="0" dirty="0" smtClean="0">
+                <a:solidFill>
+                  <a:schemeClr val="tx1"/>
+                </a:solidFill>
+                <a:latin typeface="Book Antiqua" pitchFamily="18" charset="0"/>
+              </a:rPr>
+              <a:t>        0x95, </a:t>
+            </a:r>
+            <a:r>
+              <a:rPr lang="en-US" sz="1200" b="0" dirty="0" err="1" smtClean="0">
+                <a:solidFill>
+                  <a:schemeClr val="tx1"/>
+                </a:solidFill>
+                <a:latin typeface="Book Antiqua" pitchFamily="18" charset="0"/>
+              </a:rPr>
+              <a:t>input_length</a:t>
+            </a:r>
+            <a:r>
+              <a:rPr lang="en-US" sz="1200" b="0" dirty="0" smtClean="0">
+                <a:solidFill>
+                  <a:schemeClr val="tx1"/>
+                </a:solidFill>
+                <a:latin typeface="Book Antiqua" pitchFamily="18" charset="0"/>
+              </a:rPr>
+              <a:t>,      </a:t>
+            </a:r>
+            <a:r>
+              <a:rPr lang="en-US" sz="1200" b="0" dirty="0" smtClean="0">
+                <a:solidFill>
+                  <a:schemeClr val="tx1"/>
+                </a:solidFill>
+                <a:latin typeface="Book Antiqua" pitchFamily="18" charset="0"/>
+              </a:rPr>
+              <a:t>// </a:t>
+            </a:r>
+            <a:r>
+              <a:rPr lang="en-US" sz="1200" b="0" dirty="0" smtClean="0">
+                <a:solidFill>
+                  <a:schemeClr val="tx1"/>
+                </a:solidFill>
+                <a:latin typeface="Book Antiqua" pitchFamily="18" charset="0"/>
+              </a:rPr>
+              <a:t>report count</a:t>
+            </a:r>
+          </a:p>
+          <a:p>
+            <a:pPr algn="l"/>
+            <a:r>
+              <a:rPr lang="en-US" sz="1200" b="0" dirty="0" smtClean="0">
+                <a:solidFill>
+                  <a:schemeClr val="tx1"/>
+                </a:solidFill>
+                <a:latin typeface="Book Antiqua" pitchFamily="18" charset="0"/>
+              </a:rPr>
+              <a:t>        0x09, 0x01,         </a:t>
+            </a:r>
+            <a:r>
+              <a:rPr lang="en-US" sz="1200" b="0" dirty="0" smtClean="0">
+                <a:solidFill>
+                  <a:schemeClr val="tx1"/>
+                </a:solidFill>
+                <a:latin typeface="Book Antiqua" pitchFamily="18" charset="0"/>
+              </a:rPr>
+              <a:t>	// </a:t>
+            </a:r>
+            <a:r>
+              <a:rPr lang="en-US" sz="1200" b="0" dirty="0" smtClean="0">
+                <a:solidFill>
+                  <a:schemeClr val="tx1"/>
+                </a:solidFill>
+                <a:latin typeface="Book Antiqua" pitchFamily="18" charset="0"/>
+              </a:rPr>
+              <a:t>usage</a:t>
+            </a:r>
+          </a:p>
+          <a:p>
+            <a:pPr algn="l"/>
+            <a:r>
+              <a:rPr lang="en-US" sz="1200" b="0" dirty="0" smtClean="0">
+                <a:solidFill>
+                  <a:schemeClr val="tx1"/>
+                </a:solidFill>
+                <a:latin typeface="Book Antiqua" pitchFamily="18" charset="0"/>
+              </a:rPr>
+              <a:t>        0x81, 0x02,         </a:t>
+            </a:r>
+            <a:r>
+              <a:rPr lang="en-US" sz="1200" b="0" dirty="0" smtClean="0">
+                <a:solidFill>
+                  <a:schemeClr val="tx1"/>
+                </a:solidFill>
+                <a:latin typeface="Book Antiqua" pitchFamily="18" charset="0"/>
+              </a:rPr>
+              <a:t>	// </a:t>
+            </a:r>
+            <a:r>
+              <a:rPr lang="en-US" sz="1200" b="0" dirty="0" smtClean="0">
+                <a:solidFill>
+                  <a:schemeClr val="tx1"/>
+                </a:solidFill>
+                <a:latin typeface="Book Antiqua" pitchFamily="18" charset="0"/>
+              </a:rPr>
+              <a:t>Input (array</a:t>
+            </a:r>
+            <a:r>
+              <a:rPr lang="en-US" sz="1200" b="0" dirty="0" smtClean="0">
+                <a:solidFill>
+                  <a:schemeClr val="tx1"/>
+                </a:solidFill>
+                <a:latin typeface="Book Antiqua" pitchFamily="18" charset="0"/>
+              </a:rPr>
+              <a:t>)</a:t>
+            </a:r>
+          </a:p>
+          <a:p>
+            <a:pPr algn="l"/>
+            <a:endParaRPr lang="en-US" sz="1200" b="0" dirty="0" smtClean="0">
+              <a:solidFill>
+                <a:schemeClr val="tx1"/>
+              </a:solidFill>
+              <a:latin typeface="Book Antiqua" pitchFamily="18" charset="0"/>
+            </a:endParaRPr>
+          </a:p>
+          <a:p>
+            <a:pPr algn="l"/>
+            <a:r>
+              <a:rPr lang="en-US" sz="1200" b="0" dirty="0" smtClean="0"/>
+              <a:t>       // data are sent in packets containing input length </a:t>
+            </a:r>
+            <a:r>
+              <a:rPr lang="en-US" sz="1200" b="0" dirty="0" smtClean="0"/>
+              <a:t>bytes</a:t>
+            </a:r>
+            <a:endParaRPr lang="en-US" sz="1200" b="0" dirty="0" smtClean="0">
+              <a:solidFill>
+                <a:schemeClr val="tx1"/>
+              </a:solidFill>
+              <a:latin typeface="Book Antiqua" pitchFamily="18" charset="0"/>
+            </a:endParaRPr>
+          </a:p>
+          <a:p>
+            <a:pPr algn="l"/>
+            <a:r>
+              <a:rPr lang="en-US" sz="1200" b="0" dirty="0" smtClean="0">
+                <a:solidFill>
+                  <a:schemeClr val="tx1"/>
+                </a:solidFill>
+                <a:latin typeface="Book Antiqua" pitchFamily="18" charset="0"/>
+              </a:rPr>
+              <a:t>        0x95, </a:t>
+            </a:r>
+            <a:r>
+              <a:rPr lang="en-US" sz="1200" b="0" dirty="0" err="1" smtClean="0">
+                <a:solidFill>
+                  <a:schemeClr val="tx1"/>
+                </a:solidFill>
+                <a:latin typeface="Book Antiqua" pitchFamily="18" charset="0"/>
+              </a:rPr>
+              <a:t>output_length</a:t>
+            </a:r>
+            <a:r>
+              <a:rPr lang="en-US" sz="1200" b="0" dirty="0" smtClean="0">
+                <a:solidFill>
+                  <a:schemeClr val="tx1"/>
+                </a:solidFill>
+                <a:latin typeface="Book Antiqua" pitchFamily="18" charset="0"/>
+              </a:rPr>
+              <a:t>,    </a:t>
+            </a:r>
+            <a:r>
+              <a:rPr lang="en-US" sz="1200" b="0" dirty="0" smtClean="0">
+                <a:solidFill>
+                  <a:schemeClr val="tx1"/>
+                </a:solidFill>
+                <a:latin typeface="Book Antiqua" pitchFamily="18" charset="0"/>
+              </a:rPr>
+              <a:t>// </a:t>
+            </a:r>
+            <a:r>
+              <a:rPr lang="en-US" sz="1200" b="0" dirty="0" smtClean="0">
+                <a:solidFill>
+                  <a:schemeClr val="tx1"/>
+                </a:solidFill>
+                <a:latin typeface="Book Antiqua" pitchFamily="18" charset="0"/>
+              </a:rPr>
+              <a:t>report count</a:t>
+            </a:r>
+          </a:p>
+          <a:p>
+            <a:pPr algn="l"/>
+            <a:r>
+              <a:rPr lang="en-US" sz="1200" b="0" dirty="0" smtClean="0">
+                <a:solidFill>
+                  <a:schemeClr val="tx1"/>
+                </a:solidFill>
+                <a:latin typeface="Book Antiqua" pitchFamily="18" charset="0"/>
+              </a:rPr>
+              <a:t>        0x09, 0x02,         </a:t>
+            </a:r>
+            <a:r>
+              <a:rPr lang="en-US" sz="1200" b="0" dirty="0" smtClean="0">
+                <a:solidFill>
+                  <a:schemeClr val="tx1"/>
+                </a:solidFill>
+                <a:latin typeface="Book Antiqua" pitchFamily="18" charset="0"/>
+              </a:rPr>
+              <a:t>	// </a:t>
+            </a:r>
+            <a:r>
+              <a:rPr lang="en-US" sz="1200" b="0" dirty="0" smtClean="0">
+                <a:solidFill>
+                  <a:schemeClr val="tx1"/>
+                </a:solidFill>
+                <a:latin typeface="Book Antiqua" pitchFamily="18" charset="0"/>
+              </a:rPr>
+              <a:t>usage</a:t>
+            </a:r>
+          </a:p>
+          <a:p>
+            <a:pPr algn="l"/>
+            <a:r>
+              <a:rPr lang="en-US" sz="1200" b="0" dirty="0" smtClean="0">
+                <a:solidFill>
+                  <a:schemeClr val="tx1"/>
+                </a:solidFill>
+                <a:latin typeface="Book Antiqua" pitchFamily="18" charset="0"/>
+              </a:rPr>
+              <a:t>        0x91, 0x02,         </a:t>
+            </a:r>
+            <a:r>
+              <a:rPr lang="en-US" sz="1200" b="0" dirty="0" smtClean="0">
+                <a:solidFill>
+                  <a:schemeClr val="tx1"/>
+                </a:solidFill>
+                <a:latin typeface="Book Antiqua" pitchFamily="18" charset="0"/>
+              </a:rPr>
+              <a:t>	// </a:t>
+            </a:r>
+            <a:r>
+              <a:rPr lang="en-US" sz="1200" b="0" dirty="0" smtClean="0">
+                <a:solidFill>
+                  <a:schemeClr val="tx1"/>
+                </a:solidFill>
+                <a:latin typeface="Book Antiqua" pitchFamily="18" charset="0"/>
+              </a:rPr>
+              <a:t>Output (array)</a:t>
+            </a:r>
+          </a:p>
+          <a:p>
+            <a:pPr algn="l"/>
+            <a:r>
+              <a:rPr lang="en-US" sz="1200" b="0" dirty="0" smtClean="0">
+                <a:solidFill>
+                  <a:schemeClr val="tx1"/>
+                </a:solidFill>
+                <a:latin typeface="Book Antiqua" pitchFamily="18" charset="0"/>
+              </a:rPr>
+              <a:t>        0xC0                </a:t>
+            </a:r>
+            <a:r>
+              <a:rPr lang="en-US" sz="1200" b="0" dirty="0" smtClean="0">
+                <a:solidFill>
+                  <a:schemeClr val="tx1"/>
+                </a:solidFill>
+                <a:latin typeface="Book Antiqua" pitchFamily="18" charset="0"/>
+              </a:rPr>
+              <a:t>	// </a:t>
+            </a:r>
+            <a:r>
+              <a:rPr lang="en-US" sz="1200" b="0" dirty="0" smtClean="0">
+                <a:solidFill>
+                  <a:schemeClr val="tx1"/>
+                </a:solidFill>
+                <a:latin typeface="Book Antiqua" pitchFamily="18" charset="0"/>
+              </a:rPr>
+              <a:t>end collection</a:t>
+            </a:r>
+          </a:p>
+          <a:p>
+            <a:pPr algn="l"/>
+            <a:endParaRPr lang="en-US" sz="1200" b="0" dirty="0" smtClean="0">
+              <a:solidFill>
+                <a:schemeClr val="tx1"/>
+              </a:solidFill>
+              <a:latin typeface="Book Antiqua" pitchFamily="18" charset="0"/>
+            </a:endParaRPr>
+          </a:p>
+          <a:p>
+            <a:pPr algn="l"/>
+            <a:r>
+              <a:rPr lang="en-US" sz="1200" b="0" dirty="0" smtClean="0">
+                <a:solidFill>
+                  <a:schemeClr val="tx1"/>
+                </a:solidFill>
+                <a:latin typeface="Book Antiqua" pitchFamily="18" charset="0"/>
+              </a:rPr>
+              <a:t>    };</a:t>
+            </a:r>
+          </a:p>
+          <a:p>
+            <a:pPr algn="l"/>
+            <a:r>
+              <a:rPr lang="en-US" sz="1200" b="0" dirty="0" smtClean="0">
+                <a:solidFill>
+                  <a:schemeClr val="tx1"/>
+                </a:solidFill>
+                <a:latin typeface="Book Antiqua" pitchFamily="18" charset="0"/>
+              </a:rPr>
+              <a:t>    </a:t>
+            </a:r>
+            <a:r>
+              <a:rPr lang="en-US" sz="1200" b="0" dirty="0" err="1" smtClean="0">
+                <a:solidFill>
+                  <a:schemeClr val="tx1"/>
+                </a:solidFill>
+                <a:latin typeface="Book Antiqua" pitchFamily="18" charset="0"/>
+              </a:rPr>
+              <a:t>reportLength</a:t>
+            </a:r>
+            <a:r>
+              <a:rPr lang="en-US" sz="1200" b="0" dirty="0" smtClean="0">
+                <a:solidFill>
+                  <a:schemeClr val="tx1"/>
+                </a:solidFill>
+                <a:latin typeface="Book Antiqua" pitchFamily="18" charset="0"/>
+              </a:rPr>
+              <a:t> = </a:t>
+            </a:r>
+            <a:r>
+              <a:rPr lang="en-US" sz="1200" b="0" dirty="0" err="1" smtClean="0">
+                <a:solidFill>
+                  <a:schemeClr val="tx1"/>
+                </a:solidFill>
+                <a:latin typeface="Book Antiqua" pitchFamily="18" charset="0"/>
+              </a:rPr>
+              <a:t>sizeof</a:t>
+            </a:r>
+            <a:r>
+              <a:rPr lang="en-US" sz="1200" b="0" dirty="0" smtClean="0">
+                <a:solidFill>
+                  <a:schemeClr val="tx1"/>
+                </a:solidFill>
+                <a:latin typeface="Book Antiqua" pitchFamily="18" charset="0"/>
+              </a:rPr>
+              <a:t>(</a:t>
+            </a:r>
+            <a:r>
+              <a:rPr lang="en-US" sz="1200" b="0" dirty="0" err="1" smtClean="0">
+                <a:solidFill>
+                  <a:schemeClr val="tx1"/>
+                </a:solidFill>
+                <a:latin typeface="Book Antiqua" pitchFamily="18" charset="0"/>
+              </a:rPr>
+              <a:t>reportDescriptor</a:t>
+            </a:r>
+            <a:r>
+              <a:rPr lang="en-US" sz="1200" b="0" dirty="0" smtClean="0">
+                <a:solidFill>
+                  <a:schemeClr val="tx1"/>
+                </a:solidFill>
+                <a:latin typeface="Book Antiqua" pitchFamily="18" charset="0"/>
+              </a:rPr>
+              <a:t>);</a:t>
+            </a:r>
+          </a:p>
+          <a:p>
+            <a:pPr algn="l"/>
+            <a:r>
+              <a:rPr lang="en-US" sz="1200" b="0" dirty="0" smtClean="0">
+                <a:solidFill>
+                  <a:schemeClr val="tx1"/>
+                </a:solidFill>
+                <a:latin typeface="Book Antiqua" pitchFamily="18" charset="0"/>
+              </a:rPr>
+              <a:t>    return </a:t>
+            </a:r>
+            <a:r>
+              <a:rPr lang="en-US" sz="1200" b="0" dirty="0" err="1" smtClean="0">
+                <a:solidFill>
+                  <a:schemeClr val="tx1"/>
+                </a:solidFill>
+                <a:latin typeface="Book Antiqua" pitchFamily="18" charset="0"/>
+              </a:rPr>
+              <a:t>reportDescriptor</a:t>
+            </a:r>
+            <a:r>
+              <a:rPr lang="en-US" sz="1200" b="0" dirty="0" smtClean="0">
+                <a:solidFill>
+                  <a:schemeClr val="tx1"/>
+                </a:solidFill>
+                <a:latin typeface="Book Antiqua" pitchFamily="18" charset="0"/>
+              </a:rPr>
+              <a:t>;</a:t>
+            </a:r>
+          </a:p>
+          <a:p>
+            <a:pPr algn="l"/>
+            <a:r>
+              <a:rPr lang="en-US" sz="1200" b="0" dirty="0" smtClean="0">
+                <a:solidFill>
+                  <a:schemeClr val="tx1"/>
+                </a:solidFill>
+                <a:latin typeface="Book Antiqua" pitchFamily="18" charset="0"/>
+              </a:rPr>
+              <a:t>}</a:t>
+            </a:r>
+            <a:endParaRPr lang="en-US" sz="1200" b="0" dirty="0">
+              <a:solidFill>
+                <a:schemeClr val="tx1"/>
+              </a:solidFill>
+              <a:latin typeface="Book Antiqua" pitchFamily="18" charset="0"/>
+            </a:endParaRPr>
+          </a:p>
+        </p:txBody>
+      </p:sp>
+      <p:sp>
+        <p:nvSpPr>
+          <p:cNvPr id="5" name="Espace réservé du contenu 2"/>
+          <p:cNvSpPr>
+            <a:spLocks noGrp="1"/>
+          </p:cNvSpPr>
+          <p:nvPr>
+            <p:ph idx="1"/>
+          </p:nvPr>
+        </p:nvSpPr>
+        <p:spPr>
+          <a:xfrm>
+            <a:off x="4778978" y="2430463"/>
+            <a:ext cx="4133795" cy="522944"/>
+          </a:xfrm>
+        </p:spPr>
+        <p:txBody>
+          <a:bodyPr/>
+          <a:lstStyle/>
+          <a:p>
+            <a:r>
+              <a:rPr lang="en-US" dirty="0" smtClean="0"/>
+              <a:t>Once a report defined:</a:t>
+            </a:r>
+          </a:p>
+          <a:p>
+            <a:pPr lvl="1"/>
+            <a:r>
+              <a:rPr lang="en-US" dirty="0" smtClean="0"/>
+              <a:t>Data can be exchanged between computer and device by writing and reading the two interrupts endpoints</a:t>
+            </a:r>
+            <a:endParaRPr lang="en-US" dirty="0"/>
+          </a:p>
+        </p:txBody>
+      </p:sp>
+    </p:spTree>
+  </p:cSld>
+  <p:clrMapOvr>
+    <a:masterClrMapping/>
+  </p:clrMapOvr>
+</p:sld>
+</file>
+
+<file path=ppt/slides/slide27.xml><?xml version="1.0" encoding="utf-8"?>
+<p:sld xmlns:a="http://schemas.openxmlformats.org/drawingml/2006/main" xmlns:r="http://schemas.openxmlformats.org/officeDocument/2006/relationships" xmlns:p="http://schemas.openxmlformats.org/presentationml/2006/main">
+  <p:cSld>
+    <p:spTree>
+      <p:nvGrpSpPr>
+        <p:cNvPr id="1" name=""/>
+        <p:cNvGrpSpPr/>
+        <p:nvPr/>
+      </p:nvGrpSpPr>
+      <p:grpSpPr>
+        <a:xfrm>
+          <a:off x="0" y="0"/>
+          <a:ext cx="0" cy="0"/>
+          <a:chOff x="0" y="0"/>
+          <a:chExt cx="0" cy="0"/>
+        </a:xfrm>
+      </p:grpSpPr>
+      <p:sp>
+        <p:nvSpPr>
+          <p:cNvPr id="2" name="Titre 1"/>
+          <p:cNvSpPr>
+            <a:spLocks noGrp="1"/>
+          </p:cNvSpPr>
+          <p:nvPr>
+            <p:ph type="title"/>
+          </p:nvPr>
+        </p:nvSpPr>
+        <p:spPr/>
+        <p:txBody>
+          <a:bodyPr/>
+          <a:lstStyle/>
+          <a:p>
+            <a:r>
+              <a:rPr lang="en-US" dirty="0" smtClean="0"/>
+              <a:t>USB Device: USB Audio</a:t>
+            </a:r>
+            <a:endParaRPr lang="en-US" dirty="0"/>
+          </a:p>
+        </p:txBody>
+      </p:sp>
+      <p:sp>
+        <p:nvSpPr>
+          <p:cNvPr id="3" name="Espace réservé du contenu 2"/>
+          <p:cNvSpPr>
+            <a:spLocks noGrp="1"/>
+          </p:cNvSpPr>
+          <p:nvPr>
+            <p:ph idx="1"/>
+          </p:nvPr>
+        </p:nvSpPr>
+        <p:spPr>
+          <a:xfrm>
+            <a:off x="217488" y="906463"/>
+            <a:ext cx="8775700" cy="1700103"/>
+          </a:xfrm>
+        </p:spPr>
+        <p:txBody>
+          <a:bodyPr/>
+          <a:lstStyle/>
+          <a:p>
+            <a:r>
+              <a:rPr lang="en-US" dirty="0" smtClean="0"/>
+              <a:t>Enable the </a:t>
+            </a:r>
+            <a:r>
+              <a:rPr lang="en-US" dirty="0" err="1" smtClean="0"/>
+              <a:t>mbed</a:t>
+            </a:r>
+            <a:r>
+              <a:rPr lang="en-US" dirty="0" smtClean="0"/>
+              <a:t> to:</a:t>
+            </a:r>
+          </a:p>
+          <a:p>
+            <a:pPr lvl="1"/>
+            <a:r>
+              <a:rPr lang="en-US" dirty="0" smtClean="0"/>
+              <a:t>Send and receive audio packets to or from a computer</a:t>
+            </a:r>
+          </a:p>
+          <a:p>
+            <a:pPr lvl="1"/>
+            <a:r>
+              <a:rPr lang="en-US" dirty="0" smtClean="0"/>
+              <a:t>Class requirements:</a:t>
+            </a:r>
+          </a:p>
+          <a:p>
+            <a:pPr lvl="2"/>
+            <a:r>
+              <a:rPr lang="en-US" dirty="0" smtClean="0"/>
+              <a:t>Isochronous IN endpoint to send audio packets</a:t>
+            </a:r>
+          </a:p>
+          <a:p>
+            <a:pPr lvl="2"/>
+            <a:r>
+              <a:rPr lang="en-US" dirty="0" smtClean="0"/>
+              <a:t>Isochronous OUT endpoint to receive audio packets</a:t>
+            </a:r>
+          </a:p>
+          <a:p>
+            <a:pPr lvl="2"/>
+            <a:r>
+              <a:rPr lang="en-US" dirty="0" smtClean="0"/>
+              <a:t>Format of data exchanged: PCM 16 bits signed</a:t>
+            </a:r>
+            <a:endParaRPr lang="en-US" dirty="0"/>
+          </a:p>
+        </p:txBody>
+      </p:sp>
+      <p:pic>
+        <p:nvPicPr>
+          <p:cNvPr id="3074" name="Picture 2" descr="C:\Users\samux\Desktop\ARM-internship-report\report\audio_archi.jpg"/>
+          <p:cNvPicPr>
+            <a:picLocks noChangeAspect="1" noChangeArrowheads="1"/>
+          </p:cNvPicPr>
+          <p:nvPr/>
+        </p:nvPicPr>
+        <p:blipFill>
+          <a:blip r:embed="rId2"/>
+          <a:srcRect/>
+          <a:stretch>
+            <a:fillRect/>
+          </a:stretch>
+        </p:blipFill>
+        <p:spPr bwMode="auto">
+          <a:xfrm>
+            <a:off x="1091967" y="3328609"/>
+            <a:ext cx="6616065" cy="2711848"/>
+          </a:xfrm>
+          <a:prstGeom prst="rect">
+            <a:avLst/>
+          </a:prstGeom>
+          <a:noFill/>
+        </p:spPr>
+      </p:pic>
+    </p:spTree>
+  </p:cSld>
+  <p:clrMapOvr>
+    <a:masterClrMapping/>
+  </p:clrMapOvr>
+</p:sld>
+</file>
+
+<file path=ppt/slides/slide28.xml><?xml version="1.0" encoding="utf-8"?>
+<p:sld xmlns:a="http://schemas.openxmlformats.org/drawingml/2006/main" xmlns:r="http://schemas.openxmlformats.org/officeDocument/2006/relationships" xmlns:p="http://schemas.openxmlformats.org/presentationml/2006/main">
+  <p:cSld>
+    <p:spTree>
+      <p:nvGrpSpPr>
+        <p:cNvPr id="1" name=""/>
+        <p:cNvGrpSpPr/>
+        <p:nvPr/>
+      </p:nvGrpSpPr>
+      <p:grpSpPr>
+        <a:xfrm>
+          <a:off x="0" y="0"/>
+          <a:ext cx="0" cy="0"/>
+          <a:chOff x="0" y="0"/>
+          <a:chExt cx="0" cy="0"/>
+        </a:xfrm>
+      </p:grpSpPr>
+      <p:sp>
+        <p:nvSpPr>
+          <p:cNvPr id="2" name="Titre 1"/>
+          <p:cNvSpPr>
+            <a:spLocks noGrp="1"/>
+          </p:cNvSpPr>
+          <p:nvPr>
+            <p:ph type="title"/>
+          </p:nvPr>
+        </p:nvSpPr>
+        <p:spPr/>
+        <p:txBody>
+          <a:bodyPr/>
+          <a:lstStyle/>
+          <a:p>
+            <a:r>
+              <a:rPr lang="en-US" dirty="0" smtClean="0"/>
+              <a:t>USB Device: USB Audio</a:t>
+            </a:r>
+            <a:endParaRPr lang="en-US" dirty="0"/>
+          </a:p>
+        </p:txBody>
+      </p:sp>
+      <p:sp>
+        <p:nvSpPr>
+          <p:cNvPr id="3" name="Espace réservé du contenu 2"/>
+          <p:cNvSpPr>
+            <a:spLocks noGrp="1"/>
+          </p:cNvSpPr>
+          <p:nvPr>
+            <p:ph idx="1"/>
+          </p:nvPr>
+        </p:nvSpPr>
+        <p:spPr>
+          <a:xfrm>
+            <a:off x="217488" y="906463"/>
+            <a:ext cx="8775700" cy="2477868"/>
+          </a:xfrm>
+        </p:spPr>
+        <p:txBody>
+          <a:bodyPr/>
+          <a:lstStyle/>
+          <a:p>
+            <a:r>
+              <a:rPr lang="en-US" dirty="0" smtClean="0"/>
+              <a:t>Timing requirement:</a:t>
+            </a:r>
+          </a:p>
+          <a:p>
+            <a:pPr lvl="1"/>
+            <a:r>
+              <a:rPr lang="en-US" dirty="0" smtClean="0"/>
+              <a:t>Use of the Start of Frame event generated each millisecond</a:t>
+            </a:r>
+          </a:p>
+          <a:p>
+            <a:pPr lvl="1"/>
+            <a:r>
+              <a:rPr lang="en-US" dirty="0" smtClean="0"/>
+              <a:t>Example: reception of a 48kHz stereo stream</a:t>
+            </a:r>
+          </a:p>
+          <a:p>
+            <a:pPr lvl="2"/>
+            <a:r>
+              <a:rPr lang="en-US" dirty="0" smtClean="0"/>
+              <a:t>Each sample is 16 bits (2 bytes) long: 48 * 2 bytes received for one channel each millisecond</a:t>
+            </a:r>
+          </a:p>
+          <a:p>
+            <a:pPr lvl="2"/>
+            <a:r>
+              <a:rPr lang="en-US" dirty="0" smtClean="0"/>
+              <a:t>For 2 channels, 48 * 2 * 2 bytes will be received each millisecond </a:t>
+            </a:r>
+            <a:endParaRPr lang="en-US" dirty="0"/>
+          </a:p>
+        </p:txBody>
+      </p:sp>
+      <p:sp>
+        <p:nvSpPr>
+          <p:cNvPr id="5" name="ZoneTexte 4"/>
+          <p:cNvSpPr txBox="1"/>
+          <p:nvPr/>
+        </p:nvSpPr>
+        <p:spPr>
+          <a:xfrm>
+            <a:off x="1250733" y="3386341"/>
+            <a:ext cx="6064468" cy="369332"/>
+          </a:xfrm>
+          <a:prstGeom prst="rect">
+            <a:avLst/>
+          </a:prstGeom>
+          <a:solidFill>
+            <a:schemeClr val="accent1">
+              <a:lumMod val="20000"/>
+              <a:lumOff val="80000"/>
+            </a:schemeClr>
+          </a:solidFill>
+        </p:spPr>
+        <p:txBody>
+          <a:bodyPr wrap="square" rtlCol="0">
+            <a:spAutoFit/>
+          </a:bodyPr>
+          <a:lstStyle/>
+          <a:p>
+            <a:r>
+              <a:rPr lang="en-US" sz="1800" dirty="0" smtClean="0">
+                <a:latin typeface="Arial" pitchFamily="34" charset="0"/>
+                <a:cs typeface="Arial" pitchFamily="34" charset="0"/>
+              </a:rPr>
+              <a:t>AUDIO LENGTH PACKET = (FREQ / 500) * </a:t>
+            </a:r>
+            <a:r>
+              <a:rPr lang="en-US" sz="1800" dirty="0" err="1" smtClean="0">
+                <a:latin typeface="Arial" pitchFamily="34" charset="0"/>
+                <a:cs typeface="Arial" pitchFamily="34" charset="0"/>
+              </a:rPr>
+              <a:t>nb</a:t>
+            </a:r>
+            <a:r>
+              <a:rPr lang="en-US" sz="1800" dirty="0" smtClean="0">
+                <a:latin typeface="Arial" pitchFamily="34" charset="0"/>
+                <a:cs typeface="Arial" pitchFamily="34" charset="0"/>
+              </a:rPr>
+              <a:t> channel</a:t>
+            </a:r>
+            <a:endParaRPr lang="en-US" sz="1800" b="0" dirty="0">
+              <a:solidFill>
+                <a:schemeClr val="tx1"/>
+              </a:solidFill>
+              <a:latin typeface="Arial" pitchFamily="34" charset="0"/>
+              <a:cs typeface="Arial" pitchFamily="34" charset="0"/>
+            </a:endParaRPr>
+          </a:p>
+        </p:txBody>
+      </p:sp>
+      <p:pic>
+        <p:nvPicPr>
+          <p:cNvPr id="2050" name="Picture 2" descr="C:\Users\samux\Desktop\ARM-internship-report\report\pcm_stereo.jpg"/>
+          <p:cNvPicPr>
+            <a:picLocks noChangeAspect="1" noChangeArrowheads="1"/>
+          </p:cNvPicPr>
+          <p:nvPr/>
+        </p:nvPicPr>
+        <p:blipFill>
+          <a:blip r:embed="rId2"/>
+          <a:srcRect/>
+          <a:stretch>
+            <a:fillRect/>
+          </a:stretch>
+        </p:blipFill>
+        <p:spPr bwMode="auto">
+          <a:xfrm>
+            <a:off x="954535" y="4152415"/>
+            <a:ext cx="6877051" cy="1752600"/>
+          </a:xfrm>
+          <a:prstGeom prst="rect">
+            <a:avLst/>
+          </a:prstGeom>
+          <a:noFill/>
+        </p:spPr>
+      </p:pic>
+    </p:spTree>
+  </p:cSld>
+  <p:clrMapOvr>
+    <a:masterClrMapping/>
+  </p:clrMapOvr>
+</p:sld>
+</file>
+
+<file path=ppt/slides/slide29.xml><?xml version="1.0" encoding="utf-8"?>
+<p:sld xmlns:a="http://schemas.openxmlformats.org/drawingml/2006/main" xmlns:r="http://schemas.openxmlformats.org/officeDocument/2006/relationships" xmlns:p="http://schemas.openxmlformats.org/presentationml/2006/main">
+  <p:cSld>
+    <p:spTree>
+      <p:nvGrpSpPr>
+        <p:cNvPr id="1" name=""/>
+        <p:cNvGrpSpPr/>
+        <p:nvPr/>
+      </p:nvGrpSpPr>
+      <p:grpSpPr>
+        <a:xfrm>
+          <a:off x="0" y="0"/>
+          <a:ext cx="0" cy="0"/>
+          <a:chOff x="0" y="0"/>
+          <a:chExt cx="0" cy="0"/>
+        </a:xfrm>
+      </p:grpSpPr>
+      <p:sp>
+        <p:nvSpPr>
+          <p:cNvPr id="2" name="Titre 1"/>
+          <p:cNvSpPr>
+            <a:spLocks noGrp="1"/>
+          </p:cNvSpPr>
+          <p:nvPr>
+            <p:ph type="title"/>
+          </p:nvPr>
+        </p:nvSpPr>
+        <p:spPr/>
+        <p:txBody>
+          <a:bodyPr/>
+          <a:lstStyle/>
+          <a:p>
+            <a:r>
+              <a:rPr lang="en-US" dirty="0" smtClean="0"/>
+              <a:t>USB Device: USB Audio</a:t>
+            </a:r>
+            <a:endParaRPr lang="en-US" dirty="0"/>
+          </a:p>
+        </p:txBody>
+      </p:sp>
+      <p:sp>
+        <p:nvSpPr>
+          <p:cNvPr id="3" name="Espace réservé du contenu 2"/>
+          <p:cNvSpPr>
+            <a:spLocks noGrp="1"/>
+          </p:cNvSpPr>
+          <p:nvPr>
+            <p:ph idx="1"/>
+          </p:nvPr>
+        </p:nvSpPr>
+        <p:spPr>
+          <a:xfrm>
+            <a:off x="217488" y="906463"/>
+            <a:ext cx="8775700" cy="2067965"/>
+          </a:xfrm>
+        </p:spPr>
+        <p:txBody>
+          <a:bodyPr/>
+          <a:lstStyle/>
+          <a:p>
+            <a:r>
+              <a:rPr lang="en-US" dirty="0" smtClean="0"/>
+              <a:t>Implementation:</a:t>
+            </a:r>
+          </a:p>
+          <a:p>
+            <a:pPr lvl="1"/>
+            <a:r>
+              <a:rPr lang="en-US" dirty="0" smtClean="0"/>
+              <a:t>If a user wants to read an audio packet:</a:t>
+            </a:r>
+          </a:p>
+          <a:p>
+            <a:pPr lvl="2"/>
+            <a:r>
+              <a:rPr lang="en-US" dirty="0" smtClean="0"/>
+              <a:t>Try to read the OUT isochronous endpoint on a SOF event</a:t>
+            </a:r>
+          </a:p>
+          <a:p>
+            <a:pPr lvl="1"/>
+            <a:r>
+              <a:rPr lang="en-US" dirty="0" smtClean="0"/>
+              <a:t>If a user wants to send an audio packet:</a:t>
+            </a:r>
+          </a:p>
+          <a:p>
+            <a:pPr lvl="2"/>
+            <a:r>
+              <a:rPr lang="en-US" dirty="0" smtClean="0"/>
+              <a:t>Write it on the IN isochronous endpoint on a SOF event</a:t>
+            </a:r>
+            <a:endParaRPr lang="en-US" dirty="0"/>
+          </a:p>
+        </p:txBody>
+      </p:sp>
+      <p:sp>
+        <p:nvSpPr>
+          <p:cNvPr id="4" name="Espace réservé du contenu 2"/>
+          <p:cNvSpPr txBox="1">
+            <a:spLocks/>
+          </p:cNvSpPr>
+          <p:nvPr/>
+        </p:nvSpPr>
+        <p:spPr bwMode="auto">
+          <a:xfrm>
+            <a:off x="158093" y="3917676"/>
+            <a:ext cx="8775700" cy="1700103"/>
+          </a:xfrm>
+          <a:prstGeom prst="rect">
+            <a:avLst/>
+          </a:prstGeom>
+          <a:noFill/>
+          <a:ln w="9525">
+            <a:noFill/>
+            <a:miter lim="800000"/>
+            <a:headEnd/>
+            <a:tailEnd/>
+          </a:ln>
+          <a:effectLst/>
+        </p:spPr>
+        <p:txBody>
+          <a:bodyPr vert="horz" wrap="square" lIns="91440" tIns="45720" rIns="91440" bIns="45720" numCol="1" anchor="t" anchorCtr="0" compatLnSpc="1">
+            <a:prstTxWarp prst="textNoShape">
+              <a:avLst/>
+            </a:prstTxWarp>
+          </a:bodyPr>
+          <a:lstStyle/>
+          <a:p>
+            <a:pPr marL="265113" marR="0" lvl="0" indent="-265113" algn="l" defTabSz="914400" rtl="0" eaLnBrk="1" fontAlgn="ctr" latinLnBrk="0" hangingPunct="1">
+              <a:lnSpc>
+                <a:spcPct val="100000"/>
+              </a:lnSpc>
+              <a:spcBef>
+                <a:spcPct val="25000"/>
+              </a:spcBef>
+              <a:spcAft>
+                <a:spcPct val="0"/>
+              </a:spcAft>
+              <a:buClr>
+                <a:schemeClr val="accent1"/>
+              </a:buClr>
+              <a:buSzPct val="125000"/>
+              <a:buFont typeface="Wingdings" pitchFamily="2" charset="2"/>
+              <a:buChar char="§"/>
+              <a:tabLst/>
+              <a:defRPr/>
+            </a:pPr>
+            <a:r>
+              <a:rPr kumimoji="0" lang="en-US" sz="2400" b="0" i="0" u="none" strike="noStrike" kern="0" cap="none" spc="0" normalizeH="0" baseline="0" noProof="0" dirty="0" smtClean="0">
+                <a:ln>
+                  <a:noFill/>
+                </a:ln>
+                <a:solidFill>
+                  <a:srgbClr val="000000"/>
+                </a:solidFill>
+                <a:effectLst/>
+                <a:uLnTx/>
+                <a:uFillTx/>
+                <a:latin typeface="+mn-lt"/>
+                <a:ea typeface="+mn-ea"/>
+                <a:cs typeface="+mn-cs"/>
+              </a:rPr>
+              <a:t>TODO:</a:t>
+            </a:r>
+            <a:r>
+              <a:rPr kumimoji="0" lang="en-US" sz="2400" b="0" i="0" u="none" strike="noStrike" kern="0" cap="none" spc="0" normalizeH="0" noProof="0" dirty="0" smtClean="0">
+                <a:ln>
+                  <a:noFill/>
+                </a:ln>
+                <a:solidFill>
+                  <a:srgbClr val="000000"/>
+                </a:solidFill>
+                <a:effectLst/>
+                <a:uLnTx/>
+                <a:uFillTx/>
+                <a:latin typeface="+mn-lt"/>
+                <a:ea typeface="+mn-ea"/>
+                <a:cs typeface="+mn-cs"/>
+              </a:rPr>
+              <a:t> put photo of I2S and microphone on </a:t>
+            </a:r>
+            <a:r>
+              <a:rPr kumimoji="0" lang="en-US" sz="2400" b="0" i="0" u="none" strike="noStrike" kern="0" cap="none" spc="0" normalizeH="0" noProof="0" dirty="0" err="1" smtClean="0">
+                <a:ln>
+                  <a:noFill/>
+                </a:ln>
+                <a:solidFill>
+                  <a:srgbClr val="000000"/>
+                </a:solidFill>
+                <a:effectLst/>
+                <a:uLnTx/>
+                <a:uFillTx/>
+                <a:latin typeface="+mn-lt"/>
+                <a:ea typeface="+mn-ea"/>
+                <a:cs typeface="+mn-cs"/>
+              </a:rPr>
+              <a:t>mbed</a:t>
+            </a:r>
+            <a:endParaRPr kumimoji="0" lang="en-US" sz="2000" b="0" i="0" u="none" strike="noStrike" kern="0" cap="none" spc="0" normalizeH="0" baseline="0" noProof="0" dirty="0">
+              <a:ln>
+                <a:noFill/>
+              </a:ln>
+              <a:solidFill>
+                <a:srgbClr val="000000"/>
+              </a:solidFill>
+              <a:effectLst/>
+              <a:uLnTx/>
+              <a:uFillTx/>
+              <a:latin typeface="+mn-lt"/>
+            </a:endParaRPr>
           </a:p>
         </p:txBody>
       </p:sp>
@@ -9208,7 +11013,7 @@
         </p:nvSpPr>
         <p:spPr>
           <a:xfrm>
-            <a:off x="217488" y="1778793"/>
+            <a:off x="143915" y="1032558"/>
             <a:ext cx="8775700" cy="2225620"/>
           </a:xfrm>
         </p:spPr>
@@ -9262,13 +11067,26 @@
             </a:r>
             <a:r>
               <a:rPr lang="en-US" dirty="0" smtClean="0"/>
-              <a:t>:// URL)</a:t>
-            </a:r>
-          </a:p>
-          <a:p>
+              <a:t>:// URL</a:t>
+            </a:r>
+            <a:r>
+              <a:rPr lang="en-US" dirty="0" smtClean="0"/>
+              <a:t>)</a:t>
+            </a:r>
+          </a:p>
+          <a:p>
+            <a:pPr>
+              <a:buNone/>
+            </a:pPr>
             <a:endParaRPr lang="en-US" dirty="0" smtClean="0"/>
           </a:p>
           <a:p>
+            <a:pPr>
+              <a:buNone/>
+            </a:pPr>
+            <a:endParaRPr lang="en-US" dirty="0" smtClean="0"/>
+          </a:p>
+          <a:p>
             <a:r>
               <a:rPr lang="en-US" dirty="0" smtClean="0"/>
               <a:t>Why a such new feature ?</a:t>
@@ -9278,19 +11096,53 @@
             <a:pPr lvl="1"/>
             <a:r>
               <a:rPr lang="en-US" dirty="0" smtClean="0"/>
-              <a:t>To replace all existing polling techniques (AJAX)</a:t>
+              <a:t>Replace </a:t>
+            </a:r>
+            <a:r>
+              <a:rPr lang="en-US" dirty="0" smtClean="0"/>
+              <a:t>all existing polling techniques (AJAX)</a:t>
             </a:r>
           </a:p>
           <a:p>
             <a:pPr lvl="1"/>
             <a:r>
               <a:rPr lang="en-US" dirty="0" smtClean="0"/>
-              <a:t>Allow a real server-push mechanism</a:t>
+              <a:t>Allow a real server-push </a:t>
+            </a:r>
+            <a:r>
+              <a:rPr lang="en-US" dirty="0" smtClean="0"/>
+              <a:t>mechanism</a:t>
             </a:r>
             <a:endParaRPr lang="en-US" dirty="0"/>
           </a:p>
         </p:txBody>
       </p:sp>
+      <p:pic>
+        <p:nvPicPr>
+          <p:cNvPr id="4098" name="Picture 2" descr="C:\Users\samux\Desktop\ARM-internship-report\presentation_en\html5-1-A.jpg"/>
+          <p:cNvPicPr>
+            <a:picLocks noChangeAspect="1" noChangeArrowheads="1"/>
+          </p:cNvPicPr>
+          <p:nvPr/>
+        </p:nvPicPr>
+        <p:blipFill>
+          <a:blip r:embed="rId2"/>
+          <a:srcRect/>
+          <a:stretch>
+            <a:fillRect/>
+          </a:stretch>
+        </p:blipFill>
+        <p:spPr bwMode="auto">
+          <a:xfrm>
+            <a:off x="6962074" y="923808"/>
+            <a:ext cx="2054535" cy="1388468"/>
+          </a:xfrm>
+          <a:prstGeom prst="rect">
+            <a:avLst/>
+          </a:prstGeom>
+          <a:noFill/>
+        </p:spPr>
+      </p:pic>
     </p:spTree>
   </p:cSld>
   <p:clrMapOvr>

</xml_diff>

<commit_message>
dd conclusion in pres
</commit_message>
<xml_diff>
--- a/presentation_en/pres.pptx
+++ b/presentation_en/pres.pptx
@@ -5,18 +5,18 @@
     <p:sldMasterId id="2147483664" r:id="rId1"/>
   </p:sldMasterIdLst>
   <p:notesMasterIdLst>
-    <p:notesMasterId r:id="rId31"/>
+    <p:notesMasterId r:id="rId34"/>
   </p:notesMasterIdLst>
   <p:handoutMasterIdLst>
-    <p:handoutMasterId r:id="rId32"/>
+    <p:handoutMasterId r:id="rId35"/>
   </p:handoutMasterIdLst>
   <p:sldIdLst>
     <p:sldId id="256" r:id="rId2"/>
     <p:sldId id="257" r:id="rId3"/>
     <p:sldId id="258" r:id="rId4"/>
-    <p:sldId id="259" r:id="rId5"/>
-    <p:sldId id="260" r:id="rId6"/>
-    <p:sldId id="261" r:id="rId7"/>
+    <p:sldId id="286" r:id="rId5"/>
+    <p:sldId id="259" r:id="rId6"/>
+    <p:sldId id="260" r:id="rId7"/>
     <p:sldId id="262" r:id="rId8"/>
     <p:sldId id="264" r:id="rId9"/>
     <p:sldId id="265" r:id="rId10"/>
@@ -29,17 +29,20 @@
     <p:sldId id="272" r:id="rId17"/>
     <p:sldId id="274" r:id="rId18"/>
     <p:sldId id="273" r:id="rId19"/>
-    <p:sldId id="275" r:id="rId20"/>
-    <p:sldId id="276" r:id="rId21"/>
-    <p:sldId id="277" r:id="rId22"/>
-    <p:sldId id="278" r:id="rId23"/>
-    <p:sldId id="279" r:id="rId24"/>
-    <p:sldId id="280" r:id="rId25"/>
-    <p:sldId id="281" r:id="rId26"/>
-    <p:sldId id="282" r:id="rId27"/>
-    <p:sldId id="283" r:id="rId28"/>
-    <p:sldId id="284" r:id="rId29"/>
-    <p:sldId id="285" r:id="rId30"/>
+    <p:sldId id="287" r:id="rId20"/>
+    <p:sldId id="275" r:id="rId21"/>
+    <p:sldId id="276" r:id="rId22"/>
+    <p:sldId id="277" r:id="rId23"/>
+    <p:sldId id="278" r:id="rId24"/>
+    <p:sldId id="279" r:id="rId25"/>
+    <p:sldId id="280" r:id="rId26"/>
+    <p:sldId id="281" r:id="rId27"/>
+    <p:sldId id="282" r:id="rId28"/>
+    <p:sldId id="283" r:id="rId29"/>
+    <p:sldId id="284" r:id="rId30"/>
+    <p:sldId id="285" r:id="rId31"/>
+    <p:sldId id="288" r:id="rId32"/>
+    <p:sldId id="289" r:id="rId33"/>
   </p:sldIdLst>
   <p:sldSz cx="9144000" cy="6858000" type="screen4x3"/>
   <p:notesSz cx="6743700" cy="9880600"/>
@@ -3280,19 +3283,11 @@
           <a:p>
             <a:r>
               <a:rPr lang="en-GB" sz="4000" i="1" dirty="0" smtClean="0"/>
-              <a:t>Embedded </a:t>
-            </a:r>
-            <a:r>
-              <a:rPr lang="en-GB" sz="4000" i="1" dirty="0" smtClean="0"/>
-              <a:t>systems</a:t>
+              <a:t>Embedded systems</a:t>
             </a:r>
             <a:r>
               <a:rPr lang="en-GB" sz="4000" dirty="0" smtClean="0"/>
               <a:t>:</a:t>
-            </a:r>
-            <a:r>
-              <a:rPr lang="en-GB" sz="4000" dirty="0" smtClean="0"/>
-              <a:t/>
             </a:r>
             <a:br>
               <a:rPr lang="en-GB" sz="4000" dirty="0" smtClean="0"/>
@@ -3327,15 +3322,7 @@
           <a:p>
             <a:r>
               <a:rPr lang="en-US" sz="2000" i="1" dirty="0" smtClean="0"/>
-              <a:t>Industrial </a:t>
-            </a:r>
-            <a:r>
-              <a:rPr lang="en-US" sz="2000" i="1" dirty="0" smtClean="0"/>
-              <a:t>Placement Presentation</a:t>
-            </a:r>
-            <a:r>
-              <a:rPr lang="en-US" sz="2000" i="1" dirty="0" smtClean="0"/>
-              <a:t>:</a:t>
+              <a:t>Industrial Placement Presentation:</a:t>
             </a:r>
           </a:p>
           <a:p>
@@ -4404,317 +4391,30 @@
             <p:ph type="title"/>
           </p:nvPr>
         </p:nvSpPr>
-        <p:spPr/>
-        <p:txBody>
-          <a:bodyPr/>
-          <a:lstStyle/>
-          <a:p>
-            <a:r>
-              <a:rPr lang="en-US" dirty="0" smtClean="0"/>
-              <a:t>IOT: RPC over </a:t>
-            </a:r>
-            <a:r>
-              <a:rPr lang="en-US" dirty="0" err="1" smtClean="0"/>
-              <a:t>WebSockets</a:t>
-            </a:r>
-            <a:endParaRPr lang="en-US" dirty="0"/>
-          </a:p>
-        </p:txBody>
-      </p:sp>
-      <p:sp>
-        <p:nvSpPr>
-          <p:cNvPr id="3" name="Espace réservé du contenu 2"/>
-          <p:cNvSpPr>
-            <a:spLocks noGrp="1"/>
-          </p:cNvSpPr>
-          <p:nvPr>
-            <p:ph idx="1"/>
-          </p:nvPr>
-        </p:nvSpPr>
         <p:spPr>
           <a:xfrm>
-            <a:off x="206977" y="1263816"/>
-            <a:ext cx="8775700" cy="1374282"/>
+            <a:off x="206991" y="2856230"/>
+            <a:ext cx="8777287" cy="838200"/>
           </a:xfrm>
         </p:spPr>
         <p:txBody>
           <a:bodyPr/>
           <a:lstStyle/>
           <a:p>
-            <a:r>
-              <a:rPr lang="en-US" dirty="0" smtClean="0"/>
-              <a:t>Objectives:</a:t>
-            </a:r>
-          </a:p>
-          <a:p>
-            <a:pPr lvl="1"/>
-            <a:r>
-              <a:rPr lang="en-US" dirty="0" smtClean="0"/>
-              <a:t>Execute a method on a distant </a:t>
+            <a:pPr algn="ctr"/>
+            <a:r>
+              <a:rPr lang="en-US" dirty="0" smtClean="0"/>
+              <a:t>RPC </a:t>
+            </a:r>
+            <a:r>
+              <a:rPr lang="en-US" dirty="0" smtClean="0"/>
+              <a:t>over </a:t>
             </a:r>
             <a:r>
               <a:rPr lang="en-US" dirty="0" err="1" smtClean="0"/>
-              <a:t>mbed</a:t>
-            </a:r>
-            <a:endParaRPr lang="en-US" dirty="0" smtClean="0"/>
-          </a:p>
-          <a:p>
-            <a:pPr lvl="1"/>
-            <a:r>
-              <a:rPr lang="en-US" dirty="0" err="1" smtClean="0"/>
-              <a:t>WebSocket</a:t>
-            </a:r>
-            <a:r>
-              <a:rPr lang="en-US" dirty="0" smtClean="0"/>
-              <a:t> communication</a:t>
+              <a:t>WebSockets</a:t>
             </a:r>
             <a:endParaRPr lang="en-US" dirty="0"/>
-          </a:p>
-        </p:txBody>
-      </p:sp>
-      <p:sp>
-        <p:nvSpPr>
-          <p:cNvPr id="5" name="Espace réservé du contenu 2"/>
-          <p:cNvSpPr txBox="1">
-            <a:spLocks/>
-          </p:cNvSpPr>
-          <p:nvPr/>
-        </p:nvSpPr>
-        <p:spPr bwMode="auto">
-          <a:xfrm>
-            <a:off x="222743" y="3013789"/>
-            <a:ext cx="8775700" cy="1374282"/>
-          </a:xfrm>
-          <a:prstGeom prst="rect">
-            <a:avLst/>
-          </a:prstGeom>
-          <a:noFill/>
-          <a:ln w="9525">
-            <a:noFill/>
-            <a:miter lim="800000"/>
-            <a:headEnd/>
-            <a:tailEnd/>
-          </a:ln>
-          <a:effectLst/>
-        </p:spPr>
-        <p:txBody>
-          <a:bodyPr vert="horz" wrap="square" lIns="91440" tIns="45720" rIns="91440" bIns="45720" numCol="1" anchor="t" anchorCtr="0" compatLnSpc="1">
-            <a:prstTxWarp prst="textNoShape">
-              <a:avLst/>
-            </a:prstTxWarp>
-          </a:bodyPr>
-          <a:lstStyle/>
-          <a:p>
-            <a:pPr marL="265113" marR="0" lvl="0" indent="-265113" algn="l" defTabSz="914400" rtl="0" eaLnBrk="1" fontAlgn="ctr" latinLnBrk="0" hangingPunct="1">
-              <a:lnSpc>
-                <a:spcPct val="100000"/>
-              </a:lnSpc>
-              <a:spcBef>
-                <a:spcPct val="25000"/>
-              </a:spcBef>
-              <a:spcAft>
-                <a:spcPct val="0"/>
-              </a:spcAft>
-              <a:buClr>
-                <a:schemeClr val="accent1"/>
-              </a:buClr>
-              <a:buSzPct val="125000"/>
-              <a:buFont typeface="Wingdings" pitchFamily="2" charset="2"/>
-              <a:buChar char="§"/>
-              <a:tabLst/>
-              <a:defRPr/>
-            </a:pPr>
-            <a:r>
-              <a:rPr kumimoji="0" lang="en-US" sz="2400" b="0" i="0" u="none" strike="noStrike" kern="0" cap="none" spc="0" normalizeH="0" baseline="0" noProof="0" dirty="0" smtClean="0">
-                <a:ln>
-                  <a:noFill/>
-                </a:ln>
-                <a:solidFill>
-                  <a:srgbClr val="000000"/>
-                </a:solidFill>
-                <a:effectLst/>
-                <a:uLnTx/>
-                <a:uFillTx/>
-                <a:latin typeface="+mn-lt"/>
-                <a:ea typeface="+mn-ea"/>
-                <a:cs typeface="+mn-cs"/>
-              </a:rPr>
-              <a:t>Application</a:t>
-            </a:r>
-            <a:r>
-              <a:rPr kumimoji="0" lang="en-US" sz="2400" b="0" i="0" u="none" strike="noStrike" kern="0" cap="none" spc="0" normalizeH="0" noProof="0" dirty="0" smtClean="0">
-                <a:ln>
-                  <a:noFill/>
-                </a:ln>
-                <a:solidFill>
-                  <a:srgbClr val="000000"/>
-                </a:solidFill>
-                <a:effectLst/>
-                <a:uLnTx/>
-                <a:uFillTx/>
-                <a:latin typeface="+mn-lt"/>
-                <a:ea typeface="+mn-ea"/>
-                <a:cs typeface="+mn-cs"/>
-              </a:rPr>
-              <a:t> examples</a:t>
-            </a:r>
-            <a:r>
-              <a:rPr kumimoji="0" lang="en-US" sz="2400" b="0" i="0" u="none" strike="noStrike" kern="0" cap="none" spc="0" normalizeH="0" baseline="0" noProof="0" dirty="0" smtClean="0">
-                <a:ln>
-                  <a:noFill/>
-                </a:ln>
-                <a:solidFill>
-                  <a:srgbClr val="000000"/>
-                </a:solidFill>
-                <a:effectLst/>
-                <a:uLnTx/>
-                <a:uFillTx/>
-                <a:latin typeface="+mn-lt"/>
-                <a:ea typeface="+mn-ea"/>
-                <a:cs typeface="+mn-cs"/>
-              </a:rPr>
-              <a:t>:</a:t>
-            </a:r>
-          </a:p>
-          <a:p>
-            <a:pPr marL="722313" marR="0" lvl="1" indent="-277813" algn="l" defTabSz="914400" rtl="0" eaLnBrk="1" fontAlgn="ctr" latinLnBrk="0" hangingPunct="1">
-              <a:lnSpc>
-                <a:spcPct val="100000"/>
-              </a:lnSpc>
-              <a:spcBef>
-                <a:spcPct val="25000"/>
-              </a:spcBef>
-              <a:spcAft>
-                <a:spcPct val="0"/>
-              </a:spcAft>
-              <a:buClr>
-                <a:schemeClr val="accent1"/>
-              </a:buClr>
-              <a:buSzPct val="125000"/>
-              <a:buFont typeface="Wingdings" pitchFamily="2" charset="2"/>
-              <a:buChar char="§"/>
-              <a:tabLst/>
-              <a:defRPr/>
-            </a:pPr>
-            <a:r>
-              <a:rPr lang="en-US" sz="2000" b="0" kern="0" dirty="0" smtClean="0">
-                <a:latin typeface="+mn-lt"/>
-              </a:rPr>
-              <a:t>Handle remotely a whole system</a:t>
-            </a:r>
-          </a:p>
-          <a:p>
-            <a:pPr marL="1179513" lvl="2" indent="-277813" algn="l" fontAlgn="ctr">
-              <a:spcBef>
-                <a:spcPct val="25000"/>
-              </a:spcBef>
-              <a:buClr>
-                <a:schemeClr val="accent1"/>
-              </a:buClr>
-              <a:buSzPct val="125000"/>
-              <a:buFont typeface="Wingdings" pitchFamily="2" charset="2"/>
-              <a:buChar char="§"/>
-            </a:pPr>
-            <a:r>
-              <a:rPr kumimoji="0" lang="en-US" sz="2000" b="0" i="0" u="none" strike="noStrike" kern="0" cap="none" spc="0" normalizeH="0" baseline="0" noProof="0" dirty="0" smtClean="0">
-                <a:ln>
-                  <a:noFill/>
-                </a:ln>
-                <a:solidFill>
-                  <a:srgbClr val="000000"/>
-                </a:solidFill>
-                <a:effectLst/>
-                <a:uLnTx/>
-                <a:uFillTx/>
-                <a:latin typeface="+mn-lt"/>
-              </a:rPr>
-              <a:t>Medical</a:t>
-            </a:r>
-            <a:r>
-              <a:rPr kumimoji="0" lang="en-US" sz="2000" b="0" i="0" u="none" strike="noStrike" kern="0" cap="none" spc="0" normalizeH="0" noProof="0" dirty="0" smtClean="0">
-                <a:ln>
-                  <a:noFill/>
-                </a:ln>
-                <a:solidFill>
-                  <a:srgbClr val="000000"/>
-                </a:solidFill>
-                <a:effectLst/>
-                <a:uLnTx/>
-                <a:uFillTx/>
-                <a:latin typeface="+mn-lt"/>
-              </a:rPr>
-              <a:t> applications</a:t>
-            </a:r>
-          </a:p>
-          <a:p>
-            <a:pPr marL="1179513" lvl="2" indent="-277813" algn="l" fontAlgn="ctr">
-              <a:spcBef>
-                <a:spcPct val="25000"/>
-              </a:spcBef>
-              <a:buClr>
-                <a:schemeClr val="accent1"/>
-              </a:buClr>
-              <a:buSzPct val="125000"/>
-              <a:buFont typeface="Wingdings" pitchFamily="2" charset="2"/>
-              <a:buChar char="§"/>
-            </a:pPr>
-            <a:r>
-              <a:rPr lang="en-US" sz="2000" b="0" kern="0" dirty="0" err="1" smtClean="0">
-                <a:latin typeface="+mn-lt"/>
-              </a:rPr>
-              <a:t>Mbed</a:t>
-            </a:r>
-            <a:r>
-              <a:rPr lang="en-US" sz="2000" b="0" kern="0" dirty="0" smtClean="0">
-                <a:latin typeface="+mn-lt"/>
-              </a:rPr>
-              <a:t> located in places where people cannot go frequently</a:t>
-            </a:r>
-            <a:endParaRPr kumimoji="0" lang="en-US" sz="2000" b="0" i="0" u="none" strike="noStrike" kern="0" cap="none" spc="0" normalizeH="0" baseline="0" noProof="0" dirty="0" smtClean="0">
-              <a:ln>
-                <a:noFill/>
-              </a:ln>
-              <a:solidFill>
-                <a:srgbClr val="000000"/>
-              </a:solidFill>
-              <a:effectLst/>
-              <a:uLnTx/>
-              <a:uFillTx/>
-              <a:latin typeface="+mn-lt"/>
-            </a:endParaRPr>
-          </a:p>
-          <a:p>
-            <a:pPr marL="722313" marR="0" lvl="1" indent="-277813" algn="l" defTabSz="914400" rtl="0" eaLnBrk="1" fontAlgn="ctr" latinLnBrk="0" hangingPunct="1">
-              <a:lnSpc>
-                <a:spcPct val="100000"/>
-              </a:lnSpc>
-              <a:spcBef>
-                <a:spcPct val="25000"/>
-              </a:spcBef>
-              <a:spcAft>
-                <a:spcPct val="0"/>
-              </a:spcAft>
-              <a:buClr>
-                <a:schemeClr val="accent1"/>
-              </a:buClr>
-              <a:buSzPct val="125000"/>
-              <a:buFont typeface="Wingdings" pitchFamily="2" charset="2"/>
-              <a:buChar char="§"/>
-              <a:tabLst/>
-              <a:defRPr/>
-            </a:pPr>
-            <a:endParaRPr kumimoji="0" lang="en-US" sz="2000" b="0" i="0" u="none" strike="noStrike" kern="0" cap="none" spc="0" normalizeH="0" baseline="0" noProof="0" dirty="0">
-              <a:ln>
-                <a:noFill/>
-              </a:ln>
-              <a:solidFill>
-                <a:srgbClr val="000000"/>
-              </a:solidFill>
-              <a:effectLst/>
-              <a:uLnTx/>
-              <a:uFillTx/>
-              <a:latin typeface="+mn-lt"/>
-            </a:endParaRPr>
           </a:p>
         </p:txBody>
       </p:sp>
@@ -4939,10 +4639,6 @@
               </a:rPr>
               <a:t>Sub-networks organization</a:t>
             </a:r>
-            <a:endParaRPr lang="en-US" sz="1800" b="0" kern="0" noProof="0" dirty="0" smtClean="0">
-              <a:latin typeface="+mn-lt"/>
-              <a:ea typeface="+mn-ea"/>
-            </a:endParaRPr>
           </a:p>
           <a:p>
             <a:pPr marL="265113" marR="0" lvl="0" indent="-265113" algn="l" defTabSz="914400" rtl="0" eaLnBrk="1" fontAlgn="ctr" latinLnBrk="0" hangingPunct="1">
@@ -5720,19 +5416,7 @@
                   <a:rPr lang="en-US" b="0" dirty="0" smtClean="0">
                     <a:latin typeface="Book Antiqua" pitchFamily="18" charset="0"/>
                   </a:rPr>
-                  <a:t>”: “</a:t>
-                </a:r>
-                <a:r>
-                  <a:rPr lang="en-US" b="0" dirty="0" smtClean="0">
-                    <a:latin typeface="Book Antiqua" pitchFamily="18" charset="0"/>
-                  </a:rPr>
-                  <a:t>mbed2”, </a:t>
-                </a:r>
-                <a:r>
-                  <a:rPr lang="en-US" b="0" dirty="0" smtClean="0">
-                    <a:latin typeface="Book Antiqua" pitchFamily="18" charset="0"/>
-                  </a:rPr>
-                  <a:t>“</a:t>
+                  <a:t>”: “mbed2”, “</a:t>
                 </a:r>
                 <a:r>
                   <a:rPr lang="en-US" dirty="0" err="1" smtClean="0">
@@ -6852,6 +6536,269 @@
 </file>
 
 <file path=ppt/slides/slide19.xml><?xml version="1.0" encoding="utf-8"?>
+<p:sld xmlns:a="http://schemas.openxmlformats.org/drawingml/2006/main" xmlns:r="http://schemas.openxmlformats.org/officeDocument/2006/relationships" xmlns:p="http://schemas.openxmlformats.org/presentationml/2006/main">
+  <p:cSld>
+    <p:spTree>
+      <p:nvGrpSpPr>
+        <p:cNvPr id="1" name=""/>
+        <p:cNvGrpSpPr/>
+        <p:nvPr/>
+      </p:nvGrpSpPr>
+      <p:grpSpPr>
+        <a:xfrm>
+          <a:off x="0" y="0"/>
+          <a:ext cx="0" cy="0"/>
+          <a:chOff x="0" y="0"/>
+          <a:chExt cx="0" cy="0"/>
+        </a:xfrm>
+      </p:grpSpPr>
+      <p:sp>
+        <p:nvSpPr>
+          <p:cNvPr id="2" name="Titre 1"/>
+          <p:cNvSpPr>
+            <a:spLocks noGrp="1"/>
+          </p:cNvSpPr>
+          <p:nvPr>
+            <p:ph type="title"/>
+          </p:nvPr>
+        </p:nvSpPr>
+        <p:spPr>
+          <a:xfrm>
+            <a:off x="175471" y="1868271"/>
+            <a:ext cx="8777287" cy="838200"/>
+          </a:xfrm>
+        </p:spPr>
+        <p:txBody>
+          <a:bodyPr/>
+          <a:lstStyle/>
+          <a:p>
+            <a:pPr algn="ctr"/>
+            <a:r>
+              <a:rPr lang="en-US" dirty="0" smtClean="0"/>
+              <a:t>Universal Serial Bus: Device</a:t>
+            </a:r>
+            <a:endParaRPr lang="en-US" dirty="0"/>
+          </a:p>
+        </p:txBody>
+      </p:sp>
+      <p:pic>
+        <p:nvPicPr>
+          <p:cNvPr id="1026" name="Picture 2" descr="C:\Users\samux\Desktop\ARM-internship-report\report\usb_capa1.jpg"/>
+          <p:cNvPicPr>
+            <a:picLocks noChangeAspect="1" noChangeArrowheads="1"/>
+          </p:cNvPicPr>
+          <p:nvPr/>
+        </p:nvPicPr>
+        <p:blipFill>
+          <a:blip r:embed="rId2"/>
+          <a:srcRect/>
+          <a:stretch>
+            <a:fillRect/>
+          </a:stretch>
+        </p:blipFill>
+        <p:spPr bwMode="auto">
+          <a:xfrm>
+            <a:off x="2339475" y="2890345"/>
+            <a:ext cx="4665013" cy="2815513"/>
+          </a:xfrm>
+          <a:prstGeom prst="rect">
+            <a:avLst/>
+          </a:prstGeom>
+          <a:noFill/>
+        </p:spPr>
+      </p:pic>
+    </p:spTree>
+  </p:cSld>
+  <p:clrMapOvr>
+    <a:masterClrMapping/>
+  </p:clrMapOvr>
+</p:sld>
+</file>
+
+<file path=ppt/slides/slide2.xml><?xml version="1.0" encoding="utf-8"?>
+<p:sld xmlns:a="http://schemas.openxmlformats.org/drawingml/2006/main" xmlns:r="http://schemas.openxmlformats.org/officeDocument/2006/relationships" xmlns:p="http://schemas.openxmlformats.org/presentationml/2006/main">
+  <p:cSld>
+    <p:spTree>
+      <p:nvGrpSpPr>
+        <p:cNvPr id="1" name=""/>
+        <p:cNvGrpSpPr/>
+        <p:nvPr/>
+      </p:nvGrpSpPr>
+      <p:grpSpPr>
+        <a:xfrm>
+          <a:off x="0" y="0"/>
+          <a:ext cx="0" cy="0"/>
+          <a:chOff x="0" y="0"/>
+          <a:chExt cx="0" cy="0"/>
+        </a:xfrm>
+      </p:grpSpPr>
+      <p:sp>
+        <p:nvSpPr>
+          <p:cNvPr id="2" name="Titre 1"/>
+          <p:cNvSpPr>
+            <a:spLocks noGrp="1"/>
+          </p:cNvSpPr>
+          <p:nvPr>
+            <p:ph type="title"/>
+          </p:nvPr>
+        </p:nvSpPr>
+        <p:spPr/>
+        <p:txBody>
+          <a:bodyPr/>
+          <a:lstStyle/>
+          <a:p>
+            <a:r>
+              <a:rPr lang="en-US" dirty="0" smtClean="0"/>
+              <a:t>Outline</a:t>
+            </a:r>
+            <a:endParaRPr lang="en-US" dirty="0"/>
+          </a:p>
+        </p:txBody>
+      </p:sp>
+      <p:sp>
+        <p:nvSpPr>
+          <p:cNvPr id="3" name="Espace réservé du contenu 2"/>
+          <p:cNvSpPr>
+            <a:spLocks noGrp="1"/>
+          </p:cNvSpPr>
+          <p:nvPr>
+            <p:ph idx="1"/>
+          </p:nvPr>
+        </p:nvSpPr>
+        <p:spPr>
+          <a:xfrm>
+            <a:off x="206978" y="1384300"/>
+            <a:ext cx="8775700" cy="5473700"/>
+          </a:xfrm>
+        </p:spPr>
+        <p:txBody>
+          <a:bodyPr/>
+          <a:lstStyle/>
+          <a:p>
+            <a:pPr marL="457200" indent="-457200">
+              <a:buFont typeface="+mj-lt"/>
+              <a:buAutoNum type="arabicPeriod"/>
+            </a:pPr>
+            <a:r>
+              <a:rPr lang="en-US" dirty="0" err="1" smtClean="0"/>
+              <a:t>Mbed</a:t>
+            </a:r>
+            <a:endParaRPr lang="en-US" dirty="0" smtClean="0"/>
+          </a:p>
+          <a:p>
+            <a:pPr marL="457200" indent="-457200">
+              <a:buFont typeface="+mj-lt"/>
+              <a:buAutoNum type="arabicPeriod"/>
+            </a:pPr>
+            <a:r>
+              <a:rPr lang="en-US" dirty="0" smtClean="0"/>
+              <a:t>Internet of Things</a:t>
+            </a:r>
+          </a:p>
+          <a:p>
+            <a:pPr marL="914400" lvl="1" indent="-457200">
+              <a:buFont typeface="Arial" pitchFamily="34" charset="0"/>
+              <a:buChar char="•"/>
+            </a:pPr>
+            <a:r>
+              <a:rPr lang="en-US" dirty="0" err="1" smtClean="0"/>
+              <a:t>WebSockets</a:t>
+            </a:r>
+            <a:endParaRPr lang="en-US" dirty="0" smtClean="0"/>
+          </a:p>
+          <a:p>
+            <a:pPr marL="901700" lvl="1" indent="-457200">
+              <a:buFont typeface="Arial" pitchFamily="34" charset="0"/>
+              <a:buChar char="•"/>
+            </a:pPr>
+            <a:r>
+              <a:rPr lang="en-US" dirty="0" smtClean="0"/>
+              <a:t>Connecting sensors to the cloud</a:t>
+            </a:r>
+          </a:p>
+          <a:p>
+            <a:pPr marL="901700" lvl="1" indent="-457200">
+              <a:buFont typeface="Arial" pitchFamily="34" charset="0"/>
+              <a:buChar char="•"/>
+            </a:pPr>
+            <a:r>
+              <a:rPr lang="en-US" dirty="0" smtClean="0"/>
+              <a:t>Remote Procedure Call (RPC) over </a:t>
+            </a:r>
+            <a:r>
+              <a:rPr lang="en-US" dirty="0" err="1" smtClean="0"/>
+              <a:t>WebSocket</a:t>
+            </a:r>
+            <a:endParaRPr lang="en-US" dirty="0" smtClean="0"/>
+          </a:p>
+          <a:p>
+            <a:pPr marL="457200" indent="-457200">
+              <a:buFont typeface="+mj-lt"/>
+              <a:buAutoNum type="arabicPeriod"/>
+            </a:pPr>
+            <a:r>
+              <a:rPr lang="en-US" dirty="0" smtClean="0"/>
+              <a:t>USB Device Stack</a:t>
+            </a:r>
+          </a:p>
+          <a:p>
+            <a:pPr marL="901700" lvl="1" indent="-457200">
+              <a:buFont typeface="Arial" pitchFamily="34" charset="0"/>
+              <a:buChar char="•"/>
+            </a:pPr>
+            <a:r>
+              <a:rPr lang="en-US" dirty="0" smtClean="0"/>
+              <a:t>USB Overview</a:t>
+            </a:r>
+          </a:p>
+          <a:p>
+            <a:pPr marL="901700" lvl="1" indent="-457200">
+              <a:buFont typeface="Arial" pitchFamily="34" charset="0"/>
+              <a:buChar char="•"/>
+            </a:pPr>
+            <a:r>
+              <a:rPr lang="en-US" dirty="0" smtClean="0"/>
+              <a:t>Stack architecture</a:t>
+            </a:r>
+          </a:p>
+          <a:p>
+            <a:pPr marL="901700" lvl="1" indent="-457200">
+              <a:buFont typeface="Arial" pitchFamily="34" charset="0"/>
+              <a:buChar char="•"/>
+            </a:pPr>
+            <a:r>
+              <a:rPr lang="en-US" dirty="0" smtClean="0"/>
+              <a:t>USB HID class</a:t>
+            </a:r>
+          </a:p>
+          <a:p>
+            <a:pPr marL="901700" lvl="1" indent="-457200">
+              <a:buFont typeface="Arial" pitchFamily="34" charset="0"/>
+              <a:buChar char="•"/>
+            </a:pPr>
+            <a:r>
+              <a:rPr lang="en-US" dirty="0" smtClean="0"/>
+              <a:t>USB Audio</a:t>
+            </a:r>
+          </a:p>
+        </p:txBody>
+      </p:sp>
+    </p:spTree>
+  </p:cSld>
+  <p:clrMapOvr>
+    <a:masterClrMapping/>
+  </p:clrMapOvr>
+  <p:timing>
+    <p:tnLst>
+      <p:par>
+        <p:cTn id="1" dur="indefinite" restart="never" nodeType="tmRoot"/>
+      </p:par>
+    </p:tnLst>
+  </p:timing>
+</p:sld>
+</file>
+
+<file path=ppt/slides/slide20.xml><?xml version="1.0" encoding="utf-8"?>
 <p:sld xmlns:a="http://schemas.openxmlformats.org/drawingml/2006/main" xmlns:r="http://schemas.openxmlformats.org/officeDocument/2006/relationships" xmlns:p="http://schemas.openxmlformats.org/presentationml/2006/main">
   <p:cSld>
     <p:spTree>
@@ -7470,190 +7417,7 @@
 </p:sld>
 </file>
 
-<file path=ppt/slides/slide2.xml><?xml version="1.0" encoding="utf-8"?>
-<p:sld xmlns:a="http://schemas.openxmlformats.org/drawingml/2006/main" xmlns:r="http://schemas.openxmlformats.org/officeDocument/2006/relationships" xmlns:p="http://schemas.openxmlformats.org/presentationml/2006/main">
-  <p:cSld>
-    <p:spTree>
-      <p:nvGrpSpPr>
-        <p:cNvPr id="1" name=""/>
-        <p:cNvGrpSpPr/>
-        <p:nvPr/>
-      </p:nvGrpSpPr>
-      <p:grpSpPr>
-        <a:xfrm>
-          <a:off x="0" y="0"/>
-          <a:ext cx="0" cy="0"/>
-          <a:chOff x="0" y="0"/>
-          <a:chExt cx="0" cy="0"/>
-        </a:xfrm>
-      </p:grpSpPr>
-      <p:sp>
-        <p:nvSpPr>
-          <p:cNvPr id="2" name="Titre 1"/>
-          <p:cNvSpPr>
-            <a:spLocks noGrp="1"/>
-          </p:cNvSpPr>
-          <p:nvPr>
-            <p:ph type="title"/>
-          </p:nvPr>
-        </p:nvSpPr>
-        <p:spPr/>
-        <p:txBody>
-          <a:bodyPr/>
-          <a:lstStyle/>
-          <a:p>
-            <a:r>
-              <a:rPr lang="en-US" dirty="0" smtClean="0"/>
-              <a:t>Outline</a:t>
-            </a:r>
-            <a:endParaRPr lang="en-US" dirty="0"/>
-          </a:p>
-        </p:txBody>
-      </p:sp>
-      <p:sp>
-        <p:nvSpPr>
-          <p:cNvPr id="3" name="Espace réservé du contenu 2"/>
-          <p:cNvSpPr>
-            <a:spLocks noGrp="1"/>
-          </p:cNvSpPr>
-          <p:nvPr>
-            <p:ph idx="1"/>
-          </p:nvPr>
-        </p:nvSpPr>
-        <p:spPr>
-          <a:xfrm>
-            <a:off x="206978" y="1384300"/>
-            <a:ext cx="8775700" cy="5473700"/>
-          </a:xfrm>
-        </p:spPr>
-        <p:txBody>
-          <a:bodyPr/>
-          <a:lstStyle/>
-          <a:p>
-            <a:pPr marL="457200" indent="-457200">
-              <a:buFont typeface="+mj-lt"/>
-              <a:buAutoNum type="arabicPeriod"/>
-            </a:pPr>
-            <a:r>
-              <a:rPr lang="en-US" dirty="0" err="1" smtClean="0"/>
-              <a:t>Mbed</a:t>
-            </a:r>
-            <a:endParaRPr lang="en-US" dirty="0" smtClean="0"/>
-          </a:p>
-          <a:p>
-            <a:pPr marL="457200" indent="-457200">
-              <a:buFont typeface="+mj-lt"/>
-              <a:buAutoNum type="arabicPeriod"/>
-            </a:pPr>
-            <a:r>
-              <a:rPr lang="en-US" dirty="0" smtClean="0"/>
-              <a:t>Internet of Things</a:t>
-            </a:r>
-          </a:p>
-          <a:p>
-            <a:pPr marL="914400" lvl="1" indent="-457200">
-              <a:buFont typeface="Arial" pitchFamily="34" charset="0"/>
-              <a:buChar char="•"/>
-            </a:pPr>
-            <a:r>
-              <a:rPr lang="en-US" dirty="0" err="1" smtClean="0"/>
-              <a:t>WebSockets</a:t>
-            </a:r>
-            <a:endParaRPr lang="en-US" dirty="0" smtClean="0"/>
-          </a:p>
-          <a:p>
-            <a:pPr marL="901700" lvl="1" indent="-457200">
-              <a:buFont typeface="Arial" pitchFamily="34" charset="0"/>
-              <a:buChar char="•"/>
-            </a:pPr>
-            <a:r>
-              <a:rPr lang="en-US" dirty="0" smtClean="0"/>
-              <a:t>Connecting sensors to the cloud</a:t>
-            </a:r>
-          </a:p>
-          <a:p>
-            <a:pPr marL="901700" lvl="1" indent="-457200">
-              <a:buFont typeface="Arial" pitchFamily="34" charset="0"/>
-              <a:buChar char="•"/>
-            </a:pPr>
-            <a:r>
-              <a:rPr lang="en-US" dirty="0" smtClean="0"/>
-              <a:t>Remote Procedure Call (RPC) over </a:t>
-            </a:r>
-            <a:r>
-              <a:rPr lang="en-US" dirty="0" err="1" smtClean="0"/>
-              <a:t>WebSocket</a:t>
-            </a:r>
-            <a:endParaRPr lang="en-US" dirty="0" smtClean="0"/>
-          </a:p>
-          <a:p>
-            <a:pPr marL="457200" indent="-457200">
-              <a:buFont typeface="+mj-lt"/>
-              <a:buAutoNum type="arabicPeriod"/>
-            </a:pPr>
-            <a:r>
-              <a:rPr lang="en-US" dirty="0" smtClean="0"/>
-              <a:t>USB Device Stack</a:t>
-            </a:r>
-          </a:p>
-          <a:p>
-            <a:pPr marL="901700" lvl="1" indent="-457200">
-              <a:buFont typeface="Arial" pitchFamily="34" charset="0"/>
-              <a:buChar char="•"/>
-            </a:pPr>
-            <a:r>
-              <a:rPr lang="en-US" dirty="0" smtClean="0"/>
-              <a:t>USB Overview</a:t>
-            </a:r>
-          </a:p>
-          <a:p>
-            <a:pPr marL="901700" lvl="1" indent="-457200">
-              <a:buFont typeface="Arial" pitchFamily="34" charset="0"/>
-              <a:buChar char="•"/>
-            </a:pPr>
-            <a:r>
-              <a:rPr lang="en-US" dirty="0" smtClean="0"/>
-              <a:t>Stack architecture</a:t>
-            </a:r>
-          </a:p>
-          <a:p>
-            <a:pPr marL="901700" lvl="1" indent="-457200">
-              <a:buFont typeface="Arial" pitchFamily="34" charset="0"/>
-              <a:buChar char="•"/>
-            </a:pPr>
-            <a:r>
-              <a:rPr lang="en-US" dirty="0" smtClean="0"/>
-              <a:t>USB HID class</a:t>
-            </a:r>
-          </a:p>
-          <a:p>
-            <a:pPr marL="901700" lvl="1" indent="-457200">
-              <a:buFont typeface="Arial" pitchFamily="34" charset="0"/>
-              <a:buChar char="•"/>
-            </a:pPr>
-            <a:r>
-              <a:rPr lang="en-US" dirty="0" smtClean="0"/>
-              <a:t>USB Audio</a:t>
-            </a:r>
-          </a:p>
-        </p:txBody>
-      </p:sp>
-    </p:spTree>
-  </p:cSld>
-  <p:clrMapOvr>
-    <a:masterClrMapping/>
-  </p:clrMapOvr>
-  <p:timing>
-    <p:tnLst>
-      <p:par>
-        <p:cTn id="1" dur="indefinite" restart="never" nodeType="tmRoot"/>
-      </p:par>
-    </p:tnLst>
-  </p:timing>
-</p:sld>
-</file>
-
-<file path=ppt/slides/slide20.xml><?xml version="1.0" encoding="utf-8"?>
+<file path=ppt/slides/slide21.xml><?xml version="1.0" encoding="utf-8"?>
 <p:sld xmlns:a="http://schemas.openxmlformats.org/drawingml/2006/main" xmlns:r="http://schemas.openxmlformats.org/officeDocument/2006/relationships" xmlns:p="http://schemas.openxmlformats.org/presentationml/2006/main">
   <p:cSld>
     <p:spTree>
@@ -7762,160 +7526,6 @@
           <a:xfrm>
             <a:off x="546532" y="2059206"/>
             <a:ext cx="7897620" cy="4201566"/>
-          </a:xfrm>
-          <a:prstGeom prst="rect">
-            <a:avLst/>
-          </a:prstGeom>
-          <a:noFill/>
-        </p:spPr>
-      </p:pic>
-    </p:spTree>
-  </p:cSld>
-  <p:clrMapOvr>
-    <a:masterClrMapping/>
-  </p:clrMapOvr>
-</p:sld>
-</file>
-
-<file path=ppt/slides/slide21.xml><?xml version="1.0" encoding="utf-8"?>
-<p:sld xmlns:a="http://schemas.openxmlformats.org/drawingml/2006/main" xmlns:r="http://schemas.openxmlformats.org/officeDocument/2006/relationships" xmlns:p="http://schemas.openxmlformats.org/presentationml/2006/main">
-  <p:cSld>
-    <p:spTree>
-      <p:nvGrpSpPr>
-        <p:cNvPr id="1" name=""/>
-        <p:cNvGrpSpPr/>
-        <p:nvPr/>
-      </p:nvGrpSpPr>
-      <p:grpSpPr>
-        <a:xfrm>
-          <a:off x="0" y="0"/>
-          <a:ext cx="0" cy="0"/>
-          <a:chOff x="0" y="0"/>
-          <a:chExt cx="0" cy="0"/>
-        </a:xfrm>
-      </p:grpSpPr>
-      <p:sp>
-        <p:nvSpPr>
-          <p:cNvPr id="2" name="Titre 1"/>
-          <p:cNvSpPr>
-            <a:spLocks noGrp="1"/>
-          </p:cNvSpPr>
-          <p:nvPr>
-            <p:ph type="title"/>
-          </p:nvPr>
-        </p:nvSpPr>
-        <p:spPr/>
-        <p:txBody>
-          <a:bodyPr/>
-          <a:lstStyle/>
-          <a:p>
-            <a:r>
-              <a:rPr lang="en-US" dirty="0" smtClean="0"/>
-              <a:t>USB Device: Overview</a:t>
-            </a:r>
-            <a:endParaRPr lang="en-US" dirty="0"/>
-          </a:p>
-        </p:txBody>
-      </p:sp>
-      <p:sp>
-        <p:nvSpPr>
-          <p:cNvPr id="3" name="Espace réservé du contenu 2"/>
-          <p:cNvSpPr>
-            <a:spLocks noGrp="1"/>
-          </p:cNvSpPr>
-          <p:nvPr>
-            <p:ph idx="1"/>
-          </p:nvPr>
-        </p:nvSpPr>
-        <p:spPr>
-          <a:xfrm>
-            <a:off x="217488" y="906463"/>
-            <a:ext cx="8775700" cy="1731634"/>
-          </a:xfrm>
-        </p:spPr>
-        <p:txBody>
-          <a:bodyPr/>
-          <a:lstStyle/>
-          <a:p>
-            <a:r>
-              <a:rPr lang="en-US" dirty="0" smtClean="0"/>
-              <a:t>Enumeration:</a:t>
-            </a:r>
-          </a:p>
-          <a:p>
-            <a:pPr lvl="1"/>
-            <a:r>
-              <a:rPr lang="en-US" dirty="0" smtClean="0"/>
-              <a:t>The host </a:t>
-            </a:r>
-            <a:r>
-              <a:rPr lang="en-US" dirty="0" smtClean="0"/>
-              <a:t>sets </a:t>
-            </a:r>
-            <a:r>
-              <a:rPr lang="en-US" dirty="0" smtClean="0"/>
-              <a:t>a </a:t>
-            </a:r>
-            <a:r>
-              <a:rPr lang="en-US" b="1" dirty="0" smtClean="0"/>
-              <a:t>unique address </a:t>
-            </a:r>
-            <a:r>
-              <a:rPr lang="en-US" dirty="0" smtClean="0"/>
-              <a:t>to the device</a:t>
-            </a:r>
-          </a:p>
-          <a:p>
-            <a:pPr lvl="1"/>
-            <a:r>
-              <a:rPr lang="en-US" dirty="0" smtClean="0"/>
-              <a:t>The host learns about the device capabilities</a:t>
-            </a:r>
-          </a:p>
-          <a:p>
-            <a:pPr lvl="1"/>
-            <a:r>
-              <a:rPr lang="en-US" dirty="0" smtClean="0"/>
-              <a:t>Device capabilities </a:t>
-            </a:r>
-            <a:r>
-              <a:rPr lang="en-US" dirty="0" smtClean="0"/>
-              <a:t>are contained </a:t>
-            </a:r>
-            <a:r>
-              <a:rPr lang="en-US" dirty="0" smtClean="0"/>
-              <a:t>in </a:t>
-            </a:r>
-            <a:r>
-              <a:rPr lang="en-US" b="1" dirty="0" smtClean="0"/>
-              <a:t>descriptors</a:t>
-            </a:r>
-          </a:p>
-          <a:p>
-            <a:pPr lvl="1"/>
-            <a:endParaRPr lang="en-US" dirty="0"/>
-          </a:p>
-        </p:txBody>
-      </p:sp>
-      <p:pic>
-        <p:nvPicPr>
-          <p:cNvPr id="3074" name="Picture 2" descr="C:\Users\samux\Desktop\ARM-internship-report\report\descr.jpg"/>
-          <p:cNvPicPr>
-            <a:picLocks noChangeAspect="1" noChangeArrowheads="1"/>
-          </p:cNvPicPr>
-          <p:nvPr/>
-        </p:nvPicPr>
-        <p:blipFill>
-          <a:blip r:embed="rId2"/>
-          <a:srcRect/>
-          <a:stretch>
-            <a:fillRect/>
-          </a:stretch>
-        </p:blipFill>
-        <p:spPr bwMode="auto">
-          <a:xfrm>
-            <a:off x="987404" y="2911366"/>
-            <a:ext cx="7126442" cy="3153104"/>
           </a:xfrm>
           <a:prstGeom prst="rect">
             <a:avLst/>
@@ -7965,15 +7575,79 @@
           <a:p>
             <a:r>
               <a:rPr lang="en-US" dirty="0" smtClean="0"/>
-              <a:t>USB Device: stack architecture</a:t>
-            </a:r>
+              <a:t>USB Device: Overview</a:t>
+            </a:r>
+            <a:endParaRPr lang="en-US" dirty="0"/>
+          </a:p>
+        </p:txBody>
+      </p:sp>
+      <p:sp>
+        <p:nvSpPr>
+          <p:cNvPr id="3" name="Espace réservé du contenu 2"/>
+          <p:cNvSpPr>
+            <a:spLocks noGrp="1"/>
+          </p:cNvSpPr>
+          <p:nvPr>
+            <p:ph idx="1"/>
+          </p:nvPr>
+        </p:nvSpPr>
+        <p:spPr>
+          <a:xfrm>
+            <a:off x="217488" y="906463"/>
+            <a:ext cx="8775700" cy="1731634"/>
+          </a:xfrm>
+        </p:spPr>
+        <p:txBody>
+          <a:bodyPr/>
+          <a:lstStyle/>
+          <a:p>
+            <a:r>
+              <a:rPr lang="en-US" dirty="0" smtClean="0"/>
+              <a:t>Enumeration:</a:t>
+            </a:r>
+          </a:p>
+          <a:p>
+            <a:pPr lvl="1"/>
+            <a:r>
+              <a:rPr lang="en-US" dirty="0" smtClean="0"/>
+              <a:t>The host sets a </a:t>
+            </a:r>
+            <a:r>
+              <a:rPr lang="en-US" b="1" dirty="0" smtClean="0"/>
+              <a:t>unique address </a:t>
+            </a:r>
+            <a:r>
+              <a:rPr lang="en-US" dirty="0" smtClean="0"/>
+              <a:t>to the device</a:t>
+            </a:r>
+          </a:p>
+          <a:p>
+            <a:pPr lvl="1"/>
+            <a:r>
+              <a:rPr lang="en-US" dirty="0" smtClean="0"/>
+              <a:t>The host learns about the device capabilities</a:t>
+            </a:r>
+          </a:p>
+          <a:p>
+            <a:pPr lvl="1"/>
+            <a:r>
+              <a:rPr lang="en-US" dirty="0" smtClean="0"/>
+              <a:t>Device capabilities are contained in </a:t>
+            </a:r>
+            <a:r>
+              <a:rPr lang="en-US" b="1" dirty="0" smtClean="0"/>
+              <a:t>descriptors</a:t>
+            </a:r>
+          </a:p>
+          <a:p>
+            <a:pPr lvl="1"/>
             <a:endParaRPr lang="en-US" dirty="0"/>
           </a:p>
         </p:txBody>
       </p:sp>
       <p:pic>
         <p:nvPicPr>
-          <p:cNvPr id="4098" name="Picture 2" descr="C:\Users\samux\Desktop\ARM-internship-report\report\usb_arch3.png"/>
+          <p:cNvPr id="3074" name="Picture 2" descr="C:\Users\samux\Desktop\ARM-internship-report\report\descr.jpg"/>
           <p:cNvPicPr>
             <a:picLocks noChangeAspect="1" noChangeArrowheads="1"/>
           </p:cNvPicPr>
@@ -7988,8 +7662,8 @@
         </p:blipFill>
         <p:spPr bwMode="auto">
           <a:xfrm>
-            <a:off x="207162" y="1471449"/>
-            <a:ext cx="8768678" cy="4081190"/>
+            <a:off x="987404" y="2911366"/>
+            <a:ext cx="7126442" cy="3153104"/>
           </a:xfrm>
           <a:prstGeom prst="rect">
             <a:avLst/>
@@ -8039,148 +7713,38 @@
           <a:p>
             <a:r>
               <a:rPr lang="en-US" dirty="0" smtClean="0"/>
-              <a:t>USB Device: USBHAL</a:t>
+              <a:t>USB Device: stack architecture</a:t>
             </a:r>
             <a:endParaRPr lang="en-US" dirty="0"/>
           </a:p>
         </p:txBody>
       </p:sp>
-      <p:sp>
-        <p:nvSpPr>
-          <p:cNvPr id="3" name="Espace réservé du contenu 2"/>
-          <p:cNvSpPr>
-            <a:spLocks noGrp="1"/>
-          </p:cNvSpPr>
-          <p:nvPr>
-            <p:ph idx="1"/>
-          </p:nvPr>
-        </p:nvSpPr>
-        <p:spPr>
+      <p:pic>
+        <p:nvPicPr>
+          <p:cNvPr id="4098" name="Picture 2" descr="C:\Users\samux\Desktop\ARM-internship-report\report\usb_arch3.png"/>
+          <p:cNvPicPr>
+            <a:picLocks noChangeAspect="1" noChangeArrowheads="1"/>
+          </p:cNvPicPr>
+          <p:nvPr/>
+        </p:nvPicPr>
+        <p:blipFill>
+          <a:blip r:embed="rId2"/>
+          <a:srcRect/>
+          <a:stretch>
+            <a:fillRect/>
+          </a:stretch>
+        </p:blipFill>
+        <p:spPr bwMode="auto">
           <a:xfrm>
-            <a:off x="0" y="895952"/>
-            <a:ext cx="9806152" cy="5473700"/>
+            <a:off x="207162" y="1471449"/>
+            <a:ext cx="8768678" cy="4081190"/>
           </a:xfrm>
+          <a:prstGeom prst="rect">
+            <a:avLst/>
+          </a:prstGeom>
+          <a:noFill/>
         </p:spPr>
-        <p:txBody>
-          <a:bodyPr/>
-          <a:lstStyle/>
-          <a:p>
-            <a:r>
-              <a:rPr lang="en-US" dirty="0" smtClean="0"/>
-              <a:t>USBHAL class:</a:t>
-            </a:r>
-          </a:p>
-          <a:p>
-            <a:pPr lvl="1"/>
-            <a:r>
-              <a:rPr lang="en-US" dirty="0" smtClean="0"/>
-              <a:t>USB Hardware Abstraction layer for the LPC11U24 and the LPC1768</a:t>
-            </a:r>
-          </a:p>
-          <a:p>
-            <a:pPr lvl="1"/>
-            <a:r>
-              <a:rPr lang="en-US" dirty="0" smtClean="0"/>
-              <a:t>Implemented in two different .</a:t>
-            </a:r>
-            <a:r>
-              <a:rPr lang="en-US" dirty="0" err="1" smtClean="0"/>
-              <a:t>cpp</a:t>
-            </a:r>
-            <a:r>
-              <a:rPr lang="en-US" dirty="0" smtClean="0"/>
-              <a:t> files with a unique .h</a:t>
-            </a:r>
-          </a:p>
-          <a:p>
-            <a:pPr lvl="1"/>
-            <a:r>
-              <a:rPr lang="en-US" dirty="0" smtClean="0"/>
-              <a:t>A macro is defined by the compiler according to the target</a:t>
-            </a:r>
-          </a:p>
-          <a:p>
-            <a:pPr lvl="1">
-              <a:buNone/>
-            </a:pPr>
-            <a:endParaRPr lang="en-US" dirty="0" smtClean="0"/>
-          </a:p>
-          <a:p>
-            <a:pPr lvl="1"/>
-            <a:r>
-              <a:rPr lang="en-US" dirty="0" smtClean="0"/>
-              <a:t>Low level methods:</a:t>
-            </a:r>
-          </a:p>
-          <a:p>
-            <a:pPr lvl="2"/>
-            <a:r>
-              <a:rPr lang="en-US" dirty="0" smtClean="0"/>
-              <a:t>Write an Endpoint</a:t>
-            </a:r>
-          </a:p>
-          <a:p>
-            <a:pPr lvl="2"/>
-            <a:r>
-              <a:rPr lang="en-US" dirty="0" smtClean="0"/>
-              <a:t>Read an Endpoint</a:t>
-            </a:r>
-          </a:p>
-          <a:p>
-            <a:pPr lvl="2"/>
-            <a:r>
-              <a:rPr lang="en-US" dirty="0" smtClean="0"/>
-              <a:t>IRQ handler which calls virtual functions:</a:t>
-            </a:r>
-          </a:p>
-          <a:p>
-            <a:pPr lvl="3"/>
-            <a:r>
-              <a:rPr lang="en-US" dirty="0" err="1" smtClean="0"/>
-              <a:t>EPx_OUT_callback</a:t>
-            </a:r>
-            <a:r>
-              <a:rPr lang="en-US" dirty="0" smtClean="0"/>
-              <a:t>(): data received</a:t>
-            </a:r>
-          </a:p>
-          <a:p>
-            <a:pPr lvl="3"/>
-            <a:r>
-              <a:rPr lang="en-US" dirty="0" err="1" smtClean="0"/>
-              <a:t>Epx_IN_callback</a:t>
-            </a:r>
-            <a:r>
-              <a:rPr lang="en-US" dirty="0" smtClean="0"/>
-              <a:t>(): data sent</a:t>
-            </a:r>
-          </a:p>
-          <a:p>
-            <a:pPr lvl="3"/>
-            <a:r>
-              <a:rPr lang="en-US" dirty="0" smtClean="0"/>
-              <a:t>SOF(</a:t>
-            </a:r>
-            <a:r>
-              <a:rPr lang="en-US" dirty="0" err="1" smtClean="0"/>
-              <a:t>int</a:t>
-            </a:r>
-            <a:r>
-              <a:rPr lang="en-US" dirty="0" smtClean="0"/>
-              <a:t> </a:t>
-            </a:r>
-            <a:r>
-              <a:rPr lang="en-US" dirty="0" err="1" smtClean="0"/>
-              <a:t>frameNumber</a:t>
-            </a:r>
-            <a:r>
-              <a:rPr lang="en-US" dirty="0" smtClean="0"/>
-              <a:t>): Start Of Frame event (each ms)</a:t>
-            </a:r>
-            <a:endParaRPr lang="en-US" dirty="0"/>
-          </a:p>
-        </p:txBody>
-      </p:sp>
+      </p:pic>
     </p:spTree>
   </p:cSld>
   <p:clrMapOvr>
@@ -8223,11 +7787,7 @@
           <a:p>
             <a:r>
               <a:rPr lang="en-US" dirty="0" smtClean="0"/>
-              <a:t>USB Device: </a:t>
-            </a:r>
-            <a:r>
-              <a:rPr lang="en-US" dirty="0" err="1" smtClean="0"/>
-              <a:t>USBDevice</a:t>
+              <a:t>USB Device: USBHAL</a:t>
             </a:r>
             <a:endParaRPr lang="en-US" dirty="0"/>
           </a:p>
@@ -8243,65 +7803,132 @@
             <p:ph idx="1"/>
           </p:nvPr>
         </p:nvSpPr>
-        <p:spPr/>
+        <p:spPr>
+          <a:xfrm>
+            <a:off x="0" y="895952"/>
+            <a:ext cx="9806152" cy="5473700"/>
+          </a:xfrm>
+        </p:spPr>
         <p:txBody>
           <a:bodyPr/>
           <a:lstStyle/>
           <a:p>
             <a:r>
+              <a:rPr lang="en-US" dirty="0" smtClean="0"/>
+              <a:t>USBHAL class:</a:t>
+            </a:r>
+          </a:p>
+          <a:p>
+            <a:pPr lvl="1"/>
+            <a:r>
+              <a:rPr lang="en-US" dirty="0" smtClean="0"/>
+              <a:t>USB Hardware Abstraction layer for the LPC11U24 and the LPC1768</a:t>
+            </a:r>
+          </a:p>
+          <a:p>
+            <a:pPr lvl="1"/>
+            <a:r>
+              <a:rPr lang="en-US" dirty="0" smtClean="0"/>
+              <a:t>Implemented in two different .</a:t>
+            </a:r>
+            <a:r>
               <a:rPr lang="en-US" dirty="0" err="1" smtClean="0"/>
-              <a:t>USBDevice</a:t>
-            </a:r>
-            <a:r>
-              <a:rPr lang="en-US" dirty="0" smtClean="0"/>
-              <a:t> class:</a:t>
+              <a:t>cpp</a:t>
+            </a:r>
+            <a:r>
+              <a:rPr lang="en-US" dirty="0" smtClean="0"/>
+              <a:t> files with a unique .h</a:t>
             </a:r>
           </a:p>
           <a:p>
             <a:pPr lvl="1"/>
             <a:r>
               <a:rPr lang="en-US" dirty="0" smtClean="0"/>
-              <a:t>No difference between the two targets</a:t>
-            </a:r>
+              <a:t>A macro is defined by the compiler according to the target</a:t>
+            </a:r>
+          </a:p>
+          <a:p>
+            <a:pPr lvl="1">
+              <a:buNone/>
+            </a:pPr>
+            <a:endParaRPr lang="en-US" dirty="0" smtClean="0"/>
           </a:p>
           <a:p>
             <a:pPr lvl="1"/>
             <a:r>
               <a:rPr lang="en-US" dirty="0" smtClean="0"/>
-              <a:t>Enumeration step for “standard” descriptors:</a:t>
-            </a:r>
-          </a:p>
-          <a:p>
+              <a:t>Low level methods:</a:t>
+            </a:r>
+          </a:p>
+          <a:p>
+            <a:pPr lvl="2"/>
+            <a:r>
+              <a:rPr lang="en-US" dirty="0" smtClean="0"/>
+              <a:t>Write an Endpoint</a:t>
+            </a:r>
+          </a:p>
+          <a:p>
+            <a:pPr lvl="2"/>
+            <a:r>
+              <a:rPr lang="en-US" dirty="0" smtClean="0"/>
+              <a:t>Read an Endpoint</a:t>
+            </a:r>
+          </a:p>
+          <a:p>
+            <a:pPr lvl="2"/>
+            <a:r>
+              <a:rPr lang="en-US" dirty="0" smtClean="0"/>
+              <a:t>IRQ handler which calls virtual functions:</a:t>
+            </a:r>
+          </a:p>
+          <a:p>
+            <a:pPr lvl="3"/>
+            <a:r>
+              <a:rPr lang="en-US" dirty="0" err="1" smtClean="0"/>
+              <a:t>EPx_OUT_callback</a:t>
+            </a:r>
+            <a:r>
+              <a:rPr lang="en-US" dirty="0" smtClean="0"/>
+              <a:t>(): data received</a:t>
+            </a:r>
+          </a:p>
+          <a:p>
+            <a:pPr lvl="3"/>
+            <a:r>
+              <a:rPr lang="en-US" dirty="0" err="1" smtClean="0"/>
+              <a:t>Epx_IN_callback</a:t>
+            </a:r>
+            <a:r>
+              <a:rPr lang="en-US" dirty="0" smtClean="0"/>
+              <a:t>(): data sent</a:t>
+            </a:r>
+          </a:p>
+          <a:p>
+            <a:pPr lvl="3"/>
+            <a:r>
+              <a:rPr lang="en-US" dirty="0" smtClean="0"/>
+              <a:t>SOF(</a:t>
+            </a:r>
+            <a:r>
+              <a:rPr lang="en-US" dirty="0" err="1" smtClean="0"/>
+              <a:t>int</a:t>
+            </a:r>
+            <a:r>
+              <a:rPr lang="en-US" dirty="0" smtClean="0"/>
+              <a:t> </a:t>
+            </a:r>
+            <a:r>
+              <a:rPr lang="en-US" dirty="0" err="1" smtClean="0"/>
+              <a:t>frameNumber</a:t>
+            </a:r>
+            <a:r>
+              <a:rPr lang="en-US" dirty="0" smtClean="0"/>
+              <a:t>): Start Of Frame event (each ms)</a:t>
+            </a:r>
             <a:endParaRPr lang="en-US" dirty="0"/>
           </a:p>
         </p:txBody>
       </p:sp>
-      <p:pic>
-        <p:nvPicPr>
-          <p:cNvPr id="1026" name="Picture 2" descr="C:\Users\samux\Desktop\ARM-internship-report\report\setup_packets.jpg"/>
-          <p:cNvPicPr>
-            <a:picLocks noChangeAspect="1" noChangeArrowheads="1"/>
-          </p:cNvPicPr>
-          <p:nvPr/>
-        </p:nvPicPr>
-        <p:blipFill>
-          <a:blip r:embed="rId2"/>
-          <a:srcRect/>
-          <a:stretch>
-            <a:fillRect/>
-          </a:stretch>
-        </p:blipFill>
-        <p:spPr bwMode="auto">
-          <a:xfrm>
-            <a:off x="115610" y="2375346"/>
-            <a:ext cx="8926761" cy="3136078"/>
-          </a:xfrm>
-          <a:prstGeom prst="rect">
-            <a:avLst/>
-          </a:prstGeom>
-          <a:noFill/>
-        </p:spPr>
-      </p:pic>
     </p:spTree>
   </p:cSld>
   <p:clrMapOvr>
@@ -8344,7 +7971,11 @@
           <a:p>
             <a:r>
               <a:rPr lang="en-US" dirty="0" smtClean="0"/>
-              <a:t>USB Device: USB HID</a:t>
+              <a:t>USB Device: </a:t>
+            </a:r>
+            <a:r>
+              <a:rPr lang="en-US" dirty="0" err="1" smtClean="0"/>
+              <a:t>USBDevice</a:t>
             </a:r>
             <a:endParaRPr lang="en-US" dirty="0"/>
           </a:p>
@@ -8360,123 +7991,65 @@
             <p:ph idx="1"/>
           </p:nvPr>
         </p:nvSpPr>
-        <p:spPr>
-          <a:xfrm>
-            <a:off x="217488" y="906463"/>
-            <a:ext cx="8775700" cy="522944"/>
-          </a:xfrm>
-        </p:spPr>
+        <p:spPr/>
         <p:txBody>
           <a:bodyPr/>
           <a:lstStyle/>
           <a:p>
             <a:r>
-              <a:rPr lang="en-US" dirty="0" smtClean="0"/>
-              <a:t>Human Interface device (HID):</a:t>
+              <a:rPr lang="en-US" dirty="0" err="1" smtClean="0"/>
+              <a:t>USBDevice</a:t>
+            </a:r>
+            <a:r>
+              <a:rPr lang="en-US" dirty="0" smtClean="0"/>
+              <a:t> class:</a:t>
             </a:r>
           </a:p>
           <a:p>
             <a:pPr lvl="1"/>
             <a:r>
               <a:rPr lang="en-US" dirty="0" smtClean="0"/>
-              <a:t>primarily defined </a:t>
-            </a:r>
-            <a:r>
-              <a:rPr lang="en-US" dirty="0" smtClean="0"/>
-              <a:t>for devices </a:t>
-            </a:r>
-            <a:r>
-              <a:rPr lang="en-US" dirty="0" smtClean="0"/>
-              <a:t>that are </a:t>
-            </a:r>
-            <a:r>
-              <a:rPr lang="en-US" dirty="0" smtClean="0"/>
-              <a:t>used by </a:t>
-            </a:r>
-            <a:r>
-              <a:rPr lang="en-US" dirty="0" smtClean="0"/>
-              <a:t>humans</a:t>
+              <a:t>No difference between the two targets</a:t>
             </a:r>
           </a:p>
           <a:p>
             <a:pPr lvl="1"/>
             <a:r>
               <a:rPr lang="en-US" dirty="0" smtClean="0"/>
-              <a:t>Examples: mouse, keyboard, joystick</a:t>
-            </a:r>
-          </a:p>
-          <a:p>
-            <a:pPr lvl="1"/>
-            <a:r>
-              <a:rPr lang="en-US" dirty="0" smtClean="0"/>
-              <a:t>Can be a solution to exchange raw data with a computer</a:t>
-            </a:r>
-          </a:p>
-          <a:p>
-            <a:pPr lvl="1"/>
-            <a:r>
-              <a:rPr lang="en-US" dirty="0" smtClean="0"/>
-              <a:t>A HID driver is built-in in all operating systems</a:t>
-            </a:r>
-          </a:p>
-          <a:p>
-            <a:pPr lvl="1"/>
-            <a:endParaRPr lang="en-US" dirty="0" smtClean="0"/>
-          </a:p>
-          <a:p>
-            <a:pPr lvl="1"/>
-            <a:r>
-              <a:rPr lang="en-US" dirty="0" smtClean="0"/>
-              <a:t>Class requirements:</a:t>
-            </a:r>
-          </a:p>
-          <a:p>
-            <a:pPr lvl="2"/>
-            <a:r>
-              <a:rPr lang="en-US" dirty="0" smtClean="0"/>
-              <a:t>Interrupt IN endpoint to send data</a:t>
-            </a:r>
-          </a:p>
-          <a:p>
-            <a:pPr lvl="2"/>
-            <a:r>
-              <a:rPr lang="en-US" dirty="0" smtClean="0"/>
-              <a:t>Interrupt OUT endpoint to receive data</a:t>
-            </a:r>
-          </a:p>
-          <a:p>
-            <a:pPr lvl="2"/>
-            <a:r>
-              <a:rPr lang="en-US" dirty="0" smtClean="0"/>
-              <a:t>Data are exchanged in data structure called “</a:t>
-            </a:r>
-            <a:r>
-              <a:rPr lang="en-US" b="1" dirty="0" smtClean="0"/>
-              <a:t>reports</a:t>
-            </a:r>
-            <a:r>
-              <a:rPr lang="en-US" dirty="0" smtClean="0"/>
-              <a:t>”</a:t>
-            </a:r>
-          </a:p>
-          <a:p>
-            <a:pPr lvl="2"/>
-            <a:r>
-              <a:rPr lang="en-US" dirty="0" smtClean="0"/>
-              <a:t>A </a:t>
-            </a:r>
-            <a:r>
-              <a:rPr lang="en-US" b="1" dirty="0" smtClean="0"/>
-              <a:t>report descriptor </a:t>
-            </a:r>
-            <a:r>
-              <a:rPr lang="en-US" dirty="0" smtClean="0"/>
-              <a:t>defines format and size of a report</a:t>
-            </a:r>
+              <a:t>Enumeration step for “standard” descriptors:</a:t>
+            </a:r>
+          </a:p>
+          <a:p>
             <a:endParaRPr lang="en-US" dirty="0"/>
           </a:p>
         </p:txBody>
       </p:sp>
+      <p:pic>
+        <p:nvPicPr>
+          <p:cNvPr id="1026" name="Picture 2" descr="C:\Users\samux\Desktop\ARM-internship-report\report\setup_packets.jpg"/>
+          <p:cNvPicPr>
+            <a:picLocks noChangeAspect="1" noChangeArrowheads="1"/>
+          </p:cNvPicPr>
+          <p:nvPr/>
+        </p:nvPicPr>
+        <p:blipFill>
+          <a:blip r:embed="rId2"/>
+          <a:srcRect/>
+          <a:stretch>
+            <a:fillRect/>
+          </a:stretch>
+        </p:blipFill>
+        <p:spPr bwMode="auto">
+          <a:xfrm>
+            <a:off x="115610" y="2375346"/>
+            <a:ext cx="8926761" cy="3136078"/>
+          </a:xfrm>
+          <a:prstGeom prst="rect">
+            <a:avLst/>
+          </a:prstGeom>
+          <a:noFill/>
+        </p:spPr>
+      </p:pic>
     </p:spTree>
   </p:cSld>
   <p:clrMapOvr>
@@ -8519,7 +8092,7 @@
           <a:p>
             <a:r>
               <a:rPr lang="en-US" dirty="0" smtClean="0"/>
-              <a:t>USB Device: Generic USB HID device</a:t>
+              <a:t>USB Device: USB HID</a:t>
             </a:r>
             <a:endParaRPr lang="en-US" dirty="0"/>
           </a:p>
@@ -8527,719 +8100,7 @@
       </p:sp>
       <p:sp>
         <p:nvSpPr>
-          <p:cNvPr id="4" name="ZoneTexte 3"/>
-          <p:cNvSpPr txBox="1"/>
-          <p:nvPr/>
-        </p:nvSpPr>
-        <p:spPr>
-          <a:xfrm>
-            <a:off x="157655" y="1219229"/>
-            <a:ext cx="4498428" cy="4524315"/>
-          </a:xfrm>
-          <a:prstGeom prst="rect">
-            <a:avLst/>
-          </a:prstGeom>
-          <a:solidFill>
-            <a:schemeClr val="accent1">
-              <a:lumMod val="20000"/>
-              <a:lumOff val="80000"/>
-            </a:schemeClr>
-          </a:solidFill>
-        </p:spPr>
-        <p:txBody>
-          <a:bodyPr wrap="square" rtlCol="0">
-            <a:spAutoFit/>
-          </a:bodyPr>
-          <a:lstStyle/>
-          <a:p>
-            <a:pPr algn="l"/>
-            <a:r>
-              <a:rPr lang="en-US" sz="1200" b="0" dirty="0" smtClean="0">
-                <a:solidFill>
-                  <a:schemeClr val="tx1"/>
-                </a:solidFill>
-                <a:latin typeface="Book Antiqua" pitchFamily="18" charset="0"/>
-              </a:rPr>
-              <a:t>uint8_t </a:t>
-            </a:r>
-            <a:r>
-              <a:rPr lang="en-US" sz="1200" b="0" dirty="0" smtClean="0">
-                <a:solidFill>
-                  <a:schemeClr val="tx1"/>
-                </a:solidFill>
-                <a:latin typeface="Book Antiqua" pitchFamily="18" charset="0"/>
-              </a:rPr>
-              <a:t>* USBHID::</a:t>
-            </a:r>
-            <a:r>
-              <a:rPr lang="en-US" sz="1200" b="0" dirty="0" err="1" smtClean="0">
-                <a:solidFill>
-                  <a:schemeClr val="tx1"/>
-                </a:solidFill>
-                <a:latin typeface="Book Antiqua" pitchFamily="18" charset="0"/>
-              </a:rPr>
-              <a:t>reportDesc</a:t>
-            </a:r>
-            <a:r>
-              <a:rPr lang="en-US" sz="1200" b="0" dirty="0" smtClean="0">
-                <a:solidFill>
-                  <a:schemeClr val="tx1"/>
-                </a:solidFill>
-                <a:latin typeface="Book Antiqua" pitchFamily="18" charset="0"/>
-              </a:rPr>
-              <a:t>() {</a:t>
-            </a:r>
-          </a:p>
-          <a:p>
-            <a:pPr algn="l"/>
-            <a:r>
-              <a:rPr lang="en-US" sz="1200" b="0" dirty="0" smtClean="0">
-                <a:solidFill>
-                  <a:schemeClr val="tx1"/>
-                </a:solidFill>
-                <a:latin typeface="Book Antiqua" pitchFamily="18" charset="0"/>
-              </a:rPr>
-              <a:t>    static uint8_t </a:t>
-            </a:r>
-            <a:r>
-              <a:rPr lang="en-US" sz="1200" b="0" dirty="0" err="1" smtClean="0">
-                <a:solidFill>
-                  <a:schemeClr val="tx1"/>
-                </a:solidFill>
-                <a:latin typeface="Book Antiqua" pitchFamily="18" charset="0"/>
-              </a:rPr>
-              <a:t>reportDescriptor</a:t>
-            </a:r>
-            <a:r>
-              <a:rPr lang="en-US" sz="1200" b="0" dirty="0" smtClean="0">
-                <a:solidFill>
-                  <a:schemeClr val="tx1"/>
-                </a:solidFill>
-                <a:latin typeface="Book Antiqua" pitchFamily="18" charset="0"/>
-              </a:rPr>
-              <a:t>[] = {</a:t>
-            </a:r>
-          </a:p>
-          <a:p>
-            <a:pPr algn="l"/>
-            <a:r>
-              <a:rPr lang="en-US" sz="1200" b="0" dirty="0" smtClean="0">
-                <a:solidFill>
-                  <a:schemeClr val="tx1"/>
-                </a:solidFill>
-                <a:latin typeface="Book Antiqua" pitchFamily="18" charset="0"/>
-              </a:rPr>
-              <a:t>        0x06, LSB(0xFFAB), MSB(0xFFAB),</a:t>
-            </a:r>
-          </a:p>
-          <a:p>
-            <a:pPr algn="l"/>
-            <a:r>
-              <a:rPr lang="en-US" sz="1200" b="0" dirty="0" smtClean="0">
-                <a:solidFill>
-                  <a:schemeClr val="tx1"/>
-                </a:solidFill>
-                <a:latin typeface="Book Antiqua" pitchFamily="18" charset="0"/>
-              </a:rPr>
-              <a:t>        0x0A, LSB(0x0200), MSB(0x0200),</a:t>
-            </a:r>
-          </a:p>
-          <a:p>
-            <a:pPr algn="l"/>
-            <a:r>
-              <a:rPr lang="en-US" sz="1200" b="0" dirty="0" smtClean="0">
-                <a:solidFill>
-                  <a:schemeClr val="tx1"/>
-                </a:solidFill>
-                <a:latin typeface="Book Antiqua" pitchFamily="18" charset="0"/>
-              </a:rPr>
-              <a:t>        0xA1, 0x01,         </a:t>
-            </a:r>
-            <a:r>
-              <a:rPr lang="en-US" sz="1200" b="0" dirty="0" smtClean="0">
-                <a:solidFill>
-                  <a:schemeClr val="tx1"/>
-                </a:solidFill>
-                <a:latin typeface="Book Antiqua" pitchFamily="18" charset="0"/>
-              </a:rPr>
-              <a:t>	// </a:t>
-            </a:r>
-            <a:r>
-              <a:rPr lang="en-US" sz="1200" b="0" dirty="0" smtClean="0">
-                <a:solidFill>
-                  <a:schemeClr val="tx1"/>
-                </a:solidFill>
-                <a:latin typeface="Book Antiqua" pitchFamily="18" charset="0"/>
-              </a:rPr>
-              <a:t>Collection </a:t>
-            </a:r>
-            <a:r>
-              <a:rPr lang="en-US" sz="1200" b="0" dirty="0" smtClean="0">
-                <a:solidFill>
-                  <a:schemeClr val="tx1"/>
-                </a:solidFill>
-                <a:latin typeface="Book Antiqua" pitchFamily="18" charset="0"/>
-              </a:rPr>
-              <a:t>0x01</a:t>
-            </a:r>
-          </a:p>
-          <a:p>
-            <a:pPr algn="l"/>
-            <a:endParaRPr lang="en-US" sz="1200" b="0" dirty="0" smtClean="0">
-              <a:solidFill>
-                <a:schemeClr val="tx1"/>
-              </a:solidFill>
-              <a:latin typeface="Book Antiqua" pitchFamily="18" charset="0"/>
-            </a:endParaRPr>
-          </a:p>
-          <a:p>
-            <a:pPr algn="l"/>
-            <a:r>
-              <a:rPr lang="en-US" sz="1200" b="0" dirty="0" smtClean="0"/>
-              <a:t>       // </a:t>
-            </a:r>
-            <a:r>
-              <a:rPr lang="en-US" sz="1200" b="0" dirty="0" smtClean="0"/>
-              <a:t>data </a:t>
-            </a:r>
-            <a:r>
-              <a:rPr lang="en-US" sz="1200" b="0" dirty="0" smtClean="0"/>
-              <a:t>are sent </a:t>
-            </a:r>
-            <a:r>
-              <a:rPr lang="en-US" sz="1200" b="0" dirty="0" smtClean="0"/>
-              <a:t>in </a:t>
-            </a:r>
-            <a:r>
-              <a:rPr lang="en-US" sz="1200" b="0" dirty="0" smtClean="0"/>
-              <a:t>packets containing </a:t>
-            </a:r>
-            <a:r>
-              <a:rPr lang="en-US" sz="1200" b="0" dirty="0" smtClean="0"/>
-              <a:t>input </a:t>
-            </a:r>
-            <a:r>
-              <a:rPr lang="en-US" sz="1200" b="0" dirty="0" smtClean="0"/>
-              <a:t>length bytes</a:t>
-            </a:r>
-            <a:endParaRPr lang="en-US" sz="1200" b="0" dirty="0" smtClean="0">
-              <a:solidFill>
-                <a:schemeClr val="tx1"/>
-              </a:solidFill>
-              <a:latin typeface="Book Antiqua" pitchFamily="18" charset="0"/>
-            </a:endParaRPr>
-          </a:p>
-          <a:p>
-            <a:pPr algn="l"/>
-            <a:r>
-              <a:rPr lang="en-US" sz="1200" b="0" dirty="0" smtClean="0">
-                <a:solidFill>
-                  <a:schemeClr val="tx1"/>
-                </a:solidFill>
-                <a:latin typeface="Book Antiqua" pitchFamily="18" charset="0"/>
-              </a:rPr>
-              <a:t>        0x75, 0x08,         </a:t>
-            </a:r>
-            <a:r>
-              <a:rPr lang="en-US" sz="1200" b="0" dirty="0" smtClean="0">
-                <a:solidFill>
-                  <a:schemeClr val="tx1"/>
-                </a:solidFill>
-                <a:latin typeface="Book Antiqua" pitchFamily="18" charset="0"/>
-              </a:rPr>
-              <a:t>	// </a:t>
-            </a:r>
-            <a:r>
-              <a:rPr lang="en-US" sz="1200" b="0" dirty="0" smtClean="0">
-                <a:solidFill>
-                  <a:schemeClr val="tx1"/>
-                </a:solidFill>
-                <a:latin typeface="Book Antiqua" pitchFamily="18" charset="0"/>
-              </a:rPr>
-              <a:t>report size = 8 bits</a:t>
-            </a:r>
-          </a:p>
-          <a:p>
-            <a:pPr algn="l"/>
-            <a:r>
-              <a:rPr lang="en-US" sz="1200" b="0" dirty="0" smtClean="0">
-                <a:solidFill>
-                  <a:schemeClr val="tx1"/>
-                </a:solidFill>
-                <a:latin typeface="Book Antiqua" pitchFamily="18" charset="0"/>
-              </a:rPr>
-              <a:t>        0x15, 0x00,         </a:t>
-            </a:r>
-            <a:r>
-              <a:rPr lang="en-US" sz="1200" b="0" dirty="0" smtClean="0">
-                <a:solidFill>
-                  <a:schemeClr val="tx1"/>
-                </a:solidFill>
-                <a:latin typeface="Book Antiqua" pitchFamily="18" charset="0"/>
-              </a:rPr>
-              <a:t>	// </a:t>
-            </a:r>
-            <a:r>
-              <a:rPr lang="en-US" sz="1200" b="0" dirty="0" smtClean="0">
-                <a:solidFill>
-                  <a:schemeClr val="tx1"/>
-                </a:solidFill>
-                <a:latin typeface="Book Antiqua" pitchFamily="18" charset="0"/>
-              </a:rPr>
-              <a:t>logical minimum = 0</a:t>
-            </a:r>
-          </a:p>
-          <a:p>
-            <a:pPr algn="l"/>
-            <a:r>
-              <a:rPr lang="en-US" sz="1200" b="0" dirty="0" smtClean="0">
-                <a:solidFill>
-                  <a:schemeClr val="tx1"/>
-                </a:solidFill>
-                <a:latin typeface="Book Antiqua" pitchFamily="18" charset="0"/>
-              </a:rPr>
-              <a:t>        0x26, 0xFF, 0x00,   </a:t>
-            </a:r>
-            <a:r>
-              <a:rPr lang="en-US" sz="1200" b="0" dirty="0" smtClean="0">
-                <a:solidFill>
-                  <a:schemeClr val="tx1"/>
-                </a:solidFill>
-                <a:latin typeface="Book Antiqua" pitchFamily="18" charset="0"/>
-              </a:rPr>
-              <a:t>	// </a:t>
-            </a:r>
-            <a:r>
-              <a:rPr lang="en-US" sz="1200" b="0" dirty="0" smtClean="0">
-                <a:solidFill>
-                  <a:schemeClr val="tx1"/>
-                </a:solidFill>
-                <a:latin typeface="Book Antiqua" pitchFamily="18" charset="0"/>
-              </a:rPr>
-              <a:t>logical maximum = 255</a:t>
-            </a:r>
-          </a:p>
-          <a:p>
-            <a:pPr algn="l"/>
-            <a:r>
-              <a:rPr lang="en-US" sz="1200" b="0" dirty="0" smtClean="0">
-                <a:solidFill>
-                  <a:schemeClr val="tx1"/>
-                </a:solidFill>
-                <a:latin typeface="Book Antiqua" pitchFamily="18" charset="0"/>
-              </a:rPr>
-              <a:t>        0x95, </a:t>
-            </a:r>
-            <a:r>
-              <a:rPr lang="en-US" sz="1200" b="0" dirty="0" err="1" smtClean="0">
-                <a:solidFill>
-                  <a:schemeClr val="tx1"/>
-                </a:solidFill>
-                <a:latin typeface="Book Antiqua" pitchFamily="18" charset="0"/>
-              </a:rPr>
-              <a:t>input_length</a:t>
-            </a:r>
-            <a:r>
-              <a:rPr lang="en-US" sz="1200" b="0" dirty="0" smtClean="0">
-                <a:solidFill>
-                  <a:schemeClr val="tx1"/>
-                </a:solidFill>
-                <a:latin typeface="Book Antiqua" pitchFamily="18" charset="0"/>
-              </a:rPr>
-              <a:t>,      </a:t>
-            </a:r>
-            <a:r>
-              <a:rPr lang="en-US" sz="1200" b="0" dirty="0" smtClean="0">
-                <a:solidFill>
-                  <a:schemeClr val="tx1"/>
-                </a:solidFill>
-                <a:latin typeface="Book Antiqua" pitchFamily="18" charset="0"/>
-              </a:rPr>
-              <a:t>// </a:t>
-            </a:r>
-            <a:r>
-              <a:rPr lang="en-US" sz="1200" b="0" dirty="0" smtClean="0">
-                <a:solidFill>
-                  <a:schemeClr val="tx1"/>
-                </a:solidFill>
-                <a:latin typeface="Book Antiqua" pitchFamily="18" charset="0"/>
-              </a:rPr>
-              <a:t>report count</a:t>
-            </a:r>
-          </a:p>
-          <a:p>
-            <a:pPr algn="l"/>
-            <a:r>
-              <a:rPr lang="en-US" sz="1200" b="0" dirty="0" smtClean="0">
-                <a:solidFill>
-                  <a:schemeClr val="tx1"/>
-                </a:solidFill>
-                <a:latin typeface="Book Antiqua" pitchFamily="18" charset="0"/>
-              </a:rPr>
-              <a:t>        0x09, 0x01,         </a:t>
-            </a:r>
-            <a:r>
-              <a:rPr lang="en-US" sz="1200" b="0" dirty="0" smtClean="0">
-                <a:solidFill>
-                  <a:schemeClr val="tx1"/>
-                </a:solidFill>
-                <a:latin typeface="Book Antiqua" pitchFamily="18" charset="0"/>
-              </a:rPr>
-              <a:t>	// </a:t>
-            </a:r>
-            <a:r>
-              <a:rPr lang="en-US" sz="1200" b="0" dirty="0" smtClean="0">
-                <a:solidFill>
-                  <a:schemeClr val="tx1"/>
-                </a:solidFill>
-                <a:latin typeface="Book Antiqua" pitchFamily="18" charset="0"/>
-              </a:rPr>
-              <a:t>usage</a:t>
-            </a:r>
-          </a:p>
-          <a:p>
-            <a:pPr algn="l"/>
-            <a:r>
-              <a:rPr lang="en-US" sz="1200" b="0" dirty="0" smtClean="0">
-                <a:solidFill>
-                  <a:schemeClr val="tx1"/>
-                </a:solidFill>
-                <a:latin typeface="Book Antiqua" pitchFamily="18" charset="0"/>
-              </a:rPr>
-              <a:t>        0x81, 0x02,         </a:t>
-            </a:r>
-            <a:r>
-              <a:rPr lang="en-US" sz="1200" b="0" dirty="0" smtClean="0">
-                <a:solidFill>
-                  <a:schemeClr val="tx1"/>
-                </a:solidFill>
-                <a:latin typeface="Book Antiqua" pitchFamily="18" charset="0"/>
-              </a:rPr>
-              <a:t>	// </a:t>
-            </a:r>
-            <a:r>
-              <a:rPr lang="en-US" sz="1200" b="0" dirty="0" smtClean="0">
-                <a:solidFill>
-                  <a:schemeClr val="tx1"/>
-                </a:solidFill>
-                <a:latin typeface="Book Antiqua" pitchFamily="18" charset="0"/>
-              </a:rPr>
-              <a:t>Input (array</a:t>
-            </a:r>
-            <a:r>
-              <a:rPr lang="en-US" sz="1200" b="0" dirty="0" smtClean="0">
-                <a:solidFill>
-                  <a:schemeClr val="tx1"/>
-                </a:solidFill>
-                <a:latin typeface="Book Antiqua" pitchFamily="18" charset="0"/>
-              </a:rPr>
-              <a:t>)</a:t>
-            </a:r>
-          </a:p>
-          <a:p>
-            <a:pPr algn="l"/>
-            <a:endParaRPr lang="en-US" sz="1200" b="0" dirty="0" smtClean="0">
-              <a:solidFill>
-                <a:schemeClr val="tx1"/>
-              </a:solidFill>
-              <a:latin typeface="Book Antiqua" pitchFamily="18" charset="0"/>
-            </a:endParaRPr>
-          </a:p>
-          <a:p>
-            <a:pPr algn="l"/>
-            <a:r>
-              <a:rPr lang="en-US" sz="1200" b="0" dirty="0" smtClean="0"/>
-              <a:t>       // data are sent in packets containing input length </a:t>
-            </a:r>
-            <a:r>
-              <a:rPr lang="en-US" sz="1200" b="0" dirty="0" smtClean="0"/>
-              <a:t>bytes</a:t>
-            </a:r>
-            <a:endParaRPr lang="en-US" sz="1200" b="0" dirty="0" smtClean="0">
-              <a:solidFill>
-                <a:schemeClr val="tx1"/>
-              </a:solidFill>
-              <a:latin typeface="Book Antiqua" pitchFamily="18" charset="0"/>
-            </a:endParaRPr>
-          </a:p>
-          <a:p>
-            <a:pPr algn="l"/>
-            <a:r>
-              <a:rPr lang="en-US" sz="1200" b="0" dirty="0" smtClean="0">
-                <a:solidFill>
-                  <a:schemeClr val="tx1"/>
-                </a:solidFill>
-                <a:latin typeface="Book Antiqua" pitchFamily="18" charset="0"/>
-              </a:rPr>
-              <a:t>        0x95, </a:t>
-            </a:r>
-            <a:r>
-              <a:rPr lang="en-US" sz="1200" b="0" dirty="0" err="1" smtClean="0">
-                <a:solidFill>
-                  <a:schemeClr val="tx1"/>
-                </a:solidFill>
-                <a:latin typeface="Book Antiqua" pitchFamily="18" charset="0"/>
-              </a:rPr>
-              <a:t>output_length</a:t>
-            </a:r>
-            <a:r>
-              <a:rPr lang="en-US" sz="1200" b="0" dirty="0" smtClean="0">
-                <a:solidFill>
-                  <a:schemeClr val="tx1"/>
-                </a:solidFill>
-                <a:latin typeface="Book Antiqua" pitchFamily="18" charset="0"/>
-              </a:rPr>
-              <a:t>,    </a:t>
-            </a:r>
-            <a:r>
-              <a:rPr lang="en-US" sz="1200" b="0" dirty="0" smtClean="0">
-                <a:solidFill>
-                  <a:schemeClr val="tx1"/>
-                </a:solidFill>
-                <a:latin typeface="Book Antiqua" pitchFamily="18" charset="0"/>
-              </a:rPr>
-              <a:t>// </a:t>
-            </a:r>
-            <a:r>
-              <a:rPr lang="en-US" sz="1200" b="0" dirty="0" smtClean="0">
-                <a:solidFill>
-                  <a:schemeClr val="tx1"/>
-                </a:solidFill>
-                <a:latin typeface="Book Antiqua" pitchFamily="18" charset="0"/>
-              </a:rPr>
-              <a:t>report count</a:t>
-            </a:r>
-          </a:p>
-          <a:p>
-            <a:pPr algn="l"/>
-            <a:r>
-              <a:rPr lang="en-US" sz="1200" b="0" dirty="0" smtClean="0">
-                <a:solidFill>
-                  <a:schemeClr val="tx1"/>
-                </a:solidFill>
-                <a:latin typeface="Book Antiqua" pitchFamily="18" charset="0"/>
-              </a:rPr>
-              <a:t>        0x09, 0x02,         </a:t>
-            </a:r>
-            <a:r>
-              <a:rPr lang="en-US" sz="1200" b="0" dirty="0" smtClean="0">
-                <a:solidFill>
-                  <a:schemeClr val="tx1"/>
-                </a:solidFill>
-                <a:latin typeface="Book Antiqua" pitchFamily="18" charset="0"/>
-              </a:rPr>
-              <a:t>	// </a:t>
-            </a:r>
-            <a:r>
-              <a:rPr lang="en-US" sz="1200" b="0" dirty="0" smtClean="0">
-                <a:solidFill>
-                  <a:schemeClr val="tx1"/>
-                </a:solidFill>
-                <a:latin typeface="Book Antiqua" pitchFamily="18" charset="0"/>
-              </a:rPr>
-              <a:t>usage</a:t>
-            </a:r>
-          </a:p>
-          <a:p>
-            <a:pPr algn="l"/>
-            <a:r>
-              <a:rPr lang="en-US" sz="1200" b="0" dirty="0" smtClean="0">
-                <a:solidFill>
-                  <a:schemeClr val="tx1"/>
-                </a:solidFill>
-                <a:latin typeface="Book Antiqua" pitchFamily="18" charset="0"/>
-              </a:rPr>
-              <a:t>        0x91, 0x02,         </a:t>
-            </a:r>
-            <a:r>
-              <a:rPr lang="en-US" sz="1200" b="0" dirty="0" smtClean="0">
-                <a:solidFill>
-                  <a:schemeClr val="tx1"/>
-                </a:solidFill>
-                <a:latin typeface="Book Antiqua" pitchFamily="18" charset="0"/>
-              </a:rPr>
-              <a:t>	// </a:t>
-            </a:r>
-            <a:r>
-              <a:rPr lang="en-US" sz="1200" b="0" dirty="0" smtClean="0">
-                <a:solidFill>
-                  <a:schemeClr val="tx1"/>
-                </a:solidFill>
-                <a:latin typeface="Book Antiqua" pitchFamily="18" charset="0"/>
-              </a:rPr>
-              <a:t>Output (array)</a:t>
-            </a:r>
-          </a:p>
-          <a:p>
-            <a:pPr algn="l"/>
-            <a:r>
-              <a:rPr lang="en-US" sz="1200" b="0" dirty="0" smtClean="0">
-                <a:solidFill>
-                  <a:schemeClr val="tx1"/>
-                </a:solidFill>
-                <a:latin typeface="Book Antiqua" pitchFamily="18" charset="0"/>
-              </a:rPr>
-              <a:t>        0xC0                </a:t>
-            </a:r>
-            <a:r>
-              <a:rPr lang="en-US" sz="1200" b="0" dirty="0" smtClean="0">
-                <a:solidFill>
-                  <a:schemeClr val="tx1"/>
-                </a:solidFill>
-                <a:latin typeface="Book Antiqua" pitchFamily="18" charset="0"/>
-              </a:rPr>
-              <a:t>	// </a:t>
-            </a:r>
-            <a:r>
-              <a:rPr lang="en-US" sz="1200" b="0" dirty="0" smtClean="0">
-                <a:solidFill>
-                  <a:schemeClr val="tx1"/>
-                </a:solidFill>
-                <a:latin typeface="Book Antiqua" pitchFamily="18" charset="0"/>
-              </a:rPr>
-              <a:t>end collection</a:t>
-            </a:r>
-          </a:p>
-          <a:p>
-            <a:pPr algn="l"/>
-            <a:endParaRPr lang="en-US" sz="1200" b="0" dirty="0" smtClean="0">
-              <a:solidFill>
-                <a:schemeClr val="tx1"/>
-              </a:solidFill>
-              <a:latin typeface="Book Antiqua" pitchFamily="18" charset="0"/>
-            </a:endParaRPr>
-          </a:p>
-          <a:p>
-            <a:pPr algn="l"/>
-            <a:r>
-              <a:rPr lang="en-US" sz="1200" b="0" dirty="0" smtClean="0">
-                <a:solidFill>
-                  <a:schemeClr val="tx1"/>
-                </a:solidFill>
-                <a:latin typeface="Book Antiqua" pitchFamily="18" charset="0"/>
-              </a:rPr>
-              <a:t>    };</a:t>
-            </a:r>
-          </a:p>
-          <a:p>
-            <a:pPr algn="l"/>
-            <a:r>
-              <a:rPr lang="en-US" sz="1200" b="0" dirty="0" smtClean="0">
-                <a:solidFill>
-                  <a:schemeClr val="tx1"/>
-                </a:solidFill>
-                <a:latin typeface="Book Antiqua" pitchFamily="18" charset="0"/>
-              </a:rPr>
-              <a:t>    </a:t>
-            </a:r>
-            <a:r>
-              <a:rPr lang="en-US" sz="1200" b="0" dirty="0" err="1" smtClean="0">
-                <a:solidFill>
-                  <a:schemeClr val="tx1"/>
-                </a:solidFill>
-                <a:latin typeface="Book Antiqua" pitchFamily="18" charset="0"/>
-              </a:rPr>
-              <a:t>reportLength</a:t>
-            </a:r>
-            <a:r>
-              <a:rPr lang="en-US" sz="1200" b="0" dirty="0" smtClean="0">
-                <a:solidFill>
-                  <a:schemeClr val="tx1"/>
-                </a:solidFill>
-                <a:latin typeface="Book Antiqua" pitchFamily="18" charset="0"/>
-              </a:rPr>
-              <a:t> = </a:t>
-            </a:r>
-            <a:r>
-              <a:rPr lang="en-US" sz="1200" b="0" dirty="0" err="1" smtClean="0">
-                <a:solidFill>
-                  <a:schemeClr val="tx1"/>
-                </a:solidFill>
-                <a:latin typeface="Book Antiqua" pitchFamily="18" charset="0"/>
-              </a:rPr>
-              <a:t>sizeof</a:t>
-            </a:r>
-            <a:r>
-              <a:rPr lang="en-US" sz="1200" b="0" dirty="0" smtClean="0">
-                <a:solidFill>
-                  <a:schemeClr val="tx1"/>
-                </a:solidFill>
-                <a:latin typeface="Book Antiqua" pitchFamily="18" charset="0"/>
-              </a:rPr>
-              <a:t>(</a:t>
-            </a:r>
-            <a:r>
-              <a:rPr lang="en-US" sz="1200" b="0" dirty="0" err="1" smtClean="0">
-                <a:solidFill>
-                  <a:schemeClr val="tx1"/>
-                </a:solidFill>
-                <a:latin typeface="Book Antiqua" pitchFamily="18" charset="0"/>
-              </a:rPr>
-              <a:t>reportDescriptor</a:t>
-            </a:r>
-            <a:r>
-              <a:rPr lang="en-US" sz="1200" b="0" dirty="0" smtClean="0">
-                <a:solidFill>
-                  <a:schemeClr val="tx1"/>
-                </a:solidFill>
-                <a:latin typeface="Book Antiqua" pitchFamily="18" charset="0"/>
-              </a:rPr>
-              <a:t>);</a:t>
-            </a:r>
-          </a:p>
-          <a:p>
-            <a:pPr algn="l"/>
-            <a:r>
-              <a:rPr lang="en-US" sz="1200" b="0" dirty="0" smtClean="0">
-                <a:solidFill>
-                  <a:schemeClr val="tx1"/>
-                </a:solidFill>
-                <a:latin typeface="Book Antiqua" pitchFamily="18" charset="0"/>
-              </a:rPr>
-              <a:t>    return </a:t>
-            </a:r>
-            <a:r>
-              <a:rPr lang="en-US" sz="1200" b="0" dirty="0" err="1" smtClean="0">
-                <a:solidFill>
-                  <a:schemeClr val="tx1"/>
-                </a:solidFill>
-                <a:latin typeface="Book Antiqua" pitchFamily="18" charset="0"/>
-              </a:rPr>
-              <a:t>reportDescriptor</a:t>
-            </a:r>
-            <a:r>
-              <a:rPr lang="en-US" sz="1200" b="0" dirty="0" smtClean="0">
-                <a:solidFill>
-                  <a:schemeClr val="tx1"/>
-                </a:solidFill>
-                <a:latin typeface="Book Antiqua" pitchFamily="18" charset="0"/>
-              </a:rPr>
-              <a:t>;</a:t>
-            </a:r>
-          </a:p>
-          <a:p>
-            <a:pPr algn="l"/>
-            <a:r>
-              <a:rPr lang="en-US" sz="1200" b="0" dirty="0" smtClean="0">
-                <a:solidFill>
-                  <a:schemeClr val="tx1"/>
-                </a:solidFill>
-                <a:latin typeface="Book Antiqua" pitchFamily="18" charset="0"/>
-              </a:rPr>
-              <a:t>}</a:t>
-            </a:r>
-            <a:endParaRPr lang="en-US" sz="1200" b="0" dirty="0">
-              <a:solidFill>
-                <a:schemeClr val="tx1"/>
-              </a:solidFill>
-              <a:latin typeface="Book Antiqua" pitchFamily="18" charset="0"/>
-            </a:endParaRPr>
-          </a:p>
-        </p:txBody>
-      </p:sp>
-      <p:sp>
-        <p:nvSpPr>
-          <p:cNvPr id="5" name="Espace réservé du contenu 2"/>
+          <p:cNvPr id="3" name="Espace réservé du contenu 2"/>
           <p:cNvSpPr>
             <a:spLocks noGrp="1"/>
           </p:cNvSpPr>
@@ -9249,8 +8110,8 @@
         </p:nvSpPr>
         <p:spPr>
           <a:xfrm>
-            <a:off x="4778978" y="2430463"/>
-            <a:ext cx="4133795" cy="522944"/>
+            <a:off x="217488" y="906463"/>
+            <a:ext cx="8775700" cy="522944"/>
           </a:xfrm>
         </p:spPr>
         <p:txBody>
@@ -9259,14 +8120,90 @@
           <a:p>
             <a:r>
               <a:rPr lang="en-US" dirty="0" smtClean="0"/>
-              <a:t>Once a report defined:</a:t>
+              <a:t>Human Interface device (HID):</a:t>
             </a:r>
           </a:p>
           <a:p>
             <a:pPr lvl="1"/>
             <a:r>
               <a:rPr lang="en-US" dirty="0" smtClean="0"/>
-              <a:t>Data can be exchanged between computer and device by writing and reading the two interrupts endpoints</a:t>
+              <a:t>primarily defined for devices that are used by humans</a:t>
+            </a:r>
+          </a:p>
+          <a:p>
+            <a:pPr lvl="1"/>
+            <a:r>
+              <a:rPr lang="en-US" dirty="0" smtClean="0"/>
+              <a:t>Examples: mouse, keyboard, joystick</a:t>
+            </a:r>
+          </a:p>
+          <a:p>
+            <a:pPr lvl="1"/>
+            <a:r>
+              <a:rPr lang="en-US" dirty="0" smtClean="0"/>
+              <a:t>Can be a solution to exchange raw data with a computer</a:t>
+            </a:r>
+          </a:p>
+          <a:p>
+            <a:pPr lvl="1"/>
+            <a:r>
+              <a:rPr lang="en-US" dirty="0" smtClean="0"/>
+              <a:t>A HID driver is built-in in all operating systems</a:t>
+            </a:r>
+          </a:p>
+          <a:p>
+            <a:pPr lvl="1"/>
+            <a:endParaRPr lang="en-US" dirty="0" smtClean="0"/>
+          </a:p>
+          <a:p>
+            <a:pPr lvl="1"/>
+            <a:r>
+              <a:rPr lang="en-US" dirty="0" smtClean="0"/>
+              <a:t>Class requirements:</a:t>
+            </a:r>
+          </a:p>
+          <a:p>
+            <a:pPr lvl="2"/>
+            <a:r>
+              <a:rPr lang="en-US" dirty="0" smtClean="0"/>
+              <a:t>Interrupt IN endpoint to send data</a:t>
+            </a:r>
+          </a:p>
+          <a:p>
+            <a:pPr lvl="2"/>
+            <a:r>
+              <a:rPr lang="en-US" dirty="0" smtClean="0"/>
+              <a:t>Interrupt OUT endpoint to receive data</a:t>
+            </a:r>
+          </a:p>
+          <a:p>
+            <a:pPr lvl="2"/>
+            <a:r>
+              <a:rPr lang="en-US" dirty="0" smtClean="0"/>
+              <a:t>Data are exchanged in data structure called “</a:t>
+            </a:r>
+            <a:r>
+              <a:rPr lang="en-US" b="1" dirty="0" smtClean="0"/>
+              <a:t>reports</a:t>
+            </a:r>
+            <a:r>
+              <a:rPr lang="en-US" dirty="0" smtClean="0"/>
+              <a:t>”</a:t>
+            </a:r>
+          </a:p>
+          <a:p>
+            <a:pPr lvl="2"/>
+            <a:r>
+              <a:rPr lang="en-US" dirty="0" smtClean="0"/>
+              <a:t>A </a:t>
+            </a:r>
+            <a:r>
+              <a:rPr lang="en-US" b="1" dirty="0" smtClean="0"/>
+              <a:t>report descriptor </a:t>
+            </a:r>
+            <a:r>
+              <a:rPr lang="en-US" dirty="0" smtClean="0"/>
+              <a:t>defines format and size of a report</a:t>
             </a:r>
             <a:endParaRPr lang="en-US" dirty="0"/>
           </a:p>
@@ -9314,7 +8251,7 @@
           <a:p>
             <a:r>
               <a:rPr lang="en-US" dirty="0" smtClean="0"/>
-              <a:t>USB Device: USB Audio</a:t>
+              <a:t>USB Device: Generic USB HID device</a:t>
             </a:r>
             <a:endParaRPr lang="en-US" dirty="0"/>
           </a:p>
@@ -9322,7 +8259,466 @@
       </p:sp>
       <p:sp>
         <p:nvSpPr>
-          <p:cNvPr id="3" name="Espace réservé du contenu 2"/>
+          <p:cNvPr id="4" name="ZoneTexte 3"/>
+          <p:cNvSpPr txBox="1"/>
+          <p:nvPr/>
+        </p:nvSpPr>
+        <p:spPr>
+          <a:xfrm>
+            <a:off x="157655" y="1219229"/>
+            <a:ext cx="4498428" cy="4524315"/>
+          </a:xfrm>
+          <a:prstGeom prst="rect">
+            <a:avLst/>
+          </a:prstGeom>
+          <a:solidFill>
+            <a:schemeClr val="accent1">
+              <a:lumMod val="20000"/>
+              <a:lumOff val="80000"/>
+            </a:schemeClr>
+          </a:solidFill>
+        </p:spPr>
+        <p:txBody>
+          <a:bodyPr wrap="square" rtlCol="0">
+            <a:spAutoFit/>
+          </a:bodyPr>
+          <a:lstStyle/>
+          <a:p>
+            <a:pPr algn="l"/>
+            <a:r>
+              <a:rPr lang="en-US" sz="1200" b="0" dirty="0" smtClean="0">
+                <a:solidFill>
+                  <a:schemeClr val="tx1"/>
+                </a:solidFill>
+                <a:latin typeface="Book Antiqua" pitchFamily="18" charset="0"/>
+              </a:rPr>
+              <a:t>uint8_t * USBHID::</a:t>
+            </a:r>
+            <a:r>
+              <a:rPr lang="en-US" sz="1200" b="0" dirty="0" err="1" smtClean="0">
+                <a:solidFill>
+                  <a:schemeClr val="tx1"/>
+                </a:solidFill>
+                <a:latin typeface="Book Antiqua" pitchFamily="18" charset="0"/>
+              </a:rPr>
+              <a:t>reportDesc</a:t>
+            </a:r>
+            <a:r>
+              <a:rPr lang="en-US" sz="1200" b="0" dirty="0" smtClean="0">
+                <a:solidFill>
+                  <a:schemeClr val="tx1"/>
+                </a:solidFill>
+                <a:latin typeface="Book Antiqua" pitchFamily="18" charset="0"/>
+              </a:rPr>
+              <a:t>() {</a:t>
+            </a:r>
+          </a:p>
+          <a:p>
+            <a:pPr algn="l"/>
+            <a:r>
+              <a:rPr lang="en-US" sz="1200" b="0" dirty="0" smtClean="0">
+                <a:solidFill>
+                  <a:schemeClr val="tx1"/>
+                </a:solidFill>
+                <a:latin typeface="Book Antiqua" pitchFamily="18" charset="0"/>
+              </a:rPr>
+              <a:t>    static uint8_t </a:t>
+            </a:r>
+            <a:r>
+              <a:rPr lang="en-US" sz="1200" b="0" dirty="0" err="1" smtClean="0">
+                <a:solidFill>
+                  <a:schemeClr val="tx1"/>
+                </a:solidFill>
+                <a:latin typeface="Book Antiqua" pitchFamily="18" charset="0"/>
+              </a:rPr>
+              <a:t>reportDescriptor</a:t>
+            </a:r>
+            <a:r>
+              <a:rPr lang="en-US" sz="1200" b="0" dirty="0" smtClean="0">
+                <a:solidFill>
+                  <a:schemeClr val="tx1"/>
+                </a:solidFill>
+                <a:latin typeface="Book Antiqua" pitchFamily="18" charset="0"/>
+              </a:rPr>
+              <a:t>[] = {</a:t>
+            </a:r>
+          </a:p>
+          <a:p>
+            <a:pPr algn="l"/>
+            <a:r>
+              <a:rPr lang="en-US" sz="1200" b="0" dirty="0" smtClean="0">
+                <a:solidFill>
+                  <a:schemeClr val="tx1"/>
+                </a:solidFill>
+                <a:latin typeface="Book Antiqua" pitchFamily="18" charset="0"/>
+              </a:rPr>
+              <a:t>        0x06, LSB(0xFFAB), MSB(0xFFAB),</a:t>
+            </a:r>
+          </a:p>
+          <a:p>
+            <a:pPr algn="l"/>
+            <a:r>
+              <a:rPr lang="en-US" sz="1200" b="0" dirty="0" smtClean="0">
+                <a:solidFill>
+                  <a:schemeClr val="tx1"/>
+                </a:solidFill>
+                <a:latin typeface="Book Antiqua" pitchFamily="18" charset="0"/>
+              </a:rPr>
+              <a:t>        0x0A, LSB(0x0200), MSB(0x0200),</a:t>
+            </a:r>
+          </a:p>
+          <a:p>
+            <a:pPr algn="l"/>
+            <a:r>
+              <a:rPr lang="en-US" sz="1200" b="0" dirty="0" smtClean="0">
+                <a:solidFill>
+                  <a:schemeClr val="tx1"/>
+                </a:solidFill>
+                <a:latin typeface="Book Antiqua" pitchFamily="18" charset="0"/>
+              </a:rPr>
+              <a:t>        0xA1, 0x01,         	// Collection 0x01</a:t>
+            </a:r>
+          </a:p>
+          <a:p>
+            <a:pPr algn="l"/>
+            <a:endParaRPr lang="en-US" sz="1200" b="0" dirty="0" smtClean="0">
+              <a:solidFill>
+                <a:schemeClr val="tx1"/>
+              </a:solidFill>
+              <a:latin typeface="Book Antiqua" pitchFamily="18" charset="0"/>
+            </a:endParaRPr>
+          </a:p>
+          <a:p>
+            <a:pPr algn="l"/>
+            <a:r>
+              <a:rPr lang="en-US" sz="1200" b="0" dirty="0" smtClean="0"/>
+              <a:t>       // data are sent in packets containing input length bytes</a:t>
+            </a:r>
+            <a:endParaRPr lang="en-US" sz="1200" b="0" dirty="0" smtClean="0">
+              <a:solidFill>
+                <a:schemeClr val="tx1"/>
+              </a:solidFill>
+              <a:latin typeface="Book Antiqua" pitchFamily="18" charset="0"/>
+            </a:endParaRPr>
+          </a:p>
+          <a:p>
+            <a:pPr algn="l"/>
+            <a:r>
+              <a:rPr lang="en-US" sz="1200" b="0" dirty="0" smtClean="0">
+                <a:solidFill>
+                  <a:schemeClr val="tx1"/>
+                </a:solidFill>
+                <a:latin typeface="Book Antiqua" pitchFamily="18" charset="0"/>
+              </a:rPr>
+              <a:t>        0x75, 0x08,         	// report size = 8 bits</a:t>
+            </a:r>
+          </a:p>
+          <a:p>
+            <a:pPr algn="l"/>
+            <a:r>
+              <a:rPr lang="en-US" sz="1200" b="0" dirty="0" smtClean="0">
+                <a:solidFill>
+                  <a:schemeClr val="tx1"/>
+                </a:solidFill>
+                <a:latin typeface="Book Antiqua" pitchFamily="18" charset="0"/>
+              </a:rPr>
+              <a:t>        0x15, 0x00,         	// logical minimum = 0</a:t>
+            </a:r>
+          </a:p>
+          <a:p>
+            <a:pPr algn="l"/>
+            <a:r>
+              <a:rPr lang="en-US" sz="1200" b="0" dirty="0" smtClean="0">
+                <a:solidFill>
+                  <a:schemeClr val="tx1"/>
+                </a:solidFill>
+                <a:latin typeface="Book Antiqua" pitchFamily="18" charset="0"/>
+              </a:rPr>
+              <a:t>        0x26, 0xFF, 0x00,   	// logical maximum = 255</a:t>
+            </a:r>
+          </a:p>
+          <a:p>
+            <a:pPr algn="l"/>
+            <a:r>
+              <a:rPr lang="en-US" sz="1200" b="0" dirty="0" smtClean="0">
+                <a:solidFill>
+                  <a:schemeClr val="tx1"/>
+                </a:solidFill>
+                <a:latin typeface="Book Antiqua" pitchFamily="18" charset="0"/>
+              </a:rPr>
+              <a:t>        0x95, </a:t>
+            </a:r>
+            <a:r>
+              <a:rPr lang="en-US" sz="1200" b="0" dirty="0" err="1" smtClean="0">
+                <a:solidFill>
+                  <a:schemeClr val="tx1"/>
+                </a:solidFill>
+                <a:latin typeface="Book Antiqua" pitchFamily="18" charset="0"/>
+              </a:rPr>
+              <a:t>input_length</a:t>
+            </a:r>
+            <a:r>
+              <a:rPr lang="en-US" sz="1200" b="0" dirty="0" smtClean="0">
+                <a:solidFill>
+                  <a:schemeClr val="tx1"/>
+                </a:solidFill>
+                <a:latin typeface="Book Antiqua" pitchFamily="18" charset="0"/>
+              </a:rPr>
+              <a:t>,      // report count</a:t>
+            </a:r>
+          </a:p>
+          <a:p>
+            <a:pPr algn="l"/>
+            <a:r>
+              <a:rPr lang="en-US" sz="1200" b="0" dirty="0" smtClean="0">
+                <a:solidFill>
+                  <a:schemeClr val="tx1"/>
+                </a:solidFill>
+                <a:latin typeface="Book Antiqua" pitchFamily="18" charset="0"/>
+              </a:rPr>
+              <a:t>        0x09, 0x01,         	// usage</a:t>
+            </a:r>
+          </a:p>
+          <a:p>
+            <a:pPr algn="l"/>
+            <a:r>
+              <a:rPr lang="en-US" sz="1200" b="0" dirty="0" smtClean="0">
+                <a:solidFill>
+                  <a:schemeClr val="tx1"/>
+                </a:solidFill>
+                <a:latin typeface="Book Antiqua" pitchFamily="18" charset="0"/>
+              </a:rPr>
+              <a:t>        0x81, 0x02,         	// Input (array)</a:t>
+            </a:r>
+          </a:p>
+          <a:p>
+            <a:pPr algn="l"/>
+            <a:endParaRPr lang="en-US" sz="1200" b="0" dirty="0" smtClean="0">
+              <a:solidFill>
+                <a:schemeClr val="tx1"/>
+              </a:solidFill>
+              <a:latin typeface="Book Antiqua" pitchFamily="18" charset="0"/>
+            </a:endParaRPr>
+          </a:p>
+          <a:p>
+            <a:pPr algn="l"/>
+            <a:r>
+              <a:rPr lang="en-US" sz="1200" b="0" dirty="0" smtClean="0"/>
+              <a:t>       // data are sent in packets containing input length bytes</a:t>
+            </a:r>
+            <a:endParaRPr lang="en-US" sz="1200" b="0" dirty="0" smtClean="0">
+              <a:solidFill>
+                <a:schemeClr val="tx1"/>
+              </a:solidFill>
+              <a:latin typeface="Book Antiqua" pitchFamily="18" charset="0"/>
+            </a:endParaRPr>
+          </a:p>
+          <a:p>
+            <a:pPr algn="l"/>
+            <a:r>
+              <a:rPr lang="en-US" sz="1200" b="0" dirty="0" smtClean="0">
+                <a:solidFill>
+                  <a:schemeClr val="tx1"/>
+                </a:solidFill>
+                <a:latin typeface="Book Antiqua" pitchFamily="18" charset="0"/>
+              </a:rPr>
+              <a:t>        0x95, </a:t>
+            </a:r>
+            <a:r>
+              <a:rPr lang="en-US" sz="1200" b="0" dirty="0" err="1" smtClean="0">
+                <a:solidFill>
+                  <a:schemeClr val="tx1"/>
+                </a:solidFill>
+                <a:latin typeface="Book Antiqua" pitchFamily="18" charset="0"/>
+              </a:rPr>
+              <a:t>output_length</a:t>
+            </a:r>
+            <a:r>
+              <a:rPr lang="en-US" sz="1200" b="0" dirty="0" smtClean="0">
+                <a:solidFill>
+                  <a:schemeClr val="tx1"/>
+                </a:solidFill>
+                <a:latin typeface="Book Antiqua" pitchFamily="18" charset="0"/>
+              </a:rPr>
+              <a:t>,    // report count</a:t>
+            </a:r>
+          </a:p>
+          <a:p>
+            <a:pPr algn="l"/>
+            <a:r>
+              <a:rPr lang="en-US" sz="1200" b="0" dirty="0" smtClean="0">
+                <a:solidFill>
+                  <a:schemeClr val="tx1"/>
+                </a:solidFill>
+                <a:latin typeface="Book Antiqua" pitchFamily="18" charset="0"/>
+              </a:rPr>
+              <a:t>        0x09, 0x02,         	// usage</a:t>
+            </a:r>
+          </a:p>
+          <a:p>
+            <a:pPr algn="l"/>
+            <a:r>
+              <a:rPr lang="en-US" sz="1200" b="0" dirty="0" smtClean="0">
+                <a:solidFill>
+                  <a:schemeClr val="tx1"/>
+                </a:solidFill>
+                <a:latin typeface="Book Antiqua" pitchFamily="18" charset="0"/>
+              </a:rPr>
+              <a:t>        0x91, 0x02,         	// Output (array)</a:t>
+            </a:r>
+          </a:p>
+          <a:p>
+            <a:pPr algn="l"/>
+            <a:r>
+              <a:rPr lang="en-US" sz="1200" b="0" dirty="0" smtClean="0">
+                <a:solidFill>
+                  <a:schemeClr val="tx1"/>
+                </a:solidFill>
+                <a:latin typeface="Book Antiqua" pitchFamily="18" charset="0"/>
+              </a:rPr>
+              <a:t>        0xC0                	// end collection</a:t>
+            </a:r>
+          </a:p>
+          <a:p>
+            <a:pPr algn="l"/>
+            <a:endParaRPr lang="en-US" sz="1200" b="0" dirty="0" smtClean="0">
+              <a:solidFill>
+                <a:schemeClr val="tx1"/>
+              </a:solidFill>
+              <a:latin typeface="Book Antiqua" pitchFamily="18" charset="0"/>
+            </a:endParaRPr>
+          </a:p>
+          <a:p>
+            <a:pPr algn="l"/>
+            <a:r>
+              <a:rPr lang="en-US" sz="1200" b="0" dirty="0" smtClean="0">
+                <a:solidFill>
+                  <a:schemeClr val="tx1"/>
+                </a:solidFill>
+                <a:latin typeface="Book Antiqua" pitchFamily="18" charset="0"/>
+              </a:rPr>
+              <a:t>    };</a:t>
+            </a:r>
+          </a:p>
+          <a:p>
+            <a:pPr algn="l"/>
+            <a:r>
+              <a:rPr lang="en-US" sz="1200" b="0" dirty="0" smtClean="0">
+                <a:solidFill>
+                  <a:schemeClr val="tx1"/>
+                </a:solidFill>
+                <a:latin typeface="Book Antiqua" pitchFamily="18" charset="0"/>
+              </a:rPr>
+              <a:t>    </a:t>
+            </a:r>
+            <a:r>
+              <a:rPr lang="en-US" sz="1200" b="0" dirty="0" err="1" smtClean="0">
+                <a:solidFill>
+                  <a:schemeClr val="tx1"/>
+                </a:solidFill>
+                <a:latin typeface="Book Antiqua" pitchFamily="18" charset="0"/>
+              </a:rPr>
+              <a:t>reportLength</a:t>
+            </a:r>
+            <a:r>
+              <a:rPr lang="en-US" sz="1200" b="0" dirty="0" smtClean="0">
+                <a:solidFill>
+                  <a:schemeClr val="tx1"/>
+                </a:solidFill>
+                <a:latin typeface="Book Antiqua" pitchFamily="18" charset="0"/>
+              </a:rPr>
+              <a:t> = </a:t>
+            </a:r>
+            <a:r>
+              <a:rPr lang="en-US" sz="1200" b="0" dirty="0" err="1" smtClean="0">
+                <a:solidFill>
+                  <a:schemeClr val="tx1"/>
+                </a:solidFill>
+                <a:latin typeface="Book Antiqua" pitchFamily="18" charset="0"/>
+              </a:rPr>
+              <a:t>sizeof</a:t>
+            </a:r>
+            <a:r>
+              <a:rPr lang="en-US" sz="1200" b="0" dirty="0" smtClean="0">
+                <a:solidFill>
+                  <a:schemeClr val="tx1"/>
+                </a:solidFill>
+                <a:latin typeface="Book Antiqua" pitchFamily="18" charset="0"/>
+              </a:rPr>
+              <a:t>(</a:t>
+            </a:r>
+            <a:r>
+              <a:rPr lang="en-US" sz="1200" b="0" dirty="0" err="1" smtClean="0">
+                <a:solidFill>
+                  <a:schemeClr val="tx1"/>
+                </a:solidFill>
+                <a:latin typeface="Book Antiqua" pitchFamily="18" charset="0"/>
+              </a:rPr>
+              <a:t>reportDescriptor</a:t>
+            </a:r>
+            <a:r>
+              <a:rPr lang="en-US" sz="1200" b="0" dirty="0" smtClean="0">
+                <a:solidFill>
+                  <a:schemeClr val="tx1"/>
+                </a:solidFill>
+                <a:latin typeface="Book Antiqua" pitchFamily="18" charset="0"/>
+              </a:rPr>
+              <a:t>);</a:t>
+            </a:r>
+          </a:p>
+          <a:p>
+            <a:pPr algn="l"/>
+            <a:r>
+              <a:rPr lang="en-US" sz="1200" b="0" dirty="0" smtClean="0">
+                <a:solidFill>
+                  <a:schemeClr val="tx1"/>
+                </a:solidFill>
+                <a:latin typeface="Book Antiqua" pitchFamily="18" charset="0"/>
+              </a:rPr>
+              <a:t>    return </a:t>
+            </a:r>
+            <a:r>
+              <a:rPr lang="en-US" sz="1200" b="0" dirty="0" err="1" smtClean="0">
+                <a:solidFill>
+                  <a:schemeClr val="tx1"/>
+                </a:solidFill>
+                <a:latin typeface="Book Antiqua" pitchFamily="18" charset="0"/>
+              </a:rPr>
+              <a:t>reportDescriptor</a:t>
+            </a:r>
+            <a:r>
+              <a:rPr lang="en-US" sz="1200" b="0" dirty="0" smtClean="0">
+                <a:solidFill>
+                  <a:schemeClr val="tx1"/>
+                </a:solidFill>
+                <a:latin typeface="Book Antiqua" pitchFamily="18" charset="0"/>
+              </a:rPr>
+              <a:t>;</a:t>
+            </a:r>
+          </a:p>
+          <a:p>
+            <a:pPr algn="l"/>
+            <a:r>
+              <a:rPr lang="en-US" sz="1200" b="0" dirty="0" smtClean="0">
+                <a:solidFill>
+                  <a:schemeClr val="tx1"/>
+                </a:solidFill>
+                <a:latin typeface="Book Antiqua" pitchFamily="18" charset="0"/>
+              </a:rPr>
+              <a:t>}</a:t>
+            </a:r>
+            <a:endParaRPr lang="en-US" sz="1200" b="0" dirty="0">
+              <a:solidFill>
+                <a:schemeClr val="tx1"/>
+              </a:solidFill>
+              <a:latin typeface="Book Antiqua" pitchFamily="18" charset="0"/>
+            </a:endParaRPr>
+          </a:p>
+        </p:txBody>
+      </p:sp>
+      <p:sp>
+        <p:nvSpPr>
+          <p:cNvPr id="5" name="Espace réservé du contenu 2"/>
           <p:cNvSpPr>
             <a:spLocks noGrp="1"/>
           </p:cNvSpPr>
@@ -9332,8 +8728,8 @@
         </p:nvSpPr>
         <p:spPr>
           <a:xfrm>
-            <a:off x="217488" y="906463"/>
-            <a:ext cx="8775700" cy="1700103"/>
+            <a:off x="4778978" y="2430463"/>
+            <a:ext cx="4133795" cy="522944"/>
           </a:xfrm>
         </p:spPr>
         <p:txBody>
@@ -9342,81 +8738,19 @@
           <a:p>
             <a:r>
               <a:rPr lang="en-US" dirty="0" smtClean="0"/>
-              <a:t>Enable the </a:t>
-            </a:r>
-            <a:r>
-              <a:rPr lang="en-US" dirty="0" err="1" smtClean="0"/>
-              <a:t>mbed</a:t>
-            </a:r>
-            <a:r>
-              <a:rPr lang="en-US" dirty="0" smtClean="0"/>
-              <a:t> to:</a:t>
+              <a:t>Once a report defined:</a:t>
             </a:r>
           </a:p>
           <a:p>
             <a:pPr lvl="1"/>
             <a:r>
               <a:rPr lang="en-US" dirty="0" smtClean="0"/>
-              <a:t>Send and receive audio packets to or from a computer</a:t>
-            </a:r>
-          </a:p>
-          <a:p>
-            <a:pPr lvl="1"/>
-            <a:r>
-              <a:rPr lang="en-US" dirty="0" smtClean="0"/>
-              <a:t>Class requirements:</a:t>
-            </a:r>
-          </a:p>
-          <a:p>
-            <a:pPr lvl="2"/>
-            <a:r>
-              <a:rPr lang="en-US" dirty="0" smtClean="0"/>
-              <a:t>Isochronous IN endpoint to send audio packets</a:t>
-            </a:r>
-          </a:p>
-          <a:p>
-            <a:pPr lvl="2"/>
-            <a:r>
-              <a:rPr lang="en-US" dirty="0" smtClean="0"/>
-              <a:t>Isochronous OUT endpoint to receive audio packets</a:t>
-            </a:r>
-          </a:p>
-          <a:p>
-            <a:pPr lvl="2"/>
-            <a:r>
-              <a:rPr lang="en-US" dirty="0" smtClean="0"/>
-              <a:t>Format of data exchanged: PCM 16 bits signed</a:t>
+              <a:t>Data can be exchanged between computer and device by writing and reading the two interrupts endpoints</a:t>
             </a:r>
             <a:endParaRPr lang="en-US" dirty="0"/>
           </a:p>
         </p:txBody>
       </p:sp>
-      <p:pic>
-        <p:nvPicPr>
-          <p:cNvPr id="3074" name="Picture 2" descr="C:\Users\samux\Desktop\ARM-internship-report\report\audio_archi.jpg"/>
-          <p:cNvPicPr>
-            <a:picLocks noChangeAspect="1" noChangeArrowheads="1"/>
-          </p:cNvPicPr>
-          <p:nvPr/>
-        </p:nvPicPr>
-        <p:blipFill>
-          <a:blip r:embed="rId2"/>
-          <a:srcRect/>
-          <a:stretch>
-            <a:fillRect/>
-          </a:stretch>
-        </p:blipFill>
-        <p:spPr bwMode="auto">
-          <a:xfrm>
-            <a:off x="1091967" y="3328609"/>
-            <a:ext cx="6616065" cy="2711848"/>
-          </a:xfrm>
-          <a:prstGeom prst="rect">
-            <a:avLst/>
-          </a:prstGeom>
-          <a:noFill/>
-        </p:spPr>
-      </p:pic>
     </p:spTree>
   </p:cSld>
   <p:clrMapOvr>
@@ -9478,7 +8812,7 @@
         <p:spPr>
           <a:xfrm>
             <a:off x="217488" y="906463"/>
-            <a:ext cx="8775700" cy="2477868"/>
+            <a:ext cx="8775700" cy="1700103"/>
           </a:xfrm>
         </p:spPr>
         <p:txBody>
@@ -9487,101 +8821,58 @@
           <a:p>
             <a:r>
               <a:rPr lang="en-US" dirty="0" smtClean="0"/>
-              <a:t>Timing requirement:</a:t>
+              <a:t>Enable the </a:t>
+            </a:r>
+            <a:r>
+              <a:rPr lang="en-US" dirty="0" err="1" smtClean="0"/>
+              <a:t>mbed</a:t>
+            </a:r>
+            <a:r>
+              <a:rPr lang="en-US" dirty="0" smtClean="0"/>
+              <a:t> to:</a:t>
             </a:r>
           </a:p>
           <a:p>
             <a:pPr lvl="1"/>
             <a:r>
               <a:rPr lang="en-US" dirty="0" smtClean="0"/>
-              <a:t>Use of the Start of Frame event generated each millisecond</a:t>
+              <a:t>Send and receive audio packets to or from a computer</a:t>
             </a:r>
           </a:p>
           <a:p>
             <a:pPr lvl="1"/>
             <a:r>
               <a:rPr lang="en-US" dirty="0" smtClean="0"/>
-              <a:t>Example: reception of a 48kHz stereo stream</a:t>
+              <a:t>Class requirements:</a:t>
             </a:r>
           </a:p>
           <a:p>
             <a:pPr lvl="2"/>
             <a:r>
               <a:rPr lang="en-US" dirty="0" smtClean="0"/>
-              <a:t>Each sample is 16 bits (2 bytes) long: 48 * 2 bytes received for one channel each millisecond</a:t>
+              <a:t>Isochronous IN endpoint to send audio packets</a:t>
             </a:r>
           </a:p>
           <a:p>
             <a:pPr lvl="2"/>
             <a:r>
               <a:rPr lang="en-US" dirty="0" smtClean="0"/>
-              <a:t>For 2 channels, 48 * 2 * 2 bytes will be received each millisecond </a:t>
+              <a:t>Isochronous OUT endpoint to receive audio packets</a:t>
+            </a:r>
+          </a:p>
+          <a:p>
+            <a:pPr lvl="2"/>
+            <a:r>
+              <a:rPr lang="en-US" dirty="0" smtClean="0"/>
+              <a:t>Format of data exchanged: PCM 16 bits signed</a:t>
             </a:r>
             <a:endParaRPr lang="en-US" dirty="0"/>
-          </a:p>
-        </p:txBody>
-      </p:sp>
-      <p:sp>
-        <p:nvSpPr>
-          <p:cNvPr id="5" name="ZoneTexte 4"/>
-          <p:cNvSpPr txBox="1"/>
-          <p:nvPr/>
-        </p:nvSpPr>
-        <p:spPr>
-          <a:xfrm>
-            <a:off x="1250733" y="3386341"/>
-            <a:ext cx="6064468" cy="369332"/>
-          </a:xfrm>
-          <a:prstGeom prst="rect">
-            <a:avLst/>
-          </a:prstGeom>
-          <a:solidFill>
-            <a:schemeClr val="accent1">
-              <a:lumMod val="20000"/>
-              <a:lumOff val="80000"/>
-            </a:schemeClr>
-          </a:solidFill>
-        </p:spPr>
-        <p:txBody>
-          <a:bodyPr wrap="square" rtlCol="0">
-            <a:spAutoFit/>
-          </a:bodyPr>
-          <a:lstStyle/>
-          <a:p>
-            <a:r>
-              <a:rPr lang="en-US" sz="1800" dirty="0" smtClean="0">
-                <a:latin typeface="Arial" pitchFamily="34" charset="0"/>
-                <a:cs typeface="Arial" pitchFamily="34" charset="0"/>
-              </a:rPr>
-              <a:t>AUDIO LENGTH PACKET = (FREQ / 500) * </a:t>
-            </a:r>
-            <a:r>
-              <a:rPr lang="en-US" sz="1800" dirty="0" err="1" smtClean="0">
-                <a:latin typeface="Arial" pitchFamily="34" charset="0"/>
-                <a:cs typeface="Arial" pitchFamily="34" charset="0"/>
-              </a:rPr>
-              <a:t>nb</a:t>
-            </a:r>
-            <a:r>
-              <a:rPr lang="en-US" sz="1800" dirty="0" smtClean="0">
-                <a:latin typeface="Arial" pitchFamily="34" charset="0"/>
-                <a:cs typeface="Arial" pitchFamily="34" charset="0"/>
-              </a:rPr>
-              <a:t> channel</a:t>
-            </a:r>
-            <a:endParaRPr lang="en-US" sz="1800" b="0" dirty="0">
-              <a:solidFill>
-                <a:schemeClr val="tx1"/>
-              </a:solidFill>
-              <a:latin typeface="Arial" pitchFamily="34" charset="0"/>
-              <a:cs typeface="Arial" pitchFamily="34" charset="0"/>
-            </a:endParaRPr>
           </a:p>
         </p:txBody>
       </p:sp>
       <p:pic>
         <p:nvPicPr>
-          <p:cNvPr id="2050" name="Picture 2" descr="C:\Users\samux\Desktop\ARM-internship-report\report\pcm_stereo.jpg"/>
+          <p:cNvPr id="3074" name="Picture 2" descr="C:\Users\samux\Desktop\ARM-internship-report\report\audio_archi.jpg"/>
           <p:cNvPicPr>
             <a:picLocks noChangeAspect="1" noChangeArrowheads="1"/>
           </p:cNvPicPr>
@@ -9596,8 +8887,8 @@
         </p:blipFill>
         <p:spPr bwMode="auto">
           <a:xfrm>
-            <a:off x="954535" y="4152415"/>
-            <a:ext cx="6877051" cy="1752600"/>
+            <a:off x="1091967" y="3328609"/>
+            <a:ext cx="6616065" cy="2711848"/>
           </a:xfrm>
           <a:prstGeom prst="rect">
             <a:avLst/>
@@ -9666,7 +8957,7 @@
         <p:spPr>
           <a:xfrm>
             <a:off x="217488" y="906463"/>
-            <a:ext cx="8775700" cy="2067965"/>
+            <a:ext cx="8775700" cy="2477868"/>
           </a:xfrm>
         </p:spPr>
         <p:txBody>
@@ -9675,35 +8966,35 @@
           <a:p>
             <a:r>
               <a:rPr lang="en-US" dirty="0" smtClean="0"/>
-              <a:t>Implementation:</a:t>
+              <a:t>Timing requirement:</a:t>
             </a:r>
           </a:p>
           <a:p>
             <a:pPr lvl="1"/>
             <a:r>
               <a:rPr lang="en-US" dirty="0" smtClean="0"/>
-              <a:t>If a user wants to read an audio packet:</a:t>
+              <a:t>Use of the Start of Frame event generated each millisecond</a:t>
+            </a:r>
+          </a:p>
+          <a:p>
+            <a:pPr lvl="1"/>
+            <a:r>
+              <a:rPr lang="en-US" dirty="0" smtClean="0"/>
+              <a:t>Example: reception of a 48kHz stereo stream</a:t>
             </a:r>
           </a:p>
           <a:p>
             <a:pPr lvl="2"/>
             <a:r>
               <a:rPr lang="en-US" dirty="0" smtClean="0"/>
-              <a:t>Try to read the OUT isochronous endpoint on a SOF event</a:t>
-            </a:r>
-          </a:p>
-          <a:p>
-            <a:pPr lvl="1"/>
-            <a:r>
-              <a:rPr lang="en-US" dirty="0" smtClean="0"/>
-              <a:t>If a user wants to send an audio packet:</a:t>
+              <a:t>Each sample is 16 bits (2 bytes) long: 48 * 2 bytes received for one channel each millisecond</a:t>
             </a:r>
           </a:p>
           <a:p>
             <a:pPr lvl="2"/>
             <a:r>
               <a:rPr lang="en-US" dirty="0" smtClean="0"/>
-              <a:t>Write it on the IN isochronous endpoint on a SOF event</a:t>
+              <a:t>For 2 channels, 48 * 2 * 2 bytes will be received each millisecond </a:t>
             </a:r>
             <a:endParaRPr lang="en-US" dirty="0"/>
           </a:p>
@@ -9711,122 +9002,88 @@
       </p:sp>
       <p:sp>
         <p:nvSpPr>
-          <p:cNvPr id="4" name="Espace réservé du contenu 2"/>
-          <p:cNvSpPr txBox="1">
-            <a:spLocks/>
-          </p:cNvSpPr>
+          <p:cNvPr id="5" name="ZoneTexte 4"/>
+          <p:cNvSpPr txBox="1"/>
           <p:nvPr/>
         </p:nvSpPr>
+        <p:spPr>
+          <a:xfrm>
+            <a:off x="1250733" y="3386341"/>
+            <a:ext cx="6064468" cy="369332"/>
+          </a:xfrm>
+          <a:prstGeom prst="rect">
+            <a:avLst/>
+          </a:prstGeom>
+          <a:solidFill>
+            <a:schemeClr val="accent1">
+              <a:lumMod val="20000"/>
+              <a:lumOff val="80000"/>
+            </a:schemeClr>
+          </a:solidFill>
+        </p:spPr>
+        <p:txBody>
+          <a:bodyPr wrap="square" rtlCol="0">
+            <a:spAutoFit/>
+          </a:bodyPr>
+          <a:lstStyle/>
+          <a:p>
+            <a:r>
+              <a:rPr lang="en-US" sz="1800" dirty="0" smtClean="0">
+                <a:latin typeface="Arial" pitchFamily="34" charset="0"/>
+                <a:cs typeface="Arial" pitchFamily="34" charset="0"/>
+              </a:rPr>
+              <a:t>AUDIO LENGTH PACKET = (FREQ / 500) * </a:t>
+            </a:r>
+            <a:r>
+              <a:rPr lang="en-US" sz="1800" dirty="0" err="1" smtClean="0">
+                <a:latin typeface="Arial" pitchFamily="34" charset="0"/>
+                <a:cs typeface="Arial" pitchFamily="34" charset="0"/>
+              </a:rPr>
+              <a:t>nb</a:t>
+            </a:r>
+            <a:r>
+              <a:rPr lang="en-US" sz="1800" dirty="0" smtClean="0">
+                <a:latin typeface="Arial" pitchFamily="34" charset="0"/>
+                <a:cs typeface="Arial" pitchFamily="34" charset="0"/>
+              </a:rPr>
+              <a:t> channel</a:t>
+            </a:r>
+            <a:endParaRPr lang="en-US" sz="1800" b="0" dirty="0">
+              <a:solidFill>
+                <a:schemeClr val="tx1"/>
+              </a:solidFill>
+              <a:latin typeface="Arial" pitchFamily="34" charset="0"/>
+              <a:cs typeface="Arial" pitchFamily="34" charset="0"/>
+            </a:endParaRPr>
+          </a:p>
+        </p:txBody>
+      </p:sp>
+      <p:pic>
+        <p:nvPicPr>
+          <p:cNvPr id="2050" name="Picture 2" descr="C:\Users\samux\Desktop\ARM-internship-report\report\pcm_stereo.jpg"/>
+          <p:cNvPicPr>
+            <a:picLocks noChangeAspect="1" noChangeArrowheads="1"/>
+          </p:cNvPicPr>
+          <p:nvPr/>
+        </p:nvPicPr>
+        <p:blipFill>
+          <a:blip r:embed="rId2"/>
+          <a:srcRect/>
+          <a:stretch>
+            <a:fillRect/>
+          </a:stretch>
+        </p:blipFill>
         <p:spPr bwMode="auto">
           <a:xfrm>
-            <a:off x="158093" y="3917676"/>
-            <a:ext cx="8775700" cy="1700103"/>
+            <a:off x="954535" y="4152415"/>
+            <a:ext cx="6877051" cy="1752600"/>
           </a:xfrm>
           <a:prstGeom prst="rect">
             <a:avLst/>
           </a:prstGeom>
           <a:noFill/>
-          <a:ln w="9525">
-            <a:noFill/>
-            <a:miter lim="800000"/>
-            <a:headEnd/>
-            <a:tailEnd/>
-          </a:ln>
-          <a:effectLst/>
         </p:spPr>
-        <p:txBody>
-          <a:bodyPr vert="horz" wrap="square" lIns="91440" tIns="45720" rIns="91440" bIns="45720" numCol="1" anchor="t" anchorCtr="0" compatLnSpc="1">
-            <a:prstTxWarp prst="textNoShape">
-              <a:avLst/>
-            </a:prstTxWarp>
-          </a:bodyPr>
-          <a:lstStyle/>
-          <a:p>
-            <a:pPr marL="265113" marR="0" lvl="0" indent="-265113" algn="l" defTabSz="914400" rtl="0" eaLnBrk="1" fontAlgn="ctr" latinLnBrk="0" hangingPunct="1">
-              <a:lnSpc>
-                <a:spcPct val="100000"/>
-              </a:lnSpc>
-              <a:spcBef>
-                <a:spcPct val="25000"/>
-              </a:spcBef>
-              <a:spcAft>
-                <a:spcPct val="0"/>
-              </a:spcAft>
-              <a:buClr>
-                <a:schemeClr val="accent1"/>
-              </a:buClr>
-              <a:buSzPct val="125000"/>
-              <a:buFont typeface="Wingdings" pitchFamily="2" charset="2"/>
-              <a:buChar char="§"/>
-              <a:tabLst/>
-              <a:defRPr/>
-            </a:pPr>
-            <a:r>
-              <a:rPr kumimoji="0" lang="en-US" sz="2400" b="0" i="0" u="none" strike="noStrike" kern="0" cap="none" spc="0" normalizeH="0" baseline="0" noProof="0" dirty="0" smtClean="0">
-                <a:ln>
-                  <a:noFill/>
-                </a:ln>
-                <a:solidFill>
-                  <a:srgbClr val="000000"/>
-                </a:solidFill>
-                <a:effectLst/>
-                <a:uLnTx/>
-                <a:uFillTx/>
-                <a:latin typeface="+mn-lt"/>
-                <a:ea typeface="+mn-ea"/>
-                <a:cs typeface="+mn-cs"/>
-              </a:rPr>
-              <a:t>TODO:</a:t>
-            </a:r>
-            <a:r>
-              <a:rPr kumimoji="0" lang="en-US" sz="2400" b="0" i="0" u="none" strike="noStrike" kern="0" cap="none" spc="0" normalizeH="0" noProof="0" dirty="0" smtClean="0">
-                <a:ln>
-                  <a:noFill/>
-                </a:ln>
-                <a:solidFill>
-                  <a:srgbClr val="000000"/>
-                </a:solidFill>
-                <a:effectLst/>
-                <a:uLnTx/>
-                <a:uFillTx/>
-                <a:latin typeface="+mn-lt"/>
-                <a:ea typeface="+mn-ea"/>
-                <a:cs typeface="+mn-cs"/>
-              </a:rPr>
-              <a:t> put photo of I2S and microphone on </a:t>
-            </a:r>
-            <a:r>
-              <a:rPr kumimoji="0" lang="en-US" sz="2400" b="0" i="0" u="none" strike="noStrike" kern="0" cap="none" spc="0" normalizeH="0" noProof="0" dirty="0" err="1" smtClean="0">
-                <a:ln>
-                  <a:noFill/>
-                </a:ln>
-                <a:solidFill>
-                  <a:srgbClr val="000000"/>
-                </a:solidFill>
-                <a:effectLst/>
-                <a:uLnTx/>
-                <a:uFillTx/>
-                <a:latin typeface="+mn-lt"/>
-                <a:ea typeface="+mn-ea"/>
-                <a:cs typeface="+mn-cs"/>
-              </a:rPr>
-              <a:t>mbed</a:t>
-            </a:r>
-            <a:endParaRPr kumimoji="0" lang="en-US" sz="2000" b="0" i="0" u="none" strike="noStrike" kern="0" cap="none" spc="0" normalizeH="0" baseline="0" noProof="0" dirty="0">
-              <a:ln>
-                <a:noFill/>
-              </a:ln>
-              <a:solidFill>
-                <a:srgbClr val="000000"/>
-              </a:solidFill>
-              <a:effectLst/>
-              <a:uLnTx/>
-              <a:uFillTx/>
-              <a:latin typeface="+mn-lt"/>
-            </a:endParaRPr>
-          </a:p>
-        </p:txBody>
-      </p:sp>
+      </p:pic>
     </p:spTree>
   </p:cSld>
   <p:clrMapOvr>
@@ -10611,7 +9868,518 @@
 </p:sld>
 </file>
 
+<file path=ppt/slides/slide30.xml><?xml version="1.0" encoding="utf-8"?>
+<p:sld xmlns:a="http://schemas.openxmlformats.org/drawingml/2006/main" xmlns:r="http://schemas.openxmlformats.org/officeDocument/2006/relationships" xmlns:p="http://schemas.openxmlformats.org/presentationml/2006/main">
+  <p:cSld>
+    <p:spTree>
+      <p:nvGrpSpPr>
+        <p:cNvPr id="1" name=""/>
+        <p:cNvGrpSpPr/>
+        <p:nvPr/>
+      </p:nvGrpSpPr>
+      <p:grpSpPr>
+        <a:xfrm>
+          <a:off x="0" y="0"/>
+          <a:ext cx="0" cy="0"/>
+          <a:chOff x="0" y="0"/>
+          <a:chExt cx="0" cy="0"/>
+        </a:xfrm>
+      </p:grpSpPr>
+      <p:sp>
+        <p:nvSpPr>
+          <p:cNvPr id="2" name="Titre 1"/>
+          <p:cNvSpPr>
+            <a:spLocks noGrp="1"/>
+          </p:cNvSpPr>
+          <p:nvPr>
+            <p:ph type="title"/>
+          </p:nvPr>
+        </p:nvSpPr>
+        <p:spPr/>
+        <p:txBody>
+          <a:bodyPr/>
+          <a:lstStyle/>
+          <a:p>
+            <a:r>
+              <a:rPr lang="en-US" dirty="0" smtClean="0"/>
+              <a:t>USB Device: USB Audio</a:t>
+            </a:r>
+            <a:endParaRPr lang="en-US" dirty="0"/>
+          </a:p>
+        </p:txBody>
+      </p:sp>
+      <p:sp>
+        <p:nvSpPr>
+          <p:cNvPr id="3" name="Espace réservé du contenu 2"/>
+          <p:cNvSpPr>
+            <a:spLocks noGrp="1"/>
+          </p:cNvSpPr>
+          <p:nvPr>
+            <p:ph idx="1"/>
+          </p:nvPr>
+        </p:nvSpPr>
+        <p:spPr>
+          <a:xfrm>
+            <a:off x="217488" y="906463"/>
+            <a:ext cx="8775700" cy="2067965"/>
+          </a:xfrm>
+        </p:spPr>
+        <p:txBody>
+          <a:bodyPr/>
+          <a:lstStyle/>
+          <a:p>
+            <a:r>
+              <a:rPr lang="en-US" dirty="0" smtClean="0"/>
+              <a:t>Implementation:</a:t>
+            </a:r>
+          </a:p>
+          <a:p>
+            <a:pPr lvl="1"/>
+            <a:r>
+              <a:rPr lang="en-US" dirty="0" smtClean="0"/>
+              <a:t>If a user wants to read an audio packet:</a:t>
+            </a:r>
+          </a:p>
+          <a:p>
+            <a:pPr lvl="2"/>
+            <a:r>
+              <a:rPr lang="en-US" dirty="0" smtClean="0"/>
+              <a:t>Try to read the OUT isochronous endpoint on a SOF event</a:t>
+            </a:r>
+          </a:p>
+          <a:p>
+            <a:pPr lvl="1"/>
+            <a:r>
+              <a:rPr lang="en-US" dirty="0" smtClean="0"/>
+              <a:t>If a user wants to send an audio packet:</a:t>
+            </a:r>
+          </a:p>
+          <a:p>
+            <a:pPr lvl="2"/>
+            <a:r>
+              <a:rPr lang="en-US" dirty="0" smtClean="0"/>
+              <a:t>Write it on the IN isochronous endpoint on a SOF event</a:t>
+            </a:r>
+            <a:endParaRPr lang="en-US" dirty="0"/>
+          </a:p>
+        </p:txBody>
+      </p:sp>
+      <p:sp>
+        <p:nvSpPr>
+          <p:cNvPr id="4" name="Espace réservé du contenu 2"/>
+          <p:cNvSpPr txBox="1">
+            <a:spLocks/>
+          </p:cNvSpPr>
+          <p:nvPr/>
+        </p:nvSpPr>
+        <p:spPr bwMode="auto">
+          <a:xfrm>
+            <a:off x="158093" y="3917676"/>
+            <a:ext cx="8775700" cy="1700103"/>
+          </a:xfrm>
+          <a:prstGeom prst="rect">
+            <a:avLst/>
+          </a:prstGeom>
+          <a:noFill/>
+          <a:ln w="9525">
+            <a:noFill/>
+            <a:miter lim="800000"/>
+            <a:headEnd/>
+            <a:tailEnd/>
+          </a:ln>
+          <a:effectLst/>
+        </p:spPr>
+        <p:txBody>
+          <a:bodyPr vert="horz" wrap="square" lIns="91440" tIns="45720" rIns="91440" bIns="45720" numCol="1" anchor="t" anchorCtr="0" compatLnSpc="1">
+            <a:prstTxWarp prst="textNoShape">
+              <a:avLst/>
+            </a:prstTxWarp>
+          </a:bodyPr>
+          <a:lstStyle/>
+          <a:p>
+            <a:pPr marL="265113" marR="0" lvl="0" indent="-265113" algn="l" defTabSz="914400" rtl="0" eaLnBrk="1" fontAlgn="ctr" latinLnBrk="0" hangingPunct="1">
+              <a:lnSpc>
+                <a:spcPct val="100000"/>
+              </a:lnSpc>
+              <a:spcBef>
+                <a:spcPct val="25000"/>
+              </a:spcBef>
+              <a:spcAft>
+                <a:spcPct val="0"/>
+              </a:spcAft>
+              <a:buClr>
+                <a:schemeClr val="accent1"/>
+              </a:buClr>
+              <a:buSzPct val="125000"/>
+              <a:buFont typeface="Wingdings" pitchFamily="2" charset="2"/>
+              <a:buChar char="§"/>
+              <a:tabLst/>
+              <a:defRPr/>
+            </a:pPr>
+            <a:r>
+              <a:rPr kumimoji="0" lang="en-US" sz="2400" b="0" i="0" u="none" strike="noStrike" kern="0" cap="none" spc="0" normalizeH="0" baseline="0" noProof="0" dirty="0" smtClean="0">
+                <a:ln>
+                  <a:noFill/>
+                </a:ln>
+                <a:solidFill>
+                  <a:srgbClr val="000000"/>
+                </a:solidFill>
+                <a:effectLst/>
+                <a:uLnTx/>
+                <a:uFillTx/>
+                <a:latin typeface="+mn-lt"/>
+                <a:ea typeface="+mn-ea"/>
+                <a:cs typeface="+mn-cs"/>
+              </a:rPr>
+              <a:t>TODO:</a:t>
+            </a:r>
+            <a:r>
+              <a:rPr kumimoji="0" lang="en-US" sz="2400" b="0" i="0" u="none" strike="noStrike" kern="0" cap="none" spc="0" normalizeH="0" noProof="0" dirty="0" smtClean="0">
+                <a:ln>
+                  <a:noFill/>
+                </a:ln>
+                <a:solidFill>
+                  <a:srgbClr val="000000"/>
+                </a:solidFill>
+                <a:effectLst/>
+                <a:uLnTx/>
+                <a:uFillTx/>
+                <a:latin typeface="+mn-lt"/>
+                <a:ea typeface="+mn-ea"/>
+                <a:cs typeface="+mn-cs"/>
+              </a:rPr>
+              <a:t> put photo of I2S and microphone on </a:t>
+            </a:r>
+            <a:r>
+              <a:rPr kumimoji="0" lang="en-US" sz="2400" b="0" i="0" u="none" strike="noStrike" kern="0" cap="none" spc="0" normalizeH="0" noProof="0" dirty="0" err="1" smtClean="0">
+                <a:ln>
+                  <a:noFill/>
+                </a:ln>
+                <a:solidFill>
+                  <a:srgbClr val="000000"/>
+                </a:solidFill>
+                <a:effectLst/>
+                <a:uLnTx/>
+                <a:uFillTx/>
+                <a:latin typeface="+mn-lt"/>
+                <a:ea typeface="+mn-ea"/>
+                <a:cs typeface="+mn-cs"/>
+              </a:rPr>
+              <a:t>mbed</a:t>
+            </a:r>
+            <a:endParaRPr kumimoji="0" lang="en-US" sz="2000" b="0" i="0" u="none" strike="noStrike" kern="0" cap="none" spc="0" normalizeH="0" baseline="0" noProof="0" dirty="0">
+              <a:ln>
+                <a:noFill/>
+              </a:ln>
+              <a:solidFill>
+                <a:srgbClr val="000000"/>
+              </a:solidFill>
+              <a:effectLst/>
+              <a:uLnTx/>
+              <a:uFillTx/>
+              <a:latin typeface="+mn-lt"/>
+            </a:endParaRPr>
+          </a:p>
+        </p:txBody>
+      </p:sp>
+    </p:spTree>
+  </p:cSld>
+  <p:clrMapOvr>
+    <a:masterClrMapping/>
+  </p:clrMapOvr>
+</p:sld>
+</file>
+
+<file path=ppt/slides/slide31.xml><?xml version="1.0" encoding="utf-8"?>
+<p:sld xmlns:a="http://schemas.openxmlformats.org/drawingml/2006/main" xmlns:r="http://schemas.openxmlformats.org/officeDocument/2006/relationships" xmlns:p="http://schemas.openxmlformats.org/presentationml/2006/main">
+  <p:cSld>
+    <p:spTree>
+      <p:nvGrpSpPr>
+        <p:cNvPr id="1" name=""/>
+        <p:cNvGrpSpPr/>
+        <p:nvPr/>
+      </p:nvGrpSpPr>
+      <p:grpSpPr>
+        <a:xfrm>
+          <a:off x="0" y="0"/>
+          <a:ext cx="0" cy="0"/>
+          <a:chOff x="0" y="0"/>
+          <a:chExt cx="0" cy="0"/>
+        </a:xfrm>
+      </p:grpSpPr>
+      <p:sp>
+        <p:nvSpPr>
+          <p:cNvPr id="2" name="Titre 1"/>
+          <p:cNvSpPr>
+            <a:spLocks noGrp="1"/>
+          </p:cNvSpPr>
+          <p:nvPr>
+            <p:ph type="title"/>
+          </p:nvPr>
+        </p:nvSpPr>
+        <p:spPr/>
+        <p:txBody>
+          <a:bodyPr/>
+          <a:lstStyle/>
+          <a:p>
+            <a:r>
+              <a:rPr lang="en-US" dirty="0" smtClean="0"/>
+              <a:t>Conclusion</a:t>
+            </a:r>
+            <a:endParaRPr lang="en-US" dirty="0"/>
+          </a:p>
+        </p:txBody>
+      </p:sp>
+      <p:sp>
+        <p:nvSpPr>
+          <p:cNvPr id="3" name="Espace réservé du contenu 2"/>
+          <p:cNvSpPr>
+            <a:spLocks noGrp="1"/>
+          </p:cNvSpPr>
+          <p:nvPr>
+            <p:ph idx="1"/>
+          </p:nvPr>
+        </p:nvSpPr>
+        <p:spPr/>
+        <p:txBody>
+          <a:bodyPr/>
+          <a:lstStyle/>
+          <a:p>
+            <a:r>
+              <a:rPr lang="en-US" dirty="0" smtClean="0"/>
+              <a:t>Internet Of Things:</a:t>
+            </a:r>
+          </a:p>
+          <a:p>
+            <a:pPr lvl="1"/>
+            <a:r>
+              <a:rPr lang="en-US" dirty="0" smtClean="0"/>
+              <a:t>Introduction of a new HTML5 feature on embedded systems</a:t>
+            </a:r>
+          </a:p>
+          <a:p>
+            <a:pPr lvl="1"/>
+            <a:r>
+              <a:rPr lang="en-US" dirty="0" smtClean="0"/>
+              <a:t>Connection of sensors to the cloud:</a:t>
+            </a:r>
+          </a:p>
+          <a:p>
+            <a:pPr lvl="2"/>
+            <a:r>
+              <a:rPr lang="en-US" dirty="0" smtClean="0"/>
+              <a:t>First prototypes</a:t>
+            </a:r>
+          </a:p>
+          <a:p>
+            <a:pPr lvl="2"/>
+            <a:r>
+              <a:rPr lang="en-US" dirty="0" smtClean="0"/>
+              <a:t>Basis for some potential IOT applications</a:t>
+            </a:r>
+          </a:p>
+          <a:p>
+            <a:pPr lvl="1"/>
+            <a:endParaRPr lang="en-US" dirty="0" smtClean="0"/>
+          </a:p>
+          <a:p>
+            <a:r>
+              <a:rPr lang="en-US" dirty="0" err="1" smtClean="0"/>
+              <a:t>Mbed</a:t>
+            </a:r>
+            <a:r>
+              <a:rPr lang="en-US" dirty="0" smtClean="0"/>
+              <a:t> as a USB device:</a:t>
+            </a:r>
+          </a:p>
+          <a:p>
+            <a:pPr lvl="1"/>
+            <a:r>
+              <a:rPr lang="en-US" dirty="0" smtClean="0"/>
+              <a:t>HID: generic HID, mouse, keyboard</a:t>
+            </a:r>
+          </a:p>
+          <a:p>
+            <a:pPr lvl="1"/>
+            <a:r>
+              <a:rPr lang="en-US" dirty="0" smtClean="0"/>
+              <a:t>Virtual </a:t>
+            </a:r>
+            <a:r>
+              <a:rPr lang="en-US" dirty="0" smtClean="0"/>
+              <a:t>s</a:t>
+            </a:r>
+            <a:r>
+              <a:rPr lang="en-US" dirty="0" smtClean="0"/>
+              <a:t>erial port</a:t>
+            </a:r>
+          </a:p>
+          <a:p>
+            <a:pPr lvl="1"/>
+            <a:r>
+              <a:rPr lang="en-US" dirty="0" smtClean="0"/>
+              <a:t>Mass Storage Device</a:t>
+            </a:r>
+          </a:p>
+          <a:p>
+            <a:pPr lvl="1"/>
+            <a:r>
+              <a:rPr lang="en-US" dirty="0" smtClean="0"/>
+              <a:t>Audio</a:t>
+            </a:r>
+          </a:p>
+          <a:p>
+            <a:pPr lvl="1"/>
+            <a:r>
+              <a:rPr lang="en-US" dirty="0" smtClean="0"/>
+              <a:t>MIDI</a:t>
+            </a:r>
+          </a:p>
+          <a:p>
+            <a:pPr lvl="1"/>
+            <a:endParaRPr lang="en-US" dirty="0" smtClean="0"/>
+          </a:p>
+          <a:p>
+            <a:pPr lvl="1"/>
+            <a:endParaRPr lang="en-US" dirty="0" smtClean="0"/>
+          </a:p>
+          <a:p>
+            <a:pPr lvl="1"/>
+            <a:endParaRPr lang="en-US" dirty="0"/>
+          </a:p>
+        </p:txBody>
+      </p:sp>
+    </p:spTree>
+  </p:cSld>
+  <p:clrMapOvr>
+    <a:masterClrMapping/>
+  </p:clrMapOvr>
+</p:sld>
+</file>
+
+<file path=ppt/slides/slide32.xml><?xml version="1.0" encoding="utf-8"?>
+<p:sld xmlns:a="http://schemas.openxmlformats.org/drawingml/2006/main" xmlns:r="http://schemas.openxmlformats.org/officeDocument/2006/relationships" xmlns:p="http://schemas.openxmlformats.org/presentationml/2006/main">
+  <p:cSld>
+    <p:spTree>
+      <p:nvGrpSpPr>
+        <p:cNvPr id="1" name=""/>
+        <p:cNvGrpSpPr/>
+        <p:nvPr/>
+      </p:nvGrpSpPr>
+      <p:grpSpPr>
+        <a:xfrm>
+          <a:off x="0" y="0"/>
+          <a:ext cx="0" cy="0"/>
+          <a:chOff x="0" y="0"/>
+          <a:chExt cx="0" cy="0"/>
+        </a:xfrm>
+      </p:grpSpPr>
+      <p:sp>
+        <p:nvSpPr>
+          <p:cNvPr id="2" name="Titre 1"/>
+          <p:cNvSpPr>
+            <a:spLocks noGrp="1"/>
+          </p:cNvSpPr>
+          <p:nvPr>
+            <p:ph type="title"/>
+          </p:nvPr>
+        </p:nvSpPr>
+        <p:spPr>
+          <a:xfrm>
+            <a:off x="185957" y="2646035"/>
+            <a:ext cx="8777287" cy="838200"/>
+          </a:xfrm>
+        </p:spPr>
+        <p:txBody>
+          <a:bodyPr/>
+          <a:lstStyle/>
+          <a:p>
+            <a:pPr algn="ctr"/>
+            <a:r>
+              <a:rPr lang="en-US" dirty="0" smtClean="0"/>
+              <a:t>Thanks!</a:t>
+            </a:r>
+            <a:br>
+              <a:rPr lang="en-US" dirty="0" smtClean="0"/>
+            </a:br>
+            <a:r>
+              <a:rPr lang="en-US" dirty="0" smtClean="0"/>
+              <a:t/>
+            </a:r>
+            <a:br>
+              <a:rPr lang="en-US" dirty="0" smtClean="0"/>
+            </a:br>
+            <a:r>
+              <a:rPr lang="en-US" dirty="0" smtClean="0"/>
+              <a:t>Questions ?</a:t>
+            </a:r>
+            <a:endParaRPr lang="en-US" dirty="0"/>
+          </a:p>
+        </p:txBody>
+      </p:sp>
+    </p:spTree>
+  </p:cSld>
+  <p:clrMapOvr>
+    <a:masterClrMapping/>
+  </p:clrMapOvr>
+</p:sld>
+</file>
+
 <file path=ppt/slides/slide4.xml><?xml version="1.0" encoding="utf-8"?>
+<p:sld xmlns:a="http://schemas.openxmlformats.org/drawingml/2006/main" xmlns:r="http://schemas.openxmlformats.org/officeDocument/2006/relationships" xmlns:p="http://schemas.openxmlformats.org/presentationml/2006/main">
+  <p:cSld>
+    <p:spTree>
+      <p:nvGrpSpPr>
+        <p:cNvPr id="1" name=""/>
+        <p:cNvGrpSpPr/>
+        <p:nvPr/>
+      </p:nvGrpSpPr>
+      <p:grpSpPr>
+        <a:xfrm>
+          <a:off x="0" y="0"/>
+          <a:ext cx="0" cy="0"/>
+          <a:chOff x="0" y="0"/>
+          <a:chExt cx="0" cy="0"/>
+        </a:xfrm>
+      </p:grpSpPr>
+      <p:sp>
+        <p:nvSpPr>
+          <p:cNvPr id="2" name="Titre 1"/>
+          <p:cNvSpPr>
+            <a:spLocks noGrp="1"/>
+          </p:cNvSpPr>
+          <p:nvPr>
+            <p:ph type="title"/>
+          </p:nvPr>
+        </p:nvSpPr>
+        <p:spPr>
+          <a:xfrm>
+            <a:off x="177533" y="2782677"/>
+            <a:ext cx="8777287" cy="838200"/>
+          </a:xfrm>
+        </p:spPr>
+        <p:txBody>
+          <a:bodyPr/>
+          <a:lstStyle/>
+          <a:p>
+            <a:pPr algn="ctr"/>
+            <a:r>
+              <a:rPr lang="en-US" dirty="0" smtClean="0"/>
+              <a:t>Internet Of Things</a:t>
+            </a:r>
+            <a:endParaRPr lang="en-US" dirty="0"/>
+          </a:p>
+        </p:txBody>
+      </p:sp>
+    </p:spTree>
+  </p:cSld>
+  <p:clrMapOvr>
+    <a:masterClrMapping/>
+  </p:clrMapOvr>
+</p:sld>
+</file>
+
+<file path=ppt/slides/slide5.xml><?xml version="1.0" encoding="utf-8"?>
 <p:sld xmlns:a="http://schemas.openxmlformats.org/drawingml/2006/main" xmlns:r="http://schemas.openxmlformats.org/officeDocument/2006/relationships" xmlns:p="http://schemas.openxmlformats.org/presentationml/2006/main">
   <p:cSld>
     <p:spTree>
@@ -10957,207 +10725,6 @@
 </p:sld>
 </file>
 
-<file path=ppt/slides/slide5.xml><?xml version="1.0" encoding="utf-8"?>
-<p:sld xmlns:a="http://schemas.openxmlformats.org/drawingml/2006/main" xmlns:r="http://schemas.openxmlformats.org/officeDocument/2006/relationships" xmlns:p="http://schemas.openxmlformats.org/presentationml/2006/main">
-  <p:cSld>
-    <p:spTree>
-      <p:nvGrpSpPr>
-        <p:cNvPr id="1" name=""/>
-        <p:cNvGrpSpPr/>
-        <p:nvPr/>
-      </p:nvGrpSpPr>
-      <p:grpSpPr>
-        <a:xfrm>
-          <a:off x="0" y="0"/>
-          <a:ext cx="0" cy="0"/>
-          <a:chOff x="0" y="0"/>
-          <a:chExt cx="0" cy="0"/>
-        </a:xfrm>
-      </p:grpSpPr>
-      <p:sp>
-        <p:nvSpPr>
-          <p:cNvPr id="2" name="Titre 1"/>
-          <p:cNvSpPr>
-            <a:spLocks noGrp="1"/>
-          </p:cNvSpPr>
-          <p:nvPr>
-            <p:ph type="title"/>
-          </p:nvPr>
-        </p:nvSpPr>
-        <p:spPr/>
-        <p:txBody>
-          <a:bodyPr/>
-          <a:lstStyle/>
-          <a:p>
-            <a:r>
-              <a:rPr lang="en-US" dirty="0" smtClean="0"/>
-              <a:t>IOT: </a:t>
-            </a:r>
-            <a:r>
-              <a:rPr lang="en-US" dirty="0" err="1" smtClean="0"/>
-              <a:t>WebSockets</a:t>
-            </a:r>
-            <a:endParaRPr lang="en-US" dirty="0"/>
-          </a:p>
-        </p:txBody>
-      </p:sp>
-      <p:sp>
-        <p:nvSpPr>
-          <p:cNvPr id="3" name="Espace réservé du contenu 2"/>
-          <p:cNvSpPr>
-            <a:spLocks noGrp="1"/>
-          </p:cNvSpPr>
-          <p:nvPr>
-            <p:ph idx="1"/>
-          </p:nvPr>
-        </p:nvSpPr>
-        <p:spPr>
-          <a:xfrm>
-            <a:off x="143915" y="1032558"/>
-            <a:ext cx="8775700" cy="2225620"/>
-          </a:xfrm>
-        </p:spPr>
-        <p:txBody>
-          <a:bodyPr/>
-          <a:lstStyle/>
-          <a:p>
-            <a:r>
-              <a:rPr lang="en-US" dirty="0" smtClean="0"/>
-              <a:t>New HTML5 feature providing:</a:t>
-            </a:r>
-          </a:p>
-          <a:p>
-            <a:pPr lvl="1"/>
-            <a:r>
-              <a:rPr lang="en-US" dirty="0" smtClean="0"/>
-              <a:t>Full-duplex communication over a single TCP socket</a:t>
-            </a:r>
-          </a:p>
-          <a:p>
-            <a:pPr lvl="1"/>
-            <a:r>
-              <a:rPr lang="en-US" dirty="0" smtClean="0"/>
-              <a:t>Overhead reduction</a:t>
-            </a:r>
-          </a:p>
-          <a:p>
-            <a:pPr lvl="1"/>
-            <a:r>
-              <a:rPr lang="en-US" dirty="0" smtClean="0"/>
-              <a:t>Less traffic</a:t>
-            </a:r>
-          </a:p>
-          <a:p>
-            <a:pPr lvl="1"/>
-            <a:r>
-              <a:rPr lang="en-US" dirty="0" smtClean="0"/>
-              <a:t>Standard and secure connections (</a:t>
-            </a:r>
-            <a:r>
-              <a:rPr lang="en-US" dirty="0" err="1" smtClean="0"/>
-              <a:t>ws</a:t>
-            </a:r>
-            <a:r>
-              <a:rPr lang="en-US" dirty="0" smtClean="0"/>
-              <a:t>:// and </a:t>
-            </a:r>
-            <a:r>
-              <a:rPr lang="en-US" dirty="0" err="1" smtClean="0"/>
-              <a:t>wss</a:t>
-            </a:r>
-            <a:r>
-              <a:rPr lang="en-US" dirty="0" smtClean="0"/>
-              <a:t>:// URL</a:t>
-            </a:r>
-            <a:r>
-              <a:rPr lang="en-US" dirty="0" smtClean="0"/>
-              <a:t>)</a:t>
-            </a:r>
-          </a:p>
-          <a:p>
-            <a:pPr>
-              <a:buNone/>
-            </a:pPr>
-            <a:endParaRPr lang="en-US" dirty="0" smtClean="0"/>
-          </a:p>
-          <a:p>
-            <a:pPr>
-              <a:buNone/>
-            </a:pPr>
-            <a:endParaRPr lang="en-US" dirty="0" smtClean="0"/>
-          </a:p>
-          <a:p>
-            <a:r>
-              <a:rPr lang="en-US" dirty="0" smtClean="0"/>
-              <a:t>Why a such new feature ?</a:t>
-            </a:r>
-          </a:p>
-          <a:p>
-            <a:pPr lvl="1"/>
-            <a:r>
-              <a:rPr lang="en-US" dirty="0" smtClean="0"/>
-              <a:t>Replace </a:t>
-            </a:r>
-            <a:r>
-              <a:rPr lang="en-US" dirty="0" smtClean="0"/>
-              <a:t>all existing polling techniques (AJAX)</a:t>
-            </a:r>
-          </a:p>
-          <a:p>
-            <a:pPr lvl="1"/>
-            <a:r>
-              <a:rPr lang="en-US" dirty="0" smtClean="0"/>
-              <a:t>Allow a real server-push </a:t>
-            </a:r>
-            <a:r>
-              <a:rPr lang="en-US" dirty="0" smtClean="0"/>
-              <a:t>mechanism</a:t>
-            </a:r>
-            <a:endParaRPr lang="en-US" dirty="0"/>
-          </a:p>
-        </p:txBody>
-      </p:sp>
-      <p:pic>
-        <p:nvPicPr>
-          <p:cNvPr id="4098" name="Picture 2" descr="C:\Users\samux\Desktop\ARM-internship-report\presentation_en\html5-1-A.jpg"/>
-          <p:cNvPicPr>
-            <a:picLocks noChangeAspect="1" noChangeArrowheads="1"/>
-          </p:cNvPicPr>
-          <p:nvPr/>
-        </p:nvPicPr>
-        <p:blipFill>
-          <a:blip r:embed="rId2"/>
-          <a:srcRect/>
-          <a:stretch>
-            <a:fillRect/>
-          </a:stretch>
-        </p:blipFill>
-        <p:spPr bwMode="auto">
-          <a:xfrm>
-            <a:off x="6962074" y="923808"/>
-            <a:ext cx="2054535" cy="1388468"/>
-          </a:xfrm>
-          <a:prstGeom prst="rect">
-            <a:avLst/>
-          </a:prstGeom>
-          <a:noFill/>
-        </p:spPr>
-      </p:pic>
-    </p:spTree>
-  </p:cSld>
-  <p:clrMapOvr>
-    <a:masterClrMapping/>
-  </p:clrMapOvr>
-  <p:timing>
-    <p:tnLst>
-      <p:par>
-        <p:cTn id="1" dur="indefinite" restart="never" nodeType="tmRoot"/>
-      </p:par>
-    </p:tnLst>
-  </p:timing>
-</p:sld>
-</file>
-
 <file path=ppt/slides/slide6.xml><?xml version="1.0" encoding="utf-8"?>
 <p:sld xmlns:a="http://schemas.openxmlformats.org/drawingml/2006/main" xmlns:r="http://schemas.openxmlformats.org/officeDocument/2006/relationships" xmlns:p="http://schemas.openxmlformats.org/presentationml/2006/main">
   <p:cSld>
@@ -11202,9 +10769,125 @@
           </a:p>
         </p:txBody>
       </p:sp>
+      <p:sp>
+        <p:nvSpPr>
+          <p:cNvPr id="3" name="Espace réservé du contenu 2"/>
+          <p:cNvSpPr>
+            <a:spLocks noGrp="1"/>
+          </p:cNvSpPr>
+          <p:nvPr>
+            <p:ph idx="1"/>
+          </p:nvPr>
+        </p:nvSpPr>
+        <p:spPr>
+          <a:xfrm>
+            <a:off x="143915" y="1032558"/>
+            <a:ext cx="8775700" cy="2225620"/>
+          </a:xfrm>
+        </p:spPr>
+        <p:txBody>
+          <a:bodyPr/>
+          <a:lstStyle/>
+          <a:p>
+            <a:r>
+              <a:rPr lang="en-US" dirty="0" smtClean="0"/>
+              <a:t>New HTML5 feature </a:t>
+            </a:r>
+            <a:r>
+              <a:rPr lang="en-US" dirty="0" smtClean="0"/>
+              <a:t>(RFC 6455) providing</a:t>
+            </a:r>
+            <a:r>
+              <a:rPr lang="en-US" dirty="0" smtClean="0"/>
+              <a:t>:</a:t>
+            </a:r>
+          </a:p>
+          <a:p>
+            <a:pPr lvl="1"/>
+            <a:r>
+              <a:rPr lang="en-US" dirty="0" smtClean="0"/>
+              <a:t>Full-duplex communication over a single TCP socket</a:t>
+            </a:r>
+          </a:p>
+          <a:p>
+            <a:pPr lvl="1"/>
+            <a:r>
+              <a:rPr lang="en-US" dirty="0" smtClean="0"/>
+              <a:t>Overhead reduction</a:t>
+            </a:r>
+          </a:p>
+          <a:p>
+            <a:pPr lvl="1"/>
+            <a:r>
+              <a:rPr lang="en-US" dirty="0" smtClean="0"/>
+              <a:t>Less traffic</a:t>
+            </a:r>
+          </a:p>
+          <a:p>
+            <a:pPr lvl="1"/>
+            <a:r>
+              <a:rPr lang="en-US" dirty="0" smtClean="0"/>
+              <a:t>Standard and secure connections (</a:t>
+            </a:r>
+            <a:r>
+              <a:rPr lang="en-US" dirty="0" err="1" smtClean="0"/>
+              <a:t>ws</a:t>
+            </a:r>
+            <a:r>
+              <a:rPr lang="en-US" dirty="0" smtClean="0"/>
+              <a:t>:// and </a:t>
+            </a:r>
+            <a:r>
+              <a:rPr lang="en-US" dirty="0" err="1" smtClean="0"/>
+              <a:t>wss</a:t>
+            </a:r>
+            <a:r>
+              <a:rPr lang="en-US" dirty="0" smtClean="0"/>
+              <a:t>:// URL)</a:t>
+            </a:r>
+          </a:p>
+          <a:p>
+            <a:pPr>
+              <a:buNone/>
+            </a:pPr>
+            <a:endParaRPr lang="en-US" dirty="0" smtClean="0"/>
+          </a:p>
+          <a:p>
+            <a:pPr>
+              <a:buNone/>
+            </a:pPr>
+            <a:endParaRPr lang="en-US" dirty="0" smtClean="0"/>
+          </a:p>
+          <a:p>
+            <a:r>
+              <a:rPr lang="en-US" dirty="0" smtClean="0"/>
+              <a:t>Why a such new feature ?</a:t>
+            </a:r>
+          </a:p>
+          <a:p>
+            <a:pPr lvl="1"/>
+            <a:r>
+              <a:rPr lang="en-US" dirty="0" smtClean="0"/>
+              <a:t>Replace all existing polling techniques (AJAX</a:t>
+            </a:r>
+            <a:r>
+              <a:rPr lang="en-US" dirty="0" smtClean="0"/>
+              <a:t>)</a:t>
+            </a:r>
+          </a:p>
+          <a:p>
+            <a:pPr lvl="1"/>
+            <a:r>
+              <a:rPr lang="en-US" dirty="0" smtClean="0"/>
+              <a:t>Need a two-way communication without multiple HTTP connections</a:t>
+            </a:r>
+            <a:endParaRPr lang="en-US" dirty="0"/>
+          </a:p>
+        </p:txBody>
+      </p:sp>
       <p:pic>
         <p:nvPicPr>
-          <p:cNvPr id="2050" name="Picture 2" descr="C:\Users\samux\Desktop\ARM-internship-report\report\ws_poll.jpg"/>
+          <p:cNvPr id="4098" name="Picture 2" descr="C:\Users\samux\Desktop\ARM-internship-report\presentation_en\html5-1-A.jpg"/>
           <p:cNvPicPr>
             <a:picLocks noChangeAspect="1" noChangeArrowheads="1"/>
           </p:cNvPicPr>
@@ -11219,8 +10902,8 @@
         </p:blipFill>
         <p:spPr bwMode="auto">
           <a:xfrm>
-            <a:off x="2228193" y="992636"/>
-            <a:ext cx="4599106" cy="3285075"/>
+            <a:off x="6962074" y="923808"/>
+            <a:ext cx="2054535" cy="1388468"/>
           </a:xfrm>
           <a:prstGeom prst="rect">
             <a:avLst/>
@@ -11228,51 +10911,6 @@
           <a:noFill/>
         </p:spPr>
       </p:pic>
-      <p:sp>
-        <p:nvSpPr>
-          <p:cNvPr id="6" name="Espace réservé du contenu 2"/>
-          <p:cNvSpPr>
-            <a:spLocks noGrp="1"/>
-          </p:cNvSpPr>
-          <p:nvPr>
-            <p:ph idx="1"/>
-          </p:nvPr>
-        </p:nvSpPr>
-        <p:spPr>
-          <a:xfrm>
-            <a:off x="574840" y="4632380"/>
-            <a:ext cx="8775700" cy="2225620"/>
-          </a:xfrm>
-        </p:spPr>
-        <p:txBody>
-          <a:bodyPr/>
-          <a:lstStyle/>
-          <a:p>
-            <a:r>
-              <a:rPr lang="en-US" dirty="0" smtClean="0"/>
-              <a:t>Once the connection is established:</a:t>
-            </a:r>
-          </a:p>
-          <a:p>
-            <a:pPr lvl="1"/>
-            <a:r>
-              <a:rPr lang="en-US" dirty="0" smtClean="0"/>
-              <a:t>Messages can flow between browser and server</a:t>
-            </a:r>
-          </a:p>
-          <a:p>
-            <a:pPr lvl="1"/>
-            <a:r>
-              <a:rPr lang="en-US" dirty="0" smtClean="0"/>
-              <a:t>No need to send a request to the server to receive a data</a:t>
-            </a:r>
-          </a:p>
-          <a:p>
-            <a:pPr lvl="1"/>
-            <a:endParaRPr lang="en-US" dirty="0" smtClean="0"/>
-          </a:p>
-        </p:txBody>
-      </p:sp>
     </p:spTree>
   </p:cSld>
   <p:clrMapOvr>
@@ -11865,81 +11503,28 @@
             <p:ph type="title"/>
           </p:nvPr>
         </p:nvSpPr>
-        <p:spPr/>
+        <p:spPr>
+          <a:xfrm>
+            <a:off x="196468" y="2467359"/>
+            <a:ext cx="8777287" cy="838200"/>
+          </a:xfrm>
+        </p:spPr>
         <p:txBody>
           <a:bodyPr/>
           <a:lstStyle/>
           <a:p>
-            <a:r>
-              <a:rPr lang="en-US" dirty="0" smtClean="0"/>
-              <a:t>IOT: connecting sensors to the cloud</a:t>
-            </a:r>
-            <a:endParaRPr lang="en-US" dirty="0"/>
-          </a:p>
-        </p:txBody>
-      </p:sp>
-      <p:sp>
-        <p:nvSpPr>
-          <p:cNvPr id="3" name="Espace réservé du contenu 2"/>
-          <p:cNvSpPr>
-            <a:spLocks noGrp="1"/>
-          </p:cNvSpPr>
-          <p:nvPr>
-            <p:ph idx="1"/>
-          </p:nvPr>
-        </p:nvSpPr>
-        <p:spPr/>
-        <p:txBody>
-          <a:bodyPr/>
-          <a:lstStyle/>
-          <a:p>
-            <a:r>
-              <a:rPr lang="en-US" dirty="0" smtClean="0"/>
-              <a:t>Purpose of this project:</a:t>
-            </a:r>
-          </a:p>
-          <a:p>
-            <a:pPr lvl="1"/>
-            <a:r>
-              <a:rPr lang="en-US" dirty="0" smtClean="0"/>
-              <a:t>Access sensor data all over the world</a:t>
-            </a:r>
-          </a:p>
-          <a:p>
-            <a:pPr lvl="1"/>
-            <a:r>
-              <a:rPr lang="en-US" dirty="0" smtClean="0"/>
-              <a:t>Display real-time graphs</a:t>
-            </a:r>
-          </a:p>
-          <a:p>
-            <a:pPr lvl="1"/>
-            <a:r>
-              <a:rPr lang="en-US" dirty="0" smtClean="0"/>
-              <a:t>Using </a:t>
-            </a:r>
-            <a:r>
-              <a:rPr lang="en-US" dirty="0" err="1" smtClean="0"/>
-              <a:t>WebSockets</a:t>
-            </a:r>
-            <a:r>
-              <a:rPr lang="en-US" dirty="0" smtClean="0"/>
-              <a:t> for more efficiency</a:t>
-            </a:r>
-          </a:p>
-          <a:p>
-            <a:pPr lvl="1"/>
-            <a:r>
-              <a:rPr lang="en-US" dirty="0" smtClean="0"/>
-              <a:t>Using the new </a:t>
-            </a:r>
-            <a:r>
-              <a:rPr lang="en-US" dirty="0" err="1" smtClean="0"/>
-              <a:t>mbed</a:t>
-            </a:r>
-            <a:r>
-              <a:rPr lang="en-US" dirty="0" smtClean="0"/>
-              <a:t> Cortex M0 board</a:t>
+            <a:pPr algn="ctr"/>
+            <a:r>
+              <a:rPr lang="en-US" dirty="0" smtClean="0"/>
+              <a:t>C</a:t>
+            </a:r>
+            <a:r>
+              <a:rPr lang="en-US" dirty="0" smtClean="0"/>
+              <a:t>onnecting </a:t>
+            </a:r>
+            <a:r>
+              <a:rPr lang="en-US" dirty="0" smtClean="0"/>
+              <a:t>sensors to the cloud</a:t>
             </a:r>
             <a:endParaRPr lang="en-US" dirty="0"/>
           </a:p>
@@ -11962,8 +11547,8 @@
         </p:blipFill>
         <p:spPr bwMode="auto">
           <a:xfrm>
-            <a:off x="2005159" y="3331779"/>
-            <a:ext cx="4961941" cy="2301766"/>
+            <a:off x="2659114" y="4042850"/>
+            <a:ext cx="3519707" cy="1632736"/>
           </a:xfrm>
           <a:prstGeom prst="rect">
             <a:avLst/>

</xml_diff>

<commit_message>
add some minor modif to the slides
</commit_message>
<xml_diff>
--- a/presentation_en/pres.pptx
+++ b/presentation_en/pres.pptx
@@ -3294,7 +3294,11 @@
             </a:br>
             <a:r>
               <a:rPr lang="en-GB" sz="4000" dirty="0" smtClean="0"/>
-              <a:t>From the cloud to a global connectivity</a:t>
+              <a:t>From </a:t>
+            </a:r>
+            <a:r>
+              <a:rPr lang="en-GB" sz="4000" dirty="0" smtClean="0"/>
+              <a:t>a local connectivity to the cloud</a:t>
             </a:r>
             <a:endParaRPr lang="en-GB" sz="4000" i="1" dirty="0"/>
           </a:p>
@@ -3460,32 +3464,6 @@
           </a:p>
         </p:txBody>
       </p:sp>
-      <p:pic>
-        <p:nvPicPr>
-          <p:cNvPr id="4098" name="Picture 2" descr="C:\Users\samux\Desktop\ARM-internship-report\report\env_board.png"/>
-          <p:cNvPicPr>
-            <a:picLocks noChangeAspect="1" noChangeArrowheads="1"/>
-          </p:cNvPicPr>
-          <p:nvPr/>
-        </p:nvPicPr>
-        <p:blipFill>
-          <a:blip r:embed="rId2"/>
-          <a:srcRect/>
-          <a:stretch>
-            <a:fillRect/>
-          </a:stretch>
-        </p:blipFill>
-        <p:spPr bwMode="auto">
-          <a:xfrm>
-            <a:off x="721054" y="1508890"/>
-            <a:ext cx="3120862" cy="2390448"/>
-          </a:xfrm>
-          <a:prstGeom prst="rect">
-            <a:avLst/>
-          </a:prstGeom>
-          <a:noFill/>
-        </p:spPr>
-      </p:pic>
       <p:sp>
         <p:nvSpPr>
           <p:cNvPr id="6" name="Espace réservé du contenu 2"/>
@@ -3733,6 +3711,58 @@
           </a:p>
         </p:txBody>
       </p:sp>
+      <p:pic>
+        <p:nvPicPr>
+          <p:cNvPr id="2051" name="Picture 3" descr="C:\Users\samux\Desktop\ARM-internship-report\report\acc_board_component.jpg"/>
+          <p:cNvPicPr>
+            <a:picLocks noChangeAspect="1" noChangeArrowheads="1"/>
+          </p:cNvPicPr>
+          <p:nvPr/>
+        </p:nvPicPr>
+        <p:blipFill>
+          <a:blip r:embed="rId2"/>
+          <a:srcRect/>
+          <a:stretch>
+            <a:fillRect/>
+          </a:stretch>
+        </p:blipFill>
+        <p:spPr bwMode="auto">
+          <a:xfrm>
+            <a:off x="5361919" y="1236663"/>
+            <a:ext cx="2562882" cy="2734237"/>
+          </a:xfrm>
+          <a:prstGeom prst="rect">
+            <a:avLst/>
+          </a:prstGeom>
+          <a:noFill/>
+        </p:spPr>
+      </p:pic>
+      <p:pic>
+        <p:nvPicPr>
+          <p:cNvPr id="2052" name="Picture 4" descr="C:\Users\samux\Desktop\ARM-internship-report\report\env_board.png"/>
+          <p:cNvPicPr>
+            <a:picLocks noChangeAspect="1" noChangeArrowheads="1"/>
+          </p:cNvPicPr>
+          <p:nvPr/>
+        </p:nvPicPr>
+        <p:blipFill>
+          <a:blip r:embed="rId3"/>
+          <a:srcRect/>
+          <a:stretch>
+            <a:fillRect/>
+          </a:stretch>
+        </p:blipFill>
+        <p:spPr bwMode="auto">
+          <a:xfrm>
+            <a:off x="1088476" y="1435100"/>
+            <a:ext cx="3147192" cy="2410615"/>
+          </a:xfrm>
+          <a:prstGeom prst="rect">
+            <a:avLst/>
+          </a:prstGeom>
+          <a:noFill/>
+        </p:spPr>
+      </p:pic>
     </p:spTree>
   </p:cSld>
   <p:clrMapOvr>
@@ -4404,11 +4434,7 @@
             <a:pPr algn="ctr"/>
             <a:r>
               <a:rPr lang="en-US" dirty="0" smtClean="0"/>
-              <a:t>RPC </a:t>
-            </a:r>
-            <a:r>
-              <a:rPr lang="en-US" dirty="0" smtClean="0"/>
-              <a:t>over </a:t>
+              <a:t>RPC over </a:t>
             </a:r>
             <a:r>
               <a:rPr lang="en-US" dirty="0" err="1" smtClean="0"/>
@@ -4633,11 +4659,25 @@
               <a:defRPr/>
             </a:pPr>
             <a:r>
+              <a:rPr lang="en-US" sz="1800" b="0" kern="0" noProof="0" dirty="0" err="1" smtClean="0">
+                <a:latin typeface="+mn-lt"/>
+                <a:ea typeface="+mn-ea"/>
+              </a:rPr>
+              <a:t>Subnetwork</a:t>
+            </a:r>
+            <a:r>
               <a:rPr lang="en-US" sz="1800" b="0" kern="0" noProof="0" dirty="0" smtClean="0">
                 <a:latin typeface="+mn-lt"/>
                 <a:ea typeface="+mn-ea"/>
               </a:rPr>
-              <a:t>Sub-networks organization</a:t>
+              <a:t> </a:t>
+            </a:r>
+            <a:r>
+              <a:rPr lang="en-US" sz="1800" b="0" kern="0" noProof="0" dirty="0" smtClean="0">
+                <a:latin typeface="+mn-lt"/>
+                <a:ea typeface="+mn-ea"/>
+              </a:rPr>
+              <a:t>organization</a:t>
             </a:r>
           </a:p>
           <a:p>
@@ -4692,7 +4732,41 @@
                 <a:ea typeface="+mn-ea"/>
                 <a:cs typeface="+mn-cs"/>
               </a:rPr>
-              <a:t> each sub-network, an </a:t>
+              <a:t> each </a:t>
+            </a:r>
+            <a:r>
+              <a:rPr kumimoji="0" lang="en-US" sz="1800" b="0" i="0" u="none" strike="noStrike" kern="0" cap="none" spc="0" normalizeH="0" dirty="0" err="1" smtClean="0">
+                <a:ln>
+                  <a:noFill/>
+                </a:ln>
+                <a:solidFill>
+                  <a:srgbClr val="000000"/>
+                </a:solidFill>
+                <a:effectLst/>
+                <a:uLnTx/>
+                <a:uFillTx/>
+                <a:latin typeface="+mn-lt"/>
+                <a:ea typeface="+mn-ea"/>
+                <a:cs typeface="+mn-cs"/>
+              </a:rPr>
+              <a:t>subnetwork</a:t>
+            </a:r>
+            <a:r>
+              <a:rPr kumimoji="0" lang="en-US" sz="1800" b="0" i="0" u="none" strike="noStrike" kern="0" cap="none" spc="0" normalizeH="0" dirty="0" smtClean="0">
+                <a:ln>
+                  <a:noFill/>
+                </a:ln>
+                <a:solidFill>
+                  <a:srgbClr val="000000"/>
+                </a:solidFill>
+                <a:effectLst/>
+                <a:uLnTx/>
+                <a:uFillTx/>
+                <a:latin typeface="+mn-lt"/>
+                <a:ea typeface="+mn-ea"/>
+                <a:cs typeface="+mn-cs"/>
+              </a:rPr>
+              <a:t>, an </a:t>
             </a:r>
             <a:r>
               <a:rPr kumimoji="0" lang="en-US" sz="1800" b="0" i="0" u="none" strike="noStrike" kern="0" cap="none" spc="0" normalizeH="0" dirty="0" err="1" smtClean="0">
@@ -5693,7 +5767,23 @@
                   <a:srgbClr val="FF0000"/>
                 </a:solidFill>
               </a:rPr>
-              <a:t>&lt;sub-network&gt;</a:t>
+              <a:t>&lt;</a:t>
+            </a:r>
+            <a:r>
+              <a:rPr lang="fr-FR" i="1" dirty="0" smtClean="0">
+                <a:solidFill>
+                  <a:srgbClr val="FF0000"/>
+                </a:solidFill>
+              </a:rPr>
+              <a:t>subnetwork</a:t>
+            </a:r>
+            <a:r>
+              <a:rPr lang="fr-FR" i="1" dirty="0" smtClean="0">
+                <a:solidFill>
+                  <a:srgbClr val="FF0000"/>
+                </a:solidFill>
+              </a:rPr>
+              <a:t>&gt;</a:t>
             </a:r>
             <a:r>
               <a:rPr lang="fr-FR" i="1" dirty="0" smtClean="0"/>
@@ -6702,7 +6792,11 @@
             </a:pPr>
             <a:r>
               <a:rPr lang="en-US" dirty="0" err="1" smtClean="0"/>
-              <a:t>WebSockets</a:t>
+              <a:t>WebSocket</a:t>
+            </a:r>
+            <a:r>
+              <a:rPr lang="en-US" dirty="0" smtClean="0"/>
+              <a:t>: new HTML5 feature</a:t>
             </a:r>
             <a:endParaRPr lang="en-US" dirty="0" smtClean="0"/>
           </a:p>
@@ -7509,7 +7603,7 @@
       </p:sp>
       <p:pic>
         <p:nvPicPr>
-          <p:cNvPr id="2050" name="Picture 2" descr="C:\Users\samux\Desktop\ARM-internship-report\report\endpoint.jpg"/>
+          <p:cNvPr id="3074" name="Picture 2" descr="C:\Users\samux\Desktop\ARM-internship-report\report\endpoints.jpg"/>
           <p:cNvPicPr>
             <a:picLocks noChangeAspect="1" noChangeArrowheads="1"/>
           </p:cNvPicPr>
@@ -7524,8 +7618,8 @@
         </p:blipFill>
         <p:spPr bwMode="auto">
           <a:xfrm>
-            <a:off x="546532" y="2059206"/>
-            <a:ext cx="7897620" cy="4201566"/>
+            <a:off x="497818" y="2207777"/>
+            <a:ext cx="7742181" cy="3882803"/>
           </a:xfrm>
           <a:prstGeom prst="rect">
             <a:avLst/>
@@ -9142,10 +9236,10 @@
         </p:nvGrpSpPr>
         <p:grpSpPr bwMode="auto">
           <a:xfrm>
-            <a:off x="313339" y="1682202"/>
-            <a:ext cx="8501063" cy="4262438"/>
+            <a:off x="313339" y="1682201"/>
+            <a:ext cx="8189916" cy="4121150"/>
             <a:chOff x="249" y="1162"/>
-            <a:chExt cx="5355" cy="2685"/>
+            <a:chExt cx="5159" cy="2596"/>
           </a:xfrm>
         </p:grpSpPr>
         <p:grpSp>
@@ -9158,10 +9252,10 @@
           </p:nvGrpSpPr>
           <p:grpSpPr bwMode="auto">
             <a:xfrm>
-              <a:off x="3969" y="1162"/>
-              <a:ext cx="1635" cy="1145"/>
-              <a:chOff x="3878" y="1162"/>
-              <a:chExt cx="1635" cy="1145"/>
+              <a:off x="4196" y="1162"/>
+              <a:ext cx="1179" cy="1147"/>
+              <a:chOff x="4105" y="1162"/>
+              <a:chExt cx="1179" cy="1147"/>
             </a:xfrm>
           </p:grpSpPr>
           <p:pic>
@@ -9208,8 +9302,8 @@
             </p:nvSpPr>
             <p:spPr bwMode="auto">
               <a:xfrm>
-                <a:off x="3878" y="2115"/>
-                <a:ext cx="1635" cy="192"/>
+                <a:off x="4202" y="2115"/>
+                <a:ext cx="988" cy="194"/>
               </a:xfrm>
               <a:prstGeom prst="rect">
                 <a:avLst/>
@@ -9230,110 +9324,68 @@
               <a:lstStyle/>
               <a:p>
                 <a:r>
-                  <a:rPr lang="en-GB" sz="1400" b="1"/>
-                  <a:t>Lightweight Online Compiler</a:t>
+                  <a:rPr lang="en-GB" sz="1400" b="1" dirty="0" smtClean="0"/>
+                  <a:t>Online </a:t>
+                </a:r>
+                <a:r>
+                  <a:rPr lang="en-GB" sz="1400" b="1" dirty="0"/>
+                  <a:t>Compiler</a:t>
                 </a:r>
               </a:p>
             </p:txBody>
           </p:sp>
         </p:grpSp>
-        <p:grpSp>
-          <p:nvGrpSpPr>
-            <p:cNvPr id="7" name="Group 22"/>
-            <p:cNvGrpSpPr>
-              <a:grpSpLocks/>
-            </p:cNvGrpSpPr>
+        <p:sp>
+          <p:nvSpPr>
+            <p:cNvPr id="24" name="Text Box 14"/>
+            <p:cNvSpPr txBox="1">
+              <a:spLocks noChangeArrowheads="1"/>
+            </p:cNvSpPr>
             <p:nvPr/>
-          </p:nvGrpSpPr>
-          <p:grpSpPr bwMode="auto">
+          </p:nvSpPr>
+          <p:spPr bwMode="auto">
             <a:xfrm>
-              <a:off x="4105" y="2614"/>
-              <a:ext cx="1431" cy="1233"/>
-              <a:chOff x="3969" y="2523"/>
-              <a:chExt cx="1431" cy="1233"/>
+              <a:off x="328" y="1962"/>
+              <a:ext cx="1544" cy="330"/>
             </a:xfrm>
-          </p:grpSpPr>
-          <p:pic>
-            <p:nvPicPr>
-              <p:cNvPr id="23" name="Picture 13" descr="mbed-microcontroller-angled"/>
-              <p:cNvPicPr>
-                <a:picLocks noChangeAspect="1" noChangeArrowheads="1"/>
-              </p:cNvPicPr>
-              <p:nvPr/>
-            </p:nvPicPr>
-            <p:blipFill>
-              <a:blip r:embed="rId3"/>
-              <a:srcRect l="1071" r="1071"/>
-              <a:stretch>
-                <a:fillRect/>
-              </a:stretch>
-            </p:blipFill>
-            <p:spPr bwMode="auto">
-              <a:xfrm>
-                <a:off x="4059" y="2523"/>
-                <a:ext cx="1198" cy="933"/>
-              </a:xfrm>
-              <a:prstGeom prst="rect">
-                <a:avLst/>
-              </a:prstGeom>
+            <a:prstGeom prst="rect">
+              <a:avLst/>
+            </a:prstGeom>
+            <a:noFill/>
+            <a:ln w="9525">
               <a:noFill/>
-              <a:ln w="9525">
-                <a:solidFill>
-                  <a:schemeClr val="tx1"/>
-                </a:solidFill>
-                <a:miter lim="800000"/>
-                <a:headEnd/>
-                <a:tailEnd/>
-              </a:ln>
-            </p:spPr>
-          </p:pic>
-          <p:sp>
-            <p:nvSpPr>
-              <p:cNvPr id="24" name="Text Box 14"/>
-              <p:cNvSpPr txBox="1">
-                <a:spLocks noChangeArrowheads="1"/>
-              </p:cNvSpPr>
-              <p:nvPr/>
-            </p:nvSpPr>
-            <p:spPr bwMode="auto">
-              <a:xfrm>
-                <a:off x="3969" y="3430"/>
-                <a:ext cx="1431" cy="326"/>
-              </a:xfrm>
-              <a:prstGeom prst="rect">
-                <a:avLst/>
-              </a:prstGeom>
-              <a:noFill/>
-              <a:ln w="9525">
-                <a:noFill/>
-                <a:miter lim="800000"/>
-                <a:headEnd/>
-                <a:tailEnd/>
-              </a:ln>
-              <a:effectLst/>
-            </p:spPr>
-            <p:txBody>
-              <a:bodyPr wrap="none">
-                <a:spAutoFit/>
-              </a:bodyPr>
-              <a:lstStyle/>
-              <a:p>
-                <a:pPr algn="ctr"/>
-                <a:r>
-                  <a:rPr lang="en-GB" sz="1400" b="1"/>
-                  <a:t>Cortex-M3 MCU in a </a:t>
-                </a:r>
-                <a:br>
-                  <a:rPr lang="en-GB" sz="1400" b="1"/>
-                </a:br>
-                <a:r>
-                  <a:rPr lang="en-GB" sz="1400" b="1"/>
-                  <a:t>Prototyping Form-Factor</a:t>
-                </a:r>
-              </a:p>
-            </p:txBody>
-          </p:sp>
-        </p:grpSp>
+              <a:miter lim="800000"/>
+              <a:headEnd/>
+              <a:tailEnd/>
+            </a:ln>
+            <a:effectLst/>
+          </p:spPr>
+          <p:txBody>
+            <a:bodyPr wrap="none">
+              <a:spAutoFit/>
+            </a:bodyPr>
+            <a:lstStyle/>
+            <a:p>
+              <a:pPr algn="ctr"/>
+              <a:r>
+                <a:rPr lang="en-GB" sz="1400" b="1" dirty="0"/>
+                <a:t>Cortex-M3 </a:t>
+              </a:r>
+              <a:r>
+                <a:rPr lang="en-GB" sz="1400" b="1" dirty="0" smtClean="0"/>
+                <a:t> and Cortex-M0 </a:t>
+              </a:r>
+            </a:p>
+            <a:p>
+              <a:pPr algn="ctr"/>
+              <a:r>
+                <a:rPr lang="en-GB" sz="1400" b="1" dirty="0" smtClean="0"/>
+                <a:t>boards</a:t>
+              </a:r>
+              <a:endParaRPr lang="en-GB" sz="1400" b="1" dirty="0"/>
+            </a:p>
+          </p:txBody>
+        </p:sp>
         <p:grpSp>
           <p:nvGrpSpPr>
             <p:cNvPr id="8" name="Group 19"/>
@@ -9344,10 +9396,10 @@
           </p:nvGrpSpPr>
           <p:grpSpPr bwMode="auto">
             <a:xfrm>
-              <a:off x="431" y="1162"/>
-              <a:ext cx="1270" cy="1278"/>
-              <a:chOff x="340" y="2387"/>
-              <a:chExt cx="1270" cy="1278"/>
+              <a:off x="4138" y="2456"/>
+              <a:ext cx="1270" cy="1299"/>
+              <a:chOff x="4047" y="3681"/>
+              <a:chExt cx="1270" cy="1299"/>
             </a:xfrm>
           </p:grpSpPr>
           <p:pic>
@@ -9359,7 +9411,7 @@
               <p:nvPr/>
             </p:nvPicPr>
             <p:blipFill>
-              <a:blip r:embed="rId4"/>
+              <a:blip r:embed="rId3"/>
               <a:srcRect b="1219"/>
               <a:stretch>
                 <a:fillRect/>
@@ -9367,7 +9419,7 @@
             </p:blipFill>
             <p:spPr bwMode="auto">
               <a:xfrm>
-                <a:off x="385" y="2387"/>
+                <a:off x="4092" y="3681"/>
                 <a:ext cx="1179" cy="923"/>
               </a:xfrm>
               <a:prstGeom prst="rect">
@@ -9395,7 +9447,7 @@
             </p:nvSpPr>
             <p:spPr bwMode="auto">
               <a:xfrm>
-                <a:off x="340" y="3339"/>
+                <a:off x="4047" y="4654"/>
                 <a:ext cx="1270" cy="326"/>
               </a:xfrm>
               <a:prstGeom prst="rect">
@@ -9418,14 +9470,14 @@
               <a:p>
                 <a:pPr algn="ctr"/>
                 <a:r>
-                  <a:rPr lang="en-GB" sz="1400" b="1"/>
+                  <a:rPr lang="en-GB" sz="1400" b="1" dirty="0"/>
                   <a:t>Dedicated Developer</a:t>
                 </a:r>
                 <a:br>
-                  <a:rPr lang="en-GB" sz="1400" b="1"/>
+                  <a:rPr lang="en-GB" sz="1400" b="1" dirty="0"/>
                 </a:br>
                 <a:r>
-                  <a:rPr lang="en-GB" sz="1400" b="1"/>
+                  <a:rPr lang="en-GB" sz="1400" b="1" dirty="0"/>
                   <a:t>Web Platform</a:t>
                 </a:r>
               </a:p>
@@ -9457,7 +9509,7 @@
               <p:nvPr/>
             </p:nvPicPr>
             <p:blipFill>
-              <a:blip r:embed="rId5"/>
+              <a:blip r:embed="rId4"/>
               <a:srcRect b="1472"/>
               <a:stretch>
                 <a:fillRect/>
@@ -9797,7 +9849,7 @@
                 <p:nvPr/>
               </p:nvPicPr>
               <p:blipFill>
-                <a:blip r:embed="rId6"/>
+                <a:blip r:embed="rId5"/>
                 <a:srcRect/>
                 <a:stretch>
                   <a:fillRect/>
@@ -9853,6 +9905,37 @@
           </a:p>
         </p:txBody>
       </p:sp>
+      <p:pic>
+        <p:nvPicPr>
+          <p:cNvPr id="1026" name="Picture 2" descr="C:\Users\samux\Desktop\ARM-internship-report\report\both_mbed.jpg"/>
+          <p:cNvPicPr>
+            <a:picLocks noChangeAspect="1" noChangeArrowheads="1"/>
+          </p:cNvPicPr>
+          <p:nvPr/>
+        </p:nvPicPr>
+        <p:blipFill>
+          <a:blip r:embed="rId6"/>
+          <a:srcRect/>
+          <a:stretch>
+            <a:fillRect/>
+          </a:stretch>
+        </p:blipFill>
+        <p:spPr bwMode="auto">
+          <a:xfrm>
+            <a:off x="567452" y="1822741"/>
+            <a:ext cx="2162563" cy="1040523"/>
+          </a:xfrm>
+          <a:prstGeom prst="rect">
+            <a:avLst/>
+          </a:prstGeom>
+          <a:noFill/>
+          <a:ln>
+            <a:solidFill>
+              <a:schemeClr val="tx1"/>
+            </a:solidFill>
+          </a:ln>
+        </p:spPr>
+      </p:pic>
     </p:spTree>
   </p:cSld>
   <p:clrMapOvr>
@@ -10203,15 +10286,7 @@
             <a:pPr lvl="1"/>
             <a:r>
               <a:rPr lang="en-US" dirty="0" smtClean="0"/>
-              <a:t>Virtual </a:t>
-            </a:r>
-            <a:r>
-              <a:rPr lang="en-US" dirty="0" smtClean="0"/>
-              <a:t>s</a:t>
-            </a:r>
-            <a:r>
-              <a:rPr lang="en-US" dirty="0" smtClean="0"/>
-              <a:t>erial port</a:t>
+              <a:t>Virtual serial port</a:t>
             </a:r>
           </a:p>
           <a:p>
@@ -10791,15 +10866,7 @@
           <a:p>
             <a:r>
               <a:rPr lang="en-US" dirty="0" smtClean="0"/>
-              <a:t>New HTML5 feature </a:t>
-            </a:r>
-            <a:r>
-              <a:rPr lang="en-US" dirty="0" smtClean="0"/>
-              <a:t>(RFC 6455) providing</a:t>
-            </a:r>
-            <a:r>
-              <a:rPr lang="en-US" dirty="0" smtClean="0"/>
-              <a:t>:</a:t>
+              <a:t>New HTML5 feature (RFC 6455) providing:</a:t>
             </a:r>
           </a:p>
           <a:p>
@@ -10868,11 +10935,7 @@
             <a:pPr lvl="1"/>
             <a:r>
               <a:rPr lang="en-US" dirty="0" smtClean="0"/>
-              <a:t>Replace all existing polling techniques (AJAX</a:t>
-            </a:r>
-            <a:r>
-              <a:rPr lang="en-US" dirty="0" smtClean="0"/>
-              <a:t>)</a:t>
+              <a:t>Replace all existing polling techniques (AJAX)</a:t>
             </a:r>
           </a:p>
           <a:p>
@@ -11516,15 +11579,7 @@
             <a:pPr algn="ctr"/>
             <a:r>
               <a:rPr lang="en-US" dirty="0" smtClean="0"/>
-              <a:t>C</a:t>
-            </a:r>
-            <a:r>
-              <a:rPr lang="en-US" dirty="0" smtClean="0"/>
-              <a:t>onnecting </a:t>
-            </a:r>
-            <a:r>
-              <a:rPr lang="en-US" dirty="0" smtClean="0"/>
-              <a:t>sensors to the cloud</a:t>
+              <a:t>Connecting sensors to the cloud</a:t>
             </a:r>
             <a:endParaRPr lang="en-US" dirty="0"/>
           </a:p>
@@ -11547,8 +11602,8 @@
         </p:blipFill>
         <p:spPr bwMode="auto">
           <a:xfrm>
-            <a:off x="2659114" y="4042850"/>
-            <a:ext cx="3519707" cy="1632736"/>
+            <a:off x="2464413" y="3836277"/>
+            <a:ext cx="3987677" cy="1849820"/>
           </a:xfrm>
           <a:prstGeom prst="rect">
             <a:avLst/>

</xml_diff>